<commit_message>
Progress on tasking, processes to use templates ...
</commit_message>
<xml_diff>
--- a/Moose Training/Presentations/DCS World - MOOSE - Tasking - SEAD.pptx
+++ b/Moose Training/Presentations/DCS World - MOOSE - Tasking - SEAD.pptx
@@ -9,7 +9,8 @@
     <p:sldId id="261" r:id="rId3"/>
     <p:sldId id="333" r:id="rId4"/>
     <p:sldId id="332" r:id="rId5"/>
-    <p:sldId id="285" r:id="rId6"/>
+    <p:sldId id="334" r:id="rId6"/>
+    <p:sldId id="285" r:id="rId7"/>
   </p:sldIdLst>
   <p:sldSz cx="12192000" cy="6858000"/>
   <p:notesSz cx="6858000" cy="9144000"/>
@@ -292,7 +293,7 @@
           <a:p>
             <a:fld id="{96DFF08F-DC6B-4601-B491-B0F83F6DD2DA}" type="datetimeFigureOut">
               <a:rPr lang="en-US" dirty="0"/>
-              <a:t>7/30/2016</a:t>
+              <a:t>11/2/2016</a:t>
             </a:fld>
             <a:endParaRPr lang="en-US" dirty="0"/>
           </a:p>
@@ -526,7 +527,7 @@
           <a:p>
             <a:fld id="{96DFF08F-DC6B-4601-B491-B0F83F6DD2DA}" type="datetimeFigureOut">
               <a:rPr lang="en-US" dirty="0"/>
-              <a:t>7/30/2016</a:t>
+              <a:t>11/2/2016</a:t>
             </a:fld>
             <a:endParaRPr lang="en-US" dirty="0"/>
           </a:p>
@@ -756,7 +757,7 @@
           <a:p>
             <a:fld id="{96DFF08F-DC6B-4601-B491-B0F83F6DD2DA}" type="datetimeFigureOut">
               <a:rPr lang="en-US" dirty="0"/>
-              <a:t>7/30/2016</a:t>
+              <a:t>11/2/2016</a:t>
             </a:fld>
             <a:endParaRPr lang="en-US" dirty="0"/>
           </a:p>
@@ -995,7 +996,7 @@
           <a:p>
             <a:fld id="{96DFF08F-DC6B-4601-B491-B0F83F6DD2DA}" type="datetimeFigureOut">
               <a:rPr lang="en-US" dirty="0"/>
-              <a:t>7/30/2016</a:t>
+              <a:t>11/2/2016</a:t>
             </a:fld>
             <a:endParaRPr lang="en-US" dirty="0"/>
           </a:p>
@@ -1566,7 +1567,7 @@
           <a:p>
             <a:fld id="{96DFF08F-DC6B-4601-B491-B0F83F6DD2DA}" type="datetimeFigureOut">
               <a:rPr lang="en-US" dirty="0"/>
-              <a:t>7/30/2016</a:t>
+              <a:t>11/2/2016</a:t>
             </a:fld>
             <a:endParaRPr lang="en-US" dirty="0"/>
           </a:p>
@@ -1995,7 +1996,7 @@
           <a:p>
             <a:fld id="{96DFF08F-DC6B-4601-B491-B0F83F6DD2DA}" type="datetimeFigureOut">
               <a:rPr lang="en-US" dirty="0"/>
-              <a:t>7/30/2016</a:t>
+              <a:t>11/2/2016</a:t>
             </a:fld>
             <a:endParaRPr lang="en-US" dirty="0"/>
           </a:p>
@@ -2209,7 +2210,7 @@
           <a:p>
             <a:fld id="{96DFF08F-DC6B-4601-B491-B0F83F6DD2DA}" type="datetimeFigureOut">
               <a:rPr lang="en-US" dirty="0"/>
-              <a:t>7/30/2016</a:t>
+              <a:t>11/2/2016</a:t>
             </a:fld>
             <a:endParaRPr lang="en-US" dirty="0"/>
           </a:p>
@@ -2489,7 +2490,7 @@
           <a:p>
             <a:fld id="{96DFF08F-DC6B-4601-B491-B0F83F6DD2DA}" type="datetimeFigureOut">
               <a:rPr lang="en-US" dirty="0"/>
-              <a:t>7/30/2016</a:t>
+              <a:t>11/2/2016</a:t>
             </a:fld>
             <a:endParaRPr lang="en-US" dirty="0"/>
           </a:p>
@@ -2761,7 +2762,7 @@
           <a:p>
             <a:fld id="{96DFF08F-DC6B-4601-B491-B0F83F6DD2DA}" type="datetimeFigureOut">
               <a:rPr lang="en-US" dirty="0"/>
-              <a:t>7/30/2016</a:t>
+              <a:t>11/2/2016</a:t>
             </a:fld>
             <a:endParaRPr lang="en-US" dirty="0"/>
           </a:p>
@@ -3018,7 +3019,7 @@
             <a:fld id="{96DFF08F-DC6B-4601-B491-B0F83F6DD2DA}" type="datetimeFigureOut">
               <a:rPr lang="en-US" dirty="0"/>
               <a:pPr/>
-              <a:t>7/30/2016</a:t>
+              <a:t>11/2/2016</a:t>
             </a:fld>
             <a:endParaRPr lang="en-US" dirty="0"/>
           </a:p>
@@ -8200,6 +8201,895 @@
       </p:grpSpPr>
       <p:sp>
         <p:nvSpPr>
+          <p:cNvPr id="15" name="Tekstvak 14"/>
+          <p:cNvSpPr txBox="1"/>
+          <p:nvPr/>
+        </p:nvSpPr>
+        <p:spPr>
+          <a:xfrm>
+            <a:off x="3035954" y="2708992"/>
+            <a:ext cx="1440016" cy="180002"/>
+          </a:xfrm>
+          <a:prstGeom prst="rect">
+            <a:avLst/>
+          </a:prstGeom>
+          <a:noFill/>
+          <a:ln w="28575">
+            <a:noFill/>
+          </a:ln>
+        </p:spPr>
+        <p:style>
+          <a:lnRef idx="2">
+            <a:schemeClr val="accent1"/>
+          </a:lnRef>
+          <a:fillRef idx="1">
+            <a:schemeClr val="lt1"/>
+          </a:fillRef>
+          <a:effectRef idx="0">
+            <a:schemeClr val="accent1"/>
+          </a:effectRef>
+          <a:fontRef idx="minor">
+            <a:schemeClr val="dk1"/>
+          </a:fontRef>
+        </p:style>
+        <p:txBody>
+          <a:bodyPr wrap="none" lIns="0" tIns="0" rIns="0" bIns="0" rtlCol="0" anchor="ctr">
+            <a:noAutofit/>
+          </a:bodyPr>
+          <a:lstStyle/>
+          <a:p>
+            <a:pPr algn="ctr"/>
+            <a:r>
+              <a:rPr lang="nl-BE" sz="1050" dirty="0" err="1">
+                <a:solidFill>
+                  <a:schemeClr val="tx1"/>
+                </a:solidFill>
+              </a:rPr>
+              <a:t>GetGroup</a:t>
+            </a:r>
+            <a:endParaRPr lang="nl-BE" sz="1050" dirty="0">
+              <a:solidFill>
+                <a:schemeClr val="tx1"/>
+              </a:solidFill>
+            </a:endParaRPr>
+          </a:p>
+        </p:txBody>
+      </p:sp>
+      <p:cxnSp>
+        <p:nvCxnSpPr>
+          <p:cNvPr id="67" name="Rechte verbindingslijn 66"/>
+          <p:cNvCxnSpPr/>
+          <p:nvPr/>
+        </p:nvCxnSpPr>
+        <p:spPr>
+          <a:xfrm>
+            <a:off x="-24000" y="2528990"/>
+            <a:ext cx="12192000" cy="0"/>
+          </a:xfrm>
+          <a:prstGeom prst="line">
+            <a:avLst/>
+          </a:prstGeom>
+          <a:ln w="12700">
+            <a:solidFill>
+              <a:schemeClr val="accent3">
+                <a:lumMod val="40000"/>
+                <a:lumOff val="60000"/>
+              </a:schemeClr>
+            </a:solidFill>
+            <a:prstDash val="dash"/>
+          </a:ln>
+        </p:spPr>
+        <p:style>
+          <a:lnRef idx="2">
+            <a:schemeClr val="dk1"/>
+          </a:lnRef>
+          <a:fillRef idx="0">
+            <a:schemeClr val="dk1"/>
+          </a:fillRef>
+          <a:effectRef idx="1">
+            <a:schemeClr val="dk1"/>
+          </a:effectRef>
+          <a:fontRef idx="minor">
+            <a:schemeClr val="tx1"/>
+          </a:fontRef>
+        </p:style>
+      </p:cxnSp>
+      <p:cxnSp>
+        <p:nvCxnSpPr>
+          <p:cNvPr id="148" name="Rechte verbindingslijn 147"/>
+          <p:cNvCxnSpPr/>
+          <p:nvPr/>
+        </p:nvCxnSpPr>
+        <p:spPr>
+          <a:xfrm>
+            <a:off x="24068" y="5409020"/>
+            <a:ext cx="12192000" cy="0"/>
+          </a:xfrm>
+          <a:prstGeom prst="line">
+            <a:avLst/>
+          </a:prstGeom>
+          <a:ln w="12700">
+            <a:solidFill>
+              <a:schemeClr val="accent3">
+                <a:lumMod val="40000"/>
+                <a:lumOff val="60000"/>
+              </a:schemeClr>
+            </a:solidFill>
+            <a:prstDash val="dash"/>
+          </a:ln>
+        </p:spPr>
+        <p:style>
+          <a:lnRef idx="2">
+            <a:schemeClr val="dk1"/>
+          </a:lnRef>
+          <a:fillRef idx="0">
+            <a:schemeClr val="dk1"/>
+          </a:fillRef>
+          <a:effectRef idx="1">
+            <a:schemeClr val="dk1"/>
+          </a:effectRef>
+          <a:fontRef idx="minor">
+            <a:schemeClr val="tx1"/>
+          </a:fontRef>
+        </p:style>
+      </p:cxnSp>
+      <p:sp>
+        <p:nvSpPr>
+          <p:cNvPr id="2" name="Titel 1"/>
+          <p:cNvSpPr>
+            <a:spLocks noGrp="1"/>
+          </p:cNvSpPr>
+          <p:nvPr>
+            <p:ph type="title"/>
+          </p:nvPr>
+        </p:nvSpPr>
+        <p:spPr/>
+        <p:txBody>
+          <a:bodyPr/>
+          <a:lstStyle/>
+          <a:p>
+            <a:pPr algn="r"/>
+            <a:r>
+              <a:rPr lang="nl-BE" dirty="0" err="1"/>
+              <a:t>Sead</a:t>
+            </a:r>
+            <a:r>
+              <a:rPr lang="nl-BE" dirty="0"/>
+              <a:t> </a:t>
+            </a:r>
+            <a:r>
+              <a:rPr lang="nl-BE" dirty="0" err="1"/>
+              <a:t>task</a:t>
+            </a:r>
+            <a:r>
+              <a:rPr lang="nl-BE" dirty="0"/>
+              <a:t> - </a:t>
+            </a:r>
+            <a:r>
+              <a:rPr lang="nl-BE" dirty="0" err="1"/>
+              <a:t>components</a:t>
+            </a:r>
+            <a:endParaRPr lang="nl-BE" dirty="0"/>
+          </a:p>
+        </p:txBody>
+      </p:sp>
+      <p:cxnSp>
+        <p:nvCxnSpPr>
+          <p:cNvPr id="9" name="Rechte verbindingslijn 8"/>
+          <p:cNvCxnSpPr/>
+          <p:nvPr/>
+        </p:nvCxnSpPr>
+        <p:spPr>
+          <a:xfrm>
+            <a:off x="1685951" y="1808982"/>
+            <a:ext cx="0" cy="5085000"/>
+          </a:xfrm>
+          <a:prstGeom prst="line">
+            <a:avLst/>
+          </a:prstGeom>
+          <a:ln w="3175">
+            <a:solidFill>
+              <a:schemeClr val="tx1"/>
+            </a:solidFill>
+            <a:prstDash val="dash"/>
+          </a:ln>
+        </p:spPr>
+        <p:style>
+          <a:lnRef idx="2">
+            <a:schemeClr val="dk1"/>
+          </a:lnRef>
+          <a:fillRef idx="0">
+            <a:schemeClr val="dk1"/>
+          </a:fillRef>
+          <a:effectRef idx="1">
+            <a:schemeClr val="dk1"/>
+          </a:effectRef>
+          <a:fontRef idx="minor">
+            <a:schemeClr val="tx1"/>
+          </a:fontRef>
+        </p:style>
+      </p:cxnSp>
+      <p:sp>
+        <p:nvSpPr>
+          <p:cNvPr id="16" name="Rechthoek 15"/>
+          <p:cNvSpPr/>
+          <p:nvPr/>
+        </p:nvSpPr>
+        <p:spPr>
+          <a:xfrm>
+            <a:off x="156000" y="1989000"/>
+            <a:ext cx="1080000" cy="360000"/>
+          </a:xfrm>
+          <a:prstGeom prst="rect">
+            <a:avLst/>
+          </a:prstGeom>
+          <a:solidFill>
+            <a:schemeClr val="bg2">
+              <a:lumMod val="40000"/>
+              <a:lumOff val="60000"/>
+            </a:schemeClr>
+          </a:solidFill>
+          <a:ln w="28575"/>
+        </p:spPr>
+        <p:style>
+          <a:lnRef idx="2">
+            <a:schemeClr val="accent1"/>
+          </a:lnRef>
+          <a:fillRef idx="1">
+            <a:schemeClr val="lt1"/>
+          </a:fillRef>
+          <a:effectRef idx="0">
+            <a:schemeClr val="accent1"/>
+          </a:effectRef>
+          <a:fontRef idx="minor">
+            <a:schemeClr val="dk1"/>
+          </a:fontRef>
+        </p:style>
+        <p:txBody>
+          <a:bodyPr rtlCol="0" anchor="ctr"/>
+          <a:lstStyle/>
+          <a:p>
+            <a:pPr algn="ctr"/>
+            <a:r>
+              <a:rPr lang="nl-BE" sz="1000" dirty="0"/>
+              <a:t>SEAD</a:t>
+            </a:r>
+          </a:p>
+        </p:txBody>
+      </p:sp>
+      <p:sp>
+        <p:nvSpPr>
+          <p:cNvPr id="17" name="Rechthoek 16"/>
+          <p:cNvSpPr/>
+          <p:nvPr/>
+        </p:nvSpPr>
+        <p:spPr>
+          <a:xfrm>
+            <a:off x="2225957" y="1988984"/>
+            <a:ext cx="1080000" cy="360000"/>
+          </a:xfrm>
+          <a:prstGeom prst="rect">
+            <a:avLst/>
+          </a:prstGeom>
+          <a:solidFill>
+            <a:schemeClr val="accent2">
+              <a:lumMod val="20000"/>
+              <a:lumOff val="80000"/>
+            </a:schemeClr>
+          </a:solidFill>
+          <a:ln w="28575"/>
+        </p:spPr>
+        <p:style>
+          <a:lnRef idx="2">
+            <a:schemeClr val="accent1"/>
+          </a:lnRef>
+          <a:fillRef idx="1">
+            <a:schemeClr val="lt1"/>
+          </a:fillRef>
+          <a:effectRef idx="0">
+            <a:schemeClr val="accent1"/>
+          </a:effectRef>
+          <a:fontRef idx="minor">
+            <a:schemeClr val="dk1"/>
+          </a:fontRef>
+        </p:style>
+        <p:txBody>
+          <a:bodyPr rtlCol="0" anchor="ctr"/>
+          <a:lstStyle/>
+          <a:p>
+            <a:pPr algn="ctr"/>
+            <a:r>
+              <a:rPr lang="nl-BE" sz="1000" dirty="0"/>
+              <a:t>ASSIGN</a:t>
+            </a:r>
+          </a:p>
+        </p:txBody>
+      </p:sp>
+      <p:sp>
+        <p:nvSpPr>
+          <p:cNvPr id="61" name="Rechthoek 60"/>
+          <p:cNvSpPr/>
+          <p:nvPr/>
+        </p:nvSpPr>
+        <p:spPr>
+          <a:xfrm>
+            <a:off x="4205967" y="1988984"/>
+            <a:ext cx="1080000" cy="360000"/>
+          </a:xfrm>
+          <a:prstGeom prst="rect">
+            <a:avLst/>
+          </a:prstGeom>
+          <a:solidFill>
+            <a:schemeClr val="accent2">
+              <a:lumMod val="20000"/>
+              <a:lumOff val="80000"/>
+            </a:schemeClr>
+          </a:solidFill>
+          <a:ln w="28575"/>
+        </p:spPr>
+        <p:style>
+          <a:lnRef idx="2">
+            <a:schemeClr val="accent1"/>
+          </a:lnRef>
+          <a:fillRef idx="1">
+            <a:schemeClr val="lt1"/>
+          </a:fillRef>
+          <a:effectRef idx="0">
+            <a:schemeClr val="accent1"/>
+          </a:effectRef>
+          <a:fontRef idx="minor">
+            <a:schemeClr val="dk1"/>
+          </a:fontRef>
+        </p:style>
+        <p:txBody>
+          <a:bodyPr rtlCol="0" anchor="ctr"/>
+          <a:lstStyle/>
+          <a:p>
+            <a:pPr algn="ctr"/>
+            <a:r>
+              <a:rPr lang="nl-BE" sz="1000" dirty="0"/>
+              <a:t>GROUP</a:t>
+            </a:r>
+          </a:p>
+        </p:txBody>
+      </p:sp>
+      <p:sp>
+        <p:nvSpPr>
+          <p:cNvPr id="66" name="Rechthoek 65"/>
+          <p:cNvSpPr/>
+          <p:nvPr/>
+        </p:nvSpPr>
+        <p:spPr>
+          <a:xfrm>
+            <a:off x="8076022" y="1988984"/>
+            <a:ext cx="1080000" cy="360000"/>
+          </a:xfrm>
+          <a:prstGeom prst="rect">
+            <a:avLst/>
+          </a:prstGeom>
+          <a:solidFill>
+            <a:schemeClr val="accent2">
+              <a:lumMod val="20000"/>
+              <a:lumOff val="80000"/>
+            </a:schemeClr>
+          </a:solidFill>
+          <a:ln w="28575"/>
+        </p:spPr>
+        <p:style>
+          <a:lnRef idx="2">
+            <a:schemeClr val="accent1"/>
+          </a:lnRef>
+          <a:fillRef idx="1">
+            <a:schemeClr val="lt1"/>
+          </a:fillRef>
+          <a:effectRef idx="0">
+            <a:schemeClr val="accent1"/>
+          </a:effectRef>
+          <a:fontRef idx="minor">
+            <a:schemeClr val="dk1"/>
+          </a:fontRef>
+        </p:style>
+        <p:txBody>
+          <a:bodyPr rtlCol="0" anchor="ctr"/>
+          <a:lstStyle/>
+          <a:p>
+            <a:pPr algn="ctr"/>
+            <a:r>
+              <a:rPr lang="nl-BE" sz="1000" dirty="0"/>
+              <a:t>UNIT</a:t>
+            </a:r>
+          </a:p>
+        </p:txBody>
+      </p:sp>
+      <p:cxnSp>
+        <p:nvCxnSpPr>
+          <p:cNvPr id="48" name="Rechte verbindingslijn 47"/>
+          <p:cNvCxnSpPr/>
+          <p:nvPr/>
+        </p:nvCxnSpPr>
+        <p:spPr>
+          <a:xfrm>
+            <a:off x="3665961" y="1808982"/>
+            <a:ext cx="0" cy="5085000"/>
+          </a:xfrm>
+          <a:prstGeom prst="line">
+            <a:avLst/>
+          </a:prstGeom>
+          <a:ln w="3175">
+            <a:solidFill>
+              <a:schemeClr val="tx1"/>
+            </a:solidFill>
+            <a:prstDash val="dash"/>
+          </a:ln>
+        </p:spPr>
+        <p:style>
+          <a:lnRef idx="2">
+            <a:schemeClr val="dk1"/>
+          </a:lnRef>
+          <a:fillRef idx="0">
+            <a:schemeClr val="dk1"/>
+          </a:fillRef>
+          <a:effectRef idx="1">
+            <a:schemeClr val="dk1"/>
+          </a:effectRef>
+          <a:fontRef idx="minor">
+            <a:schemeClr val="tx1"/>
+          </a:fontRef>
+        </p:style>
+      </p:cxnSp>
+      <p:cxnSp>
+        <p:nvCxnSpPr>
+          <p:cNvPr id="50" name="Rechte verbindingslijn 49"/>
+          <p:cNvCxnSpPr/>
+          <p:nvPr/>
+        </p:nvCxnSpPr>
+        <p:spPr>
+          <a:xfrm>
+            <a:off x="7176012" y="1808982"/>
+            <a:ext cx="0" cy="5085000"/>
+          </a:xfrm>
+          <a:prstGeom prst="line">
+            <a:avLst/>
+          </a:prstGeom>
+          <a:ln w="3175">
+            <a:solidFill>
+              <a:schemeClr val="tx1"/>
+            </a:solidFill>
+            <a:prstDash val="dash"/>
+          </a:ln>
+        </p:spPr>
+        <p:style>
+          <a:lnRef idx="2">
+            <a:schemeClr val="dk1"/>
+          </a:lnRef>
+          <a:fillRef idx="0">
+            <a:schemeClr val="dk1"/>
+          </a:fillRef>
+          <a:effectRef idx="1">
+            <a:schemeClr val="dk1"/>
+          </a:effectRef>
+          <a:fontRef idx="minor">
+            <a:schemeClr val="tx1"/>
+          </a:fontRef>
+        </p:style>
+      </p:cxnSp>
+      <p:cxnSp>
+        <p:nvCxnSpPr>
+          <p:cNvPr id="7" name="Rechte verbindingslijn 6"/>
+          <p:cNvCxnSpPr>
+            <a:stCxn id="16" idx="2"/>
+          </p:cNvCxnSpPr>
+          <p:nvPr/>
+        </p:nvCxnSpPr>
+        <p:spPr>
+          <a:xfrm flipH="1">
+            <a:off x="695940" y="2349000"/>
+            <a:ext cx="60" cy="4509000"/>
+          </a:xfrm>
+          <a:prstGeom prst="line">
+            <a:avLst/>
+          </a:prstGeom>
+          <a:ln w="28575"/>
+        </p:spPr>
+        <p:style>
+          <a:lnRef idx="1">
+            <a:schemeClr val="accent1"/>
+          </a:lnRef>
+          <a:fillRef idx="0">
+            <a:schemeClr val="accent1"/>
+          </a:fillRef>
+          <a:effectRef idx="0">
+            <a:schemeClr val="accent1"/>
+          </a:effectRef>
+          <a:fontRef idx="minor">
+            <a:schemeClr val="tx1"/>
+          </a:fontRef>
+        </p:style>
+      </p:cxnSp>
+      <p:cxnSp>
+        <p:nvCxnSpPr>
+          <p:cNvPr id="54" name="Rechte verbindingslijn 53"/>
+          <p:cNvCxnSpPr>
+            <a:stCxn id="17" idx="2"/>
+          </p:cNvCxnSpPr>
+          <p:nvPr/>
+        </p:nvCxnSpPr>
+        <p:spPr>
+          <a:xfrm flipH="1">
+            <a:off x="2765951" y="2348984"/>
+            <a:ext cx="6" cy="4509016"/>
+          </a:xfrm>
+          <a:prstGeom prst="line">
+            <a:avLst/>
+          </a:prstGeom>
+          <a:ln w="28575"/>
+        </p:spPr>
+        <p:style>
+          <a:lnRef idx="1">
+            <a:schemeClr val="accent1"/>
+          </a:lnRef>
+          <a:fillRef idx="0">
+            <a:schemeClr val="accent1"/>
+          </a:fillRef>
+          <a:effectRef idx="0">
+            <a:schemeClr val="accent1"/>
+          </a:effectRef>
+          <a:fontRef idx="minor">
+            <a:schemeClr val="tx1"/>
+          </a:fontRef>
+        </p:style>
+      </p:cxnSp>
+      <p:cxnSp>
+        <p:nvCxnSpPr>
+          <p:cNvPr id="55" name="Rechte verbindingslijn 54"/>
+          <p:cNvCxnSpPr>
+            <a:stCxn id="61" idx="2"/>
+          </p:cNvCxnSpPr>
+          <p:nvPr/>
+        </p:nvCxnSpPr>
+        <p:spPr>
+          <a:xfrm>
+            <a:off x="4745967" y="2348984"/>
+            <a:ext cx="6" cy="4509016"/>
+          </a:xfrm>
+          <a:prstGeom prst="line">
+            <a:avLst/>
+          </a:prstGeom>
+          <a:ln w="28575"/>
+        </p:spPr>
+        <p:style>
+          <a:lnRef idx="1">
+            <a:schemeClr val="accent1"/>
+          </a:lnRef>
+          <a:fillRef idx="0">
+            <a:schemeClr val="accent1"/>
+          </a:fillRef>
+          <a:effectRef idx="0">
+            <a:schemeClr val="accent1"/>
+          </a:effectRef>
+          <a:fontRef idx="minor">
+            <a:schemeClr val="tx1"/>
+          </a:fontRef>
+        </p:style>
+      </p:cxnSp>
+      <p:cxnSp>
+        <p:nvCxnSpPr>
+          <p:cNvPr id="56" name="Rechte verbindingslijn 55"/>
+          <p:cNvCxnSpPr>
+            <a:stCxn id="66" idx="2"/>
+          </p:cNvCxnSpPr>
+          <p:nvPr/>
+        </p:nvCxnSpPr>
+        <p:spPr>
+          <a:xfrm>
+            <a:off x="8616022" y="2348984"/>
+            <a:ext cx="12" cy="4509016"/>
+          </a:xfrm>
+          <a:prstGeom prst="line">
+            <a:avLst/>
+          </a:prstGeom>
+          <a:ln w="28575"/>
+        </p:spPr>
+        <p:style>
+          <a:lnRef idx="1">
+            <a:schemeClr val="accent1"/>
+          </a:lnRef>
+          <a:fillRef idx="0">
+            <a:schemeClr val="accent1"/>
+          </a:fillRef>
+          <a:effectRef idx="0">
+            <a:schemeClr val="accent1"/>
+          </a:effectRef>
+          <a:fontRef idx="minor">
+            <a:schemeClr val="tx1"/>
+          </a:fontRef>
+        </p:style>
+      </p:cxnSp>
+      <p:cxnSp>
+        <p:nvCxnSpPr>
+          <p:cNvPr id="14" name="Rechte verbindingslijn met pijl 13"/>
+          <p:cNvCxnSpPr/>
+          <p:nvPr/>
+        </p:nvCxnSpPr>
+        <p:spPr>
+          <a:xfrm flipH="1">
+            <a:off x="2855964" y="2888994"/>
+            <a:ext cx="1800008" cy="0"/>
+          </a:xfrm>
+          <a:prstGeom prst="straightConnector1">
+            <a:avLst/>
+          </a:prstGeom>
+          <a:ln w="19050">
+            <a:tailEnd type="triangle"/>
+          </a:ln>
+        </p:spPr>
+        <p:style>
+          <a:lnRef idx="1">
+            <a:schemeClr val="accent1"/>
+          </a:lnRef>
+          <a:fillRef idx="0">
+            <a:schemeClr val="accent1"/>
+          </a:fillRef>
+          <a:effectRef idx="0">
+            <a:schemeClr val="accent1"/>
+          </a:effectRef>
+          <a:fontRef idx="minor">
+            <a:schemeClr val="tx1"/>
+          </a:fontRef>
+        </p:style>
+      </p:cxnSp>
+      <p:sp>
+        <p:nvSpPr>
+          <p:cNvPr id="31" name="Rechthoek 30"/>
+          <p:cNvSpPr/>
+          <p:nvPr/>
+        </p:nvSpPr>
+        <p:spPr>
+          <a:xfrm>
+            <a:off x="2675950" y="2798992"/>
+            <a:ext cx="180014" cy="540007"/>
+          </a:xfrm>
+          <a:prstGeom prst="rect">
+            <a:avLst/>
+          </a:prstGeom>
+          <a:ln w="28575"/>
+        </p:spPr>
+        <p:style>
+          <a:lnRef idx="2">
+            <a:schemeClr val="accent1"/>
+          </a:lnRef>
+          <a:fillRef idx="1">
+            <a:schemeClr val="lt1"/>
+          </a:fillRef>
+          <a:effectRef idx="0">
+            <a:schemeClr val="accent1"/>
+          </a:effectRef>
+          <a:fontRef idx="minor">
+            <a:schemeClr val="dk1"/>
+          </a:fontRef>
+        </p:style>
+        <p:txBody>
+          <a:bodyPr rtlCol="0" anchor="ctr"/>
+          <a:lstStyle/>
+          <a:p>
+            <a:pPr algn="ctr"/>
+            <a:endParaRPr lang="nl-BE"/>
+          </a:p>
+        </p:txBody>
+      </p:sp>
+      <p:sp>
+        <p:nvSpPr>
+          <p:cNvPr id="33" name="Rechthoek 32"/>
+          <p:cNvSpPr/>
+          <p:nvPr/>
+        </p:nvSpPr>
+        <p:spPr>
+          <a:xfrm>
+            <a:off x="4655972" y="2438989"/>
+            <a:ext cx="180002" cy="4419011"/>
+          </a:xfrm>
+          <a:prstGeom prst="rect">
+            <a:avLst/>
+          </a:prstGeom>
+          <a:ln w="28575"/>
+        </p:spPr>
+        <p:style>
+          <a:lnRef idx="2">
+            <a:schemeClr val="accent1"/>
+          </a:lnRef>
+          <a:fillRef idx="1">
+            <a:schemeClr val="lt1"/>
+          </a:fillRef>
+          <a:effectRef idx="0">
+            <a:schemeClr val="accent1"/>
+          </a:effectRef>
+          <a:fontRef idx="minor">
+            <a:schemeClr val="dk1"/>
+          </a:fontRef>
+        </p:style>
+        <p:txBody>
+          <a:bodyPr rtlCol="0" anchor="ctr"/>
+          <a:lstStyle/>
+          <a:p>
+            <a:pPr algn="ctr"/>
+            <a:endParaRPr lang="nl-BE"/>
+          </a:p>
+        </p:txBody>
+      </p:sp>
+      <p:sp>
+        <p:nvSpPr>
+          <p:cNvPr id="71" name="Tekstvak 70"/>
+          <p:cNvSpPr txBox="1"/>
+          <p:nvPr/>
+        </p:nvSpPr>
+        <p:spPr>
+          <a:xfrm>
+            <a:off x="965942" y="3068996"/>
+            <a:ext cx="1530018" cy="180002"/>
+          </a:xfrm>
+          <a:prstGeom prst="rect">
+            <a:avLst/>
+          </a:prstGeom>
+          <a:noFill/>
+          <a:ln w="28575">
+            <a:noFill/>
+          </a:ln>
+        </p:spPr>
+        <p:style>
+          <a:lnRef idx="2">
+            <a:schemeClr val="accent1"/>
+          </a:lnRef>
+          <a:fillRef idx="1">
+            <a:schemeClr val="lt1"/>
+          </a:fillRef>
+          <a:effectRef idx="0">
+            <a:schemeClr val="accent1"/>
+          </a:effectRef>
+          <a:fontRef idx="minor">
+            <a:schemeClr val="dk1"/>
+          </a:fontRef>
+        </p:style>
+        <p:txBody>
+          <a:bodyPr wrap="none" lIns="0" tIns="0" rIns="0" bIns="0" rtlCol="0" anchor="ctr">
+            <a:noAutofit/>
+          </a:bodyPr>
+          <a:lstStyle/>
+          <a:p>
+            <a:pPr algn="ctr"/>
+            <a:r>
+              <a:rPr lang="nl-BE" sz="1050" dirty="0" err="1">
+                <a:solidFill>
+                  <a:schemeClr val="tx1"/>
+                </a:solidFill>
+              </a:rPr>
+              <a:t>SetProcess</a:t>
+            </a:r>
+            <a:endParaRPr lang="nl-BE" sz="1050" dirty="0">
+              <a:solidFill>
+                <a:schemeClr val="tx1"/>
+              </a:solidFill>
+            </a:endParaRPr>
+          </a:p>
+        </p:txBody>
+      </p:sp>
+      <p:cxnSp>
+        <p:nvCxnSpPr>
+          <p:cNvPr id="72" name="Rechte verbindingslijn met pijl 71"/>
+          <p:cNvCxnSpPr>
+            <a:endCxn id="75" idx="3"/>
+          </p:cNvCxnSpPr>
+          <p:nvPr/>
+        </p:nvCxnSpPr>
+        <p:spPr>
+          <a:xfrm flipH="1">
+            <a:off x="785941" y="3248998"/>
+            <a:ext cx="1890021" cy="0"/>
+          </a:xfrm>
+          <a:prstGeom prst="straightConnector1">
+            <a:avLst/>
+          </a:prstGeom>
+          <a:ln w="19050">
+            <a:tailEnd type="triangle"/>
+          </a:ln>
+        </p:spPr>
+        <p:style>
+          <a:lnRef idx="1">
+            <a:schemeClr val="accent1"/>
+          </a:lnRef>
+          <a:fillRef idx="0">
+            <a:schemeClr val="accent1"/>
+          </a:fillRef>
+          <a:effectRef idx="0">
+            <a:schemeClr val="accent1"/>
+          </a:effectRef>
+          <a:fontRef idx="minor">
+            <a:schemeClr val="tx1"/>
+          </a:fontRef>
+        </p:style>
+      </p:cxnSp>
+      <p:sp>
+        <p:nvSpPr>
+          <p:cNvPr id="75" name="Rechthoek 74"/>
+          <p:cNvSpPr/>
+          <p:nvPr/>
+        </p:nvSpPr>
+        <p:spPr>
+          <a:xfrm>
+            <a:off x="605939" y="3158997"/>
+            <a:ext cx="180002" cy="180002"/>
+          </a:xfrm>
+          <a:prstGeom prst="rect">
+            <a:avLst/>
+          </a:prstGeom>
+          <a:ln w="28575"/>
+        </p:spPr>
+        <p:style>
+          <a:lnRef idx="2">
+            <a:schemeClr val="accent1"/>
+          </a:lnRef>
+          <a:fillRef idx="1">
+            <a:schemeClr val="lt1"/>
+          </a:fillRef>
+          <a:effectRef idx="0">
+            <a:schemeClr val="accent1"/>
+          </a:effectRef>
+          <a:fontRef idx="minor">
+            <a:schemeClr val="dk1"/>
+          </a:fontRef>
+        </p:style>
+        <p:txBody>
+          <a:bodyPr rtlCol="0" anchor="ctr"/>
+          <a:lstStyle/>
+          <a:p>
+            <a:pPr algn="ctr"/>
+            <a:endParaRPr lang="nl-BE"/>
+          </a:p>
+        </p:txBody>
+      </p:sp>
+    </p:spTree>
+    <p:extLst>
+      <p:ext uri="{BB962C8B-B14F-4D97-AF65-F5344CB8AC3E}">
+        <p14:creationId xmlns:p14="http://schemas.microsoft.com/office/powerpoint/2010/main" val="2734425295"/>
+      </p:ext>
+    </p:extLst>
+  </p:cSld>
+  <p:clrMapOvr>
+    <a:masterClrMapping/>
+  </p:clrMapOvr>
+  <mc:AlternateContent xmlns:mc="http://schemas.openxmlformats.org/markup-compatibility/2006" xmlns:p159="http://schemas.microsoft.com/office/powerpoint/2015/09/main">
+    <mc:Choice Requires="p159">
+      <p:transition xmlns:p14="http://schemas.microsoft.com/office/powerpoint/2010/main" spd="slow" p14:dur="2000">
+        <p159:morph option="byObject"/>
+      </p:transition>
+    </mc:Choice>
+    <mc:Fallback xmlns="">
+      <p:transition spd="slow">
+        <p:fade/>
+      </p:transition>
+    </mc:Fallback>
+  </mc:AlternateContent>
+</p:sld>
+</file>
+
+<file path=ppt/slides/slide6.xml><?xml version="1.0" encoding="utf-8"?>
+<p:sld xmlns:a="http://schemas.openxmlformats.org/drawingml/2006/main" xmlns:r="http://schemas.openxmlformats.org/officeDocument/2006/relationships" xmlns:p="http://schemas.openxmlformats.org/presentationml/2006/main">
+  <p:cSld>
+    <p:spTree>
+      <p:nvGrpSpPr>
+        <p:cNvPr id="1" name=""/>
+        <p:cNvGrpSpPr/>
+        <p:nvPr/>
+      </p:nvGrpSpPr>
+      <p:grpSpPr>
+        <a:xfrm>
+          <a:off x="0" y="0"/>
+          <a:ext cx="0" cy="0"/>
+          <a:chOff x="0" y="0"/>
+          <a:chExt cx="0" cy="0"/>
+        </a:xfrm>
+      </p:grpSpPr>
+      <p:sp>
+        <p:nvSpPr>
           <p:cNvPr id="4" name="Titel 3"/>
           <p:cNvSpPr>
             <a:spLocks noGrp="1"/>

</xml_diff>

<commit_message>
Got SEAD tasking working now with new Process Templates...
</commit_message>
<xml_diff>
--- a/Moose Training/Presentations/DCS World - MOOSE - Tasking - SEAD.pptx
+++ b/Moose Training/Presentations/DCS World - MOOSE - Tasking - SEAD.pptx
@@ -10,7 +10,8 @@
     <p:sldId id="333" r:id="rId4"/>
     <p:sldId id="332" r:id="rId5"/>
     <p:sldId id="334" r:id="rId6"/>
-    <p:sldId id="285" r:id="rId7"/>
+    <p:sldId id="335" r:id="rId7"/>
+    <p:sldId id="285" r:id="rId8"/>
   </p:sldIdLst>
   <p:sldSz cx="12192000" cy="6858000"/>
   <p:notesSz cx="6858000" cy="9144000"/>
@@ -293,7 +294,7 @@
           <a:p>
             <a:fld id="{96DFF08F-DC6B-4601-B491-B0F83F6DD2DA}" type="datetimeFigureOut">
               <a:rPr lang="en-US" dirty="0"/>
-              <a:t>11/2/2016</a:t>
+              <a:t>11/5/2016</a:t>
             </a:fld>
             <a:endParaRPr lang="en-US" dirty="0"/>
           </a:p>
@@ -527,7 +528,7 @@
           <a:p>
             <a:fld id="{96DFF08F-DC6B-4601-B491-B0F83F6DD2DA}" type="datetimeFigureOut">
               <a:rPr lang="en-US" dirty="0"/>
-              <a:t>11/2/2016</a:t>
+              <a:t>11/5/2016</a:t>
             </a:fld>
             <a:endParaRPr lang="en-US" dirty="0"/>
           </a:p>
@@ -757,7 +758,7 @@
           <a:p>
             <a:fld id="{96DFF08F-DC6B-4601-B491-B0F83F6DD2DA}" type="datetimeFigureOut">
               <a:rPr lang="en-US" dirty="0"/>
-              <a:t>11/2/2016</a:t>
+              <a:t>11/5/2016</a:t>
             </a:fld>
             <a:endParaRPr lang="en-US" dirty="0"/>
           </a:p>
@@ -996,7 +997,7 @@
           <a:p>
             <a:fld id="{96DFF08F-DC6B-4601-B491-B0F83F6DD2DA}" type="datetimeFigureOut">
               <a:rPr lang="en-US" dirty="0"/>
-              <a:t>11/2/2016</a:t>
+              <a:t>11/5/2016</a:t>
             </a:fld>
             <a:endParaRPr lang="en-US" dirty="0"/>
           </a:p>
@@ -1567,7 +1568,7 @@
           <a:p>
             <a:fld id="{96DFF08F-DC6B-4601-B491-B0F83F6DD2DA}" type="datetimeFigureOut">
               <a:rPr lang="en-US" dirty="0"/>
-              <a:t>11/2/2016</a:t>
+              <a:t>11/5/2016</a:t>
             </a:fld>
             <a:endParaRPr lang="en-US" dirty="0"/>
           </a:p>
@@ -1996,7 +1997,7 @@
           <a:p>
             <a:fld id="{96DFF08F-DC6B-4601-B491-B0F83F6DD2DA}" type="datetimeFigureOut">
               <a:rPr lang="en-US" dirty="0"/>
-              <a:t>11/2/2016</a:t>
+              <a:t>11/5/2016</a:t>
             </a:fld>
             <a:endParaRPr lang="en-US" dirty="0"/>
           </a:p>
@@ -2210,7 +2211,7 @@
           <a:p>
             <a:fld id="{96DFF08F-DC6B-4601-B491-B0F83F6DD2DA}" type="datetimeFigureOut">
               <a:rPr lang="en-US" dirty="0"/>
-              <a:t>11/2/2016</a:t>
+              <a:t>11/5/2016</a:t>
             </a:fld>
             <a:endParaRPr lang="en-US" dirty="0"/>
           </a:p>
@@ -2490,7 +2491,7 @@
           <a:p>
             <a:fld id="{96DFF08F-DC6B-4601-B491-B0F83F6DD2DA}" type="datetimeFigureOut">
               <a:rPr lang="en-US" dirty="0"/>
-              <a:t>11/2/2016</a:t>
+              <a:t>11/5/2016</a:t>
             </a:fld>
             <a:endParaRPr lang="en-US" dirty="0"/>
           </a:p>
@@ -2762,7 +2763,7 @@
           <a:p>
             <a:fld id="{96DFF08F-DC6B-4601-B491-B0F83F6DD2DA}" type="datetimeFigureOut">
               <a:rPr lang="en-US" dirty="0"/>
-              <a:t>11/2/2016</a:t>
+              <a:t>11/5/2016</a:t>
             </a:fld>
             <a:endParaRPr lang="en-US" dirty="0"/>
           </a:p>
@@ -3019,7 +3020,7 @@
             <a:fld id="{96DFF08F-DC6B-4601-B491-B0F83F6DD2DA}" type="datetimeFigureOut">
               <a:rPr lang="en-US" dirty="0"/>
               <a:pPr/>
-              <a:t>11/2/2016</a:t>
+              <a:t>11/5/2016</a:t>
             </a:fld>
             <a:endParaRPr lang="en-US" dirty="0"/>
           </a:p>
@@ -9090,6 +9091,4736 @@
       </p:grpSpPr>
       <p:sp>
         <p:nvSpPr>
+          <p:cNvPr id="28" name="Rechthoek 27"/>
+          <p:cNvSpPr/>
+          <p:nvPr/>
+        </p:nvSpPr>
+        <p:spPr>
+          <a:xfrm>
+            <a:off x="965943" y="2078985"/>
+            <a:ext cx="1530017" cy="630008"/>
+          </a:xfrm>
+          <a:prstGeom prst="rect">
+            <a:avLst/>
+          </a:prstGeom>
+          <a:ln w="19050"/>
+        </p:spPr>
+        <p:style>
+          <a:lnRef idx="2">
+            <a:schemeClr val="accent1"/>
+          </a:lnRef>
+          <a:fillRef idx="1">
+            <a:schemeClr val="lt1"/>
+          </a:fillRef>
+          <a:effectRef idx="0">
+            <a:schemeClr val="accent1"/>
+          </a:effectRef>
+          <a:fontRef idx="minor">
+            <a:schemeClr val="dk1"/>
+          </a:fontRef>
+        </p:style>
+        <p:txBody>
+          <a:bodyPr rtlCol="0" anchor="t"/>
+          <a:lstStyle/>
+          <a:p>
+            <a:pPr algn="ctr"/>
+            <a:r>
+              <a:rPr lang="nl-BE" sz="1400" dirty="0"/>
+              <a:t>MISSION</a:t>
+            </a:r>
+          </a:p>
+        </p:txBody>
+      </p:sp>
+      <p:cxnSp>
+        <p:nvCxnSpPr>
+          <p:cNvPr id="82" name="Rechte verbindingslijn 81"/>
+          <p:cNvCxnSpPr>
+            <a:stCxn id="3" idx="1"/>
+            <a:endCxn id="81" idx="3"/>
+          </p:cNvCxnSpPr>
+          <p:nvPr/>
+        </p:nvCxnSpPr>
+        <p:spPr>
+          <a:xfrm flipH="1">
+            <a:off x="2855964" y="2393989"/>
+            <a:ext cx="450005" cy="0"/>
+          </a:xfrm>
+          <a:prstGeom prst="line">
+            <a:avLst/>
+          </a:prstGeom>
+          <a:ln w="19050"/>
+        </p:spPr>
+        <p:style>
+          <a:lnRef idx="1">
+            <a:schemeClr val="accent1"/>
+          </a:lnRef>
+          <a:fillRef idx="0">
+            <a:schemeClr val="accent1"/>
+          </a:fillRef>
+          <a:effectRef idx="0">
+            <a:schemeClr val="accent1"/>
+          </a:effectRef>
+          <a:fontRef idx="minor">
+            <a:schemeClr val="tx1"/>
+          </a:fontRef>
+        </p:style>
+      </p:cxnSp>
+      <p:sp>
+        <p:nvSpPr>
+          <p:cNvPr id="2" name="Titel 1"/>
+          <p:cNvSpPr>
+            <a:spLocks noGrp="1"/>
+          </p:cNvSpPr>
+          <p:nvPr>
+            <p:ph type="title"/>
+          </p:nvPr>
+        </p:nvSpPr>
+        <p:spPr/>
+        <p:txBody>
+          <a:bodyPr/>
+          <a:lstStyle/>
+          <a:p>
+            <a:pPr algn="r"/>
+            <a:r>
+              <a:rPr lang="nl-BE" dirty="0" err="1"/>
+              <a:t>Sead</a:t>
+            </a:r>
+            <a:r>
+              <a:rPr lang="nl-BE" dirty="0"/>
+              <a:t> </a:t>
+            </a:r>
+            <a:r>
+              <a:rPr lang="nl-BE" dirty="0" err="1"/>
+              <a:t>task</a:t>
+            </a:r>
+            <a:r>
+              <a:rPr lang="nl-BE" dirty="0"/>
+              <a:t> - </a:t>
+            </a:r>
+            <a:r>
+              <a:rPr lang="nl-BE" dirty="0" err="1"/>
+              <a:t>components</a:t>
+            </a:r>
+            <a:endParaRPr lang="nl-BE" dirty="0"/>
+          </a:p>
+        </p:txBody>
+      </p:sp>
+      <p:sp>
+        <p:nvSpPr>
+          <p:cNvPr id="3" name="Rechthoek 2"/>
+          <p:cNvSpPr/>
+          <p:nvPr/>
+        </p:nvSpPr>
+        <p:spPr>
+          <a:xfrm>
+            <a:off x="3305969" y="2078985"/>
+            <a:ext cx="1530017" cy="630007"/>
+          </a:xfrm>
+          <a:prstGeom prst="rect">
+            <a:avLst/>
+          </a:prstGeom>
+          <a:ln w="19050"/>
+        </p:spPr>
+        <p:style>
+          <a:lnRef idx="2">
+            <a:schemeClr val="accent1"/>
+          </a:lnRef>
+          <a:fillRef idx="1">
+            <a:schemeClr val="lt1"/>
+          </a:fillRef>
+          <a:effectRef idx="0">
+            <a:schemeClr val="accent1"/>
+          </a:effectRef>
+          <a:fontRef idx="minor">
+            <a:schemeClr val="dk1"/>
+          </a:fontRef>
+        </p:style>
+        <p:txBody>
+          <a:bodyPr rtlCol="0" anchor="t"/>
+          <a:lstStyle/>
+          <a:p>
+            <a:pPr algn="ctr"/>
+            <a:r>
+              <a:rPr lang="nl-BE" sz="1400" dirty="0"/>
+              <a:t>TASK</a:t>
+            </a:r>
+          </a:p>
+        </p:txBody>
+      </p:sp>
+      <p:sp>
+        <p:nvSpPr>
+          <p:cNvPr id="81" name="Ruit 80"/>
+          <p:cNvSpPr/>
+          <p:nvPr/>
+        </p:nvSpPr>
+        <p:spPr>
+          <a:xfrm>
+            <a:off x="2495960" y="2258987"/>
+            <a:ext cx="360004" cy="270003"/>
+          </a:xfrm>
+          <a:prstGeom prst="diamond">
+            <a:avLst/>
+          </a:prstGeom>
+          <a:ln w="19050"/>
+        </p:spPr>
+        <p:style>
+          <a:lnRef idx="2">
+            <a:schemeClr val="accent1"/>
+          </a:lnRef>
+          <a:fillRef idx="1">
+            <a:schemeClr val="lt1"/>
+          </a:fillRef>
+          <a:effectRef idx="0">
+            <a:schemeClr val="accent1"/>
+          </a:effectRef>
+          <a:fontRef idx="minor">
+            <a:schemeClr val="dk1"/>
+          </a:fontRef>
+        </p:style>
+        <p:txBody>
+          <a:bodyPr rtlCol="0" anchor="ctr"/>
+          <a:lstStyle/>
+          <a:p>
+            <a:pPr algn="ctr"/>
+            <a:endParaRPr lang="nl-BE"/>
+          </a:p>
+        </p:txBody>
+      </p:sp>
+      <p:sp>
+        <p:nvSpPr>
+          <p:cNvPr id="186" name="Gelijkbenige driehoek 185"/>
+          <p:cNvSpPr/>
+          <p:nvPr/>
+        </p:nvSpPr>
+        <p:spPr>
+          <a:xfrm rot="16200000">
+            <a:off x="2720962" y="6399033"/>
+            <a:ext cx="270003" cy="360004"/>
+          </a:xfrm>
+          <a:prstGeom prst="triangle">
+            <a:avLst/>
+          </a:prstGeom>
+          <a:ln w="19050"/>
+        </p:spPr>
+        <p:style>
+          <a:lnRef idx="2">
+            <a:schemeClr val="accent1"/>
+          </a:lnRef>
+          <a:fillRef idx="1">
+            <a:schemeClr val="lt1"/>
+          </a:fillRef>
+          <a:effectRef idx="0">
+            <a:schemeClr val="accent1"/>
+          </a:effectRef>
+          <a:fontRef idx="minor">
+            <a:schemeClr val="dk1"/>
+          </a:fontRef>
+        </p:style>
+        <p:txBody>
+          <a:bodyPr rtlCol="0" anchor="ctr"/>
+          <a:lstStyle/>
+          <a:p>
+            <a:pPr algn="ctr"/>
+            <a:endParaRPr lang="nl-BE"/>
+          </a:p>
+        </p:txBody>
+      </p:sp>
+      <p:cxnSp>
+        <p:nvCxnSpPr>
+          <p:cNvPr id="187" name="Rechte verbindingslijn 186"/>
+          <p:cNvCxnSpPr>
+            <a:endCxn id="186" idx="3"/>
+          </p:cNvCxnSpPr>
+          <p:nvPr/>
+        </p:nvCxnSpPr>
+        <p:spPr>
+          <a:xfrm flipH="1">
+            <a:off x="3035966" y="6579035"/>
+            <a:ext cx="720007" cy="0"/>
+          </a:xfrm>
+          <a:prstGeom prst="line">
+            <a:avLst/>
+          </a:prstGeom>
+          <a:ln w="19050"/>
+        </p:spPr>
+        <p:style>
+          <a:lnRef idx="1">
+            <a:schemeClr val="accent1"/>
+          </a:lnRef>
+          <a:fillRef idx="0">
+            <a:schemeClr val="accent1"/>
+          </a:fillRef>
+          <a:effectRef idx="0">
+            <a:schemeClr val="accent1"/>
+          </a:effectRef>
+          <a:fontRef idx="minor">
+            <a:schemeClr val="tx1"/>
+          </a:fontRef>
+        </p:style>
+      </p:cxnSp>
+      <p:cxnSp>
+        <p:nvCxnSpPr>
+          <p:cNvPr id="188" name="Rechte verbindingslijn 187"/>
+          <p:cNvCxnSpPr>
+            <a:endCxn id="189" idx="3"/>
+          </p:cNvCxnSpPr>
+          <p:nvPr/>
+        </p:nvCxnSpPr>
+        <p:spPr>
+          <a:xfrm flipH="1">
+            <a:off x="1685951" y="6579035"/>
+            <a:ext cx="720008" cy="0"/>
+          </a:xfrm>
+          <a:prstGeom prst="line">
+            <a:avLst/>
+          </a:prstGeom>
+          <a:ln w="19050"/>
+        </p:spPr>
+        <p:style>
+          <a:lnRef idx="1">
+            <a:schemeClr val="accent1"/>
+          </a:lnRef>
+          <a:fillRef idx="0">
+            <a:schemeClr val="accent1"/>
+          </a:fillRef>
+          <a:effectRef idx="0">
+            <a:schemeClr val="accent1"/>
+          </a:effectRef>
+          <a:fontRef idx="minor">
+            <a:schemeClr val="tx1"/>
+          </a:fontRef>
+        </p:style>
+      </p:cxnSp>
+      <p:sp>
+        <p:nvSpPr>
+          <p:cNvPr id="189" name="Ruit 188"/>
+          <p:cNvSpPr/>
+          <p:nvPr/>
+        </p:nvSpPr>
+        <p:spPr>
+          <a:xfrm>
+            <a:off x="1325947" y="6444033"/>
+            <a:ext cx="360004" cy="270003"/>
+          </a:xfrm>
+          <a:prstGeom prst="diamond">
+            <a:avLst/>
+          </a:prstGeom>
+          <a:solidFill>
+            <a:schemeClr val="accent1"/>
+          </a:solidFill>
+          <a:ln w="19050"/>
+        </p:spPr>
+        <p:style>
+          <a:lnRef idx="2">
+            <a:schemeClr val="accent1"/>
+          </a:lnRef>
+          <a:fillRef idx="1">
+            <a:schemeClr val="lt1"/>
+          </a:fillRef>
+          <a:effectRef idx="0">
+            <a:schemeClr val="accent1"/>
+          </a:effectRef>
+          <a:fontRef idx="minor">
+            <a:schemeClr val="dk1"/>
+          </a:fontRef>
+        </p:style>
+        <p:txBody>
+          <a:bodyPr rtlCol="0" anchor="ctr"/>
+          <a:lstStyle/>
+          <a:p>
+            <a:pPr algn="ctr"/>
+            <a:endParaRPr lang="nl-BE"/>
+          </a:p>
+        </p:txBody>
+      </p:sp>
+      <p:cxnSp>
+        <p:nvCxnSpPr>
+          <p:cNvPr id="191" name="Rechte verbindingslijn 190"/>
+          <p:cNvCxnSpPr>
+            <a:endCxn id="192" idx="3"/>
+          </p:cNvCxnSpPr>
+          <p:nvPr/>
+        </p:nvCxnSpPr>
+        <p:spPr>
+          <a:xfrm flipH="1">
+            <a:off x="425937" y="6579035"/>
+            <a:ext cx="720008" cy="0"/>
+          </a:xfrm>
+          <a:prstGeom prst="line">
+            <a:avLst/>
+          </a:prstGeom>
+          <a:ln w="19050"/>
+        </p:spPr>
+        <p:style>
+          <a:lnRef idx="1">
+            <a:schemeClr val="accent1"/>
+          </a:lnRef>
+          <a:fillRef idx="0">
+            <a:schemeClr val="accent1"/>
+          </a:fillRef>
+          <a:effectRef idx="0">
+            <a:schemeClr val="accent1"/>
+          </a:effectRef>
+          <a:fontRef idx="minor">
+            <a:schemeClr val="tx1"/>
+          </a:fontRef>
+        </p:style>
+      </p:cxnSp>
+      <p:sp>
+        <p:nvSpPr>
+          <p:cNvPr id="192" name="Ruit 191"/>
+          <p:cNvSpPr/>
+          <p:nvPr/>
+        </p:nvSpPr>
+        <p:spPr>
+          <a:xfrm>
+            <a:off x="65933" y="6444033"/>
+            <a:ext cx="360004" cy="270003"/>
+          </a:xfrm>
+          <a:prstGeom prst="diamond">
+            <a:avLst/>
+          </a:prstGeom>
+          <a:ln w="19050"/>
+        </p:spPr>
+        <p:style>
+          <a:lnRef idx="2">
+            <a:schemeClr val="accent1"/>
+          </a:lnRef>
+          <a:fillRef idx="1">
+            <a:schemeClr val="lt1"/>
+          </a:fillRef>
+          <a:effectRef idx="0">
+            <a:schemeClr val="accent1"/>
+          </a:effectRef>
+          <a:fontRef idx="minor">
+            <a:schemeClr val="dk1"/>
+          </a:fontRef>
+        </p:style>
+        <p:txBody>
+          <a:bodyPr rtlCol="0" anchor="ctr"/>
+          <a:lstStyle/>
+          <a:p>
+            <a:pPr algn="ctr"/>
+            <a:endParaRPr lang="nl-BE"/>
+          </a:p>
+        </p:txBody>
+      </p:sp>
+      <p:sp>
+        <p:nvSpPr>
+          <p:cNvPr id="194" name="Tekstvak 193"/>
+          <p:cNvSpPr txBox="1"/>
+          <p:nvPr/>
+        </p:nvSpPr>
+        <p:spPr>
+          <a:xfrm>
+            <a:off x="425937" y="6580802"/>
+            <a:ext cx="720008" cy="178235"/>
+          </a:xfrm>
+          <a:prstGeom prst="rect">
+            <a:avLst/>
+          </a:prstGeom>
+          <a:noFill/>
+          <a:ln w="19050">
+            <a:noFill/>
+          </a:ln>
+        </p:spPr>
+        <p:style>
+          <a:lnRef idx="2">
+            <a:schemeClr val="accent1"/>
+          </a:lnRef>
+          <a:fillRef idx="1">
+            <a:schemeClr val="lt1"/>
+          </a:fillRef>
+          <a:effectRef idx="0">
+            <a:schemeClr val="accent1"/>
+          </a:effectRef>
+          <a:fontRef idx="minor">
+            <a:schemeClr val="dk1"/>
+          </a:fontRef>
+        </p:style>
+        <p:txBody>
+          <a:bodyPr wrap="none" rtlCol="0">
+            <a:noAutofit/>
+          </a:bodyPr>
+          <a:lstStyle/>
+          <a:p>
+            <a:pPr algn="ctr"/>
+            <a:r>
+              <a:rPr lang="nl-BE" sz="900" dirty="0" err="1">
+                <a:solidFill>
+                  <a:schemeClr val="tx1"/>
+                </a:solidFill>
+              </a:rPr>
+              <a:t>Composition</a:t>
+            </a:r>
+            <a:endParaRPr lang="nl-BE" sz="900" dirty="0">
+              <a:solidFill>
+                <a:schemeClr val="tx1"/>
+              </a:solidFill>
+            </a:endParaRPr>
+          </a:p>
+        </p:txBody>
+      </p:sp>
+      <p:sp>
+        <p:nvSpPr>
+          <p:cNvPr id="195" name="Tekstvak 194"/>
+          <p:cNvSpPr txBox="1"/>
+          <p:nvPr/>
+        </p:nvSpPr>
+        <p:spPr>
+          <a:xfrm>
+            <a:off x="1685951" y="6579035"/>
+            <a:ext cx="720008" cy="178235"/>
+          </a:xfrm>
+          <a:prstGeom prst="rect">
+            <a:avLst/>
+          </a:prstGeom>
+          <a:noFill/>
+          <a:ln w="19050">
+            <a:noFill/>
+          </a:ln>
+        </p:spPr>
+        <p:style>
+          <a:lnRef idx="2">
+            <a:schemeClr val="accent1"/>
+          </a:lnRef>
+          <a:fillRef idx="1">
+            <a:schemeClr val="lt1"/>
+          </a:fillRef>
+          <a:effectRef idx="0">
+            <a:schemeClr val="accent1"/>
+          </a:effectRef>
+          <a:fontRef idx="minor">
+            <a:schemeClr val="dk1"/>
+          </a:fontRef>
+        </p:style>
+        <p:txBody>
+          <a:bodyPr wrap="none" rtlCol="0">
+            <a:noAutofit/>
+          </a:bodyPr>
+          <a:lstStyle/>
+          <a:p>
+            <a:pPr algn="ctr"/>
+            <a:r>
+              <a:rPr lang="nl-BE" sz="900" dirty="0" err="1">
+                <a:solidFill>
+                  <a:schemeClr val="tx1"/>
+                </a:solidFill>
+              </a:rPr>
+              <a:t>Aggregation</a:t>
+            </a:r>
+            <a:endParaRPr lang="nl-BE" sz="900" dirty="0">
+              <a:solidFill>
+                <a:schemeClr val="tx1"/>
+              </a:solidFill>
+            </a:endParaRPr>
+          </a:p>
+        </p:txBody>
+      </p:sp>
+      <p:sp>
+        <p:nvSpPr>
+          <p:cNvPr id="196" name="Tekstvak 195"/>
+          <p:cNvSpPr txBox="1"/>
+          <p:nvPr/>
+        </p:nvSpPr>
+        <p:spPr>
+          <a:xfrm>
+            <a:off x="3035966" y="6579035"/>
+            <a:ext cx="720008" cy="178235"/>
+          </a:xfrm>
+          <a:prstGeom prst="rect">
+            <a:avLst/>
+          </a:prstGeom>
+          <a:noFill/>
+          <a:ln w="19050">
+            <a:noFill/>
+          </a:ln>
+        </p:spPr>
+        <p:style>
+          <a:lnRef idx="2">
+            <a:schemeClr val="accent1"/>
+          </a:lnRef>
+          <a:fillRef idx="1">
+            <a:schemeClr val="lt1"/>
+          </a:fillRef>
+          <a:effectRef idx="0">
+            <a:schemeClr val="accent1"/>
+          </a:effectRef>
+          <a:fontRef idx="minor">
+            <a:schemeClr val="dk1"/>
+          </a:fontRef>
+        </p:style>
+        <p:txBody>
+          <a:bodyPr wrap="none" rtlCol="0">
+            <a:noAutofit/>
+          </a:bodyPr>
+          <a:lstStyle/>
+          <a:p>
+            <a:pPr algn="ctr"/>
+            <a:r>
+              <a:rPr lang="nl-BE" sz="900" dirty="0" err="1">
+                <a:solidFill>
+                  <a:schemeClr val="tx1"/>
+                </a:solidFill>
+              </a:rPr>
+              <a:t>Inheritance</a:t>
+            </a:r>
+            <a:endParaRPr lang="nl-BE" sz="900" dirty="0">
+              <a:solidFill>
+                <a:schemeClr val="tx1"/>
+              </a:solidFill>
+            </a:endParaRPr>
+          </a:p>
+        </p:txBody>
+      </p:sp>
+      <p:sp>
+        <p:nvSpPr>
+          <p:cNvPr id="199" name="Gelijkbenige driehoek 198"/>
+          <p:cNvSpPr/>
+          <p:nvPr/>
+        </p:nvSpPr>
+        <p:spPr>
+          <a:xfrm>
+            <a:off x="3935976" y="2708992"/>
+            <a:ext cx="270003" cy="360004"/>
+          </a:xfrm>
+          <a:prstGeom prst="triangle">
+            <a:avLst/>
+          </a:prstGeom>
+          <a:ln w="19050"/>
+        </p:spPr>
+        <p:style>
+          <a:lnRef idx="2">
+            <a:schemeClr val="accent1"/>
+          </a:lnRef>
+          <a:fillRef idx="1">
+            <a:schemeClr val="lt1"/>
+          </a:fillRef>
+          <a:effectRef idx="0">
+            <a:schemeClr val="accent1"/>
+          </a:effectRef>
+          <a:fontRef idx="minor">
+            <a:schemeClr val="dk1"/>
+          </a:fontRef>
+        </p:style>
+        <p:txBody>
+          <a:bodyPr rtlCol="0" anchor="ctr"/>
+          <a:lstStyle/>
+          <a:p>
+            <a:pPr algn="ctr"/>
+            <a:endParaRPr lang="nl-BE"/>
+          </a:p>
+        </p:txBody>
+      </p:sp>
+      <p:sp>
+        <p:nvSpPr>
+          <p:cNvPr id="200" name="Rechthoek 199"/>
+          <p:cNvSpPr/>
+          <p:nvPr/>
+        </p:nvSpPr>
+        <p:spPr>
+          <a:xfrm>
+            <a:off x="3305969" y="3429000"/>
+            <a:ext cx="1530017" cy="2070023"/>
+          </a:xfrm>
+          <a:prstGeom prst="rect">
+            <a:avLst/>
+          </a:prstGeom>
+          <a:ln w="19050"/>
+        </p:spPr>
+        <p:style>
+          <a:lnRef idx="2">
+            <a:schemeClr val="accent1"/>
+          </a:lnRef>
+          <a:fillRef idx="1">
+            <a:schemeClr val="lt1"/>
+          </a:fillRef>
+          <a:effectRef idx="0">
+            <a:schemeClr val="accent1"/>
+          </a:effectRef>
+          <a:fontRef idx="minor">
+            <a:schemeClr val="dk1"/>
+          </a:fontRef>
+        </p:style>
+        <p:txBody>
+          <a:bodyPr rtlCol="0" anchor="t"/>
+          <a:lstStyle/>
+          <a:p>
+            <a:pPr algn="ctr"/>
+            <a:r>
+              <a:rPr lang="nl-BE" sz="1400" dirty="0"/>
+              <a:t>TASK_SEAD</a:t>
+            </a:r>
+          </a:p>
+        </p:txBody>
+      </p:sp>
+      <p:cxnSp>
+        <p:nvCxnSpPr>
+          <p:cNvPr id="201" name="Rechte verbindingslijn 200"/>
+          <p:cNvCxnSpPr>
+            <a:stCxn id="200" idx="0"/>
+            <a:endCxn id="199" idx="3"/>
+          </p:cNvCxnSpPr>
+          <p:nvPr/>
+        </p:nvCxnSpPr>
+        <p:spPr>
+          <a:xfrm flipV="1">
+            <a:off x="4070978" y="3068996"/>
+            <a:ext cx="0" cy="360004"/>
+          </a:xfrm>
+          <a:prstGeom prst="line">
+            <a:avLst/>
+          </a:prstGeom>
+          <a:ln w="19050"/>
+        </p:spPr>
+        <p:style>
+          <a:lnRef idx="1">
+            <a:schemeClr val="accent1"/>
+          </a:lnRef>
+          <a:fillRef idx="0">
+            <a:schemeClr val="accent1"/>
+          </a:fillRef>
+          <a:effectRef idx="0">
+            <a:schemeClr val="accent1"/>
+          </a:effectRef>
+          <a:fontRef idx="minor">
+            <a:schemeClr val="tx1"/>
+          </a:fontRef>
+        </p:style>
+      </p:cxnSp>
+      <p:sp>
+        <p:nvSpPr>
+          <p:cNvPr id="204" name="Rechthoek 203"/>
+          <p:cNvSpPr/>
+          <p:nvPr/>
+        </p:nvSpPr>
+        <p:spPr>
+          <a:xfrm>
+            <a:off x="8076022" y="3969006"/>
+            <a:ext cx="1530017" cy="630007"/>
+          </a:xfrm>
+          <a:prstGeom prst="rect">
+            <a:avLst/>
+          </a:prstGeom>
+          <a:ln w="19050"/>
+        </p:spPr>
+        <p:style>
+          <a:lnRef idx="2">
+            <a:schemeClr val="accent1"/>
+          </a:lnRef>
+          <a:fillRef idx="1">
+            <a:schemeClr val="lt1"/>
+          </a:fillRef>
+          <a:effectRef idx="0">
+            <a:schemeClr val="accent1"/>
+          </a:effectRef>
+          <a:fontRef idx="minor">
+            <a:schemeClr val="dk1"/>
+          </a:fontRef>
+        </p:style>
+        <p:txBody>
+          <a:bodyPr rtlCol="0" anchor="t"/>
+          <a:lstStyle/>
+          <a:p>
+            <a:pPr algn="ctr"/>
+            <a:r>
+              <a:rPr lang="nl-BE" sz="1400" dirty="0"/>
+              <a:t>FSM_</a:t>
+            </a:r>
+            <a:br>
+              <a:rPr lang="nl-BE" sz="1400" dirty="0"/>
+            </a:br>
+            <a:r>
+              <a:rPr lang="nl-BE" sz="1400" dirty="0"/>
+              <a:t>CONTROLLABLE</a:t>
+            </a:r>
+          </a:p>
+        </p:txBody>
+      </p:sp>
+      <p:cxnSp>
+        <p:nvCxnSpPr>
+          <p:cNvPr id="210" name="Rechte verbindingslijn 209"/>
+          <p:cNvCxnSpPr>
+            <a:stCxn id="211" idx="1"/>
+            <a:endCxn id="212" idx="3"/>
+          </p:cNvCxnSpPr>
+          <p:nvPr/>
+        </p:nvCxnSpPr>
+        <p:spPr>
+          <a:xfrm flipH="1">
+            <a:off x="5195990" y="3654003"/>
+            <a:ext cx="450005" cy="0"/>
+          </a:xfrm>
+          <a:prstGeom prst="line">
+            <a:avLst/>
+          </a:prstGeom>
+          <a:ln w="19050">
+            <a:prstDash val="sysDash"/>
+          </a:ln>
+        </p:spPr>
+        <p:style>
+          <a:lnRef idx="1">
+            <a:schemeClr val="accent1"/>
+          </a:lnRef>
+          <a:fillRef idx="0">
+            <a:schemeClr val="accent1"/>
+          </a:fillRef>
+          <a:effectRef idx="0">
+            <a:schemeClr val="accent1"/>
+          </a:effectRef>
+          <a:fontRef idx="minor">
+            <a:schemeClr val="tx1"/>
+          </a:fontRef>
+        </p:style>
+      </p:cxnSp>
+      <p:sp>
+        <p:nvSpPr>
+          <p:cNvPr id="211" name="Rechthoek 210"/>
+          <p:cNvSpPr/>
+          <p:nvPr/>
+        </p:nvSpPr>
+        <p:spPr>
+          <a:xfrm>
+            <a:off x="5645995" y="3429000"/>
+            <a:ext cx="1530017" cy="450005"/>
+          </a:xfrm>
+          <a:prstGeom prst="rect">
+            <a:avLst/>
+          </a:prstGeom>
+          <a:ln w="19050"/>
+        </p:spPr>
+        <p:style>
+          <a:lnRef idx="2">
+            <a:schemeClr val="accent1"/>
+          </a:lnRef>
+          <a:fillRef idx="1">
+            <a:schemeClr val="lt1"/>
+          </a:fillRef>
+          <a:effectRef idx="0">
+            <a:schemeClr val="accent1"/>
+          </a:effectRef>
+          <a:fontRef idx="minor">
+            <a:schemeClr val="dk1"/>
+          </a:fontRef>
+        </p:style>
+        <p:txBody>
+          <a:bodyPr rtlCol="0" anchor="t"/>
+          <a:lstStyle/>
+          <a:p>
+            <a:pPr algn="ctr"/>
+            <a:r>
+              <a:rPr lang="nl-BE" sz="1400" dirty="0"/>
+              <a:t>FSM_ASSIGN</a:t>
+            </a:r>
+          </a:p>
+        </p:txBody>
+      </p:sp>
+      <p:sp>
+        <p:nvSpPr>
+          <p:cNvPr id="212" name="Ruit 211"/>
+          <p:cNvSpPr/>
+          <p:nvPr/>
+        </p:nvSpPr>
+        <p:spPr>
+          <a:xfrm>
+            <a:off x="4835986" y="3519001"/>
+            <a:ext cx="360004" cy="270003"/>
+          </a:xfrm>
+          <a:prstGeom prst="diamond">
+            <a:avLst/>
+          </a:prstGeom>
+          <a:solidFill>
+            <a:schemeClr val="accent1"/>
+          </a:solidFill>
+          <a:ln w="19050"/>
+        </p:spPr>
+        <p:style>
+          <a:lnRef idx="2">
+            <a:schemeClr val="accent1"/>
+          </a:lnRef>
+          <a:fillRef idx="1">
+            <a:schemeClr val="lt1"/>
+          </a:fillRef>
+          <a:effectRef idx="0">
+            <a:schemeClr val="accent1"/>
+          </a:effectRef>
+          <a:fontRef idx="minor">
+            <a:schemeClr val="dk1"/>
+          </a:fontRef>
+        </p:style>
+        <p:txBody>
+          <a:bodyPr rtlCol="0" anchor="ctr"/>
+          <a:lstStyle/>
+          <a:p>
+            <a:pPr algn="ctr"/>
+            <a:endParaRPr lang="nl-BE"/>
+          </a:p>
+        </p:txBody>
+      </p:sp>
+      <p:cxnSp>
+        <p:nvCxnSpPr>
+          <p:cNvPr id="26" name="Rechte verbindingslijn 25"/>
+          <p:cNvCxnSpPr/>
+          <p:nvPr/>
+        </p:nvCxnSpPr>
+        <p:spPr>
+          <a:xfrm>
+            <a:off x="3305969" y="3699003"/>
+            <a:ext cx="1530017" cy="0"/>
+          </a:xfrm>
+          <a:prstGeom prst="line">
+            <a:avLst/>
+          </a:prstGeom>
+          <a:ln w="19050"/>
+        </p:spPr>
+        <p:style>
+          <a:lnRef idx="1">
+            <a:schemeClr val="accent1"/>
+          </a:lnRef>
+          <a:fillRef idx="0">
+            <a:schemeClr val="accent1"/>
+          </a:fillRef>
+          <a:effectRef idx="0">
+            <a:schemeClr val="accent1"/>
+          </a:effectRef>
+          <a:fontRef idx="minor">
+            <a:schemeClr val="tx1"/>
+          </a:fontRef>
+        </p:style>
+      </p:cxnSp>
+      <p:cxnSp>
+        <p:nvCxnSpPr>
+          <p:cNvPr id="69" name="Rechte verbindingslijn 68"/>
+          <p:cNvCxnSpPr/>
+          <p:nvPr/>
+        </p:nvCxnSpPr>
+        <p:spPr>
+          <a:xfrm>
+            <a:off x="8076022" y="4509012"/>
+            <a:ext cx="1530017" cy="0"/>
+          </a:xfrm>
+          <a:prstGeom prst="line">
+            <a:avLst/>
+          </a:prstGeom>
+          <a:ln w="19050"/>
+        </p:spPr>
+        <p:style>
+          <a:lnRef idx="1">
+            <a:schemeClr val="accent1"/>
+          </a:lnRef>
+          <a:fillRef idx="0">
+            <a:schemeClr val="accent1"/>
+          </a:fillRef>
+          <a:effectRef idx="0">
+            <a:schemeClr val="accent1"/>
+          </a:effectRef>
+          <a:fontRef idx="minor">
+            <a:schemeClr val="tx1"/>
+          </a:fontRef>
+        </p:style>
+      </p:cxnSp>
+      <p:cxnSp>
+        <p:nvCxnSpPr>
+          <p:cNvPr id="70" name="Rechte verbindingslijn 69"/>
+          <p:cNvCxnSpPr/>
+          <p:nvPr/>
+        </p:nvCxnSpPr>
+        <p:spPr>
+          <a:xfrm>
+            <a:off x="8076022" y="4419011"/>
+            <a:ext cx="1530017" cy="0"/>
+          </a:xfrm>
+          <a:prstGeom prst="line">
+            <a:avLst/>
+          </a:prstGeom>
+          <a:ln w="19050"/>
+        </p:spPr>
+        <p:style>
+          <a:lnRef idx="1">
+            <a:schemeClr val="accent1"/>
+          </a:lnRef>
+          <a:fillRef idx="0">
+            <a:schemeClr val="accent1"/>
+          </a:fillRef>
+          <a:effectRef idx="0">
+            <a:schemeClr val="accent1"/>
+          </a:effectRef>
+          <a:fontRef idx="minor">
+            <a:schemeClr val="tx1"/>
+          </a:fontRef>
+        </p:style>
+      </p:cxnSp>
+      <p:cxnSp>
+        <p:nvCxnSpPr>
+          <p:cNvPr id="75" name="Rechte verbindingslijn 74"/>
+          <p:cNvCxnSpPr>
+            <a:stCxn id="76" idx="1"/>
+            <a:endCxn id="77" idx="3"/>
+          </p:cNvCxnSpPr>
+          <p:nvPr/>
+        </p:nvCxnSpPr>
+        <p:spPr>
+          <a:xfrm flipH="1">
+            <a:off x="5195990" y="4194009"/>
+            <a:ext cx="450005" cy="0"/>
+          </a:xfrm>
+          <a:prstGeom prst="line">
+            <a:avLst/>
+          </a:prstGeom>
+          <a:ln w="19050">
+            <a:prstDash val="sysDash"/>
+          </a:ln>
+        </p:spPr>
+        <p:style>
+          <a:lnRef idx="1">
+            <a:schemeClr val="accent1"/>
+          </a:lnRef>
+          <a:fillRef idx="0">
+            <a:schemeClr val="accent1"/>
+          </a:fillRef>
+          <a:effectRef idx="0">
+            <a:schemeClr val="accent1"/>
+          </a:effectRef>
+          <a:fontRef idx="minor">
+            <a:schemeClr val="tx1"/>
+          </a:fontRef>
+        </p:style>
+      </p:cxnSp>
+      <p:sp>
+        <p:nvSpPr>
+          <p:cNvPr id="76" name="Rechthoek 75"/>
+          <p:cNvSpPr/>
+          <p:nvPr/>
+        </p:nvSpPr>
+        <p:spPr>
+          <a:xfrm>
+            <a:off x="5645995" y="3969006"/>
+            <a:ext cx="1530017" cy="450005"/>
+          </a:xfrm>
+          <a:prstGeom prst="rect">
+            <a:avLst/>
+          </a:prstGeom>
+          <a:ln w="19050"/>
+        </p:spPr>
+        <p:style>
+          <a:lnRef idx="2">
+            <a:schemeClr val="accent1"/>
+          </a:lnRef>
+          <a:fillRef idx="1">
+            <a:schemeClr val="lt1"/>
+          </a:fillRef>
+          <a:effectRef idx="0">
+            <a:schemeClr val="accent1"/>
+          </a:effectRef>
+          <a:fontRef idx="minor">
+            <a:schemeClr val="dk1"/>
+          </a:fontRef>
+        </p:style>
+        <p:txBody>
+          <a:bodyPr rtlCol="0" anchor="t"/>
+          <a:lstStyle/>
+          <a:p>
+            <a:pPr algn="ctr"/>
+            <a:r>
+              <a:rPr lang="nl-BE" sz="1400" dirty="0"/>
+              <a:t>FSM_ROUTE</a:t>
+            </a:r>
+          </a:p>
+        </p:txBody>
+      </p:sp>
+      <p:sp>
+        <p:nvSpPr>
+          <p:cNvPr id="77" name="Ruit 76"/>
+          <p:cNvSpPr/>
+          <p:nvPr/>
+        </p:nvSpPr>
+        <p:spPr>
+          <a:xfrm>
+            <a:off x="4835986" y="4059007"/>
+            <a:ext cx="360004" cy="270003"/>
+          </a:xfrm>
+          <a:prstGeom prst="diamond">
+            <a:avLst/>
+          </a:prstGeom>
+          <a:solidFill>
+            <a:schemeClr val="accent1"/>
+          </a:solidFill>
+          <a:ln w="19050"/>
+        </p:spPr>
+        <p:style>
+          <a:lnRef idx="2">
+            <a:schemeClr val="accent1"/>
+          </a:lnRef>
+          <a:fillRef idx="1">
+            <a:schemeClr val="lt1"/>
+          </a:fillRef>
+          <a:effectRef idx="0">
+            <a:schemeClr val="accent1"/>
+          </a:effectRef>
+          <a:fontRef idx="minor">
+            <a:schemeClr val="dk1"/>
+          </a:fontRef>
+        </p:style>
+        <p:txBody>
+          <a:bodyPr rtlCol="0" anchor="ctr"/>
+          <a:lstStyle/>
+          <a:p>
+            <a:pPr algn="ctr"/>
+            <a:endParaRPr lang="nl-BE"/>
+          </a:p>
+        </p:txBody>
+      </p:sp>
+      <p:cxnSp>
+        <p:nvCxnSpPr>
+          <p:cNvPr id="80" name="Rechte verbindingslijn 79"/>
+          <p:cNvCxnSpPr>
+            <a:stCxn id="83" idx="1"/>
+            <a:endCxn id="84" idx="3"/>
+          </p:cNvCxnSpPr>
+          <p:nvPr/>
+        </p:nvCxnSpPr>
+        <p:spPr>
+          <a:xfrm flipH="1">
+            <a:off x="5195990" y="4734015"/>
+            <a:ext cx="450005" cy="0"/>
+          </a:xfrm>
+          <a:prstGeom prst="line">
+            <a:avLst/>
+          </a:prstGeom>
+          <a:ln w="19050">
+            <a:prstDash val="sysDash"/>
+          </a:ln>
+        </p:spPr>
+        <p:style>
+          <a:lnRef idx="1">
+            <a:schemeClr val="accent1"/>
+          </a:lnRef>
+          <a:fillRef idx="0">
+            <a:schemeClr val="accent1"/>
+          </a:fillRef>
+          <a:effectRef idx="0">
+            <a:schemeClr val="accent1"/>
+          </a:effectRef>
+          <a:fontRef idx="minor">
+            <a:schemeClr val="tx1"/>
+          </a:fontRef>
+        </p:style>
+      </p:cxnSp>
+      <p:sp>
+        <p:nvSpPr>
+          <p:cNvPr id="83" name="Rechthoek 82"/>
+          <p:cNvSpPr/>
+          <p:nvPr/>
+        </p:nvSpPr>
+        <p:spPr>
+          <a:xfrm>
+            <a:off x="5645995" y="4509012"/>
+            <a:ext cx="1530017" cy="450005"/>
+          </a:xfrm>
+          <a:prstGeom prst="rect">
+            <a:avLst/>
+          </a:prstGeom>
+          <a:ln w="19050"/>
+        </p:spPr>
+        <p:style>
+          <a:lnRef idx="2">
+            <a:schemeClr val="accent1"/>
+          </a:lnRef>
+          <a:fillRef idx="1">
+            <a:schemeClr val="lt1"/>
+          </a:fillRef>
+          <a:effectRef idx="0">
+            <a:schemeClr val="accent1"/>
+          </a:effectRef>
+          <a:fontRef idx="minor">
+            <a:schemeClr val="dk1"/>
+          </a:fontRef>
+        </p:style>
+        <p:txBody>
+          <a:bodyPr rtlCol="0" anchor="t"/>
+          <a:lstStyle/>
+          <a:p>
+            <a:pPr algn="ctr"/>
+            <a:r>
+              <a:rPr lang="nl-BE" sz="1400" dirty="0"/>
+              <a:t>FSM_ACCOUNT</a:t>
+            </a:r>
+          </a:p>
+        </p:txBody>
+      </p:sp>
+      <p:sp>
+        <p:nvSpPr>
+          <p:cNvPr id="84" name="Ruit 83"/>
+          <p:cNvSpPr/>
+          <p:nvPr/>
+        </p:nvSpPr>
+        <p:spPr>
+          <a:xfrm>
+            <a:off x="4835986" y="4599013"/>
+            <a:ext cx="360004" cy="270003"/>
+          </a:xfrm>
+          <a:prstGeom prst="diamond">
+            <a:avLst/>
+          </a:prstGeom>
+          <a:solidFill>
+            <a:schemeClr val="accent1"/>
+          </a:solidFill>
+          <a:ln w="19050"/>
+        </p:spPr>
+        <p:style>
+          <a:lnRef idx="2">
+            <a:schemeClr val="accent1"/>
+          </a:lnRef>
+          <a:fillRef idx="1">
+            <a:schemeClr val="lt1"/>
+          </a:fillRef>
+          <a:effectRef idx="0">
+            <a:schemeClr val="accent1"/>
+          </a:effectRef>
+          <a:fontRef idx="minor">
+            <a:schemeClr val="dk1"/>
+          </a:fontRef>
+        </p:style>
+        <p:txBody>
+          <a:bodyPr rtlCol="0" anchor="ctr"/>
+          <a:lstStyle/>
+          <a:p>
+            <a:pPr algn="ctr"/>
+            <a:endParaRPr lang="nl-BE"/>
+          </a:p>
+        </p:txBody>
+      </p:sp>
+      <p:cxnSp>
+        <p:nvCxnSpPr>
+          <p:cNvPr id="87" name="Rechte verbindingslijn 86"/>
+          <p:cNvCxnSpPr>
+            <a:stCxn id="88" idx="1"/>
+            <a:endCxn id="89" idx="3"/>
+          </p:cNvCxnSpPr>
+          <p:nvPr/>
+        </p:nvCxnSpPr>
+        <p:spPr>
+          <a:xfrm flipH="1">
+            <a:off x="5195990" y="5274021"/>
+            <a:ext cx="450005" cy="0"/>
+          </a:xfrm>
+          <a:prstGeom prst="line">
+            <a:avLst/>
+          </a:prstGeom>
+          <a:ln w="19050">
+            <a:prstDash val="sysDash"/>
+          </a:ln>
+        </p:spPr>
+        <p:style>
+          <a:lnRef idx="1">
+            <a:schemeClr val="accent1"/>
+          </a:lnRef>
+          <a:fillRef idx="0">
+            <a:schemeClr val="accent1"/>
+          </a:fillRef>
+          <a:effectRef idx="0">
+            <a:schemeClr val="accent1"/>
+          </a:effectRef>
+          <a:fontRef idx="minor">
+            <a:schemeClr val="tx1"/>
+          </a:fontRef>
+        </p:style>
+      </p:cxnSp>
+      <p:sp>
+        <p:nvSpPr>
+          <p:cNvPr id="88" name="Rechthoek 87"/>
+          <p:cNvSpPr/>
+          <p:nvPr/>
+        </p:nvSpPr>
+        <p:spPr>
+          <a:xfrm>
+            <a:off x="5645995" y="5049018"/>
+            <a:ext cx="1530017" cy="450005"/>
+          </a:xfrm>
+          <a:prstGeom prst="rect">
+            <a:avLst/>
+          </a:prstGeom>
+          <a:ln w="19050"/>
+        </p:spPr>
+        <p:style>
+          <a:lnRef idx="2">
+            <a:schemeClr val="accent1"/>
+          </a:lnRef>
+          <a:fillRef idx="1">
+            <a:schemeClr val="lt1"/>
+          </a:fillRef>
+          <a:effectRef idx="0">
+            <a:schemeClr val="accent1"/>
+          </a:effectRef>
+          <a:fontRef idx="minor">
+            <a:schemeClr val="dk1"/>
+          </a:fontRef>
+        </p:style>
+        <p:txBody>
+          <a:bodyPr rtlCol="0" anchor="t"/>
+          <a:lstStyle/>
+          <a:p>
+            <a:pPr algn="ctr"/>
+            <a:r>
+              <a:rPr lang="nl-BE" sz="1400" dirty="0"/>
+              <a:t>FSM_SMOKE</a:t>
+            </a:r>
+          </a:p>
+        </p:txBody>
+      </p:sp>
+      <p:sp>
+        <p:nvSpPr>
+          <p:cNvPr id="89" name="Ruit 88"/>
+          <p:cNvSpPr/>
+          <p:nvPr/>
+        </p:nvSpPr>
+        <p:spPr>
+          <a:xfrm>
+            <a:off x="4835986" y="5139019"/>
+            <a:ext cx="360004" cy="270003"/>
+          </a:xfrm>
+          <a:prstGeom prst="diamond">
+            <a:avLst/>
+          </a:prstGeom>
+          <a:solidFill>
+            <a:schemeClr val="accent1"/>
+          </a:solidFill>
+          <a:ln w="19050"/>
+        </p:spPr>
+        <p:style>
+          <a:lnRef idx="2">
+            <a:schemeClr val="accent1"/>
+          </a:lnRef>
+          <a:fillRef idx="1">
+            <a:schemeClr val="lt1"/>
+          </a:fillRef>
+          <a:effectRef idx="0">
+            <a:schemeClr val="accent1"/>
+          </a:effectRef>
+          <a:fontRef idx="minor">
+            <a:schemeClr val="dk1"/>
+          </a:fontRef>
+        </p:style>
+        <p:txBody>
+          <a:bodyPr rtlCol="0" anchor="ctr"/>
+          <a:lstStyle/>
+          <a:p>
+            <a:pPr algn="ctr"/>
+            <a:endParaRPr lang="nl-BE"/>
+          </a:p>
+        </p:txBody>
+      </p:sp>
+      <p:sp>
+        <p:nvSpPr>
+          <p:cNvPr id="97" name="Rechthoek 96"/>
+          <p:cNvSpPr/>
+          <p:nvPr/>
+        </p:nvSpPr>
+        <p:spPr>
+          <a:xfrm>
+            <a:off x="8076022" y="5949028"/>
+            <a:ext cx="1530017" cy="630007"/>
+          </a:xfrm>
+          <a:prstGeom prst="rect">
+            <a:avLst/>
+          </a:prstGeom>
+          <a:ln w="19050"/>
+        </p:spPr>
+        <p:style>
+          <a:lnRef idx="2">
+            <a:schemeClr val="accent1"/>
+          </a:lnRef>
+          <a:fillRef idx="1">
+            <a:schemeClr val="lt1"/>
+          </a:fillRef>
+          <a:effectRef idx="0">
+            <a:schemeClr val="accent1"/>
+          </a:effectRef>
+          <a:fontRef idx="minor">
+            <a:schemeClr val="dk1"/>
+          </a:fontRef>
+        </p:style>
+        <p:txBody>
+          <a:bodyPr rtlCol="0" anchor="t"/>
+          <a:lstStyle/>
+          <a:p>
+            <a:pPr algn="ctr"/>
+            <a:r>
+              <a:rPr lang="nl-BE" sz="1400" dirty="0"/>
+              <a:t>UNIT</a:t>
+            </a:r>
+          </a:p>
+        </p:txBody>
+      </p:sp>
+      <p:sp>
+        <p:nvSpPr>
+          <p:cNvPr id="101" name="Ruit 100"/>
+          <p:cNvSpPr/>
+          <p:nvPr/>
+        </p:nvSpPr>
+        <p:spPr>
+          <a:xfrm rot="16200000">
+            <a:off x="3890976" y="5544023"/>
+            <a:ext cx="360004" cy="270003"/>
+          </a:xfrm>
+          <a:prstGeom prst="diamond">
+            <a:avLst/>
+          </a:prstGeom>
+          <a:solidFill>
+            <a:schemeClr val="accent1"/>
+          </a:solidFill>
+          <a:ln w="19050"/>
+        </p:spPr>
+        <p:style>
+          <a:lnRef idx="2">
+            <a:schemeClr val="accent1"/>
+          </a:lnRef>
+          <a:fillRef idx="1">
+            <a:schemeClr val="lt1"/>
+          </a:fillRef>
+          <a:effectRef idx="0">
+            <a:schemeClr val="accent1"/>
+          </a:effectRef>
+          <a:fontRef idx="minor">
+            <a:schemeClr val="dk1"/>
+          </a:fontRef>
+        </p:style>
+        <p:txBody>
+          <a:bodyPr rtlCol="0" anchor="ctr"/>
+          <a:lstStyle/>
+          <a:p>
+            <a:pPr algn="ctr"/>
+            <a:endParaRPr lang="nl-BE"/>
+          </a:p>
+        </p:txBody>
+      </p:sp>
+      <p:sp>
+        <p:nvSpPr>
+          <p:cNvPr id="115" name="Ruit 114"/>
+          <p:cNvSpPr/>
+          <p:nvPr/>
+        </p:nvSpPr>
+        <p:spPr>
+          <a:xfrm rot="5400000">
+            <a:off x="4340980" y="3113997"/>
+            <a:ext cx="360004" cy="270003"/>
+          </a:xfrm>
+          <a:prstGeom prst="diamond">
+            <a:avLst/>
+          </a:prstGeom>
+          <a:ln w="19050"/>
+        </p:spPr>
+        <p:style>
+          <a:lnRef idx="2">
+            <a:schemeClr val="accent1"/>
+          </a:lnRef>
+          <a:fillRef idx="1">
+            <a:schemeClr val="lt1"/>
+          </a:fillRef>
+          <a:effectRef idx="0">
+            <a:schemeClr val="accent1"/>
+          </a:effectRef>
+          <a:fontRef idx="minor">
+            <a:schemeClr val="dk1"/>
+          </a:fontRef>
+        </p:style>
+        <p:txBody>
+          <a:bodyPr rtlCol="0" anchor="ctr"/>
+          <a:lstStyle/>
+          <a:p>
+            <a:pPr algn="ctr"/>
+            <a:endParaRPr lang="nl-BE"/>
+          </a:p>
+        </p:txBody>
+      </p:sp>
+      <p:sp>
+        <p:nvSpPr>
+          <p:cNvPr id="116" name="Gelijkbenige driehoek 115"/>
+          <p:cNvSpPr/>
+          <p:nvPr/>
+        </p:nvSpPr>
+        <p:spPr>
+          <a:xfrm rot="5400000">
+            <a:off x="7761018" y="4104008"/>
+            <a:ext cx="270003" cy="360004"/>
+          </a:xfrm>
+          <a:prstGeom prst="triangle">
+            <a:avLst/>
+          </a:prstGeom>
+          <a:ln w="19050"/>
+        </p:spPr>
+        <p:style>
+          <a:lnRef idx="2">
+            <a:schemeClr val="accent1"/>
+          </a:lnRef>
+          <a:fillRef idx="1">
+            <a:schemeClr val="lt1"/>
+          </a:fillRef>
+          <a:effectRef idx="0">
+            <a:schemeClr val="accent1"/>
+          </a:effectRef>
+          <a:fontRef idx="minor">
+            <a:schemeClr val="dk1"/>
+          </a:fontRef>
+        </p:style>
+        <p:txBody>
+          <a:bodyPr rtlCol="0" anchor="ctr"/>
+          <a:lstStyle/>
+          <a:p>
+            <a:pPr algn="ctr"/>
+            <a:endParaRPr lang="nl-BE"/>
+          </a:p>
+        </p:txBody>
+      </p:sp>
+      <p:cxnSp>
+        <p:nvCxnSpPr>
+          <p:cNvPr id="239" name="Verbindingslijn: gebogen 238"/>
+          <p:cNvCxnSpPr>
+            <a:stCxn id="116" idx="3"/>
+            <a:endCxn id="211" idx="3"/>
+          </p:cNvCxnSpPr>
+          <p:nvPr/>
+        </p:nvCxnSpPr>
+        <p:spPr>
+          <a:xfrm rot="10800000">
+            <a:off x="7176012" y="3654003"/>
+            <a:ext cx="540006" cy="630008"/>
+          </a:xfrm>
+          <a:prstGeom prst="bentConnector3">
+            <a:avLst>
+              <a:gd name="adj1" fmla="val 50000"/>
+            </a:avLst>
+          </a:prstGeom>
+          <a:ln w="19050"/>
+        </p:spPr>
+        <p:style>
+          <a:lnRef idx="1">
+            <a:schemeClr val="accent1"/>
+          </a:lnRef>
+          <a:fillRef idx="0">
+            <a:schemeClr val="accent1"/>
+          </a:fillRef>
+          <a:effectRef idx="0">
+            <a:schemeClr val="accent1"/>
+          </a:effectRef>
+          <a:fontRef idx="minor">
+            <a:schemeClr val="tx1"/>
+          </a:fontRef>
+        </p:style>
+      </p:cxnSp>
+      <p:cxnSp>
+        <p:nvCxnSpPr>
+          <p:cNvPr id="119" name="Verbindingslijn: gebogen 118"/>
+          <p:cNvCxnSpPr>
+            <a:stCxn id="116" idx="3"/>
+            <a:endCxn id="76" idx="3"/>
+          </p:cNvCxnSpPr>
+          <p:nvPr/>
+        </p:nvCxnSpPr>
+        <p:spPr>
+          <a:xfrm rot="10800000">
+            <a:off x="7176012" y="4194009"/>
+            <a:ext cx="540006" cy="90002"/>
+          </a:xfrm>
+          <a:prstGeom prst="bentConnector3">
+            <a:avLst>
+              <a:gd name="adj1" fmla="val 50000"/>
+            </a:avLst>
+          </a:prstGeom>
+          <a:ln w="19050"/>
+        </p:spPr>
+        <p:style>
+          <a:lnRef idx="1">
+            <a:schemeClr val="accent1"/>
+          </a:lnRef>
+          <a:fillRef idx="0">
+            <a:schemeClr val="accent1"/>
+          </a:fillRef>
+          <a:effectRef idx="0">
+            <a:schemeClr val="accent1"/>
+          </a:effectRef>
+          <a:fontRef idx="minor">
+            <a:schemeClr val="tx1"/>
+          </a:fontRef>
+        </p:style>
+      </p:cxnSp>
+      <p:cxnSp>
+        <p:nvCxnSpPr>
+          <p:cNvPr id="122" name="Verbindingslijn: gebogen 121"/>
+          <p:cNvCxnSpPr>
+            <a:stCxn id="116" idx="3"/>
+            <a:endCxn id="83" idx="3"/>
+          </p:cNvCxnSpPr>
+          <p:nvPr/>
+        </p:nvCxnSpPr>
+        <p:spPr>
+          <a:xfrm rot="10800000" flipV="1">
+            <a:off x="7176012" y="4284011"/>
+            <a:ext cx="540006" cy="450004"/>
+          </a:xfrm>
+          <a:prstGeom prst="bentConnector3">
+            <a:avLst>
+              <a:gd name="adj1" fmla="val 50000"/>
+            </a:avLst>
+          </a:prstGeom>
+          <a:ln w="19050"/>
+        </p:spPr>
+        <p:style>
+          <a:lnRef idx="1">
+            <a:schemeClr val="accent1"/>
+          </a:lnRef>
+          <a:fillRef idx="0">
+            <a:schemeClr val="accent1"/>
+          </a:fillRef>
+          <a:effectRef idx="0">
+            <a:schemeClr val="accent1"/>
+          </a:effectRef>
+          <a:fontRef idx="minor">
+            <a:schemeClr val="tx1"/>
+          </a:fontRef>
+        </p:style>
+      </p:cxnSp>
+      <p:cxnSp>
+        <p:nvCxnSpPr>
+          <p:cNvPr id="125" name="Verbindingslijn: gebogen 124"/>
+          <p:cNvCxnSpPr>
+            <a:stCxn id="116" idx="3"/>
+            <a:endCxn id="88" idx="3"/>
+          </p:cNvCxnSpPr>
+          <p:nvPr/>
+        </p:nvCxnSpPr>
+        <p:spPr>
+          <a:xfrm rot="10800000" flipV="1">
+            <a:off x="7176012" y="4284011"/>
+            <a:ext cx="540006" cy="990010"/>
+          </a:xfrm>
+          <a:prstGeom prst="bentConnector3">
+            <a:avLst>
+              <a:gd name="adj1" fmla="val 50000"/>
+            </a:avLst>
+          </a:prstGeom>
+          <a:ln w="19050"/>
+        </p:spPr>
+        <p:style>
+          <a:lnRef idx="1">
+            <a:schemeClr val="accent1"/>
+          </a:lnRef>
+          <a:fillRef idx="0">
+            <a:schemeClr val="accent1"/>
+          </a:fillRef>
+          <a:effectRef idx="0">
+            <a:schemeClr val="accent1"/>
+          </a:effectRef>
+          <a:fontRef idx="minor">
+            <a:schemeClr val="tx1"/>
+          </a:fontRef>
+        </p:style>
+      </p:cxnSp>
+      <p:sp>
+        <p:nvSpPr>
+          <p:cNvPr id="130" name="Rechthoek 129"/>
+          <p:cNvSpPr/>
+          <p:nvPr/>
+        </p:nvSpPr>
+        <p:spPr>
+          <a:xfrm>
+            <a:off x="5645995" y="2078985"/>
+            <a:ext cx="1530017" cy="630007"/>
+          </a:xfrm>
+          <a:prstGeom prst="rect">
+            <a:avLst/>
+          </a:prstGeom>
+          <a:ln w="19050"/>
+        </p:spPr>
+        <p:style>
+          <a:lnRef idx="2">
+            <a:schemeClr val="accent1"/>
+          </a:lnRef>
+          <a:fillRef idx="1">
+            <a:schemeClr val="lt1"/>
+          </a:fillRef>
+          <a:effectRef idx="0">
+            <a:schemeClr val="accent1"/>
+          </a:effectRef>
+          <a:fontRef idx="minor">
+            <a:schemeClr val="dk1"/>
+          </a:fontRef>
+        </p:style>
+        <p:txBody>
+          <a:bodyPr rtlCol="0" anchor="t"/>
+          <a:lstStyle/>
+          <a:p>
+            <a:pPr algn="ctr"/>
+            <a:r>
+              <a:rPr lang="nl-BE" sz="1400" dirty="0"/>
+              <a:t>FSM_TASK</a:t>
+            </a:r>
+          </a:p>
+        </p:txBody>
+      </p:sp>
+      <p:sp>
+        <p:nvSpPr>
+          <p:cNvPr id="134" name="Gelijkbenige driehoek 133"/>
+          <p:cNvSpPr/>
+          <p:nvPr/>
+        </p:nvSpPr>
+        <p:spPr>
+          <a:xfrm rot="5400000">
+            <a:off x="7761018" y="2213987"/>
+            <a:ext cx="270004" cy="360004"/>
+          </a:xfrm>
+          <a:prstGeom prst="triangle">
+            <a:avLst/>
+          </a:prstGeom>
+          <a:ln w="19050"/>
+        </p:spPr>
+        <p:style>
+          <a:lnRef idx="2">
+            <a:schemeClr val="accent1"/>
+          </a:lnRef>
+          <a:fillRef idx="1">
+            <a:schemeClr val="lt1"/>
+          </a:fillRef>
+          <a:effectRef idx="0">
+            <a:schemeClr val="accent1"/>
+          </a:effectRef>
+          <a:fontRef idx="minor">
+            <a:schemeClr val="dk1"/>
+          </a:fontRef>
+        </p:style>
+        <p:txBody>
+          <a:bodyPr rtlCol="0" anchor="ctr"/>
+          <a:lstStyle/>
+          <a:p>
+            <a:pPr algn="ctr"/>
+            <a:endParaRPr lang="nl-BE"/>
+          </a:p>
+        </p:txBody>
+      </p:sp>
+      <p:cxnSp>
+        <p:nvCxnSpPr>
+          <p:cNvPr id="254" name="Verbindingslijn: gebogen 253"/>
+          <p:cNvCxnSpPr>
+            <a:stCxn id="115" idx="1"/>
+            <a:endCxn id="130" idx="2"/>
+          </p:cNvCxnSpPr>
+          <p:nvPr/>
+        </p:nvCxnSpPr>
+        <p:spPr>
+          <a:xfrm rot="5400000" flipH="1" flipV="1">
+            <a:off x="5285991" y="1943984"/>
+            <a:ext cx="360005" cy="1890022"/>
+          </a:xfrm>
+          <a:prstGeom prst="bentConnector3">
+            <a:avLst/>
+          </a:prstGeom>
+          <a:ln w="19050"/>
+        </p:spPr>
+        <p:style>
+          <a:lnRef idx="1">
+            <a:schemeClr val="accent1"/>
+          </a:lnRef>
+          <a:fillRef idx="0">
+            <a:schemeClr val="accent1"/>
+          </a:fillRef>
+          <a:effectRef idx="0">
+            <a:schemeClr val="accent1"/>
+          </a:effectRef>
+          <a:fontRef idx="minor">
+            <a:schemeClr val="tx1"/>
+          </a:fontRef>
+        </p:style>
+      </p:cxnSp>
+      <p:sp>
+        <p:nvSpPr>
+          <p:cNvPr id="166" name="Rechthoek 165"/>
+          <p:cNvSpPr/>
+          <p:nvPr/>
+        </p:nvSpPr>
+        <p:spPr>
+          <a:xfrm>
+            <a:off x="8076022" y="2078985"/>
+            <a:ext cx="1530017" cy="630007"/>
+          </a:xfrm>
+          <a:prstGeom prst="rect">
+            <a:avLst/>
+          </a:prstGeom>
+          <a:ln w="19050"/>
+        </p:spPr>
+        <p:style>
+          <a:lnRef idx="2">
+            <a:schemeClr val="accent1"/>
+          </a:lnRef>
+          <a:fillRef idx="1">
+            <a:schemeClr val="lt1"/>
+          </a:fillRef>
+          <a:effectRef idx="0">
+            <a:schemeClr val="accent1"/>
+          </a:effectRef>
+          <a:fontRef idx="minor">
+            <a:schemeClr val="dk1"/>
+          </a:fontRef>
+        </p:style>
+        <p:txBody>
+          <a:bodyPr rtlCol="0" anchor="t"/>
+          <a:lstStyle/>
+          <a:p>
+            <a:pPr algn="ctr"/>
+            <a:r>
+              <a:rPr lang="nl-BE" sz="1400" dirty="0"/>
+              <a:t>FSM</a:t>
+            </a:r>
+          </a:p>
+        </p:txBody>
+      </p:sp>
+      <p:cxnSp>
+        <p:nvCxnSpPr>
+          <p:cNvPr id="95" name="Rechte verbindingslijn 94"/>
+          <p:cNvCxnSpPr>
+            <a:stCxn id="130" idx="3"/>
+            <a:endCxn id="134" idx="3"/>
+          </p:cNvCxnSpPr>
+          <p:nvPr/>
+        </p:nvCxnSpPr>
+        <p:spPr>
+          <a:xfrm>
+            <a:off x="7176012" y="2393989"/>
+            <a:ext cx="540006" cy="0"/>
+          </a:xfrm>
+          <a:prstGeom prst="line">
+            <a:avLst/>
+          </a:prstGeom>
+          <a:ln w="19050"/>
+        </p:spPr>
+        <p:style>
+          <a:lnRef idx="1">
+            <a:schemeClr val="accent1"/>
+          </a:lnRef>
+          <a:fillRef idx="0">
+            <a:schemeClr val="accent1"/>
+          </a:fillRef>
+          <a:effectRef idx="0">
+            <a:schemeClr val="accent1"/>
+          </a:effectRef>
+          <a:fontRef idx="minor">
+            <a:schemeClr val="tx1"/>
+          </a:fontRef>
+        </p:style>
+      </p:cxnSp>
+      <p:sp>
+        <p:nvSpPr>
+          <p:cNvPr id="173" name="Gelijkbenige driehoek 172"/>
+          <p:cNvSpPr/>
+          <p:nvPr/>
+        </p:nvSpPr>
+        <p:spPr>
+          <a:xfrm>
+            <a:off x="8706029" y="2708992"/>
+            <a:ext cx="270003" cy="360004"/>
+          </a:xfrm>
+          <a:prstGeom prst="triangle">
+            <a:avLst/>
+          </a:prstGeom>
+          <a:ln w="19050"/>
+        </p:spPr>
+        <p:style>
+          <a:lnRef idx="2">
+            <a:schemeClr val="accent1"/>
+          </a:lnRef>
+          <a:fillRef idx="1">
+            <a:schemeClr val="lt1"/>
+          </a:fillRef>
+          <a:effectRef idx="0">
+            <a:schemeClr val="accent1"/>
+          </a:effectRef>
+          <a:fontRef idx="minor">
+            <a:schemeClr val="dk1"/>
+          </a:fontRef>
+        </p:style>
+        <p:txBody>
+          <a:bodyPr rtlCol="0" anchor="ctr"/>
+          <a:lstStyle/>
+          <a:p>
+            <a:pPr algn="ctr"/>
+            <a:endParaRPr lang="nl-BE"/>
+          </a:p>
+        </p:txBody>
+      </p:sp>
+      <p:cxnSp>
+        <p:nvCxnSpPr>
+          <p:cNvPr id="175" name="Rechte verbindingslijn 174"/>
+          <p:cNvCxnSpPr>
+            <a:stCxn id="204" idx="0"/>
+            <a:endCxn id="173" idx="3"/>
+          </p:cNvCxnSpPr>
+          <p:nvPr/>
+        </p:nvCxnSpPr>
+        <p:spPr>
+          <a:xfrm flipV="1">
+            <a:off x="8841031" y="3068996"/>
+            <a:ext cx="0" cy="900010"/>
+          </a:xfrm>
+          <a:prstGeom prst="line">
+            <a:avLst/>
+          </a:prstGeom>
+          <a:ln w="19050"/>
+        </p:spPr>
+        <p:style>
+          <a:lnRef idx="1">
+            <a:schemeClr val="accent1"/>
+          </a:lnRef>
+          <a:fillRef idx="0">
+            <a:schemeClr val="accent1"/>
+          </a:fillRef>
+          <a:effectRef idx="0">
+            <a:schemeClr val="accent1"/>
+          </a:effectRef>
+          <a:fontRef idx="minor">
+            <a:schemeClr val="tx1"/>
+          </a:fontRef>
+        </p:style>
+      </p:cxnSp>
+      <p:sp>
+        <p:nvSpPr>
+          <p:cNvPr id="181" name="Rechthoek 180"/>
+          <p:cNvSpPr/>
+          <p:nvPr/>
+        </p:nvSpPr>
+        <p:spPr>
+          <a:xfrm>
+            <a:off x="5015988" y="5949028"/>
+            <a:ext cx="1530017" cy="630007"/>
+          </a:xfrm>
+          <a:prstGeom prst="rect">
+            <a:avLst/>
+          </a:prstGeom>
+          <a:ln w="19050"/>
+        </p:spPr>
+        <p:style>
+          <a:lnRef idx="2">
+            <a:schemeClr val="accent1"/>
+          </a:lnRef>
+          <a:fillRef idx="1">
+            <a:schemeClr val="lt1"/>
+          </a:fillRef>
+          <a:effectRef idx="0">
+            <a:schemeClr val="accent1"/>
+          </a:effectRef>
+          <a:fontRef idx="minor">
+            <a:schemeClr val="dk1"/>
+          </a:fontRef>
+        </p:style>
+        <p:txBody>
+          <a:bodyPr rtlCol="0" anchor="t"/>
+          <a:lstStyle/>
+          <a:p>
+            <a:pPr algn="ctr"/>
+            <a:r>
+              <a:rPr lang="nl-BE" sz="1400" dirty="0"/>
+              <a:t>GROUP</a:t>
+            </a:r>
+          </a:p>
+        </p:txBody>
+      </p:sp>
+      <p:cxnSp>
+        <p:nvCxnSpPr>
+          <p:cNvPr id="109" name="Verbindingslijn: gebogen 108"/>
+          <p:cNvCxnSpPr>
+            <a:stCxn id="101" idx="1"/>
+            <a:endCxn id="181" idx="1"/>
+          </p:cNvCxnSpPr>
+          <p:nvPr/>
+        </p:nvCxnSpPr>
+        <p:spPr>
+          <a:xfrm rot="16200000" flipH="1">
+            <a:off x="4340981" y="5589024"/>
+            <a:ext cx="405005" cy="945009"/>
+          </a:xfrm>
+          <a:prstGeom prst="bentConnector2">
+            <a:avLst/>
+          </a:prstGeom>
+          <a:ln w="19050"/>
+        </p:spPr>
+        <p:style>
+          <a:lnRef idx="1">
+            <a:schemeClr val="accent1"/>
+          </a:lnRef>
+          <a:fillRef idx="0">
+            <a:schemeClr val="accent1"/>
+          </a:fillRef>
+          <a:effectRef idx="0">
+            <a:schemeClr val="accent1"/>
+          </a:effectRef>
+          <a:fontRef idx="minor">
+            <a:schemeClr val="tx1"/>
+          </a:fontRef>
+        </p:style>
+      </p:cxnSp>
+      <p:cxnSp>
+        <p:nvCxnSpPr>
+          <p:cNvPr id="111" name="Rechte verbindingslijn 110"/>
+          <p:cNvCxnSpPr>
+            <a:stCxn id="190" idx="3"/>
+            <a:endCxn id="97" idx="1"/>
+          </p:cNvCxnSpPr>
+          <p:nvPr/>
+        </p:nvCxnSpPr>
+        <p:spPr>
+          <a:xfrm>
+            <a:off x="6906009" y="6264032"/>
+            <a:ext cx="1170013" cy="0"/>
+          </a:xfrm>
+          <a:prstGeom prst="line">
+            <a:avLst/>
+          </a:prstGeom>
+          <a:ln w="19050"/>
+        </p:spPr>
+        <p:style>
+          <a:lnRef idx="1">
+            <a:schemeClr val="accent1"/>
+          </a:lnRef>
+          <a:fillRef idx="0">
+            <a:schemeClr val="accent1"/>
+          </a:fillRef>
+          <a:effectRef idx="0">
+            <a:schemeClr val="accent1"/>
+          </a:effectRef>
+          <a:fontRef idx="minor">
+            <a:schemeClr val="tx1"/>
+          </a:fontRef>
+        </p:style>
+      </p:cxnSp>
+      <p:sp>
+        <p:nvSpPr>
+          <p:cNvPr id="190" name="Ruit 189"/>
+          <p:cNvSpPr/>
+          <p:nvPr/>
+        </p:nvSpPr>
+        <p:spPr>
+          <a:xfrm>
+            <a:off x="6546005" y="6129030"/>
+            <a:ext cx="360004" cy="270003"/>
+          </a:xfrm>
+          <a:prstGeom prst="diamond">
+            <a:avLst/>
+          </a:prstGeom>
+          <a:ln w="19050"/>
+        </p:spPr>
+        <p:style>
+          <a:lnRef idx="2">
+            <a:schemeClr val="accent1"/>
+          </a:lnRef>
+          <a:fillRef idx="1">
+            <a:schemeClr val="lt1"/>
+          </a:fillRef>
+          <a:effectRef idx="0">
+            <a:schemeClr val="accent1"/>
+          </a:effectRef>
+          <a:fontRef idx="minor">
+            <a:schemeClr val="dk1"/>
+          </a:fontRef>
+        </p:style>
+        <p:txBody>
+          <a:bodyPr rtlCol="0" anchor="ctr"/>
+          <a:lstStyle/>
+          <a:p>
+            <a:pPr algn="ctr"/>
+            <a:endParaRPr lang="nl-BE"/>
+          </a:p>
+        </p:txBody>
+      </p:sp>
+      <p:sp>
+        <p:nvSpPr>
+          <p:cNvPr id="193" name="Ruit 192"/>
+          <p:cNvSpPr/>
+          <p:nvPr/>
+        </p:nvSpPr>
+        <p:spPr>
+          <a:xfrm rot="16200000">
+            <a:off x="8661029" y="4644014"/>
+            <a:ext cx="360004" cy="270003"/>
+          </a:xfrm>
+          <a:prstGeom prst="diamond">
+            <a:avLst/>
+          </a:prstGeom>
+          <a:solidFill>
+            <a:schemeClr val="accent1"/>
+          </a:solidFill>
+          <a:ln w="19050"/>
+        </p:spPr>
+        <p:style>
+          <a:lnRef idx="2">
+            <a:schemeClr val="accent1"/>
+          </a:lnRef>
+          <a:fillRef idx="1">
+            <a:schemeClr val="lt1"/>
+          </a:fillRef>
+          <a:effectRef idx="0">
+            <a:schemeClr val="accent1"/>
+          </a:effectRef>
+          <a:fontRef idx="minor">
+            <a:schemeClr val="dk1"/>
+          </a:fontRef>
+        </p:style>
+        <p:txBody>
+          <a:bodyPr rtlCol="0" anchor="ctr"/>
+          <a:lstStyle/>
+          <a:p>
+            <a:pPr algn="ctr"/>
+            <a:endParaRPr lang="nl-BE"/>
+          </a:p>
+        </p:txBody>
+      </p:sp>
+      <p:cxnSp>
+        <p:nvCxnSpPr>
+          <p:cNvPr id="117" name="Rechte verbindingslijn 116"/>
+          <p:cNvCxnSpPr>
+            <a:stCxn id="193" idx="1"/>
+            <a:endCxn id="97" idx="0"/>
+          </p:cNvCxnSpPr>
+          <p:nvPr/>
+        </p:nvCxnSpPr>
+        <p:spPr>
+          <a:xfrm flipH="1">
+            <a:off x="8841031" y="4959018"/>
+            <a:ext cx="1" cy="990010"/>
+          </a:xfrm>
+          <a:prstGeom prst="line">
+            <a:avLst/>
+          </a:prstGeom>
+          <a:ln w="19050"/>
+        </p:spPr>
+        <p:style>
+          <a:lnRef idx="1">
+            <a:schemeClr val="accent1"/>
+          </a:lnRef>
+          <a:fillRef idx="0">
+            <a:schemeClr val="accent1"/>
+          </a:fillRef>
+          <a:effectRef idx="0">
+            <a:schemeClr val="accent1"/>
+          </a:effectRef>
+          <a:fontRef idx="minor">
+            <a:schemeClr val="tx1"/>
+          </a:fontRef>
+        </p:style>
+      </p:cxnSp>
+      <p:sp>
+        <p:nvSpPr>
+          <p:cNvPr id="198" name="Tekstvak 197"/>
+          <p:cNvSpPr txBox="1"/>
+          <p:nvPr/>
+        </p:nvSpPr>
+        <p:spPr>
+          <a:xfrm>
+            <a:off x="8886031" y="5679025"/>
+            <a:ext cx="270004" cy="270003"/>
+          </a:xfrm>
+          <a:prstGeom prst="rect">
+            <a:avLst/>
+          </a:prstGeom>
+          <a:noFill/>
+          <a:ln w="19050">
+            <a:noFill/>
+          </a:ln>
+        </p:spPr>
+        <p:style>
+          <a:lnRef idx="2">
+            <a:schemeClr val="accent1"/>
+          </a:lnRef>
+          <a:fillRef idx="1">
+            <a:schemeClr val="lt1"/>
+          </a:fillRef>
+          <a:effectRef idx="0">
+            <a:schemeClr val="accent1"/>
+          </a:effectRef>
+          <a:fontRef idx="minor">
+            <a:schemeClr val="dk1"/>
+          </a:fontRef>
+        </p:style>
+        <p:txBody>
+          <a:bodyPr wrap="none" rtlCol="0" anchor="ctr">
+            <a:noAutofit/>
+          </a:bodyPr>
+          <a:lstStyle/>
+          <a:p>
+            <a:pPr algn="ctr"/>
+            <a:r>
+              <a:rPr lang="nl-BE" sz="1200" dirty="0">
+                <a:solidFill>
+                  <a:schemeClr val="tx1"/>
+                </a:solidFill>
+              </a:rPr>
+              <a:t>0..1</a:t>
+            </a:r>
+          </a:p>
+        </p:txBody>
+      </p:sp>
+      <p:sp>
+        <p:nvSpPr>
+          <p:cNvPr id="126" name="Rechthoek 125"/>
+          <p:cNvSpPr/>
+          <p:nvPr/>
+        </p:nvSpPr>
+        <p:spPr>
+          <a:xfrm>
+            <a:off x="8076022" y="2528990"/>
+            <a:ext cx="1530017" cy="90001"/>
+          </a:xfrm>
+          <a:prstGeom prst="rect">
+            <a:avLst/>
+          </a:prstGeom>
+          <a:ln w="19050"/>
+        </p:spPr>
+        <p:style>
+          <a:lnRef idx="2">
+            <a:schemeClr val="accent1"/>
+          </a:lnRef>
+          <a:fillRef idx="1">
+            <a:schemeClr val="lt1"/>
+          </a:fillRef>
+          <a:effectRef idx="0">
+            <a:schemeClr val="accent1"/>
+          </a:effectRef>
+          <a:fontRef idx="minor">
+            <a:schemeClr val="dk1"/>
+          </a:fontRef>
+        </p:style>
+        <p:txBody>
+          <a:bodyPr rtlCol="0" anchor="ctr"/>
+          <a:lstStyle/>
+          <a:p>
+            <a:pPr algn="ctr"/>
+            <a:endParaRPr lang="nl-BE" sz="1000"/>
+          </a:p>
+        </p:txBody>
+      </p:sp>
+      <p:sp>
+        <p:nvSpPr>
+          <p:cNvPr id="202" name="Rechthoek 201"/>
+          <p:cNvSpPr/>
+          <p:nvPr/>
+        </p:nvSpPr>
+        <p:spPr>
+          <a:xfrm>
+            <a:off x="8076022" y="2618991"/>
+            <a:ext cx="1530017" cy="90001"/>
+          </a:xfrm>
+          <a:prstGeom prst="rect">
+            <a:avLst/>
+          </a:prstGeom>
+          <a:ln w="19050"/>
+        </p:spPr>
+        <p:style>
+          <a:lnRef idx="2">
+            <a:schemeClr val="accent1"/>
+          </a:lnRef>
+          <a:fillRef idx="1">
+            <a:schemeClr val="lt1"/>
+          </a:fillRef>
+          <a:effectRef idx="0">
+            <a:schemeClr val="accent1"/>
+          </a:effectRef>
+          <a:fontRef idx="minor">
+            <a:schemeClr val="dk1"/>
+          </a:fontRef>
+        </p:style>
+        <p:txBody>
+          <a:bodyPr rtlCol="0" anchor="ctr"/>
+          <a:lstStyle/>
+          <a:p>
+            <a:pPr algn="ctr"/>
+            <a:endParaRPr lang="nl-BE" sz="1000"/>
+          </a:p>
+        </p:txBody>
+      </p:sp>
+      <p:sp>
+        <p:nvSpPr>
+          <p:cNvPr id="203" name="Rechthoek 202"/>
+          <p:cNvSpPr/>
+          <p:nvPr/>
+        </p:nvSpPr>
+        <p:spPr>
+          <a:xfrm>
+            <a:off x="5645995" y="2528990"/>
+            <a:ext cx="1530017" cy="90001"/>
+          </a:xfrm>
+          <a:prstGeom prst="rect">
+            <a:avLst/>
+          </a:prstGeom>
+          <a:ln w="19050"/>
+        </p:spPr>
+        <p:style>
+          <a:lnRef idx="2">
+            <a:schemeClr val="accent1"/>
+          </a:lnRef>
+          <a:fillRef idx="1">
+            <a:schemeClr val="lt1"/>
+          </a:fillRef>
+          <a:effectRef idx="0">
+            <a:schemeClr val="accent1"/>
+          </a:effectRef>
+          <a:fontRef idx="minor">
+            <a:schemeClr val="dk1"/>
+          </a:fontRef>
+        </p:style>
+        <p:txBody>
+          <a:bodyPr rtlCol="0" anchor="ctr"/>
+          <a:lstStyle/>
+          <a:p>
+            <a:pPr algn="ctr"/>
+            <a:endParaRPr lang="nl-BE" sz="1000"/>
+          </a:p>
+        </p:txBody>
+      </p:sp>
+      <p:sp>
+        <p:nvSpPr>
+          <p:cNvPr id="207" name="Rechthoek 206"/>
+          <p:cNvSpPr/>
+          <p:nvPr/>
+        </p:nvSpPr>
+        <p:spPr>
+          <a:xfrm>
+            <a:off x="5645995" y="2618991"/>
+            <a:ext cx="1530017" cy="90001"/>
+          </a:xfrm>
+          <a:prstGeom prst="rect">
+            <a:avLst/>
+          </a:prstGeom>
+          <a:ln w="19050"/>
+        </p:spPr>
+        <p:style>
+          <a:lnRef idx="2">
+            <a:schemeClr val="accent1"/>
+          </a:lnRef>
+          <a:fillRef idx="1">
+            <a:schemeClr val="lt1"/>
+          </a:fillRef>
+          <a:effectRef idx="0">
+            <a:schemeClr val="accent1"/>
+          </a:effectRef>
+          <a:fontRef idx="minor">
+            <a:schemeClr val="dk1"/>
+          </a:fontRef>
+        </p:style>
+        <p:txBody>
+          <a:bodyPr rtlCol="0" anchor="ctr"/>
+          <a:lstStyle/>
+          <a:p>
+            <a:pPr algn="ctr"/>
+            <a:endParaRPr lang="nl-BE" sz="1000"/>
+          </a:p>
+        </p:txBody>
+      </p:sp>
+      <p:sp>
+        <p:nvSpPr>
+          <p:cNvPr id="208" name="Rechthoek 207"/>
+          <p:cNvSpPr/>
+          <p:nvPr/>
+        </p:nvSpPr>
+        <p:spPr>
+          <a:xfrm>
+            <a:off x="3305969" y="2528990"/>
+            <a:ext cx="1530017" cy="90001"/>
+          </a:xfrm>
+          <a:prstGeom prst="rect">
+            <a:avLst/>
+          </a:prstGeom>
+          <a:ln w="19050"/>
+        </p:spPr>
+        <p:style>
+          <a:lnRef idx="2">
+            <a:schemeClr val="accent1"/>
+          </a:lnRef>
+          <a:fillRef idx="1">
+            <a:schemeClr val="lt1"/>
+          </a:fillRef>
+          <a:effectRef idx="0">
+            <a:schemeClr val="accent1"/>
+          </a:effectRef>
+          <a:fontRef idx="minor">
+            <a:schemeClr val="dk1"/>
+          </a:fontRef>
+        </p:style>
+        <p:txBody>
+          <a:bodyPr rtlCol="0" anchor="ctr"/>
+          <a:lstStyle/>
+          <a:p>
+            <a:pPr algn="ctr"/>
+            <a:endParaRPr lang="nl-BE" sz="1000"/>
+          </a:p>
+        </p:txBody>
+      </p:sp>
+      <p:sp>
+        <p:nvSpPr>
+          <p:cNvPr id="209" name="Rechthoek 208"/>
+          <p:cNvSpPr/>
+          <p:nvPr/>
+        </p:nvSpPr>
+        <p:spPr>
+          <a:xfrm>
+            <a:off x="3305969" y="2618991"/>
+            <a:ext cx="1530017" cy="90001"/>
+          </a:xfrm>
+          <a:prstGeom prst="rect">
+            <a:avLst/>
+          </a:prstGeom>
+          <a:ln w="19050"/>
+        </p:spPr>
+        <p:style>
+          <a:lnRef idx="2">
+            <a:schemeClr val="accent1"/>
+          </a:lnRef>
+          <a:fillRef idx="1">
+            <a:schemeClr val="lt1"/>
+          </a:fillRef>
+          <a:effectRef idx="0">
+            <a:schemeClr val="accent1"/>
+          </a:effectRef>
+          <a:fontRef idx="minor">
+            <a:schemeClr val="dk1"/>
+          </a:fontRef>
+        </p:style>
+        <p:txBody>
+          <a:bodyPr rtlCol="0" anchor="ctr"/>
+          <a:lstStyle/>
+          <a:p>
+            <a:pPr algn="ctr"/>
+            <a:endParaRPr lang="nl-BE" sz="1000"/>
+          </a:p>
+        </p:txBody>
+      </p:sp>
+      <p:sp>
+        <p:nvSpPr>
+          <p:cNvPr id="213" name="Rechthoek 212"/>
+          <p:cNvSpPr/>
+          <p:nvPr/>
+        </p:nvSpPr>
+        <p:spPr>
+          <a:xfrm>
+            <a:off x="965943" y="2528990"/>
+            <a:ext cx="1530017" cy="90001"/>
+          </a:xfrm>
+          <a:prstGeom prst="rect">
+            <a:avLst/>
+          </a:prstGeom>
+          <a:ln w="19050"/>
+        </p:spPr>
+        <p:style>
+          <a:lnRef idx="2">
+            <a:schemeClr val="accent1"/>
+          </a:lnRef>
+          <a:fillRef idx="1">
+            <a:schemeClr val="lt1"/>
+          </a:fillRef>
+          <a:effectRef idx="0">
+            <a:schemeClr val="accent1"/>
+          </a:effectRef>
+          <a:fontRef idx="minor">
+            <a:schemeClr val="dk1"/>
+          </a:fontRef>
+        </p:style>
+        <p:txBody>
+          <a:bodyPr rtlCol="0" anchor="ctr"/>
+          <a:lstStyle/>
+          <a:p>
+            <a:pPr algn="ctr"/>
+            <a:endParaRPr lang="nl-BE" sz="1000"/>
+          </a:p>
+        </p:txBody>
+      </p:sp>
+      <p:sp>
+        <p:nvSpPr>
+          <p:cNvPr id="214" name="Rechthoek 213"/>
+          <p:cNvSpPr/>
+          <p:nvPr/>
+        </p:nvSpPr>
+        <p:spPr>
+          <a:xfrm>
+            <a:off x="965943" y="2618991"/>
+            <a:ext cx="1530017" cy="90001"/>
+          </a:xfrm>
+          <a:prstGeom prst="rect">
+            <a:avLst/>
+          </a:prstGeom>
+          <a:ln w="19050"/>
+        </p:spPr>
+        <p:style>
+          <a:lnRef idx="2">
+            <a:schemeClr val="accent1"/>
+          </a:lnRef>
+          <a:fillRef idx="1">
+            <a:schemeClr val="lt1"/>
+          </a:fillRef>
+          <a:effectRef idx="0">
+            <a:schemeClr val="accent1"/>
+          </a:effectRef>
+          <a:fontRef idx="minor">
+            <a:schemeClr val="dk1"/>
+          </a:fontRef>
+        </p:style>
+        <p:txBody>
+          <a:bodyPr rtlCol="0" anchor="ctr"/>
+          <a:lstStyle/>
+          <a:p>
+            <a:pPr algn="ctr"/>
+            <a:endParaRPr lang="nl-BE" sz="1000"/>
+          </a:p>
+        </p:txBody>
+      </p:sp>
+      <p:sp>
+        <p:nvSpPr>
+          <p:cNvPr id="215" name="Rechthoek 214"/>
+          <p:cNvSpPr/>
+          <p:nvPr/>
+        </p:nvSpPr>
+        <p:spPr>
+          <a:xfrm>
+            <a:off x="5645995" y="3699003"/>
+            <a:ext cx="1530017" cy="90001"/>
+          </a:xfrm>
+          <a:prstGeom prst="rect">
+            <a:avLst/>
+          </a:prstGeom>
+          <a:ln w="19050"/>
+        </p:spPr>
+        <p:style>
+          <a:lnRef idx="2">
+            <a:schemeClr val="accent1"/>
+          </a:lnRef>
+          <a:fillRef idx="1">
+            <a:schemeClr val="lt1"/>
+          </a:fillRef>
+          <a:effectRef idx="0">
+            <a:schemeClr val="accent1"/>
+          </a:effectRef>
+          <a:fontRef idx="minor">
+            <a:schemeClr val="dk1"/>
+          </a:fontRef>
+        </p:style>
+        <p:txBody>
+          <a:bodyPr rtlCol="0" anchor="ctr"/>
+          <a:lstStyle/>
+          <a:p>
+            <a:pPr algn="ctr"/>
+            <a:endParaRPr lang="nl-BE" sz="1000"/>
+          </a:p>
+        </p:txBody>
+      </p:sp>
+      <p:sp>
+        <p:nvSpPr>
+          <p:cNvPr id="216" name="Rechthoek 215"/>
+          <p:cNvSpPr/>
+          <p:nvPr/>
+        </p:nvSpPr>
+        <p:spPr>
+          <a:xfrm>
+            <a:off x="5645995" y="3789004"/>
+            <a:ext cx="1530017" cy="90001"/>
+          </a:xfrm>
+          <a:prstGeom prst="rect">
+            <a:avLst/>
+          </a:prstGeom>
+          <a:ln w="19050"/>
+        </p:spPr>
+        <p:style>
+          <a:lnRef idx="2">
+            <a:schemeClr val="accent1"/>
+          </a:lnRef>
+          <a:fillRef idx="1">
+            <a:schemeClr val="lt1"/>
+          </a:fillRef>
+          <a:effectRef idx="0">
+            <a:schemeClr val="accent1"/>
+          </a:effectRef>
+          <a:fontRef idx="minor">
+            <a:schemeClr val="dk1"/>
+          </a:fontRef>
+        </p:style>
+        <p:txBody>
+          <a:bodyPr rtlCol="0" anchor="ctr"/>
+          <a:lstStyle/>
+          <a:p>
+            <a:pPr algn="ctr"/>
+            <a:endParaRPr lang="nl-BE" sz="1000"/>
+          </a:p>
+        </p:txBody>
+      </p:sp>
+      <p:sp>
+        <p:nvSpPr>
+          <p:cNvPr id="217" name="Rechthoek 216"/>
+          <p:cNvSpPr/>
+          <p:nvPr/>
+        </p:nvSpPr>
+        <p:spPr>
+          <a:xfrm>
+            <a:off x="3305969" y="3699004"/>
+            <a:ext cx="1530017" cy="450004"/>
+          </a:xfrm>
+          <a:prstGeom prst="rect">
+            <a:avLst/>
+          </a:prstGeom>
+          <a:ln w="19050"/>
+        </p:spPr>
+        <p:style>
+          <a:lnRef idx="2">
+            <a:schemeClr val="accent1"/>
+          </a:lnRef>
+          <a:fillRef idx="1">
+            <a:schemeClr val="lt1"/>
+          </a:fillRef>
+          <a:effectRef idx="0">
+            <a:schemeClr val="accent1"/>
+          </a:effectRef>
+          <a:fontRef idx="minor">
+            <a:schemeClr val="dk1"/>
+          </a:fontRef>
+        </p:style>
+        <p:txBody>
+          <a:bodyPr rtlCol="0" anchor="t"/>
+          <a:lstStyle/>
+          <a:p>
+            <a:pPr marL="171450" indent="-171450">
+              <a:buFont typeface="Arial" panose="020B0604020202020204" pitchFamily="34" charset="0"/>
+              <a:buChar char="•"/>
+            </a:pPr>
+            <a:r>
+              <a:rPr lang="nl-BE" sz="1000" dirty="0" err="1"/>
+              <a:t>TemplateProcesses</a:t>
+            </a:r>
+            <a:r>
+              <a:rPr lang="nl-BE" sz="1000" dirty="0"/>
+              <a:t>[ ]</a:t>
+            </a:r>
+          </a:p>
+          <a:p>
+            <a:pPr marL="171450" indent="-171450">
+              <a:buFont typeface="Arial" panose="020B0604020202020204" pitchFamily="34" charset="0"/>
+              <a:buChar char="•"/>
+            </a:pPr>
+            <a:r>
+              <a:rPr lang="nl-BE" sz="1000" dirty="0" err="1"/>
+              <a:t>AssignedProcesses</a:t>
+            </a:r>
+            <a:r>
+              <a:rPr lang="nl-BE" sz="1000" dirty="0"/>
+              <a:t>[ ]</a:t>
+            </a:r>
+          </a:p>
+          <a:p>
+            <a:pPr marL="171450" indent="-171450">
+              <a:buFont typeface="Arial" panose="020B0604020202020204" pitchFamily="34" charset="0"/>
+              <a:buChar char="•"/>
+            </a:pPr>
+            <a:endParaRPr lang="nl-BE" sz="1000" dirty="0"/>
+          </a:p>
+        </p:txBody>
+      </p:sp>
+      <p:sp>
+        <p:nvSpPr>
+          <p:cNvPr id="218" name="Rechthoek 217"/>
+          <p:cNvSpPr/>
+          <p:nvPr/>
+        </p:nvSpPr>
+        <p:spPr>
+          <a:xfrm>
+            <a:off x="3305969" y="4149008"/>
+            <a:ext cx="1530017" cy="1350015"/>
+          </a:xfrm>
+          <a:prstGeom prst="rect">
+            <a:avLst/>
+          </a:prstGeom>
+          <a:ln w="19050"/>
+        </p:spPr>
+        <p:style>
+          <a:lnRef idx="2">
+            <a:schemeClr val="accent1"/>
+          </a:lnRef>
+          <a:fillRef idx="1">
+            <a:schemeClr val="lt1"/>
+          </a:fillRef>
+          <a:effectRef idx="0">
+            <a:schemeClr val="accent1"/>
+          </a:effectRef>
+          <a:fontRef idx="minor">
+            <a:schemeClr val="dk1"/>
+          </a:fontRef>
+        </p:style>
+        <p:txBody>
+          <a:bodyPr rtlCol="0" anchor="t"/>
+          <a:lstStyle/>
+          <a:p>
+            <a:pPr marL="171450" indent="-171450">
+              <a:buFont typeface="Arial" panose="020B0604020202020204" pitchFamily="34" charset="0"/>
+              <a:buChar char="•"/>
+            </a:pPr>
+            <a:r>
+              <a:rPr lang="nl-BE" sz="1000" dirty="0" err="1"/>
+              <a:t>AssignProcess</a:t>
+            </a:r>
+            <a:r>
+              <a:rPr lang="nl-BE" sz="1000" dirty="0"/>
+              <a:t>()</a:t>
+            </a:r>
+          </a:p>
+          <a:p>
+            <a:pPr marL="171450" indent="-171450">
+              <a:buFont typeface="Arial" panose="020B0604020202020204" pitchFamily="34" charset="0"/>
+              <a:buChar char="•"/>
+            </a:pPr>
+            <a:r>
+              <a:rPr lang="nl-BE" sz="1000" dirty="0" err="1"/>
+              <a:t>SetProcessTemplate</a:t>
+            </a:r>
+            <a:r>
+              <a:rPr lang="nl-BE" sz="1000" dirty="0"/>
+              <a:t>()</a:t>
+            </a:r>
+          </a:p>
+        </p:txBody>
+      </p:sp>
+      <p:sp>
+        <p:nvSpPr>
+          <p:cNvPr id="219" name="Rechthoek 218"/>
+          <p:cNvSpPr/>
+          <p:nvPr/>
+        </p:nvSpPr>
+        <p:spPr>
+          <a:xfrm>
+            <a:off x="5645995" y="4239009"/>
+            <a:ext cx="1530017" cy="90001"/>
+          </a:xfrm>
+          <a:prstGeom prst="rect">
+            <a:avLst/>
+          </a:prstGeom>
+          <a:ln w="19050"/>
+        </p:spPr>
+        <p:style>
+          <a:lnRef idx="2">
+            <a:schemeClr val="accent1"/>
+          </a:lnRef>
+          <a:fillRef idx="1">
+            <a:schemeClr val="lt1"/>
+          </a:fillRef>
+          <a:effectRef idx="0">
+            <a:schemeClr val="accent1"/>
+          </a:effectRef>
+          <a:fontRef idx="minor">
+            <a:schemeClr val="dk1"/>
+          </a:fontRef>
+        </p:style>
+        <p:txBody>
+          <a:bodyPr rtlCol="0" anchor="ctr"/>
+          <a:lstStyle/>
+          <a:p>
+            <a:pPr algn="ctr"/>
+            <a:endParaRPr lang="nl-BE" sz="1000"/>
+          </a:p>
+        </p:txBody>
+      </p:sp>
+      <p:sp>
+        <p:nvSpPr>
+          <p:cNvPr id="220" name="Rechthoek 219"/>
+          <p:cNvSpPr/>
+          <p:nvPr/>
+        </p:nvSpPr>
+        <p:spPr>
+          <a:xfrm>
+            <a:off x="5645995" y="4329010"/>
+            <a:ext cx="1530017" cy="90001"/>
+          </a:xfrm>
+          <a:prstGeom prst="rect">
+            <a:avLst/>
+          </a:prstGeom>
+          <a:ln w="19050"/>
+        </p:spPr>
+        <p:style>
+          <a:lnRef idx="2">
+            <a:schemeClr val="accent1"/>
+          </a:lnRef>
+          <a:fillRef idx="1">
+            <a:schemeClr val="lt1"/>
+          </a:fillRef>
+          <a:effectRef idx="0">
+            <a:schemeClr val="accent1"/>
+          </a:effectRef>
+          <a:fontRef idx="minor">
+            <a:schemeClr val="dk1"/>
+          </a:fontRef>
+        </p:style>
+        <p:txBody>
+          <a:bodyPr rtlCol="0" anchor="ctr"/>
+          <a:lstStyle/>
+          <a:p>
+            <a:pPr algn="ctr"/>
+            <a:endParaRPr lang="nl-BE" sz="1000"/>
+          </a:p>
+        </p:txBody>
+      </p:sp>
+      <p:sp>
+        <p:nvSpPr>
+          <p:cNvPr id="221" name="Rechthoek 220"/>
+          <p:cNvSpPr/>
+          <p:nvPr/>
+        </p:nvSpPr>
+        <p:spPr>
+          <a:xfrm>
+            <a:off x="5645995" y="4779015"/>
+            <a:ext cx="1530017" cy="90001"/>
+          </a:xfrm>
+          <a:prstGeom prst="rect">
+            <a:avLst/>
+          </a:prstGeom>
+          <a:ln w="19050"/>
+        </p:spPr>
+        <p:style>
+          <a:lnRef idx="2">
+            <a:schemeClr val="accent1"/>
+          </a:lnRef>
+          <a:fillRef idx="1">
+            <a:schemeClr val="lt1"/>
+          </a:fillRef>
+          <a:effectRef idx="0">
+            <a:schemeClr val="accent1"/>
+          </a:effectRef>
+          <a:fontRef idx="minor">
+            <a:schemeClr val="dk1"/>
+          </a:fontRef>
+        </p:style>
+        <p:txBody>
+          <a:bodyPr rtlCol="0" anchor="ctr"/>
+          <a:lstStyle/>
+          <a:p>
+            <a:pPr algn="ctr"/>
+            <a:endParaRPr lang="nl-BE" sz="1000"/>
+          </a:p>
+        </p:txBody>
+      </p:sp>
+      <p:sp>
+        <p:nvSpPr>
+          <p:cNvPr id="222" name="Rechthoek 221"/>
+          <p:cNvSpPr/>
+          <p:nvPr/>
+        </p:nvSpPr>
+        <p:spPr>
+          <a:xfrm>
+            <a:off x="5645995" y="4869016"/>
+            <a:ext cx="1530017" cy="90001"/>
+          </a:xfrm>
+          <a:prstGeom prst="rect">
+            <a:avLst/>
+          </a:prstGeom>
+          <a:ln w="19050"/>
+        </p:spPr>
+        <p:style>
+          <a:lnRef idx="2">
+            <a:schemeClr val="accent1"/>
+          </a:lnRef>
+          <a:fillRef idx="1">
+            <a:schemeClr val="lt1"/>
+          </a:fillRef>
+          <a:effectRef idx="0">
+            <a:schemeClr val="accent1"/>
+          </a:effectRef>
+          <a:fontRef idx="minor">
+            <a:schemeClr val="dk1"/>
+          </a:fontRef>
+        </p:style>
+        <p:txBody>
+          <a:bodyPr rtlCol="0" anchor="ctr"/>
+          <a:lstStyle/>
+          <a:p>
+            <a:pPr algn="ctr"/>
+            <a:endParaRPr lang="nl-BE" sz="1000"/>
+          </a:p>
+        </p:txBody>
+      </p:sp>
+      <p:sp>
+        <p:nvSpPr>
+          <p:cNvPr id="223" name="Rechthoek 222"/>
+          <p:cNvSpPr/>
+          <p:nvPr/>
+        </p:nvSpPr>
+        <p:spPr>
+          <a:xfrm>
+            <a:off x="5645995" y="5319021"/>
+            <a:ext cx="1530017" cy="90001"/>
+          </a:xfrm>
+          <a:prstGeom prst="rect">
+            <a:avLst/>
+          </a:prstGeom>
+          <a:ln w="19050"/>
+        </p:spPr>
+        <p:style>
+          <a:lnRef idx="2">
+            <a:schemeClr val="accent1"/>
+          </a:lnRef>
+          <a:fillRef idx="1">
+            <a:schemeClr val="lt1"/>
+          </a:fillRef>
+          <a:effectRef idx="0">
+            <a:schemeClr val="accent1"/>
+          </a:effectRef>
+          <a:fontRef idx="minor">
+            <a:schemeClr val="dk1"/>
+          </a:fontRef>
+        </p:style>
+        <p:txBody>
+          <a:bodyPr rtlCol="0" anchor="ctr"/>
+          <a:lstStyle/>
+          <a:p>
+            <a:pPr algn="ctr"/>
+            <a:endParaRPr lang="nl-BE" sz="1000"/>
+          </a:p>
+        </p:txBody>
+      </p:sp>
+      <p:sp>
+        <p:nvSpPr>
+          <p:cNvPr id="256" name="Rechthoek 255"/>
+          <p:cNvSpPr/>
+          <p:nvPr/>
+        </p:nvSpPr>
+        <p:spPr>
+          <a:xfrm>
+            <a:off x="5645995" y="5409022"/>
+            <a:ext cx="1530017" cy="90001"/>
+          </a:xfrm>
+          <a:prstGeom prst="rect">
+            <a:avLst/>
+          </a:prstGeom>
+          <a:ln w="19050"/>
+        </p:spPr>
+        <p:style>
+          <a:lnRef idx="2">
+            <a:schemeClr val="accent1"/>
+          </a:lnRef>
+          <a:fillRef idx="1">
+            <a:schemeClr val="lt1"/>
+          </a:fillRef>
+          <a:effectRef idx="0">
+            <a:schemeClr val="accent1"/>
+          </a:effectRef>
+          <a:fontRef idx="minor">
+            <a:schemeClr val="dk1"/>
+          </a:fontRef>
+        </p:style>
+        <p:txBody>
+          <a:bodyPr rtlCol="0" anchor="ctr"/>
+          <a:lstStyle/>
+          <a:p>
+            <a:pPr algn="ctr"/>
+            <a:endParaRPr lang="nl-BE" sz="1000"/>
+          </a:p>
+        </p:txBody>
+      </p:sp>
+      <p:sp>
+        <p:nvSpPr>
+          <p:cNvPr id="257" name="Rechthoek 256"/>
+          <p:cNvSpPr/>
+          <p:nvPr/>
+        </p:nvSpPr>
+        <p:spPr>
+          <a:xfrm>
+            <a:off x="5015988" y="6399033"/>
+            <a:ext cx="1530017" cy="90001"/>
+          </a:xfrm>
+          <a:prstGeom prst="rect">
+            <a:avLst/>
+          </a:prstGeom>
+          <a:ln w="19050"/>
+        </p:spPr>
+        <p:style>
+          <a:lnRef idx="2">
+            <a:schemeClr val="accent1"/>
+          </a:lnRef>
+          <a:fillRef idx="1">
+            <a:schemeClr val="lt1"/>
+          </a:fillRef>
+          <a:effectRef idx="0">
+            <a:schemeClr val="accent1"/>
+          </a:effectRef>
+          <a:fontRef idx="minor">
+            <a:schemeClr val="dk1"/>
+          </a:fontRef>
+        </p:style>
+        <p:txBody>
+          <a:bodyPr rtlCol="0" anchor="ctr"/>
+          <a:lstStyle/>
+          <a:p>
+            <a:pPr algn="ctr"/>
+            <a:endParaRPr lang="nl-BE" sz="1000"/>
+          </a:p>
+        </p:txBody>
+      </p:sp>
+      <p:sp>
+        <p:nvSpPr>
+          <p:cNvPr id="258" name="Rechthoek 257"/>
+          <p:cNvSpPr/>
+          <p:nvPr/>
+        </p:nvSpPr>
+        <p:spPr>
+          <a:xfrm>
+            <a:off x="5015988" y="6489034"/>
+            <a:ext cx="1530017" cy="90001"/>
+          </a:xfrm>
+          <a:prstGeom prst="rect">
+            <a:avLst/>
+          </a:prstGeom>
+          <a:ln w="19050"/>
+        </p:spPr>
+        <p:style>
+          <a:lnRef idx="2">
+            <a:schemeClr val="accent1"/>
+          </a:lnRef>
+          <a:fillRef idx="1">
+            <a:schemeClr val="lt1"/>
+          </a:fillRef>
+          <a:effectRef idx="0">
+            <a:schemeClr val="accent1"/>
+          </a:effectRef>
+          <a:fontRef idx="minor">
+            <a:schemeClr val="dk1"/>
+          </a:fontRef>
+        </p:style>
+        <p:txBody>
+          <a:bodyPr rtlCol="0" anchor="ctr"/>
+          <a:lstStyle/>
+          <a:p>
+            <a:pPr algn="ctr"/>
+            <a:endParaRPr lang="nl-BE" sz="1000"/>
+          </a:p>
+        </p:txBody>
+      </p:sp>
+      <p:sp>
+        <p:nvSpPr>
+          <p:cNvPr id="259" name="Rechthoek 258"/>
+          <p:cNvSpPr/>
+          <p:nvPr/>
+        </p:nvSpPr>
+        <p:spPr>
+          <a:xfrm>
+            <a:off x="8076022" y="6399033"/>
+            <a:ext cx="1530017" cy="90001"/>
+          </a:xfrm>
+          <a:prstGeom prst="rect">
+            <a:avLst/>
+          </a:prstGeom>
+          <a:ln w="19050"/>
+        </p:spPr>
+        <p:style>
+          <a:lnRef idx="2">
+            <a:schemeClr val="accent1"/>
+          </a:lnRef>
+          <a:fillRef idx="1">
+            <a:schemeClr val="lt1"/>
+          </a:fillRef>
+          <a:effectRef idx="0">
+            <a:schemeClr val="accent1"/>
+          </a:effectRef>
+          <a:fontRef idx="minor">
+            <a:schemeClr val="dk1"/>
+          </a:fontRef>
+        </p:style>
+        <p:txBody>
+          <a:bodyPr rtlCol="0" anchor="ctr"/>
+          <a:lstStyle/>
+          <a:p>
+            <a:pPr algn="ctr"/>
+            <a:endParaRPr lang="nl-BE" sz="1000"/>
+          </a:p>
+        </p:txBody>
+      </p:sp>
+      <p:sp>
+        <p:nvSpPr>
+          <p:cNvPr id="260" name="Rechthoek 259"/>
+          <p:cNvSpPr/>
+          <p:nvPr/>
+        </p:nvSpPr>
+        <p:spPr>
+          <a:xfrm>
+            <a:off x="8076022" y="6489034"/>
+            <a:ext cx="1530017" cy="90001"/>
+          </a:xfrm>
+          <a:prstGeom prst="rect">
+            <a:avLst/>
+          </a:prstGeom>
+          <a:ln w="19050"/>
+        </p:spPr>
+        <p:style>
+          <a:lnRef idx="2">
+            <a:schemeClr val="accent1"/>
+          </a:lnRef>
+          <a:fillRef idx="1">
+            <a:schemeClr val="lt1"/>
+          </a:fillRef>
+          <a:effectRef idx="0">
+            <a:schemeClr val="accent1"/>
+          </a:effectRef>
+          <a:fontRef idx="minor">
+            <a:schemeClr val="dk1"/>
+          </a:fontRef>
+        </p:style>
+        <p:txBody>
+          <a:bodyPr rtlCol="0" anchor="ctr"/>
+          <a:lstStyle/>
+          <a:p>
+            <a:pPr algn="ctr"/>
+            <a:endParaRPr lang="nl-BE" sz="1000"/>
+          </a:p>
+        </p:txBody>
+      </p:sp>
+      <p:sp>
+        <p:nvSpPr>
+          <p:cNvPr id="79" name="Rechthoek 78"/>
+          <p:cNvSpPr/>
+          <p:nvPr/>
+        </p:nvSpPr>
+        <p:spPr>
+          <a:xfrm>
+            <a:off x="965943" y="3429000"/>
+            <a:ext cx="1530017" cy="450005"/>
+          </a:xfrm>
+          <a:prstGeom prst="rect">
+            <a:avLst/>
+          </a:prstGeom>
+          <a:ln w="19050"/>
+        </p:spPr>
+        <p:style>
+          <a:lnRef idx="2">
+            <a:schemeClr val="accent1"/>
+          </a:lnRef>
+          <a:fillRef idx="1">
+            <a:schemeClr val="lt1"/>
+          </a:fillRef>
+          <a:effectRef idx="0">
+            <a:schemeClr val="accent1"/>
+          </a:effectRef>
+          <a:fontRef idx="minor">
+            <a:schemeClr val="dk1"/>
+          </a:fontRef>
+        </p:style>
+        <p:txBody>
+          <a:bodyPr rtlCol="0" anchor="t"/>
+          <a:lstStyle/>
+          <a:p>
+            <a:pPr algn="ctr"/>
+            <a:r>
+              <a:rPr lang="nl-BE" sz="1400" dirty="0"/>
+              <a:t>FSM_ASSIGN</a:t>
+            </a:r>
+          </a:p>
+        </p:txBody>
+      </p:sp>
+      <p:sp>
+        <p:nvSpPr>
+          <p:cNvPr id="85" name="Rechthoek 84"/>
+          <p:cNvSpPr/>
+          <p:nvPr/>
+        </p:nvSpPr>
+        <p:spPr>
+          <a:xfrm>
+            <a:off x="965943" y="3969006"/>
+            <a:ext cx="1530017" cy="450005"/>
+          </a:xfrm>
+          <a:prstGeom prst="rect">
+            <a:avLst/>
+          </a:prstGeom>
+          <a:ln w="19050"/>
+        </p:spPr>
+        <p:style>
+          <a:lnRef idx="2">
+            <a:schemeClr val="accent1"/>
+          </a:lnRef>
+          <a:fillRef idx="1">
+            <a:schemeClr val="lt1"/>
+          </a:fillRef>
+          <a:effectRef idx="0">
+            <a:schemeClr val="accent1"/>
+          </a:effectRef>
+          <a:fontRef idx="minor">
+            <a:schemeClr val="dk1"/>
+          </a:fontRef>
+        </p:style>
+        <p:txBody>
+          <a:bodyPr rtlCol="0" anchor="t"/>
+          <a:lstStyle/>
+          <a:p>
+            <a:pPr algn="ctr"/>
+            <a:r>
+              <a:rPr lang="nl-BE" sz="1400" dirty="0"/>
+              <a:t>FSM_ROUTE</a:t>
+            </a:r>
+          </a:p>
+        </p:txBody>
+      </p:sp>
+      <p:sp>
+        <p:nvSpPr>
+          <p:cNvPr id="86" name="Rechthoek 85"/>
+          <p:cNvSpPr/>
+          <p:nvPr/>
+        </p:nvSpPr>
+        <p:spPr>
+          <a:xfrm>
+            <a:off x="965943" y="4509012"/>
+            <a:ext cx="1530017" cy="450005"/>
+          </a:xfrm>
+          <a:prstGeom prst="rect">
+            <a:avLst/>
+          </a:prstGeom>
+          <a:ln w="19050"/>
+        </p:spPr>
+        <p:style>
+          <a:lnRef idx="2">
+            <a:schemeClr val="accent1"/>
+          </a:lnRef>
+          <a:fillRef idx="1">
+            <a:schemeClr val="lt1"/>
+          </a:fillRef>
+          <a:effectRef idx="0">
+            <a:schemeClr val="accent1"/>
+          </a:effectRef>
+          <a:fontRef idx="minor">
+            <a:schemeClr val="dk1"/>
+          </a:fontRef>
+        </p:style>
+        <p:txBody>
+          <a:bodyPr rtlCol="0" anchor="t"/>
+          <a:lstStyle/>
+          <a:p>
+            <a:pPr algn="ctr"/>
+            <a:r>
+              <a:rPr lang="nl-BE" sz="1400" dirty="0"/>
+              <a:t>FSM_ACCOUNT</a:t>
+            </a:r>
+          </a:p>
+        </p:txBody>
+      </p:sp>
+      <p:sp>
+        <p:nvSpPr>
+          <p:cNvPr id="90" name="Rechthoek 89"/>
+          <p:cNvSpPr/>
+          <p:nvPr/>
+        </p:nvSpPr>
+        <p:spPr>
+          <a:xfrm>
+            <a:off x="965943" y="5049018"/>
+            <a:ext cx="1530017" cy="450005"/>
+          </a:xfrm>
+          <a:prstGeom prst="rect">
+            <a:avLst/>
+          </a:prstGeom>
+          <a:ln w="19050"/>
+        </p:spPr>
+        <p:style>
+          <a:lnRef idx="2">
+            <a:schemeClr val="accent1"/>
+          </a:lnRef>
+          <a:fillRef idx="1">
+            <a:schemeClr val="lt1"/>
+          </a:fillRef>
+          <a:effectRef idx="0">
+            <a:schemeClr val="accent1"/>
+          </a:effectRef>
+          <a:fontRef idx="minor">
+            <a:schemeClr val="dk1"/>
+          </a:fontRef>
+        </p:style>
+        <p:txBody>
+          <a:bodyPr rtlCol="0" anchor="t"/>
+          <a:lstStyle/>
+          <a:p>
+            <a:pPr algn="ctr"/>
+            <a:r>
+              <a:rPr lang="nl-BE" sz="1400" dirty="0"/>
+              <a:t>FSM_SMOKE</a:t>
+            </a:r>
+          </a:p>
+        </p:txBody>
+      </p:sp>
+      <p:sp>
+        <p:nvSpPr>
+          <p:cNvPr id="91" name="Rechthoek 90"/>
+          <p:cNvSpPr/>
+          <p:nvPr/>
+        </p:nvSpPr>
+        <p:spPr>
+          <a:xfrm>
+            <a:off x="965943" y="3699003"/>
+            <a:ext cx="1530017" cy="90001"/>
+          </a:xfrm>
+          <a:prstGeom prst="rect">
+            <a:avLst/>
+          </a:prstGeom>
+          <a:ln w="19050"/>
+        </p:spPr>
+        <p:style>
+          <a:lnRef idx="2">
+            <a:schemeClr val="accent1"/>
+          </a:lnRef>
+          <a:fillRef idx="1">
+            <a:schemeClr val="lt1"/>
+          </a:fillRef>
+          <a:effectRef idx="0">
+            <a:schemeClr val="accent1"/>
+          </a:effectRef>
+          <a:fontRef idx="minor">
+            <a:schemeClr val="dk1"/>
+          </a:fontRef>
+        </p:style>
+        <p:txBody>
+          <a:bodyPr rtlCol="0" anchor="ctr"/>
+          <a:lstStyle/>
+          <a:p>
+            <a:pPr algn="ctr"/>
+            <a:endParaRPr lang="nl-BE" sz="1000"/>
+          </a:p>
+        </p:txBody>
+      </p:sp>
+      <p:sp>
+        <p:nvSpPr>
+          <p:cNvPr id="92" name="Rechthoek 91"/>
+          <p:cNvSpPr/>
+          <p:nvPr/>
+        </p:nvSpPr>
+        <p:spPr>
+          <a:xfrm>
+            <a:off x="965943" y="3789004"/>
+            <a:ext cx="1530017" cy="90001"/>
+          </a:xfrm>
+          <a:prstGeom prst="rect">
+            <a:avLst/>
+          </a:prstGeom>
+          <a:ln w="19050"/>
+        </p:spPr>
+        <p:style>
+          <a:lnRef idx="2">
+            <a:schemeClr val="accent1"/>
+          </a:lnRef>
+          <a:fillRef idx="1">
+            <a:schemeClr val="lt1"/>
+          </a:fillRef>
+          <a:effectRef idx="0">
+            <a:schemeClr val="accent1"/>
+          </a:effectRef>
+          <a:fontRef idx="minor">
+            <a:schemeClr val="dk1"/>
+          </a:fontRef>
+        </p:style>
+        <p:txBody>
+          <a:bodyPr rtlCol="0" anchor="ctr"/>
+          <a:lstStyle/>
+          <a:p>
+            <a:pPr algn="ctr"/>
+            <a:endParaRPr lang="nl-BE" sz="1000"/>
+          </a:p>
+        </p:txBody>
+      </p:sp>
+      <p:sp>
+        <p:nvSpPr>
+          <p:cNvPr id="93" name="Rechthoek 92"/>
+          <p:cNvSpPr/>
+          <p:nvPr/>
+        </p:nvSpPr>
+        <p:spPr>
+          <a:xfrm>
+            <a:off x="965943" y="4239009"/>
+            <a:ext cx="1530017" cy="90001"/>
+          </a:xfrm>
+          <a:prstGeom prst="rect">
+            <a:avLst/>
+          </a:prstGeom>
+          <a:ln w="19050"/>
+        </p:spPr>
+        <p:style>
+          <a:lnRef idx="2">
+            <a:schemeClr val="accent1"/>
+          </a:lnRef>
+          <a:fillRef idx="1">
+            <a:schemeClr val="lt1"/>
+          </a:fillRef>
+          <a:effectRef idx="0">
+            <a:schemeClr val="accent1"/>
+          </a:effectRef>
+          <a:fontRef idx="minor">
+            <a:schemeClr val="dk1"/>
+          </a:fontRef>
+        </p:style>
+        <p:txBody>
+          <a:bodyPr rtlCol="0" anchor="ctr"/>
+          <a:lstStyle/>
+          <a:p>
+            <a:pPr algn="ctr"/>
+            <a:endParaRPr lang="nl-BE" sz="1000"/>
+          </a:p>
+        </p:txBody>
+      </p:sp>
+      <p:sp>
+        <p:nvSpPr>
+          <p:cNvPr id="94" name="Rechthoek 93"/>
+          <p:cNvSpPr/>
+          <p:nvPr/>
+        </p:nvSpPr>
+        <p:spPr>
+          <a:xfrm>
+            <a:off x="965943" y="4329010"/>
+            <a:ext cx="1530017" cy="90001"/>
+          </a:xfrm>
+          <a:prstGeom prst="rect">
+            <a:avLst/>
+          </a:prstGeom>
+          <a:ln w="19050"/>
+        </p:spPr>
+        <p:style>
+          <a:lnRef idx="2">
+            <a:schemeClr val="accent1"/>
+          </a:lnRef>
+          <a:fillRef idx="1">
+            <a:schemeClr val="lt1"/>
+          </a:fillRef>
+          <a:effectRef idx="0">
+            <a:schemeClr val="accent1"/>
+          </a:effectRef>
+          <a:fontRef idx="minor">
+            <a:schemeClr val="dk1"/>
+          </a:fontRef>
+        </p:style>
+        <p:txBody>
+          <a:bodyPr rtlCol="0" anchor="ctr"/>
+          <a:lstStyle/>
+          <a:p>
+            <a:pPr algn="ctr"/>
+            <a:endParaRPr lang="nl-BE" sz="1000"/>
+          </a:p>
+        </p:txBody>
+      </p:sp>
+      <p:sp>
+        <p:nvSpPr>
+          <p:cNvPr id="96" name="Rechthoek 95"/>
+          <p:cNvSpPr/>
+          <p:nvPr/>
+        </p:nvSpPr>
+        <p:spPr>
+          <a:xfrm>
+            <a:off x="965943" y="4779015"/>
+            <a:ext cx="1530017" cy="90001"/>
+          </a:xfrm>
+          <a:prstGeom prst="rect">
+            <a:avLst/>
+          </a:prstGeom>
+          <a:ln w="19050"/>
+        </p:spPr>
+        <p:style>
+          <a:lnRef idx="2">
+            <a:schemeClr val="accent1"/>
+          </a:lnRef>
+          <a:fillRef idx="1">
+            <a:schemeClr val="lt1"/>
+          </a:fillRef>
+          <a:effectRef idx="0">
+            <a:schemeClr val="accent1"/>
+          </a:effectRef>
+          <a:fontRef idx="minor">
+            <a:schemeClr val="dk1"/>
+          </a:fontRef>
+        </p:style>
+        <p:txBody>
+          <a:bodyPr rtlCol="0" anchor="ctr"/>
+          <a:lstStyle/>
+          <a:p>
+            <a:pPr algn="ctr"/>
+            <a:endParaRPr lang="nl-BE" sz="1000"/>
+          </a:p>
+        </p:txBody>
+      </p:sp>
+      <p:sp>
+        <p:nvSpPr>
+          <p:cNvPr id="98" name="Rechthoek 97"/>
+          <p:cNvSpPr/>
+          <p:nvPr/>
+        </p:nvSpPr>
+        <p:spPr>
+          <a:xfrm>
+            <a:off x="965943" y="4869016"/>
+            <a:ext cx="1530017" cy="90001"/>
+          </a:xfrm>
+          <a:prstGeom prst="rect">
+            <a:avLst/>
+          </a:prstGeom>
+          <a:ln w="19050"/>
+        </p:spPr>
+        <p:style>
+          <a:lnRef idx="2">
+            <a:schemeClr val="accent1"/>
+          </a:lnRef>
+          <a:fillRef idx="1">
+            <a:schemeClr val="lt1"/>
+          </a:fillRef>
+          <a:effectRef idx="0">
+            <a:schemeClr val="accent1"/>
+          </a:effectRef>
+          <a:fontRef idx="minor">
+            <a:schemeClr val="dk1"/>
+          </a:fontRef>
+        </p:style>
+        <p:txBody>
+          <a:bodyPr rtlCol="0" anchor="ctr"/>
+          <a:lstStyle/>
+          <a:p>
+            <a:pPr algn="ctr"/>
+            <a:endParaRPr lang="nl-BE" sz="1000"/>
+          </a:p>
+        </p:txBody>
+      </p:sp>
+      <p:sp>
+        <p:nvSpPr>
+          <p:cNvPr id="99" name="Rechthoek 98"/>
+          <p:cNvSpPr/>
+          <p:nvPr/>
+        </p:nvSpPr>
+        <p:spPr>
+          <a:xfrm>
+            <a:off x="965943" y="5319021"/>
+            <a:ext cx="1530017" cy="90001"/>
+          </a:xfrm>
+          <a:prstGeom prst="rect">
+            <a:avLst/>
+          </a:prstGeom>
+          <a:ln w="19050"/>
+        </p:spPr>
+        <p:style>
+          <a:lnRef idx="2">
+            <a:schemeClr val="accent1"/>
+          </a:lnRef>
+          <a:fillRef idx="1">
+            <a:schemeClr val="lt1"/>
+          </a:fillRef>
+          <a:effectRef idx="0">
+            <a:schemeClr val="accent1"/>
+          </a:effectRef>
+          <a:fontRef idx="minor">
+            <a:schemeClr val="dk1"/>
+          </a:fontRef>
+        </p:style>
+        <p:txBody>
+          <a:bodyPr rtlCol="0" anchor="ctr"/>
+          <a:lstStyle/>
+          <a:p>
+            <a:pPr algn="ctr"/>
+            <a:endParaRPr lang="nl-BE" sz="1000"/>
+          </a:p>
+        </p:txBody>
+      </p:sp>
+      <p:sp>
+        <p:nvSpPr>
+          <p:cNvPr id="100" name="Rechthoek 99"/>
+          <p:cNvSpPr/>
+          <p:nvPr/>
+        </p:nvSpPr>
+        <p:spPr>
+          <a:xfrm>
+            <a:off x="965943" y="5409022"/>
+            <a:ext cx="1530017" cy="90001"/>
+          </a:xfrm>
+          <a:prstGeom prst="rect">
+            <a:avLst/>
+          </a:prstGeom>
+          <a:ln w="19050"/>
+        </p:spPr>
+        <p:style>
+          <a:lnRef idx="2">
+            <a:schemeClr val="accent1"/>
+          </a:lnRef>
+          <a:fillRef idx="1">
+            <a:schemeClr val="lt1"/>
+          </a:fillRef>
+          <a:effectRef idx="0">
+            <a:schemeClr val="accent1"/>
+          </a:effectRef>
+          <a:fontRef idx="minor">
+            <a:schemeClr val="dk1"/>
+          </a:fontRef>
+        </p:style>
+        <p:txBody>
+          <a:bodyPr rtlCol="0" anchor="ctr"/>
+          <a:lstStyle/>
+          <a:p>
+            <a:pPr algn="ctr"/>
+            <a:endParaRPr lang="nl-BE" sz="1000"/>
+          </a:p>
+        </p:txBody>
+      </p:sp>
+      <p:sp>
+        <p:nvSpPr>
+          <p:cNvPr id="102" name="Ruit 101"/>
+          <p:cNvSpPr/>
+          <p:nvPr/>
+        </p:nvSpPr>
+        <p:spPr>
+          <a:xfrm>
+            <a:off x="2945965" y="3519001"/>
+            <a:ext cx="360004" cy="270003"/>
+          </a:xfrm>
+          <a:prstGeom prst="diamond">
+            <a:avLst/>
+          </a:prstGeom>
+          <a:ln w="19050"/>
+        </p:spPr>
+        <p:style>
+          <a:lnRef idx="2">
+            <a:schemeClr val="accent1"/>
+          </a:lnRef>
+          <a:fillRef idx="1">
+            <a:schemeClr val="lt1"/>
+          </a:fillRef>
+          <a:effectRef idx="0">
+            <a:schemeClr val="accent1"/>
+          </a:effectRef>
+          <a:fontRef idx="minor">
+            <a:schemeClr val="dk1"/>
+          </a:fontRef>
+        </p:style>
+        <p:txBody>
+          <a:bodyPr rtlCol="0" anchor="ctr"/>
+          <a:lstStyle/>
+          <a:p>
+            <a:pPr algn="ctr"/>
+            <a:endParaRPr lang="nl-BE"/>
+          </a:p>
+        </p:txBody>
+      </p:sp>
+      <p:cxnSp>
+        <p:nvCxnSpPr>
+          <p:cNvPr id="103" name="Rechte verbindingslijn 102"/>
+          <p:cNvCxnSpPr>
+            <a:stCxn id="79" idx="3"/>
+            <a:endCxn id="102" idx="1"/>
+          </p:cNvCxnSpPr>
+          <p:nvPr/>
+        </p:nvCxnSpPr>
+        <p:spPr>
+          <a:xfrm>
+            <a:off x="2495960" y="3654003"/>
+            <a:ext cx="450005" cy="0"/>
+          </a:xfrm>
+          <a:prstGeom prst="line">
+            <a:avLst/>
+          </a:prstGeom>
+          <a:ln w="19050"/>
+        </p:spPr>
+        <p:style>
+          <a:lnRef idx="1">
+            <a:schemeClr val="accent1"/>
+          </a:lnRef>
+          <a:fillRef idx="0">
+            <a:schemeClr val="accent1"/>
+          </a:fillRef>
+          <a:effectRef idx="0">
+            <a:schemeClr val="accent1"/>
+          </a:effectRef>
+          <a:fontRef idx="minor">
+            <a:schemeClr val="tx1"/>
+          </a:fontRef>
+        </p:style>
+      </p:cxnSp>
+      <p:sp>
+        <p:nvSpPr>
+          <p:cNvPr id="104" name="Ruit 103"/>
+          <p:cNvSpPr/>
+          <p:nvPr/>
+        </p:nvSpPr>
+        <p:spPr>
+          <a:xfrm>
+            <a:off x="2945965" y="4059007"/>
+            <a:ext cx="360004" cy="270003"/>
+          </a:xfrm>
+          <a:prstGeom prst="diamond">
+            <a:avLst/>
+          </a:prstGeom>
+          <a:ln w="19050"/>
+        </p:spPr>
+        <p:style>
+          <a:lnRef idx="2">
+            <a:schemeClr val="accent1"/>
+          </a:lnRef>
+          <a:fillRef idx="1">
+            <a:schemeClr val="lt1"/>
+          </a:fillRef>
+          <a:effectRef idx="0">
+            <a:schemeClr val="accent1"/>
+          </a:effectRef>
+          <a:fontRef idx="minor">
+            <a:schemeClr val="dk1"/>
+          </a:fontRef>
+        </p:style>
+        <p:txBody>
+          <a:bodyPr rtlCol="0" anchor="ctr"/>
+          <a:lstStyle/>
+          <a:p>
+            <a:pPr algn="ctr"/>
+            <a:endParaRPr lang="nl-BE"/>
+          </a:p>
+        </p:txBody>
+      </p:sp>
+      <p:sp>
+        <p:nvSpPr>
+          <p:cNvPr id="105" name="Ruit 104"/>
+          <p:cNvSpPr/>
+          <p:nvPr/>
+        </p:nvSpPr>
+        <p:spPr>
+          <a:xfrm>
+            <a:off x="2945965" y="4599013"/>
+            <a:ext cx="360004" cy="270003"/>
+          </a:xfrm>
+          <a:prstGeom prst="diamond">
+            <a:avLst/>
+          </a:prstGeom>
+          <a:ln w="19050"/>
+        </p:spPr>
+        <p:style>
+          <a:lnRef idx="2">
+            <a:schemeClr val="accent1"/>
+          </a:lnRef>
+          <a:fillRef idx="1">
+            <a:schemeClr val="lt1"/>
+          </a:fillRef>
+          <a:effectRef idx="0">
+            <a:schemeClr val="accent1"/>
+          </a:effectRef>
+          <a:fontRef idx="minor">
+            <a:schemeClr val="dk1"/>
+          </a:fontRef>
+        </p:style>
+        <p:txBody>
+          <a:bodyPr rtlCol="0" anchor="ctr"/>
+          <a:lstStyle/>
+          <a:p>
+            <a:pPr algn="ctr"/>
+            <a:endParaRPr lang="nl-BE"/>
+          </a:p>
+        </p:txBody>
+      </p:sp>
+      <p:sp>
+        <p:nvSpPr>
+          <p:cNvPr id="106" name="Ruit 105"/>
+          <p:cNvSpPr/>
+          <p:nvPr/>
+        </p:nvSpPr>
+        <p:spPr>
+          <a:xfrm>
+            <a:off x="2945965" y="5139019"/>
+            <a:ext cx="360004" cy="270003"/>
+          </a:xfrm>
+          <a:prstGeom prst="diamond">
+            <a:avLst/>
+          </a:prstGeom>
+          <a:ln w="19050"/>
+        </p:spPr>
+        <p:style>
+          <a:lnRef idx="2">
+            <a:schemeClr val="accent1"/>
+          </a:lnRef>
+          <a:fillRef idx="1">
+            <a:schemeClr val="lt1"/>
+          </a:fillRef>
+          <a:effectRef idx="0">
+            <a:schemeClr val="accent1"/>
+          </a:effectRef>
+          <a:fontRef idx="minor">
+            <a:schemeClr val="dk1"/>
+          </a:fontRef>
+        </p:style>
+        <p:txBody>
+          <a:bodyPr rtlCol="0" anchor="ctr"/>
+          <a:lstStyle/>
+          <a:p>
+            <a:pPr algn="ctr"/>
+            <a:endParaRPr lang="nl-BE"/>
+          </a:p>
+        </p:txBody>
+      </p:sp>
+      <p:cxnSp>
+        <p:nvCxnSpPr>
+          <p:cNvPr id="107" name="Rechte verbindingslijn 106"/>
+          <p:cNvCxnSpPr>
+            <a:stCxn id="85" idx="3"/>
+            <a:endCxn id="104" idx="1"/>
+          </p:cNvCxnSpPr>
+          <p:nvPr/>
+        </p:nvCxnSpPr>
+        <p:spPr>
+          <a:xfrm>
+            <a:off x="2495960" y="4194009"/>
+            <a:ext cx="450005" cy="0"/>
+          </a:xfrm>
+          <a:prstGeom prst="line">
+            <a:avLst/>
+          </a:prstGeom>
+          <a:ln w="19050"/>
+        </p:spPr>
+        <p:style>
+          <a:lnRef idx="1">
+            <a:schemeClr val="accent1"/>
+          </a:lnRef>
+          <a:fillRef idx="0">
+            <a:schemeClr val="accent1"/>
+          </a:fillRef>
+          <a:effectRef idx="0">
+            <a:schemeClr val="accent1"/>
+          </a:effectRef>
+          <a:fontRef idx="minor">
+            <a:schemeClr val="tx1"/>
+          </a:fontRef>
+        </p:style>
+      </p:cxnSp>
+      <p:cxnSp>
+        <p:nvCxnSpPr>
+          <p:cNvPr id="108" name="Rechte verbindingslijn 107"/>
+          <p:cNvCxnSpPr>
+            <a:stCxn id="86" idx="3"/>
+            <a:endCxn id="105" idx="1"/>
+          </p:cNvCxnSpPr>
+          <p:nvPr/>
+        </p:nvCxnSpPr>
+        <p:spPr>
+          <a:xfrm>
+            <a:off x="2495960" y="4734015"/>
+            <a:ext cx="450005" cy="0"/>
+          </a:xfrm>
+          <a:prstGeom prst="line">
+            <a:avLst/>
+          </a:prstGeom>
+          <a:ln w="19050"/>
+        </p:spPr>
+        <p:style>
+          <a:lnRef idx="1">
+            <a:schemeClr val="accent1"/>
+          </a:lnRef>
+          <a:fillRef idx="0">
+            <a:schemeClr val="accent1"/>
+          </a:fillRef>
+          <a:effectRef idx="0">
+            <a:schemeClr val="accent1"/>
+          </a:effectRef>
+          <a:fontRef idx="minor">
+            <a:schemeClr val="tx1"/>
+          </a:fontRef>
+        </p:style>
+      </p:cxnSp>
+      <p:cxnSp>
+        <p:nvCxnSpPr>
+          <p:cNvPr id="110" name="Rechte verbindingslijn 109"/>
+          <p:cNvCxnSpPr>
+            <a:stCxn id="90" idx="3"/>
+            <a:endCxn id="106" idx="1"/>
+          </p:cNvCxnSpPr>
+          <p:nvPr/>
+        </p:nvCxnSpPr>
+        <p:spPr>
+          <a:xfrm>
+            <a:off x="2495960" y="5274021"/>
+            <a:ext cx="450005" cy="0"/>
+          </a:xfrm>
+          <a:prstGeom prst="line">
+            <a:avLst/>
+          </a:prstGeom>
+          <a:ln w="19050"/>
+        </p:spPr>
+        <p:style>
+          <a:lnRef idx="1">
+            <a:schemeClr val="accent1"/>
+          </a:lnRef>
+          <a:fillRef idx="0">
+            <a:schemeClr val="accent1"/>
+          </a:fillRef>
+          <a:effectRef idx="0">
+            <a:schemeClr val="accent1"/>
+          </a:effectRef>
+          <a:fontRef idx="minor">
+            <a:schemeClr val="tx1"/>
+          </a:fontRef>
+        </p:style>
+      </p:cxnSp>
+      <p:sp>
+        <p:nvSpPr>
+          <p:cNvPr id="112" name="Tekstvak 111"/>
+          <p:cNvSpPr txBox="1"/>
+          <p:nvPr/>
+        </p:nvSpPr>
+        <p:spPr>
+          <a:xfrm>
+            <a:off x="2495960" y="3609002"/>
+            <a:ext cx="450005" cy="178235"/>
+          </a:xfrm>
+          <a:prstGeom prst="rect">
+            <a:avLst/>
+          </a:prstGeom>
+          <a:noFill/>
+          <a:ln w="19050">
+            <a:noFill/>
+          </a:ln>
+        </p:spPr>
+        <p:style>
+          <a:lnRef idx="2">
+            <a:schemeClr val="accent1"/>
+          </a:lnRef>
+          <a:fillRef idx="1">
+            <a:schemeClr val="lt1"/>
+          </a:fillRef>
+          <a:effectRef idx="0">
+            <a:schemeClr val="accent1"/>
+          </a:effectRef>
+          <a:fontRef idx="minor">
+            <a:schemeClr val="dk1"/>
+          </a:fontRef>
+        </p:style>
+        <p:txBody>
+          <a:bodyPr wrap="none" rtlCol="0">
+            <a:noAutofit/>
+          </a:bodyPr>
+          <a:lstStyle/>
+          <a:p>
+            <a:pPr algn="ctr"/>
+            <a:r>
+              <a:rPr lang="nl-BE" sz="900" dirty="0" err="1">
+                <a:solidFill>
+                  <a:schemeClr val="tx1"/>
+                </a:solidFill>
+              </a:rPr>
+              <a:t>Assign</a:t>
+            </a:r>
+            <a:endParaRPr lang="nl-BE" sz="900" dirty="0">
+              <a:solidFill>
+                <a:schemeClr val="tx1"/>
+              </a:solidFill>
+            </a:endParaRPr>
+          </a:p>
+        </p:txBody>
+      </p:sp>
+      <p:sp>
+        <p:nvSpPr>
+          <p:cNvPr id="113" name="Tekstvak 112"/>
+          <p:cNvSpPr txBox="1"/>
+          <p:nvPr/>
+        </p:nvSpPr>
+        <p:spPr>
+          <a:xfrm>
+            <a:off x="2495960" y="4150775"/>
+            <a:ext cx="450005" cy="178235"/>
+          </a:xfrm>
+          <a:prstGeom prst="rect">
+            <a:avLst/>
+          </a:prstGeom>
+          <a:noFill/>
+          <a:ln w="19050">
+            <a:noFill/>
+          </a:ln>
+        </p:spPr>
+        <p:style>
+          <a:lnRef idx="2">
+            <a:schemeClr val="accent1"/>
+          </a:lnRef>
+          <a:fillRef idx="1">
+            <a:schemeClr val="lt1"/>
+          </a:fillRef>
+          <a:effectRef idx="0">
+            <a:schemeClr val="accent1"/>
+          </a:effectRef>
+          <a:fontRef idx="minor">
+            <a:schemeClr val="dk1"/>
+          </a:fontRef>
+        </p:style>
+        <p:txBody>
+          <a:bodyPr wrap="none" rtlCol="0">
+            <a:noAutofit/>
+          </a:bodyPr>
+          <a:lstStyle/>
+          <a:p>
+            <a:pPr algn="ctr"/>
+            <a:r>
+              <a:rPr lang="nl-BE" sz="900" dirty="0" err="1">
+                <a:solidFill>
+                  <a:schemeClr val="tx1"/>
+                </a:solidFill>
+              </a:rPr>
+              <a:t>Assign</a:t>
+            </a:r>
+            <a:endParaRPr lang="nl-BE" sz="900" dirty="0">
+              <a:solidFill>
+                <a:schemeClr val="tx1"/>
+              </a:solidFill>
+            </a:endParaRPr>
+          </a:p>
+        </p:txBody>
+      </p:sp>
+      <p:sp>
+        <p:nvSpPr>
+          <p:cNvPr id="114" name="Tekstvak 113"/>
+          <p:cNvSpPr txBox="1"/>
+          <p:nvPr/>
+        </p:nvSpPr>
+        <p:spPr>
+          <a:xfrm>
+            <a:off x="2495960" y="4689014"/>
+            <a:ext cx="450005" cy="178235"/>
+          </a:xfrm>
+          <a:prstGeom prst="rect">
+            <a:avLst/>
+          </a:prstGeom>
+          <a:noFill/>
+          <a:ln w="19050">
+            <a:noFill/>
+          </a:ln>
+        </p:spPr>
+        <p:style>
+          <a:lnRef idx="2">
+            <a:schemeClr val="accent1"/>
+          </a:lnRef>
+          <a:fillRef idx="1">
+            <a:schemeClr val="lt1"/>
+          </a:fillRef>
+          <a:effectRef idx="0">
+            <a:schemeClr val="accent1"/>
+          </a:effectRef>
+          <a:fontRef idx="minor">
+            <a:schemeClr val="dk1"/>
+          </a:fontRef>
+        </p:style>
+        <p:txBody>
+          <a:bodyPr wrap="none" rtlCol="0">
+            <a:noAutofit/>
+          </a:bodyPr>
+          <a:lstStyle/>
+          <a:p>
+            <a:pPr algn="ctr"/>
+            <a:r>
+              <a:rPr lang="nl-BE" sz="900" dirty="0" err="1">
+                <a:solidFill>
+                  <a:schemeClr val="tx1"/>
+                </a:solidFill>
+              </a:rPr>
+              <a:t>Assign</a:t>
+            </a:r>
+            <a:endParaRPr lang="nl-BE" sz="900" dirty="0">
+              <a:solidFill>
+                <a:schemeClr val="tx1"/>
+              </a:solidFill>
+            </a:endParaRPr>
+          </a:p>
+        </p:txBody>
+      </p:sp>
+      <p:sp>
+        <p:nvSpPr>
+          <p:cNvPr id="118" name="Tekstvak 117"/>
+          <p:cNvSpPr txBox="1"/>
+          <p:nvPr/>
+        </p:nvSpPr>
+        <p:spPr>
+          <a:xfrm>
+            <a:off x="2495960" y="5229020"/>
+            <a:ext cx="450005" cy="178235"/>
+          </a:xfrm>
+          <a:prstGeom prst="rect">
+            <a:avLst/>
+          </a:prstGeom>
+          <a:noFill/>
+          <a:ln w="19050">
+            <a:noFill/>
+          </a:ln>
+        </p:spPr>
+        <p:style>
+          <a:lnRef idx="2">
+            <a:schemeClr val="accent1"/>
+          </a:lnRef>
+          <a:fillRef idx="1">
+            <a:schemeClr val="lt1"/>
+          </a:fillRef>
+          <a:effectRef idx="0">
+            <a:schemeClr val="accent1"/>
+          </a:effectRef>
+          <a:fontRef idx="minor">
+            <a:schemeClr val="dk1"/>
+          </a:fontRef>
+        </p:style>
+        <p:txBody>
+          <a:bodyPr wrap="none" rtlCol="0">
+            <a:noAutofit/>
+          </a:bodyPr>
+          <a:lstStyle/>
+          <a:p>
+            <a:pPr algn="ctr"/>
+            <a:r>
+              <a:rPr lang="nl-BE" sz="900" dirty="0" err="1">
+                <a:solidFill>
+                  <a:schemeClr val="tx1"/>
+                </a:solidFill>
+              </a:rPr>
+              <a:t>Assign</a:t>
+            </a:r>
+            <a:endParaRPr lang="nl-BE" sz="900" dirty="0">
+              <a:solidFill>
+                <a:schemeClr val="tx1"/>
+              </a:solidFill>
+            </a:endParaRPr>
+          </a:p>
+        </p:txBody>
+      </p:sp>
+      <p:sp>
+        <p:nvSpPr>
+          <p:cNvPr id="120" name="Tekstvak 119"/>
+          <p:cNvSpPr txBox="1"/>
+          <p:nvPr/>
+        </p:nvSpPr>
+        <p:spPr>
+          <a:xfrm>
+            <a:off x="5195990" y="5229020"/>
+            <a:ext cx="450005" cy="178235"/>
+          </a:xfrm>
+          <a:prstGeom prst="rect">
+            <a:avLst/>
+          </a:prstGeom>
+          <a:noFill/>
+          <a:ln w="19050">
+            <a:noFill/>
+          </a:ln>
+        </p:spPr>
+        <p:style>
+          <a:lnRef idx="2">
+            <a:schemeClr val="accent1"/>
+          </a:lnRef>
+          <a:fillRef idx="1">
+            <a:schemeClr val="lt1"/>
+          </a:fillRef>
+          <a:effectRef idx="0">
+            <a:schemeClr val="accent1"/>
+          </a:effectRef>
+          <a:fontRef idx="minor">
+            <a:schemeClr val="dk1"/>
+          </a:fontRef>
+        </p:style>
+        <p:txBody>
+          <a:bodyPr wrap="none" rtlCol="0">
+            <a:noAutofit/>
+          </a:bodyPr>
+          <a:lstStyle/>
+          <a:p>
+            <a:pPr algn="ctr"/>
+            <a:r>
+              <a:rPr lang="nl-BE" sz="900" dirty="0">
+                <a:solidFill>
+                  <a:schemeClr val="tx1"/>
+                </a:solidFill>
+              </a:rPr>
+              <a:t>Template</a:t>
+            </a:r>
+          </a:p>
+        </p:txBody>
+      </p:sp>
+      <p:sp>
+        <p:nvSpPr>
+          <p:cNvPr id="121" name="Tekstvak 120"/>
+          <p:cNvSpPr txBox="1"/>
+          <p:nvPr/>
+        </p:nvSpPr>
+        <p:spPr>
+          <a:xfrm>
+            <a:off x="5195990" y="4689014"/>
+            <a:ext cx="450005" cy="178235"/>
+          </a:xfrm>
+          <a:prstGeom prst="rect">
+            <a:avLst/>
+          </a:prstGeom>
+          <a:noFill/>
+          <a:ln w="19050">
+            <a:noFill/>
+          </a:ln>
+        </p:spPr>
+        <p:style>
+          <a:lnRef idx="2">
+            <a:schemeClr val="accent1"/>
+          </a:lnRef>
+          <a:fillRef idx="1">
+            <a:schemeClr val="lt1"/>
+          </a:fillRef>
+          <a:effectRef idx="0">
+            <a:schemeClr val="accent1"/>
+          </a:effectRef>
+          <a:fontRef idx="minor">
+            <a:schemeClr val="dk1"/>
+          </a:fontRef>
+        </p:style>
+        <p:txBody>
+          <a:bodyPr wrap="none" rtlCol="0">
+            <a:noAutofit/>
+          </a:bodyPr>
+          <a:lstStyle/>
+          <a:p>
+            <a:pPr algn="ctr"/>
+            <a:r>
+              <a:rPr lang="nl-BE" sz="900" dirty="0">
+                <a:solidFill>
+                  <a:schemeClr val="tx1"/>
+                </a:solidFill>
+              </a:rPr>
+              <a:t>Template</a:t>
+            </a:r>
+          </a:p>
+        </p:txBody>
+      </p:sp>
+      <p:sp>
+        <p:nvSpPr>
+          <p:cNvPr id="123" name="Tekstvak 122"/>
+          <p:cNvSpPr txBox="1"/>
+          <p:nvPr/>
+        </p:nvSpPr>
+        <p:spPr>
+          <a:xfrm>
+            <a:off x="5195990" y="4149008"/>
+            <a:ext cx="450005" cy="178235"/>
+          </a:xfrm>
+          <a:prstGeom prst="rect">
+            <a:avLst/>
+          </a:prstGeom>
+          <a:noFill/>
+          <a:ln w="19050">
+            <a:noFill/>
+          </a:ln>
+        </p:spPr>
+        <p:style>
+          <a:lnRef idx="2">
+            <a:schemeClr val="accent1"/>
+          </a:lnRef>
+          <a:fillRef idx="1">
+            <a:schemeClr val="lt1"/>
+          </a:fillRef>
+          <a:effectRef idx="0">
+            <a:schemeClr val="accent1"/>
+          </a:effectRef>
+          <a:fontRef idx="minor">
+            <a:schemeClr val="dk1"/>
+          </a:fontRef>
+        </p:style>
+        <p:txBody>
+          <a:bodyPr wrap="none" rtlCol="0">
+            <a:noAutofit/>
+          </a:bodyPr>
+          <a:lstStyle/>
+          <a:p>
+            <a:pPr algn="ctr"/>
+            <a:r>
+              <a:rPr lang="nl-BE" sz="900" dirty="0">
+                <a:solidFill>
+                  <a:schemeClr val="tx1"/>
+                </a:solidFill>
+              </a:rPr>
+              <a:t>Template</a:t>
+            </a:r>
+          </a:p>
+        </p:txBody>
+      </p:sp>
+      <p:sp>
+        <p:nvSpPr>
+          <p:cNvPr id="124" name="Tekstvak 123"/>
+          <p:cNvSpPr txBox="1"/>
+          <p:nvPr/>
+        </p:nvSpPr>
+        <p:spPr>
+          <a:xfrm>
+            <a:off x="5195990" y="3609002"/>
+            <a:ext cx="450005" cy="178235"/>
+          </a:xfrm>
+          <a:prstGeom prst="rect">
+            <a:avLst/>
+          </a:prstGeom>
+          <a:noFill/>
+          <a:ln w="19050">
+            <a:noFill/>
+          </a:ln>
+        </p:spPr>
+        <p:style>
+          <a:lnRef idx="2">
+            <a:schemeClr val="accent1"/>
+          </a:lnRef>
+          <a:fillRef idx="1">
+            <a:schemeClr val="lt1"/>
+          </a:fillRef>
+          <a:effectRef idx="0">
+            <a:schemeClr val="accent1"/>
+          </a:effectRef>
+          <a:fontRef idx="minor">
+            <a:schemeClr val="dk1"/>
+          </a:fontRef>
+        </p:style>
+        <p:txBody>
+          <a:bodyPr wrap="none" rtlCol="0">
+            <a:noAutofit/>
+          </a:bodyPr>
+          <a:lstStyle/>
+          <a:p>
+            <a:pPr algn="ctr"/>
+            <a:r>
+              <a:rPr lang="nl-BE" sz="900" dirty="0">
+                <a:solidFill>
+                  <a:schemeClr val="tx1"/>
+                </a:solidFill>
+              </a:rPr>
+              <a:t>Template</a:t>
+            </a:r>
+          </a:p>
+        </p:txBody>
+      </p:sp>
+      <p:sp>
+        <p:nvSpPr>
+          <p:cNvPr id="127" name="Tekstvak 126"/>
+          <p:cNvSpPr txBox="1"/>
+          <p:nvPr/>
+        </p:nvSpPr>
+        <p:spPr>
+          <a:xfrm>
+            <a:off x="5375992" y="3429000"/>
+            <a:ext cx="270004" cy="270003"/>
+          </a:xfrm>
+          <a:prstGeom prst="rect">
+            <a:avLst/>
+          </a:prstGeom>
+          <a:noFill/>
+          <a:ln w="19050">
+            <a:noFill/>
+          </a:ln>
+        </p:spPr>
+        <p:style>
+          <a:lnRef idx="2">
+            <a:schemeClr val="accent1"/>
+          </a:lnRef>
+          <a:fillRef idx="1">
+            <a:schemeClr val="lt1"/>
+          </a:fillRef>
+          <a:effectRef idx="0">
+            <a:schemeClr val="accent1"/>
+          </a:effectRef>
+          <a:fontRef idx="minor">
+            <a:schemeClr val="dk1"/>
+          </a:fontRef>
+        </p:style>
+        <p:txBody>
+          <a:bodyPr wrap="none" rtlCol="0" anchor="ctr">
+            <a:noAutofit/>
+          </a:bodyPr>
+          <a:lstStyle/>
+          <a:p>
+            <a:pPr algn="ctr"/>
+            <a:r>
+              <a:rPr lang="nl-BE" sz="1200" dirty="0">
+                <a:solidFill>
+                  <a:schemeClr val="tx1"/>
+                </a:solidFill>
+              </a:rPr>
+              <a:t>0..1</a:t>
+            </a:r>
+          </a:p>
+        </p:txBody>
+      </p:sp>
+      <p:sp>
+        <p:nvSpPr>
+          <p:cNvPr id="128" name="Tekstvak 127"/>
+          <p:cNvSpPr txBox="1"/>
+          <p:nvPr/>
+        </p:nvSpPr>
+        <p:spPr>
+          <a:xfrm>
+            <a:off x="5375992" y="3969006"/>
+            <a:ext cx="270004" cy="270003"/>
+          </a:xfrm>
+          <a:prstGeom prst="rect">
+            <a:avLst/>
+          </a:prstGeom>
+          <a:noFill/>
+          <a:ln w="19050">
+            <a:noFill/>
+          </a:ln>
+        </p:spPr>
+        <p:style>
+          <a:lnRef idx="2">
+            <a:schemeClr val="accent1"/>
+          </a:lnRef>
+          <a:fillRef idx="1">
+            <a:schemeClr val="lt1"/>
+          </a:fillRef>
+          <a:effectRef idx="0">
+            <a:schemeClr val="accent1"/>
+          </a:effectRef>
+          <a:fontRef idx="minor">
+            <a:schemeClr val="dk1"/>
+          </a:fontRef>
+        </p:style>
+        <p:txBody>
+          <a:bodyPr wrap="none" rtlCol="0" anchor="ctr">
+            <a:noAutofit/>
+          </a:bodyPr>
+          <a:lstStyle/>
+          <a:p>
+            <a:pPr algn="ctr"/>
+            <a:r>
+              <a:rPr lang="nl-BE" sz="1200" dirty="0">
+                <a:solidFill>
+                  <a:schemeClr val="tx1"/>
+                </a:solidFill>
+              </a:rPr>
+              <a:t>0..1</a:t>
+            </a:r>
+          </a:p>
+        </p:txBody>
+      </p:sp>
+      <p:sp>
+        <p:nvSpPr>
+          <p:cNvPr id="129" name="Tekstvak 128"/>
+          <p:cNvSpPr txBox="1"/>
+          <p:nvPr/>
+        </p:nvSpPr>
+        <p:spPr>
+          <a:xfrm>
+            <a:off x="5375992" y="4509012"/>
+            <a:ext cx="270004" cy="270003"/>
+          </a:xfrm>
+          <a:prstGeom prst="rect">
+            <a:avLst/>
+          </a:prstGeom>
+          <a:noFill/>
+          <a:ln w="19050">
+            <a:noFill/>
+          </a:ln>
+        </p:spPr>
+        <p:style>
+          <a:lnRef idx="2">
+            <a:schemeClr val="accent1"/>
+          </a:lnRef>
+          <a:fillRef idx="1">
+            <a:schemeClr val="lt1"/>
+          </a:fillRef>
+          <a:effectRef idx="0">
+            <a:schemeClr val="accent1"/>
+          </a:effectRef>
+          <a:fontRef idx="minor">
+            <a:schemeClr val="dk1"/>
+          </a:fontRef>
+        </p:style>
+        <p:txBody>
+          <a:bodyPr wrap="none" rtlCol="0" anchor="ctr">
+            <a:noAutofit/>
+          </a:bodyPr>
+          <a:lstStyle/>
+          <a:p>
+            <a:pPr algn="ctr"/>
+            <a:r>
+              <a:rPr lang="nl-BE" sz="1200" dirty="0">
+                <a:solidFill>
+                  <a:schemeClr val="tx1"/>
+                </a:solidFill>
+              </a:rPr>
+              <a:t>0..1</a:t>
+            </a:r>
+          </a:p>
+        </p:txBody>
+      </p:sp>
+      <p:sp>
+        <p:nvSpPr>
+          <p:cNvPr id="131" name="Tekstvak 130"/>
+          <p:cNvSpPr txBox="1"/>
+          <p:nvPr/>
+        </p:nvSpPr>
+        <p:spPr>
+          <a:xfrm>
+            <a:off x="5375992" y="5049018"/>
+            <a:ext cx="270004" cy="270003"/>
+          </a:xfrm>
+          <a:prstGeom prst="rect">
+            <a:avLst/>
+          </a:prstGeom>
+          <a:noFill/>
+          <a:ln w="19050">
+            <a:noFill/>
+          </a:ln>
+        </p:spPr>
+        <p:style>
+          <a:lnRef idx="2">
+            <a:schemeClr val="accent1"/>
+          </a:lnRef>
+          <a:fillRef idx="1">
+            <a:schemeClr val="lt1"/>
+          </a:fillRef>
+          <a:effectRef idx="0">
+            <a:schemeClr val="accent1"/>
+          </a:effectRef>
+          <a:fontRef idx="minor">
+            <a:schemeClr val="dk1"/>
+          </a:fontRef>
+        </p:style>
+        <p:txBody>
+          <a:bodyPr wrap="none" rtlCol="0" anchor="ctr">
+            <a:noAutofit/>
+          </a:bodyPr>
+          <a:lstStyle/>
+          <a:p>
+            <a:pPr algn="ctr"/>
+            <a:r>
+              <a:rPr lang="nl-BE" sz="1200" dirty="0">
+                <a:solidFill>
+                  <a:schemeClr val="tx1"/>
+                </a:solidFill>
+              </a:rPr>
+              <a:t>0..1</a:t>
+            </a:r>
+          </a:p>
+        </p:txBody>
+      </p:sp>
+      <p:sp>
+        <p:nvSpPr>
+          <p:cNvPr id="132" name="Tekstvak 131"/>
+          <p:cNvSpPr txBox="1"/>
+          <p:nvPr/>
+        </p:nvSpPr>
+        <p:spPr>
+          <a:xfrm>
+            <a:off x="2495960" y="5049018"/>
+            <a:ext cx="270004" cy="270003"/>
+          </a:xfrm>
+          <a:prstGeom prst="rect">
+            <a:avLst/>
+          </a:prstGeom>
+          <a:noFill/>
+          <a:ln w="19050">
+            <a:noFill/>
+          </a:ln>
+        </p:spPr>
+        <p:style>
+          <a:lnRef idx="2">
+            <a:schemeClr val="accent1"/>
+          </a:lnRef>
+          <a:fillRef idx="1">
+            <a:schemeClr val="lt1"/>
+          </a:fillRef>
+          <a:effectRef idx="0">
+            <a:schemeClr val="accent1"/>
+          </a:effectRef>
+          <a:fontRef idx="minor">
+            <a:schemeClr val="dk1"/>
+          </a:fontRef>
+        </p:style>
+        <p:txBody>
+          <a:bodyPr wrap="none" rtlCol="0" anchor="ctr">
+            <a:noAutofit/>
+          </a:bodyPr>
+          <a:lstStyle/>
+          <a:p>
+            <a:pPr algn="ctr"/>
+            <a:r>
+              <a:rPr lang="nl-BE" sz="1200" dirty="0">
+                <a:solidFill>
+                  <a:schemeClr val="tx1"/>
+                </a:solidFill>
+              </a:rPr>
+              <a:t>1..*</a:t>
+            </a:r>
+          </a:p>
+        </p:txBody>
+      </p:sp>
+      <p:sp>
+        <p:nvSpPr>
+          <p:cNvPr id="133" name="Tekstvak 132"/>
+          <p:cNvSpPr txBox="1"/>
+          <p:nvPr/>
+        </p:nvSpPr>
+        <p:spPr>
+          <a:xfrm>
+            <a:off x="2495960" y="4509012"/>
+            <a:ext cx="270004" cy="270003"/>
+          </a:xfrm>
+          <a:prstGeom prst="rect">
+            <a:avLst/>
+          </a:prstGeom>
+          <a:noFill/>
+          <a:ln w="19050">
+            <a:noFill/>
+          </a:ln>
+        </p:spPr>
+        <p:style>
+          <a:lnRef idx="2">
+            <a:schemeClr val="accent1"/>
+          </a:lnRef>
+          <a:fillRef idx="1">
+            <a:schemeClr val="lt1"/>
+          </a:fillRef>
+          <a:effectRef idx="0">
+            <a:schemeClr val="accent1"/>
+          </a:effectRef>
+          <a:fontRef idx="minor">
+            <a:schemeClr val="dk1"/>
+          </a:fontRef>
+        </p:style>
+        <p:txBody>
+          <a:bodyPr wrap="none" rtlCol="0" anchor="ctr">
+            <a:noAutofit/>
+          </a:bodyPr>
+          <a:lstStyle/>
+          <a:p>
+            <a:pPr algn="ctr"/>
+            <a:r>
+              <a:rPr lang="nl-BE" sz="1200" dirty="0">
+                <a:solidFill>
+                  <a:schemeClr val="tx1"/>
+                </a:solidFill>
+              </a:rPr>
+              <a:t>1..*</a:t>
+            </a:r>
+          </a:p>
+        </p:txBody>
+      </p:sp>
+      <p:sp>
+        <p:nvSpPr>
+          <p:cNvPr id="135" name="Tekstvak 134"/>
+          <p:cNvSpPr txBox="1"/>
+          <p:nvPr/>
+        </p:nvSpPr>
+        <p:spPr>
+          <a:xfrm>
+            <a:off x="2495960" y="3969006"/>
+            <a:ext cx="270004" cy="270003"/>
+          </a:xfrm>
+          <a:prstGeom prst="rect">
+            <a:avLst/>
+          </a:prstGeom>
+          <a:noFill/>
+          <a:ln w="19050">
+            <a:noFill/>
+          </a:ln>
+        </p:spPr>
+        <p:style>
+          <a:lnRef idx="2">
+            <a:schemeClr val="accent1"/>
+          </a:lnRef>
+          <a:fillRef idx="1">
+            <a:schemeClr val="lt1"/>
+          </a:fillRef>
+          <a:effectRef idx="0">
+            <a:schemeClr val="accent1"/>
+          </a:effectRef>
+          <a:fontRef idx="minor">
+            <a:schemeClr val="dk1"/>
+          </a:fontRef>
+        </p:style>
+        <p:txBody>
+          <a:bodyPr wrap="none" rtlCol="0" anchor="ctr">
+            <a:noAutofit/>
+          </a:bodyPr>
+          <a:lstStyle/>
+          <a:p>
+            <a:pPr algn="ctr"/>
+            <a:r>
+              <a:rPr lang="nl-BE" sz="1200" dirty="0">
+                <a:solidFill>
+                  <a:schemeClr val="tx1"/>
+                </a:solidFill>
+              </a:rPr>
+              <a:t>1..*</a:t>
+            </a:r>
+          </a:p>
+        </p:txBody>
+      </p:sp>
+      <p:sp>
+        <p:nvSpPr>
+          <p:cNvPr id="136" name="Tekstvak 135"/>
+          <p:cNvSpPr txBox="1"/>
+          <p:nvPr/>
+        </p:nvSpPr>
+        <p:spPr>
+          <a:xfrm>
+            <a:off x="2495960" y="3429000"/>
+            <a:ext cx="270004" cy="270003"/>
+          </a:xfrm>
+          <a:prstGeom prst="rect">
+            <a:avLst/>
+          </a:prstGeom>
+          <a:noFill/>
+          <a:ln w="19050">
+            <a:noFill/>
+          </a:ln>
+        </p:spPr>
+        <p:style>
+          <a:lnRef idx="2">
+            <a:schemeClr val="accent1"/>
+          </a:lnRef>
+          <a:fillRef idx="1">
+            <a:schemeClr val="lt1"/>
+          </a:fillRef>
+          <a:effectRef idx="0">
+            <a:schemeClr val="accent1"/>
+          </a:effectRef>
+          <a:fontRef idx="minor">
+            <a:schemeClr val="dk1"/>
+          </a:fontRef>
+        </p:style>
+        <p:txBody>
+          <a:bodyPr wrap="none" rtlCol="0" anchor="ctr">
+            <a:noAutofit/>
+          </a:bodyPr>
+          <a:lstStyle/>
+          <a:p>
+            <a:pPr algn="ctr"/>
+            <a:r>
+              <a:rPr lang="nl-BE" sz="1200" dirty="0">
+                <a:solidFill>
+                  <a:schemeClr val="tx1"/>
+                </a:solidFill>
+              </a:rPr>
+              <a:t>1..*</a:t>
+            </a:r>
+          </a:p>
+        </p:txBody>
+      </p:sp>
+    </p:spTree>
+    <p:extLst>
+      <p:ext uri="{BB962C8B-B14F-4D97-AF65-F5344CB8AC3E}">
+        <p14:creationId xmlns:p14="http://schemas.microsoft.com/office/powerpoint/2010/main" val="2192034346"/>
+      </p:ext>
+    </p:extLst>
+  </p:cSld>
+  <p:clrMapOvr>
+    <a:masterClrMapping/>
+  </p:clrMapOvr>
+  <mc:AlternateContent xmlns:mc="http://schemas.openxmlformats.org/markup-compatibility/2006" xmlns:p159="http://schemas.microsoft.com/office/powerpoint/2015/09/main">
+    <mc:Choice Requires="p159">
+      <p:transition xmlns:p14="http://schemas.microsoft.com/office/powerpoint/2010/main" spd="slow" p14:dur="2000">
+        <p159:morph option="byObject"/>
+      </p:transition>
+    </mc:Choice>
+    <mc:Fallback xmlns="">
+      <p:transition spd="slow">
+        <p:fade/>
+      </p:transition>
+    </mc:Fallback>
+  </mc:AlternateContent>
+</p:sld>
+</file>
+
+<file path=ppt/slides/slide7.xml><?xml version="1.0" encoding="utf-8"?>
+<p:sld xmlns:a="http://schemas.openxmlformats.org/drawingml/2006/main" xmlns:r="http://schemas.openxmlformats.org/officeDocument/2006/relationships" xmlns:p="http://schemas.openxmlformats.org/presentationml/2006/main">
+  <p:cSld>
+    <p:spTree>
+      <p:nvGrpSpPr>
+        <p:cNvPr id="1" name=""/>
+        <p:cNvGrpSpPr/>
+        <p:nvPr/>
+      </p:nvGrpSpPr>
+      <p:grpSpPr>
+        <a:xfrm>
+          <a:off x="0" y="0"/>
+          <a:ext cx="0" cy="0"/>
+          <a:chOff x="0" y="0"/>
+          <a:chExt cx="0" cy="0"/>
+        </a:xfrm>
+      </p:grpSpPr>
+      <p:sp>
+        <p:nvSpPr>
           <p:cNvPr id="4" name="Titel 3"/>
           <p:cNvSpPr>
             <a:spLocks noGrp="1"/>
@@ -9622,12 +14353,12 @@
   <a:objectDefaults>
     <a:spDef>
       <a:spPr>
-        <a:ln w="28575"/>
+        <a:ln w="19050"/>
       </a:spPr>
       <a:bodyPr rtlCol="0" anchor="ctr"/>
       <a:lstStyle>
         <a:defPPr algn="ctr">
-          <a:defRPr/>
+          <a:defRPr sz="1000"/>
         </a:defPPr>
       </a:lstStyle>
       <a:style>

</xml_diff>

<commit_message>
Got the process cleanup working now, when a task has finished.
ProcessStop is called for each process that is destructed... Actually, I
need to implement destructors upon a garbage collection event. Found the
method to do that, but need to implement it ... Next time ...
</commit_message>
<xml_diff>
--- a/Moose Training/Presentations/DCS World - MOOSE - Tasking - SEAD.pptx
+++ b/Moose Training/Presentations/DCS World - MOOSE - Tasking - SEAD.pptx
@@ -11,7 +11,8 @@
     <p:sldId id="332" r:id="rId5"/>
     <p:sldId id="334" r:id="rId6"/>
     <p:sldId id="335" r:id="rId7"/>
-    <p:sldId id="285" r:id="rId8"/>
+    <p:sldId id="336" r:id="rId8"/>
+    <p:sldId id="285" r:id="rId9"/>
   </p:sldIdLst>
   <p:sldSz cx="12192000" cy="6858000"/>
   <p:notesSz cx="6858000" cy="9144000"/>
@@ -294,7 +295,7 @@
           <a:p>
             <a:fld id="{96DFF08F-DC6B-4601-B491-B0F83F6DD2DA}" type="datetimeFigureOut">
               <a:rPr lang="en-US" dirty="0"/>
-              <a:t>11/5/2016</a:t>
+              <a:t>11/8/2016</a:t>
             </a:fld>
             <a:endParaRPr lang="en-US" dirty="0"/>
           </a:p>
@@ -528,7 +529,7 @@
           <a:p>
             <a:fld id="{96DFF08F-DC6B-4601-B491-B0F83F6DD2DA}" type="datetimeFigureOut">
               <a:rPr lang="en-US" dirty="0"/>
-              <a:t>11/5/2016</a:t>
+              <a:t>11/8/2016</a:t>
             </a:fld>
             <a:endParaRPr lang="en-US" dirty="0"/>
           </a:p>
@@ -758,7 +759,7 @@
           <a:p>
             <a:fld id="{96DFF08F-DC6B-4601-B491-B0F83F6DD2DA}" type="datetimeFigureOut">
               <a:rPr lang="en-US" dirty="0"/>
-              <a:t>11/5/2016</a:t>
+              <a:t>11/8/2016</a:t>
             </a:fld>
             <a:endParaRPr lang="en-US" dirty="0"/>
           </a:p>
@@ -997,7 +998,7 @@
           <a:p>
             <a:fld id="{96DFF08F-DC6B-4601-B491-B0F83F6DD2DA}" type="datetimeFigureOut">
               <a:rPr lang="en-US" dirty="0"/>
-              <a:t>11/5/2016</a:t>
+              <a:t>11/8/2016</a:t>
             </a:fld>
             <a:endParaRPr lang="en-US" dirty="0"/>
           </a:p>
@@ -1568,7 +1569,7 @@
           <a:p>
             <a:fld id="{96DFF08F-DC6B-4601-B491-B0F83F6DD2DA}" type="datetimeFigureOut">
               <a:rPr lang="en-US" dirty="0"/>
-              <a:t>11/5/2016</a:t>
+              <a:t>11/8/2016</a:t>
             </a:fld>
             <a:endParaRPr lang="en-US" dirty="0"/>
           </a:p>
@@ -1997,7 +1998,7 @@
           <a:p>
             <a:fld id="{96DFF08F-DC6B-4601-B491-B0F83F6DD2DA}" type="datetimeFigureOut">
               <a:rPr lang="en-US" dirty="0"/>
-              <a:t>11/5/2016</a:t>
+              <a:t>11/8/2016</a:t>
             </a:fld>
             <a:endParaRPr lang="en-US" dirty="0"/>
           </a:p>
@@ -2211,7 +2212,7 @@
           <a:p>
             <a:fld id="{96DFF08F-DC6B-4601-B491-B0F83F6DD2DA}" type="datetimeFigureOut">
               <a:rPr lang="en-US" dirty="0"/>
-              <a:t>11/5/2016</a:t>
+              <a:t>11/8/2016</a:t>
             </a:fld>
             <a:endParaRPr lang="en-US" dirty="0"/>
           </a:p>
@@ -2491,7 +2492,7 @@
           <a:p>
             <a:fld id="{96DFF08F-DC6B-4601-B491-B0F83F6DD2DA}" type="datetimeFigureOut">
               <a:rPr lang="en-US" dirty="0"/>
-              <a:t>11/5/2016</a:t>
+              <a:t>11/8/2016</a:t>
             </a:fld>
             <a:endParaRPr lang="en-US" dirty="0"/>
           </a:p>
@@ -2763,7 +2764,7 @@
           <a:p>
             <a:fld id="{96DFF08F-DC6B-4601-B491-B0F83F6DD2DA}" type="datetimeFigureOut">
               <a:rPr lang="en-US" dirty="0"/>
-              <a:t>11/5/2016</a:t>
+              <a:t>11/8/2016</a:t>
             </a:fld>
             <a:endParaRPr lang="en-US" dirty="0"/>
           </a:p>
@@ -3020,7 +3021,7 @@
             <a:fld id="{96DFF08F-DC6B-4601-B491-B0F83F6DD2DA}" type="datetimeFigureOut">
               <a:rPr lang="en-US" dirty="0"/>
               <a:pPr/>
-              <a:t>11/5/2016</a:t>
+              <a:t>11/8/2016</a:t>
             </a:fld>
             <a:endParaRPr lang="en-US" dirty="0"/>
           </a:p>
@@ -13805,6 +13806,3393 @@
 <file path=ppt/slides/slide7.xml><?xml version="1.0" encoding="utf-8"?>
 <p:sld xmlns:a="http://schemas.openxmlformats.org/drawingml/2006/main" xmlns:r="http://schemas.openxmlformats.org/officeDocument/2006/relationships" xmlns:p="http://schemas.openxmlformats.org/presentationml/2006/main">
   <p:cSld>
+    <p:bg>
+      <p:bgPr>
+        <a:gradFill>
+          <a:gsLst>
+            <a:gs pos="12000">
+              <a:schemeClr val="accent1">
+                <a:lumMod val="5000"/>
+                <a:lumOff val="95000"/>
+              </a:schemeClr>
+            </a:gs>
+            <a:gs pos="49000">
+              <a:schemeClr val="accent1">
+                <a:lumMod val="45000"/>
+                <a:lumOff val="55000"/>
+              </a:schemeClr>
+            </a:gs>
+            <a:gs pos="70000">
+              <a:schemeClr val="accent1">
+                <a:lumMod val="45000"/>
+                <a:lumOff val="55000"/>
+              </a:schemeClr>
+            </a:gs>
+            <a:gs pos="97000">
+              <a:schemeClr val="bg2">
+                <a:lumMod val="40000"/>
+                <a:lumOff val="60000"/>
+              </a:schemeClr>
+            </a:gs>
+          </a:gsLst>
+          <a:lin ang="5400000" scaled="1"/>
+        </a:gradFill>
+        <a:effectLst/>
+      </p:bgPr>
+    </p:bg>
+    <p:spTree>
+      <p:nvGrpSpPr>
+        <p:cNvPr id="1" name=""/>
+        <p:cNvGrpSpPr/>
+        <p:nvPr/>
+      </p:nvGrpSpPr>
+      <p:grpSpPr>
+        <a:xfrm>
+          <a:off x="0" y="0"/>
+          <a:ext cx="0" cy="0"/>
+          <a:chOff x="0" y="0"/>
+          <a:chExt cx="0" cy="0"/>
+        </a:xfrm>
+      </p:grpSpPr>
+      <p:sp>
+        <p:nvSpPr>
+          <p:cNvPr id="28" name="Rechthoek 27"/>
+          <p:cNvSpPr/>
+          <p:nvPr/>
+        </p:nvSpPr>
+        <p:spPr>
+          <a:xfrm>
+            <a:off x="965943" y="2078985"/>
+            <a:ext cx="1530017" cy="630008"/>
+          </a:xfrm>
+          <a:prstGeom prst="rect">
+            <a:avLst/>
+          </a:prstGeom>
+          <a:ln w="19050"/>
+        </p:spPr>
+        <p:style>
+          <a:lnRef idx="2">
+            <a:schemeClr val="accent1"/>
+          </a:lnRef>
+          <a:fillRef idx="1">
+            <a:schemeClr val="lt1"/>
+          </a:fillRef>
+          <a:effectRef idx="0">
+            <a:schemeClr val="accent1"/>
+          </a:effectRef>
+          <a:fontRef idx="minor">
+            <a:schemeClr val="dk1"/>
+          </a:fontRef>
+        </p:style>
+        <p:txBody>
+          <a:bodyPr rtlCol="0" anchor="t"/>
+          <a:lstStyle/>
+          <a:p>
+            <a:pPr algn="ctr"/>
+            <a:r>
+              <a:rPr lang="nl-BE" sz="1400" dirty="0"/>
+              <a:t>MISSION</a:t>
+            </a:r>
+          </a:p>
+        </p:txBody>
+      </p:sp>
+      <p:cxnSp>
+        <p:nvCxnSpPr>
+          <p:cNvPr id="82" name="Rechte verbindingslijn 81"/>
+          <p:cNvCxnSpPr>
+            <a:stCxn id="3" idx="1"/>
+            <a:endCxn id="81" idx="3"/>
+          </p:cNvCxnSpPr>
+          <p:nvPr/>
+        </p:nvCxnSpPr>
+        <p:spPr>
+          <a:xfrm flipH="1">
+            <a:off x="2855964" y="2393989"/>
+            <a:ext cx="450005" cy="0"/>
+          </a:xfrm>
+          <a:prstGeom prst="line">
+            <a:avLst/>
+          </a:prstGeom>
+          <a:ln w="19050"/>
+        </p:spPr>
+        <p:style>
+          <a:lnRef idx="1">
+            <a:schemeClr val="accent1"/>
+          </a:lnRef>
+          <a:fillRef idx="0">
+            <a:schemeClr val="accent1"/>
+          </a:fillRef>
+          <a:effectRef idx="0">
+            <a:schemeClr val="accent1"/>
+          </a:effectRef>
+          <a:fontRef idx="minor">
+            <a:schemeClr val="tx1"/>
+          </a:fontRef>
+        </p:style>
+      </p:cxnSp>
+      <p:sp>
+        <p:nvSpPr>
+          <p:cNvPr id="2" name="Titel 1"/>
+          <p:cNvSpPr>
+            <a:spLocks noGrp="1"/>
+          </p:cNvSpPr>
+          <p:nvPr>
+            <p:ph type="title"/>
+          </p:nvPr>
+        </p:nvSpPr>
+        <p:spPr/>
+        <p:txBody>
+          <a:bodyPr/>
+          <a:lstStyle/>
+          <a:p>
+            <a:pPr algn="r"/>
+            <a:r>
+              <a:rPr lang="nl-BE" dirty="0" err="1"/>
+              <a:t>Sead</a:t>
+            </a:r>
+            <a:r>
+              <a:rPr lang="nl-BE" dirty="0"/>
+              <a:t> </a:t>
+            </a:r>
+            <a:r>
+              <a:rPr lang="nl-BE" dirty="0" err="1"/>
+              <a:t>task</a:t>
+            </a:r>
+            <a:r>
+              <a:rPr lang="nl-BE" dirty="0"/>
+              <a:t> - </a:t>
+            </a:r>
+            <a:r>
+              <a:rPr lang="nl-BE" dirty="0" err="1"/>
+              <a:t>components</a:t>
+            </a:r>
+            <a:endParaRPr lang="nl-BE" dirty="0"/>
+          </a:p>
+        </p:txBody>
+      </p:sp>
+      <p:sp>
+        <p:nvSpPr>
+          <p:cNvPr id="3" name="Rechthoek 2"/>
+          <p:cNvSpPr/>
+          <p:nvPr/>
+        </p:nvSpPr>
+        <p:spPr>
+          <a:xfrm>
+            <a:off x="3305969" y="2078985"/>
+            <a:ext cx="1530017" cy="630007"/>
+          </a:xfrm>
+          <a:prstGeom prst="rect">
+            <a:avLst/>
+          </a:prstGeom>
+          <a:ln w="19050"/>
+        </p:spPr>
+        <p:style>
+          <a:lnRef idx="2">
+            <a:schemeClr val="accent1"/>
+          </a:lnRef>
+          <a:fillRef idx="1">
+            <a:schemeClr val="lt1"/>
+          </a:fillRef>
+          <a:effectRef idx="0">
+            <a:schemeClr val="accent1"/>
+          </a:effectRef>
+          <a:fontRef idx="minor">
+            <a:schemeClr val="dk1"/>
+          </a:fontRef>
+        </p:style>
+        <p:txBody>
+          <a:bodyPr rtlCol="0" anchor="t"/>
+          <a:lstStyle/>
+          <a:p>
+            <a:pPr algn="ctr"/>
+            <a:r>
+              <a:rPr lang="nl-BE" sz="1400" dirty="0"/>
+              <a:t>TASK</a:t>
+            </a:r>
+          </a:p>
+        </p:txBody>
+      </p:sp>
+      <p:sp>
+        <p:nvSpPr>
+          <p:cNvPr id="81" name="Ruit 80"/>
+          <p:cNvSpPr/>
+          <p:nvPr/>
+        </p:nvSpPr>
+        <p:spPr>
+          <a:xfrm>
+            <a:off x="2495960" y="2258987"/>
+            <a:ext cx="360004" cy="270003"/>
+          </a:xfrm>
+          <a:prstGeom prst="diamond">
+            <a:avLst/>
+          </a:prstGeom>
+          <a:ln w="19050"/>
+        </p:spPr>
+        <p:style>
+          <a:lnRef idx="2">
+            <a:schemeClr val="accent1"/>
+          </a:lnRef>
+          <a:fillRef idx="1">
+            <a:schemeClr val="lt1"/>
+          </a:fillRef>
+          <a:effectRef idx="0">
+            <a:schemeClr val="accent1"/>
+          </a:effectRef>
+          <a:fontRef idx="minor">
+            <a:schemeClr val="dk1"/>
+          </a:fontRef>
+        </p:style>
+        <p:txBody>
+          <a:bodyPr rtlCol="0" anchor="ctr"/>
+          <a:lstStyle/>
+          <a:p>
+            <a:pPr algn="ctr"/>
+            <a:endParaRPr lang="nl-BE"/>
+          </a:p>
+        </p:txBody>
+      </p:sp>
+      <p:sp>
+        <p:nvSpPr>
+          <p:cNvPr id="186" name="Gelijkbenige driehoek 185"/>
+          <p:cNvSpPr/>
+          <p:nvPr/>
+        </p:nvSpPr>
+        <p:spPr>
+          <a:xfrm rot="16200000">
+            <a:off x="2720962" y="6399033"/>
+            <a:ext cx="270003" cy="360004"/>
+          </a:xfrm>
+          <a:prstGeom prst="triangle">
+            <a:avLst/>
+          </a:prstGeom>
+          <a:ln w="19050"/>
+        </p:spPr>
+        <p:style>
+          <a:lnRef idx="2">
+            <a:schemeClr val="accent1"/>
+          </a:lnRef>
+          <a:fillRef idx="1">
+            <a:schemeClr val="lt1"/>
+          </a:fillRef>
+          <a:effectRef idx="0">
+            <a:schemeClr val="accent1"/>
+          </a:effectRef>
+          <a:fontRef idx="minor">
+            <a:schemeClr val="dk1"/>
+          </a:fontRef>
+        </p:style>
+        <p:txBody>
+          <a:bodyPr rtlCol="0" anchor="ctr"/>
+          <a:lstStyle/>
+          <a:p>
+            <a:pPr algn="ctr"/>
+            <a:endParaRPr lang="nl-BE"/>
+          </a:p>
+        </p:txBody>
+      </p:sp>
+      <p:cxnSp>
+        <p:nvCxnSpPr>
+          <p:cNvPr id="187" name="Rechte verbindingslijn 186"/>
+          <p:cNvCxnSpPr>
+            <a:endCxn id="186" idx="3"/>
+          </p:cNvCxnSpPr>
+          <p:nvPr/>
+        </p:nvCxnSpPr>
+        <p:spPr>
+          <a:xfrm flipH="1">
+            <a:off x="3035966" y="6579035"/>
+            <a:ext cx="720007" cy="0"/>
+          </a:xfrm>
+          <a:prstGeom prst="line">
+            <a:avLst/>
+          </a:prstGeom>
+          <a:ln w="19050"/>
+        </p:spPr>
+        <p:style>
+          <a:lnRef idx="1">
+            <a:schemeClr val="accent1"/>
+          </a:lnRef>
+          <a:fillRef idx="0">
+            <a:schemeClr val="accent1"/>
+          </a:fillRef>
+          <a:effectRef idx="0">
+            <a:schemeClr val="accent1"/>
+          </a:effectRef>
+          <a:fontRef idx="minor">
+            <a:schemeClr val="tx1"/>
+          </a:fontRef>
+        </p:style>
+      </p:cxnSp>
+      <p:cxnSp>
+        <p:nvCxnSpPr>
+          <p:cNvPr id="188" name="Rechte verbindingslijn 187"/>
+          <p:cNvCxnSpPr>
+            <a:endCxn id="189" idx="3"/>
+          </p:cNvCxnSpPr>
+          <p:nvPr/>
+        </p:nvCxnSpPr>
+        <p:spPr>
+          <a:xfrm flipH="1">
+            <a:off x="1685951" y="6579035"/>
+            <a:ext cx="720008" cy="0"/>
+          </a:xfrm>
+          <a:prstGeom prst="line">
+            <a:avLst/>
+          </a:prstGeom>
+          <a:ln w="19050"/>
+        </p:spPr>
+        <p:style>
+          <a:lnRef idx="1">
+            <a:schemeClr val="accent1"/>
+          </a:lnRef>
+          <a:fillRef idx="0">
+            <a:schemeClr val="accent1"/>
+          </a:fillRef>
+          <a:effectRef idx="0">
+            <a:schemeClr val="accent1"/>
+          </a:effectRef>
+          <a:fontRef idx="minor">
+            <a:schemeClr val="tx1"/>
+          </a:fontRef>
+        </p:style>
+      </p:cxnSp>
+      <p:sp>
+        <p:nvSpPr>
+          <p:cNvPr id="189" name="Ruit 188"/>
+          <p:cNvSpPr/>
+          <p:nvPr/>
+        </p:nvSpPr>
+        <p:spPr>
+          <a:xfrm>
+            <a:off x="1325947" y="6444033"/>
+            <a:ext cx="360004" cy="270003"/>
+          </a:xfrm>
+          <a:prstGeom prst="diamond">
+            <a:avLst/>
+          </a:prstGeom>
+          <a:solidFill>
+            <a:schemeClr val="accent1"/>
+          </a:solidFill>
+          <a:ln w="19050"/>
+        </p:spPr>
+        <p:style>
+          <a:lnRef idx="2">
+            <a:schemeClr val="accent1"/>
+          </a:lnRef>
+          <a:fillRef idx="1">
+            <a:schemeClr val="lt1"/>
+          </a:fillRef>
+          <a:effectRef idx="0">
+            <a:schemeClr val="accent1"/>
+          </a:effectRef>
+          <a:fontRef idx="minor">
+            <a:schemeClr val="dk1"/>
+          </a:fontRef>
+        </p:style>
+        <p:txBody>
+          <a:bodyPr rtlCol="0" anchor="ctr"/>
+          <a:lstStyle/>
+          <a:p>
+            <a:pPr algn="ctr"/>
+            <a:endParaRPr lang="nl-BE"/>
+          </a:p>
+        </p:txBody>
+      </p:sp>
+      <p:cxnSp>
+        <p:nvCxnSpPr>
+          <p:cNvPr id="191" name="Rechte verbindingslijn 190"/>
+          <p:cNvCxnSpPr>
+            <a:endCxn id="192" idx="3"/>
+          </p:cNvCxnSpPr>
+          <p:nvPr/>
+        </p:nvCxnSpPr>
+        <p:spPr>
+          <a:xfrm flipH="1">
+            <a:off x="425937" y="6579035"/>
+            <a:ext cx="720008" cy="0"/>
+          </a:xfrm>
+          <a:prstGeom prst="line">
+            <a:avLst/>
+          </a:prstGeom>
+          <a:ln w="19050"/>
+        </p:spPr>
+        <p:style>
+          <a:lnRef idx="1">
+            <a:schemeClr val="accent1"/>
+          </a:lnRef>
+          <a:fillRef idx="0">
+            <a:schemeClr val="accent1"/>
+          </a:fillRef>
+          <a:effectRef idx="0">
+            <a:schemeClr val="accent1"/>
+          </a:effectRef>
+          <a:fontRef idx="minor">
+            <a:schemeClr val="tx1"/>
+          </a:fontRef>
+        </p:style>
+      </p:cxnSp>
+      <p:sp>
+        <p:nvSpPr>
+          <p:cNvPr id="192" name="Ruit 191"/>
+          <p:cNvSpPr/>
+          <p:nvPr/>
+        </p:nvSpPr>
+        <p:spPr>
+          <a:xfrm>
+            <a:off x="65933" y="6444033"/>
+            <a:ext cx="360004" cy="270003"/>
+          </a:xfrm>
+          <a:prstGeom prst="diamond">
+            <a:avLst/>
+          </a:prstGeom>
+          <a:ln w="19050"/>
+        </p:spPr>
+        <p:style>
+          <a:lnRef idx="2">
+            <a:schemeClr val="accent1"/>
+          </a:lnRef>
+          <a:fillRef idx="1">
+            <a:schemeClr val="lt1"/>
+          </a:fillRef>
+          <a:effectRef idx="0">
+            <a:schemeClr val="accent1"/>
+          </a:effectRef>
+          <a:fontRef idx="minor">
+            <a:schemeClr val="dk1"/>
+          </a:fontRef>
+        </p:style>
+        <p:txBody>
+          <a:bodyPr rtlCol="0" anchor="ctr"/>
+          <a:lstStyle/>
+          <a:p>
+            <a:pPr algn="ctr"/>
+            <a:endParaRPr lang="nl-BE"/>
+          </a:p>
+        </p:txBody>
+      </p:sp>
+      <p:sp>
+        <p:nvSpPr>
+          <p:cNvPr id="194" name="Tekstvak 193"/>
+          <p:cNvSpPr txBox="1"/>
+          <p:nvPr/>
+        </p:nvSpPr>
+        <p:spPr>
+          <a:xfrm>
+            <a:off x="425937" y="6580802"/>
+            <a:ext cx="720008" cy="178235"/>
+          </a:xfrm>
+          <a:prstGeom prst="rect">
+            <a:avLst/>
+          </a:prstGeom>
+          <a:noFill/>
+          <a:ln w="19050">
+            <a:noFill/>
+          </a:ln>
+        </p:spPr>
+        <p:style>
+          <a:lnRef idx="2">
+            <a:schemeClr val="accent1"/>
+          </a:lnRef>
+          <a:fillRef idx="1">
+            <a:schemeClr val="lt1"/>
+          </a:fillRef>
+          <a:effectRef idx="0">
+            <a:schemeClr val="accent1"/>
+          </a:effectRef>
+          <a:fontRef idx="minor">
+            <a:schemeClr val="dk1"/>
+          </a:fontRef>
+        </p:style>
+        <p:txBody>
+          <a:bodyPr wrap="none" rtlCol="0">
+            <a:noAutofit/>
+          </a:bodyPr>
+          <a:lstStyle/>
+          <a:p>
+            <a:pPr algn="ctr"/>
+            <a:r>
+              <a:rPr lang="nl-BE" sz="900" dirty="0" err="1">
+                <a:solidFill>
+                  <a:schemeClr val="tx1"/>
+                </a:solidFill>
+              </a:rPr>
+              <a:t>Composition</a:t>
+            </a:r>
+            <a:endParaRPr lang="nl-BE" sz="900" dirty="0">
+              <a:solidFill>
+                <a:schemeClr val="tx1"/>
+              </a:solidFill>
+            </a:endParaRPr>
+          </a:p>
+        </p:txBody>
+      </p:sp>
+      <p:sp>
+        <p:nvSpPr>
+          <p:cNvPr id="195" name="Tekstvak 194"/>
+          <p:cNvSpPr txBox="1"/>
+          <p:nvPr/>
+        </p:nvSpPr>
+        <p:spPr>
+          <a:xfrm>
+            <a:off x="1685951" y="6579035"/>
+            <a:ext cx="720008" cy="178235"/>
+          </a:xfrm>
+          <a:prstGeom prst="rect">
+            <a:avLst/>
+          </a:prstGeom>
+          <a:noFill/>
+          <a:ln w="19050">
+            <a:noFill/>
+          </a:ln>
+        </p:spPr>
+        <p:style>
+          <a:lnRef idx="2">
+            <a:schemeClr val="accent1"/>
+          </a:lnRef>
+          <a:fillRef idx="1">
+            <a:schemeClr val="lt1"/>
+          </a:fillRef>
+          <a:effectRef idx="0">
+            <a:schemeClr val="accent1"/>
+          </a:effectRef>
+          <a:fontRef idx="minor">
+            <a:schemeClr val="dk1"/>
+          </a:fontRef>
+        </p:style>
+        <p:txBody>
+          <a:bodyPr wrap="none" rtlCol="0">
+            <a:noAutofit/>
+          </a:bodyPr>
+          <a:lstStyle/>
+          <a:p>
+            <a:pPr algn="ctr"/>
+            <a:r>
+              <a:rPr lang="nl-BE" sz="900" dirty="0" err="1">
+                <a:solidFill>
+                  <a:schemeClr val="tx1"/>
+                </a:solidFill>
+              </a:rPr>
+              <a:t>Aggregation</a:t>
+            </a:r>
+            <a:endParaRPr lang="nl-BE" sz="900" dirty="0">
+              <a:solidFill>
+                <a:schemeClr val="tx1"/>
+              </a:solidFill>
+            </a:endParaRPr>
+          </a:p>
+        </p:txBody>
+      </p:sp>
+      <p:sp>
+        <p:nvSpPr>
+          <p:cNvPr id="196" name="Tekstvak 195"/>
+          <p:cNvSpPr txBox="1"/>
+          <p:nvPr/>
+        </p:nvSpPr>
+        <p:spPr>
+          <a:xfrm>
+            <a:off x="3035966" y="6579035"/>
+            <a:ext cx="720008" cy="178235"/>
+          </a:xfrm>
+          <a:prstGeom prst="rect">
+            <a:avLst/>
+          </a:prstGeom>
+          <a:noFill/>
+          <a:ln w="19050">
+            <a:noFill/>
+          </a:ln>
+        </p:spPr>
+        <p:style>
+          <a:lnRef idx="2">
+            <a:schemeClr val="accent1"/>
+          </a:lnRef>
+          <a:fillRef idx="1">
+            <a:schemeClr val="lt1"/>
+          </a:fillRef>
+          <a:effectRef idx="0">
+            <a:schemeClr val="accent1"/>
+          </a:effectRef>
+          <a:fontRef idx="minor">
+            <a:schemeClr val="dk1"/>
+          </a:fontRef>
+        </p:style>
+        <p:txBody>
+          <a:bodyPr wrap="none" rtlCol="0">
+            <a:noAutofit/>
+          </a:bodyPr>
+          <a:lstStyle/>
+          <a:p>
+            <a:pPr algn="ctr"/>
+            <a:r>
+              <a:rPr lang="nl-BE" sz="900" dirty="0" err="1">
+                <a:solidFill>
+                  <a:schemeClr val="tx1"/>
+                </a:solidFill>
+              </a:rPr>
+              <a:t>Inheritance</a:t>
+            </a:r>
+            <a:endParaRPr lang="nl-BE" sz="900" dirty="0">
+              <a:solidFill>
+                <a:schemeClr val="tx1"/>
+              </a:solidFill>
+            </a:endParaRPr>
+          </a:p>
+        </p:txBody>
+      </p:sp>
+      <p:sp>
+        <p:nvSpPr>
+          <p:cNvPr id="199" name="Gelijkbenige driehoek 198"/>
+          <p:cNvSpPr/>
+          <p:nvPr/>
+        </p:nvSpPr>
+        <p:spPr>
+          <a:xfrm>
+            <a:off x="3935976" y="2708992"/>
+            <a:ext cx="270003" cy="360004"/>
+          </a:xfrm>
+          <a:prstGeom prst="triangle">
+            <a:avLst/>
+          </a:prstGeom>
+          <a:ln w="19050"/>
+        </p:spPr>
+        <p:style>
+          <a:lnRef idx="2">
+            <a:schemeClr val="accent1"/>
+          </a:lnRef>
+          <a:fillRef idx="1">
+            <a:schemeClr val="lt1"/>
+          </a:fillRef>
+          <a:effectRef idx="0">
+            <a:schemeClr val="accent1"/>
+          </a:effectRef>
+          <a:fontRef idx="minor">
+            <a:schemeClr val="dk1"/>
+          </a:fontRef>
+        </p:style>
+        <p:txBody>
+          <a:bodyPr rtlCol="0" anchor="ctr"/>
+          <a:lstStyle/>
+          <a:p>
+            <a:pPr algn="ctr"/>
+            <a:endParaRPr lang="nl-BE"/>
+          </a:p>
+        </p:txBody>
+      </p:sp>
+      <p:sp>
+        <p:nvSpPr>
+          <p:cNvPr id="200" name="Rechthoek 199"/>
+          <p:cNvSpPr/>
+          <p:nvPr/>
+        </p:nvSpPr>
+        <p:spPr>
+          <a:xfrm>
+            <a:off x="3305969" y="3429000"/>
+            <a:ext cx="1530017" cy="2070023"/>
+          </a:xfrm>
+          <a:prstGeom prst="rect">
+            <a:avLst/>
+          </a:prstGeom>
+          <a:ln w="19050"/>
+        </p:spPr>
+        <p:style>
+          <a:lnRef idx="2">
+            <a:schemeClr val="accent1"/>
+          </a:lnRef>
+          <a:fillRef idx="1">
+            <a:schemeClr val="lt1"/>
+          </a:fillRef>
+          <a:effectRef idx="0">
+            <a:schemeClr val="accent1"/>
+          </a:effectRef>
+          <a:fontRef idx="minor">
+            <a:schemeClr val="dk1"/>
+          </a:fontRef>
+        </p:style>
+        <p:txBody>
+          <a:bodyPr rtlCol="0" anchor="t"/>
+          <a:lstStyle/>
+          <a:p>
+            <a:pPr algn="ctr"/>
+            <a:r>
+              <a:rPr lang="nl-BE" sz="1400" dirty="0"/>
+              <a:t>TASK_SEAD</a:t>
+            </a:r>
+          </a:p>
+        </p:txBody>
+      </p:sp>
+      <p:cxnSp>
+        <p:nvCxnSpPr>
+          <p:cNvPr id="201" name="Rechte verbindingslijn 200"/>
+          <p:cNvCxnSpPr>
+            <a:stCxn id="200" idx="0"/>
+            <a:endCxn id="199" idx="3"/>
+          </p:cNvCxnSpPr>
+          <p:nvPr/>
+        </p:nvCxnSpPr>
+        <p:spPr>
+          <a:xfrm flipV="1">
+            <a:off x="4070978" y="3068996"/>
+            <a:ext cx="0" cy="360004"/>
+          </a:xfrm>
+          <a:prstGeom prst="line">
+            <a:avLst/>
+          </a:prstGeom>
+          <a:ln w="19050"/>
+        </p:spPr>
+        <p:style>
+          <a:lnRef idx="1">
+            <a:schemeClr val="accent1"/>
+          </a:lnRef>
+          <a:fillRef idx="0">
+            <a:schemeClr val="accent1"/>
+          </a:fillRef>
+          <a:effectRef idx="0">
+            <a:schemeClr val="accent1"/>
+          </a:effectRef>
+          <a:fontRef idx="minor">
+            <a:schemeClr val="tx1"/>
+          </a:fontRef>
+        </p:style>
+      </p:cxnSp>
+      <p:cxnSp>
+        <p:nvCxnSpPr>
+          <p:cNvPr id="26" name="Rechte verbindingslijn 25"/>
+          <p:cNvCxnSpPr/>
+          <p:nvPr/>
+        </p:nvCxnSpPr>
+        <p:spPr>
+          <a:xfrm>
+            <a:off x="3305969" y="3699003"/>
+            <a:ext cx="1530017" cy="0"/>
+          </a:xfrm>
+          <a:prstGeom prst="line">
+            <a:avLst/>
+          </a:prstGeom>
+          <a:ln w="19050"/>
+        </p:spPr>
+        <p:style>
+          <a:lnRef idx="1">
+            <a:schemeClr val="accent1"/>
+          </a:lnRef>
+          <a:fillRef idx="0">
+            <a:schemeClr val="accent1"/>
+          </a:fillRef>
+          <a:effectRef idx="0">
+            <a:schemeClr val="accent1"/>
+          </a:effectRef>
+          <a:fontRef idx="minor">
+            <a:schemeClr val="tx1"/>
+          </a:fontRef>
+        </p:style>
+      </p:cxnSp>
+      <p:cxnSp>
+        <p:nvCxnSpPr>
+          <p:cNvPr id="80" name="Rechte verbindingslijn 79"/>
+          <p:cNvCxnSpPr>
+            <a:stCxn id="83" idx="1"/>
+            <a:endCxn id="84" idx="3"/>
+          </p:cNvCxnSpPr>
+          <p:nvPr/>
+        </p:nvCxnSpPr>
+        <p:spPr>
+          <a:xfrm flipH="1">
+            <a:off x="5195990" y="4734015"/>
+            <a:ext cx="450005" cy="0"/>
+          </a:xfrm>
+          <a:prstGeom prst="line">
+            <a:avLst/>
+          </a:prstGeom>
+          <a:ln w="19050">
+            <a:prstDash val="sysDash"/>
+          </a:ln>
+        </p:spPr>
+        <p:style>
+          <a:lnRef idx="1">
+            <a:schemeClr val="accent1"/>
+          </a:lnRef>
+          <a:fillRef idx="0">
+            <a:schemeClr val="accent1"/>
+          </a:fillRef>
+          <a:effectRef idx="0">
+            <a:schemeClr val="accent1"/>
+          </a:effectRef>
+          <a:fontRef idx="minor">
+            <a:schemeClr val="tx1"/>
+          </a:fontRef>
+        </p:style>
+      </p:cxnSp>
+      <p:sp>
+        <p:nvSpPr>
+          <p:cNvPr id="83" name="Rechthoek 82"/>
+          <p:cNvSpPr/>
+          <p:nvPr/>
+        </p:nvSpPr>
+        <p:spPr>
+          <a:xfrm>
+            <a:off x="5645995" y="4509012"/>
+            <a:ext cx="1530017" cy="450005"/>
+          </a:xfrm>
+          <a:prstGeom prst="rect">
+            <a:avLst/>
+          </a:prstGeom>
+          <a:ln w="19050"/>
+        </p:spPr>
+        <p:style>
+          <a:lnRef idx="2">
+            <a:schemeClr val="accent1"/>
+          </a:lnRef>
+          <a:fillRef idx="1">
+            <a:schemeClr val="lt1"/>
+          </a:fillRef>
+          <a:effectRef idx="0">
+            <a:schemeClr val="accent1"/>
+          </a:effectRef>
+          <a:fontRef idx="minor">
+            <a:schemeClr val="dk1"/>
+          </a:fontRef>
+        </p:style>
+        <p:txBody>
+          <a:bodyPr rtlCol="0" anchor="t"/>
+          <a:lstStyle/>
+          <a:p>
+            <a:pPr algn="ctr"/>
+            <a:r>
+              <a:rPr lang="nl-BE" sz="1400" dirty="0"/>
+              <a:t>FSM_ACCOUNT</a:t>
+            </a:r>
+          </a:p>
+        </p:txBody>
+      </p:sp>
+      <p:sp>
+        <p:nvSpPr>
+          <p:cNvPr id="84" name="Ruit 83"/>
+          <p:cNvSpPr/>
+          <p:nvPr/>
+        </p:nvSpPr>
+        <p:spPr>
+          <a:xfrm>
+            <a:off x="4835986" y="4599013"/>
+            <a:ext cx="360004" cy="270003"/>
+          </a:xfrm>
+          <a:prstGeom prst="diamond">
+            <a:avLst/>
+          </a:prstGeom>
+          <a:solidFill>
+            <a:schemeClr val="accent1"/>
+          </a:solidFill>
+          <a:ln w="19050"/>
+        </p:spPr>
+        <p:style>
+          <a:lnRef idx="2">
+            <a:schemeClr val="accent1"/>
+          </a:lnRef>
+          <a:fillRef idx="1">
+            <a:schemeClr val="lt1"/>
+          </a:fillRef>
+          <a:effectRef idx="0">
+            <a:schemeClr val="accent1"/>
+          </a:effectRef>
+          <a:fontRef idx="minor">
+            <a:schemeClr val="dk1"/>
+          </a:fontRef>
+        </p:style>
+        <p:txBody>
+          <a:bodyPr rtlCol="0" anchor="ctr"/>
+          <a:lstStyle/>
+          <a:p>
+            <a:pPr algn="ctr"/>
+            <a:endParaRPr lang="nl-BE"/>
+          </a:p>
+        </p:txBody>
+      </p:sp>
+      <p:sp>
+        <p:nvSpPr>
+          <p:cNvPr id="97" name="Rechthoek 96"/>
+          <p:cNvSpPr/>
+          <p:nvPr/>
+        </p:nvSpPr>
+        <p:spPr>
+          <a:xfrm>
+            <a:off x="8076022" y="5949028"/>
+            <a:ext cx="1530017" cy="630007"/>
+          </a:xfrm>
+          <a:prstGeom prst="rect">
+            <a:avLst/>
+          </a:prstGeom>
+          <a:ln w="19050"/>
+        </p:spPr>
+        <p:style>
+          <a:lnRef idx="2">
+            <a:schemeClr val="accent1"/>
+          </a:lnRef>
+          <a:fillRef idx="1">
+            <a:schemeClr val="lt1"/>
+          </a:fillRef>
+          <a:effectRef idx="0">
+            <a:schemeClr val="accent1"/>
+          </a:effectRef>
+          <a:fontRef idx="minor">
+            <a:schemeClr val="dk1"/>
+          </a:fontRef>
+        </p:style>
+        <p:txBody>
+          <a:bodyPr rtlCol="0" anchor="t"/>
+          <a:lstStyle/>
+          <a:p>
+            <a:pPr algn="ctr"/>
+            <a:r>
+              <a:rPr lang="nl-BE" sz="1400" dirty="0"/>
+              <a:t>UNIT</a:t>
+            </a:r>
+          </a:p>
+        </p:txBody>
+      </p:sp>
+      <p:sp>
+        <p:nvSpPr>
+          <p:cNvPr id="101" name="Ruit 100"/>
+          <p:cNvSpPr/>
+          <p:nvPr/>
+        </p:nvSpPr>
+        <p:spPr>
+          <a:xfrm rot="16200000">
+            <a:off x="3890976" y="5544023"/>
+            <a:ext cx="360004" cy="270003"/>
+          </a:xfrm>
+          <a:prstGeom prst="diamond">
+            <a:avLst/>
+          </a:prstGeom>
+          <a:solidFill>
+            <a:schemeClr val="accent1"/>
+          </a:solidFill>
+          <a:ln w="19050"/>
+        </p:spPr>
+        <p:style>
+          <a:lnRef idx="2">
+            <a:schemeClr val="accent1"/>
+          </a:lnRef>
+          <a:fillRef idx="1">
+            <a:schemeClr val="lt1"/>
+          </a:fillRef>
+          <a:effectRef idx="0">
+            <a:schemeClr val="accent1"/>
+          </a:effectRef>
+          <a:fontRef idx="minor">
+            <a:schemeClr val="dk1"/>
+          </a:fontRef>
+        </p:style>
+        <p:txBody>
+          <a:bodyPr rtlCol="0" anchor="ctr"/>
+          <a:lstStyle/>
+          <a:p>
+            <a:pPr algn="ctr"/>
+            <a:endParaRPr lang="nl-BE"/>
+          </a:p>
+        </p:txBody>
+      </p:sp>
+      <p:sp>
+        <p:nvSpPr>
+          <p:cNvPr id="115" name="Ruit 114"/>
+          <p:cNvSpPr/>
+          <p:nvPr/>
+        </p:nvSpPr>
+        <p:spPr>
+          <a:xfrm rot="5400000">
+            <a:off x="4340980" y="3113997"/>
+            <a:ext cx="360004" cy="270003"/>
+          </a:xfrm>
+          <a:prstGeom prst="diamond">
+            <a:avLst/>
+          </a:prstGeom>
+          <a:ln w="19050"/>
+        </p:spPr>
+        <p:style>
+          <a:lnRef idx="2">
+            <a:schemeClr val="accent1"/>
+          </a:lnRef>
+          <a:fillRef idx="1">
+            <a:schemeClr val="lt1"/>
+          </a:fillRef>
+          <a:effectRef idx="0">
+            <a:schemeClr val="accent1"/>
+          </a:effectRef>
+          <a:fontRef idx="minor">
+            <a:schemeClr val="dk1"/>
+          </a:fontRef>
+        </p:style>
+        <p:txBody>
+          <a:bodyPr rtlCol="0" anchor="ctr"/>
+          <a:lstStyle/>
+          <a:p>
+            <a:pPr algn="ctr"/>
+            <a:endParaRPr lang="nl-BE"/>
+          </a:p>
+        </p:txBody>
+      </p:sp>
+      <p:sp>
+        <p:nvSpPr>
+          <p:cNvPr id="130" name="Rechthoek 129"/>
+          <p:cNvSpPr/>
+          <p:nvPr/>
+        </p:nvSpPr>
+        <p:spPr>
+          <a:xfrm>
+            <a:off x="5645995" y="2078985"/>
+            <a:ext cx="1530017" cy="630007"/>
+          </a:xfrm>
+          <a:prstGeom prst="rect">
+            <a:avLst/>
+          </a:prstGeom>
+          <a:ln w="19050"/>
+        </p:spPr>
+        <p:style>
+          <a:lnRef idx="2">
+            <a:schemeClr val="accent1"/>
+          </a:lnRef>
+          <a:fillRef idx="1">
+            <a:schemeClr val="lt1"/>
+          </a:fillRef>
+          <a:effectRef idx="0">
+            <a:schemeClr val="accent1"/>
+          </a:effectRef>
+          <a:fontRef idx="minor">
+            <a:schemeClr val="dk1"/>
+          </a:fontRef>
+        </p:style>
+        <p:txBody>
+          <a:bodyPr rtlCol="0" anchor="t"/>
+          <a:lstStyle/>
+          <a:p>
+            <a:pPr algn="ctr"/>
+            <a:r>
+              <a:rPr lang="nl-BE" sz="1400" dirty="0"/>
+              <a:t>FSM_TASK</a:t>
+            </a:r>
+          </a:p>
+        </p:txBody>
+      </p:sp>
+      <p:cxnSp>
+        <p:nvCxnSpPr>
+          <p:cNvPr id="254" name="Verbindingslijn: gebogen 253"/>
+          <p:cNvCxnSpPr>
+            <a:stCxn id="115" idx="1"/>
+            <a:endCxn id="130" idx="2"/>
+          </p:cNvCxnSpPr>
+          <p:nvPr/>
+        </p:nvCxnSpPr>
+        <p:spPr>
+          <a:xfrm rot="5400000" flipH="1" flipV="1">
+            <a:off x="5285991" y="1943984"/>
+            <a:ext cx="360005" cy="1890022"/>
+          </a:xfrm>
+          <a:prstGeom prst="bentConnector3">
+            <a:avLst/>
+          </a:prstGeom>
+          <a:ln w="19050"/>
+        </p:spPr>
+        <p:style>
+          <a:lnRef idx="1">
+            <a:schemeClr val="accent1"/>
+          </a:lnRef>
+          <a:fillRef idx="0">
+            <a:schemeClr val="accent1"/>
+          </a:fillRef>
+          <a:effectRef idx="0">
+            <a:schemeClr val="accent1"/>
+          </a:effectRef>
+          <a:fontRef idx="minor">
+            <a:schemeClr val="tx1"/>
+          </a:fontRef>
+        </p:style>
+      </p:cxnSp>
+      <p:sp>
+        <p:nvSpPr>
+          <p:cNvPr id="181" name="Rechthoek 180"/>
+          <p:cNvSpPr/>
+          <p:nvPr/>
+        </p:nvSpPr>
+        <p:spPr>
+          <a:xfrm>
+            <a:off x="5015988" y="5949028"/>
+            <a:ext cx="1530017" cy="630007"/>
+          </a:xfrm>
+          <a:prstGeom prst="rect">
+            <a:avLst/>
+          </a:prstGeom>
+          <a:ln w="19050"/>
+        </p:spPr>
+        <p:style>
+          <a:lnRef idx="2">
+            <a:schemeClr val="accent1"/>
+          </a:lnRef>
+          <a:fillRef idx="1">
+            <a:schemeClr val="lt1"/>
+          </a:fillRef>
+          <a:effectRef idx="0">
+            <a:schemeClr val="accent1"/>
+          </a:effectRef>
+          <a:fontRef idx="minor">
+            <a:schemeClr val="dk1"/>
+          </a:fontRef>
+        </p:style>
+        <p:txBody>
+          <a:bodyPr rtlCol="0" anchor="t"/>
+          <a:lstStyle/>
+          <a:p>
+            <a:pPr algn="ctr"/>
+            <a:r>
+              <a:rPr lang="nl-BE" sz="1400" dirty="0"/>
+              <a:t>GROUP</a:t>
+            </a:r>
+          </a:p>
+        </p:txBody>
+      </p:sp>
+      <p:cxnSp>
+        <p:nvCxnSpPr>
+          <p:cNvPr id="109" name="Verbindingslijn: gebogen 108"/>
+          <p:cNvCxnSpPr>
+            <a:stCxn id="101" idx="1"/>
+            <a:endCxn id="181" idx="1"/>
+          </p:cNvCxnSpPr>
+          <p:nvPr/>
+        </p:nvCxnSpPr>
+        <p:spPr>
+          <a:xfrm rot="16200000" flipH="1">
+            <a:off x="4340981" y="5589024"/>
+            <a:ext cx="405005" cy="945009"/>
+          </a:xfrm>
+          <a:prstGeom prst="bentConnector2">
+            <a:avLst/>
+          </a:prstGeom>
+          <a:ln w="19050"/>
+        </p:spPr>
+        <p:style>
+          <a:lnRef idx="1">
+            <a:schemeClr val="accent1"/>
+          </a:lnRef>
+          <a:fillRef idx="0">
+            <a:schemeClr val="accent1"/>
+          </a:fillRef>
+          <a:effectRef idx="0">
+            <a:schemeClr val="accent1"/>
+          </a:effectRef>
+          <a:fontRef idx="minor">
+            <a:schemeClr val="tx1"/>
+          </a:fontRef>
+        </p:style>
+      </p:cxnSp>
+      <p:cxnSp>
+        <p:nvCxnSpPr>
+          <p:cNvPr id="111" name="Rechte verbindingslijn 110"/>
+          <p:cNvCxnSpPr>
+            <a:stCxn id="190" idx="3"/>
+            <a:endCxn id="97" idx="1"/>
+          </p:cNvCxnSpPr>
+          <p:nvPr/>
+        </p:nvCxnSpPr>
+        <p:spPr>
+          <a:xfrm>
+            <a:off x="6906009" y="6264032"/>
+            <a:ext cx="1170013" cy="0"/>
+          </a:xfrm>
+          <a:prstGeom prst="line">
+            <a:avLst/>
+          </a:prstGeom>
+          <a:ln w="19050"/>
+        </p:spPr>
+        <p:style>
+          <a:lnRef idx="1">
+            <a:schemeClr val="accent1"/>
+          </a:lnRef>
+          <a:fillRef idx="0">
+            <a:schemeClr val="accent1"/>
+          </a:fillRef>
+          <a:effectRef idx="0">
+            <a:schemeClr val="accent1"/>
+          </a:effectRef>
+          <a:fontRef idx="minor">
+            <a:schemeClr val="tx1"/>
+          </a:fontRef>
+        </p:style>
+      </p:cxnSp>
+      <p:sp>
+        <p:nvSpPr>
+          <p:cNvPr id="190" name="Ruit 189"/>
+          <p:cNvSpPr/>
+          <p:nvPr/>
+        </p:nvSpPr>
+        <p:spPr>
+          <a:xfrm>
+            <a:off x="6546005" y="6129030"/>
+            <a:ext cx="360004" cy="270003"/>
+          </a:xfrm>
+          <a:prstGeom prst="diamond">
+            <a:avLst/>
+          </a:prstGeom>
+          <a:ln w="19050"/>
+        </p:spPr>
+        <p:style>
+          <a:lnRef idx="2">
+            <a:schemeClr val="accent1"/>
+          </a:lnRef>
+          <a:fillRef idx="1">
+            <a:schemeClr val="lt1"/>
+          </a:fillRef>
+          <a:effectRef idx="0">
+            <a:schemeClr val="accent1"/>
+          </a:effectRef>
+          <a:fontRef idx="minor">
+            <a:schemeClr val="dk1"/>
+          </a:fontRef>
+        </p:style>
+        <p:txBody>
+          <a:bodyPr rtlCol="0" anchor="ctr"/>
+          <a:lstStyle/>
+          <a:p>
+            <a:pPr algn="ctr"/>
+            <a:endParaRPr lang="nl-BE"/>
+          </a:p>
+        </p:txBody>
+      </p:sp>
+      <p:sp>
+        <p:nvSpPr>
+          <p:cNvPr id="203" name="Rechthoek 202"/>
+          <p:cNvSpPr/>
+          <p:nvPr/>
+        </p:nvSpPr>
+        <p:spPr>
+          <a:xfrm>
+            <a:off x="5645995" y="2528990"/>
+            <a:ext cx="1530017" cy="90001"/>
+          </a:xfrm>
+          <a:prstGeom prst="rect">
+            <a:avLst/>
+          </a:prstGeom>
+          <a:ln w="19050"/>
+        </p:spPr>
+        <p:style>
+          <a:lnRef idx="2">
+            <a:schemeClr val="accent1"/>
+          </a:lnRef>
+          <a:fillRef idx="1">
+            <a:schemeClr val="lt1"/>
+          </a:fillRef>
+          <a:effectRef idx="0">
+            <a:schemeClr val="accent1"/>
+          </a:effectRef>
+          <a:fontRef idx="minor">
+            <a:schemeClr val="dk1"/>
+          </a:fontRef>
+        </p:style>
+        <p:txBody>
+          <a:bodyPr rtlCol="0" anchor="ctr"/>
+          <a:lstStyle/>
+          <a:p>
+            <a:pPr algn="ctr"/>
+            <a:endParaRPr lang="nl-BE" sz="1000"/>
+          </a:p>
+        </p:txBody>
+      </p:sp>
+      <p:sp>
+        <p:nvSpPr>
+          <p:cNvPr id="207" name="Rechthoek 206"/>
+          <p:cNvSpPr/>
+          <p:nvPr/>
+        </p:nvSpPr>
+        <p:spPr>
+          <a:xfrm>
+            <a:off x="5645995" y="2618991"/>
+            <a:ext cx="1530017" cy="90001"/>
+          </a:xfrm>
+          <a:prstGeom prst="rect">
+            <a:avLst/>
+          </a:prstGeom>
+          <a:ln w="19050"/>
+        </p:spPr>
+        <p:style>
+          <a:lnRef idx="2">
+            <a:schemeClr val="accent1"/>
+          </a:lnRef>
+          <a:fillRef idx="1">
+            <a:schemeClr val="lt1"/>
+          </a:fillRef>
+          <a:effectRef idx="0">
+            <a:schemeClr val="accent1"/>
+          </a:effectRef>
+          <a:fontRef idx="minor">
+            <a:schemeClr val="dk1"/>
+          </a:fontRef>
+        </p:style>
+        <p:txBody>
+          <a:bodyPr rtlCol="0" anchor="ctr"/>
+          <a:lstStyle/>
+          <a:p>
+            <a:pPr algn="ctr"/>
+            <a:endParaRPr lang="nl-BE" sz="1000"/>
+          </a:p>
+        </p:txBody>
+      </p:sp>
+      <p:sp>
+        <p:nvSpPr>
+          <p:cNvPr id="208" name="Rechthoek 207"/>
+          <p:cNvSpPr/>
+          <p:nvPr/>
+        </p:nvSpPr>
+        <p:spPr>
+          <a:xfrm>
+            <a:off x="3305969" y="2528990"/>
+            <a:ext cx="1530017" cy="90001"/>
+          </a:xfrm>
+          <a:prstGeom prst="rect">
+            <a:avLst/>
+          </a:prstGeom>
+          <a:ln w="19050"/>
+        </p:spPr>
+        <p:style>
+          <a:lnRef idx="2">
+            <a:schemeClr val="accent1"/>
+          </a:lnRef>
+          <a:fillRef idx="1">
+            <a:schemeClr val="lt1"/>
+          </a:fillRef>
+          <a:effectRef idx="0">
+            <a:schemeClr val="accent1"/>
+          </a:effectRef>
+          <a:fontRef idx="minor">
+            <a:schemeClr val="dk1"/>
+          </a:fontRef>
+        </p:style>
+        <p:txBody>
+          <a:bodyPr rtlCol="0" anchor="ctr"/>
+          <a:lstStyle/>
+          <a:p>
+            <a:pPr algn="ctr"/>
+            <a:endParaRPr lang="nl-BE" sz="1000"/>
+          </a:p>
+        </p:txBody>
+      </p:sp>
+      <p:sp>
+        <p:nvSpPr>
+          <p:cNvPr id="209" name="Rechthoek 208"/>
+          <p:cNvSpPr/>
+          <p:nvPr/>
+        </p:nvSpPr>
+        <p:spPr>
+          <a:xfrm>
+            <a:off x="3305969" y="2618991"/>
+            <a:ext cx="1530017" cy="90001"/>
+          </a:xfrm>
+          <a:prstGeom prst="rect">
+            <a:avLst/>
+          </a:prstGeom>
+          <a:ln w="19050"/>
+        </p:spPr>
+        <p:style>
+          <a:lnRef idx="2">
+            <a:schemeClr val="accent1"/>
+          </a:lnRef>
+          <a:fillRef idx="1">
+            <a:schemeClr val="lt1"/>
+          </a:fillRef>
+          <a:effectRef idx="0">
+            <a:schemeClr val="accent1"/>
+          </a:effectRef>
+          <a:fontRef idx="minor">
+            <a:schemeClr val="dk1"/>
+          </a:fontRef>
+        </p:style>
+        <p:txBody>
+          <a:bodyPr rtlCol="0" anchor="ctr"/>
+          <a:lstStyle/>
+          <a:p>
+            <a:pPr algn="ctr"/>
+            <a:endParaRPr lang="nl-BE" sz="1000"/>
+          </a:p>
+        </p:txBody>
+      </p:sp>
+      <p:sp>
+        <p:nvSpPr>
+          <p:cNvPr id="213" name="Rechthoek 212"/>
+          <p:cNvSpPr/>
+          <p:nvPr/>
+        </p:nvSpPr>
+        <p:spPr>
+          <a:xfrm>
+            <a:off x="965943" y="2528990"/>
+            <a:ext cx="1530017" cy="90001"/>
+          </a:xfrm>
+          <a:prstGeom prst="rect">
+            <a:avLst/>
+          </a:prstGeom>
+          <a:ln w="19050"/>
+        </p:spPr>
+        <p:style>
+          <a:lnRef idx="2">
+            <a:schemeClr val="accent1"/>
+          </a:lnRef>
+          <a:fillRef idx="1">
+            <a:schemeClr val="lt1"/>
+          </a:fillRef>
+          <a:effectRef idx="0">
+            <a:schemeClr val="accent1"/>
+          </a:effectRef>
+          <a:fontRef idx="minor">
+            <a:schemeClr val="dk1"/>
+          </a:fontRef>
+        </p:style>
+        <p:txBody>
+          <a:bodyPr rtlCol="0" anchor="ctr"/>
+          <a:lstStyle/>
+          <a:p>
+            <a:pPr algn="ctr"/>
+            <a:endParaRPr lang="nl-BE" sz="1000"/>
+          </a:p>
+        </p:txBody>
+      </p:sp>
+      <p:sp>
+        <p:nvSpPr>
+          <p:cNvPr id="214" name="Rechthoek 213"/>
+          <p:cNvSpPr/>
+          <p:nvPr/>
+        </p:nvSpPr>
+        <p:spPr>
+          <a:xfrm>
+            <a:off x="965943" y="2618991"/>
+            <a:ext cx="1530017" cy="90001"/>
+          </a:xfrm>
+          <a:prstGeom prst="rect">
+            <a:avLst/>
+          </a:prstGeom>
+          <a:ln w="19050"/>
+        </p:spPr>
+        <p:style>
+          <a:lnRef idx="2">
+            <a:schemeClr val="accent1"/>
+          </a:lnRef>
+          <a:fillRef idx="1">
+            <a:schemeClr val="lt1"/>
+          </a:fillRef>
+          <a:effectRef idx="0">
+            <a:schemeClr val="accent1"/>
+          </a:effectRef>
+          <a:fontRef idx="minor">
+            <a:schemeClr val="dk1"/>
+          </a:fontRef>
+        </p:style>
+        <p:txBody>
+          <a:bodyPr rtlCol="0" anchor="ctr"/>
+          <a:lstStyle/>
+          <a:p>
+            <a:pPr algn="ctr"/>
+            <a:endParaRPr lang="nl-BE" sz="1000"/>
+          </a:p>
+        </p:txBody>
+      </p:sp>
+      <p:sp>
+        <p:nvSpPr>
+          <p:cNvPr id="217" name="Rechthoek 216"/>
+          <p:cNvSpPr/>
+          <p:nvPr/>
+        </p:nvSpPr>
+        <p:spPr>
+          <a:xfrm>
+            <a:off x="3305969" y="3699004"/>
+            <a:ext cx="1530017" cy="450004"/>
+          </a:xfrm>
+          <a:prstGeom prst="rect">
+            <a:avLst/>
+          </a:prstGeom>
+          <a:ln w="19050"/>
+        </p:spPr>
+        <p:style>
+          <a:lnRef idx="2">
+            <a:schemeClr val="accent1"/>
+          </a:lnRef>
+          <a:fillRef idx="1">
+            <a:schemeClr val="lt1"/>
+          </a:fillRef>
+          <a:effectRef idx="0">
+            <a:schemeClr val="accent1"/>
+          </a:effectRef>
+          <a:fontRef idx="minor">
+            <a:schemeClr val="dk1"/>
+          </a:fontRef>
+        </p:style>
+        <p:txBody>
+          <a:bodyPr rtlCol="0" anchor="t"/>
+          <a:lstStyle/>
+          <a:p>
+            <a:pPr marL="171450" indent="-171450">
+              <a:buFont typeface="Arial" panose="020B0604020202020204" pitchFamily="34" charset="0"/>
+              <a:buChar char="•"/>
+            </a:pPr>
+            <a:r>
+              <a:rPr lang="nl-BE" sz="1000" dirty="0" err="1"/>
+              <a:t>TemplateProcesses</a:t>
+            </a:r>
+            <a:r>
+              <a:rPr lang="nl-BE" sz="1000" dirty="0"/>
+              <a:t>[ ]</a:t>
+            </a:r>
+          </a:p>
+          <a:p>
+            <a:pPr marL="171450" indent="-171450">
+              <a:buFont typeface="Arial" panose="020B0604020202020204" pitchFamily="34" charset="0"/>
+              <a:buChar char="•"/>
+            </a:pPr>
+            <a:r>
+              <a:rPr lang="nl-BE" sz="1000" dirty="0" err="1"/>
+              <a:t>AssignedProcesses</a:t>
+            </a:r>
+            <a:r>
+              <a:rPr lang="nl-BE" sz="1000" dirty="0"/>
+              <a:t>[ ]</a:t>
+            </a:r>
+          </a:p>
+          <a:p>
+            <a:pPr marL="171450" indent="-171450">
+              <a:buFont typeface="Arial" panose="020B0604020202020204" pitchFamily="34" charset="0"/>
+              <a:buChar char="•"/>
+            </a:pPr>
+            <a:endParaRPr lang="nl-BE" sz="1000" dirty="0"/>
+          </a:p>
+        </p:txBody>
+      </p:sp>
+      <p:sp>
+        <p:nvSpPr>
+          <p:cNvPr id="218" name="Rechthoek 217"/>
+          <p:cNvSpPr/>
+          <p:nvPr/>
+        </p:nvSpPr>
+        <p:spPr>
+          <a:xfrm>
+            <a:off x="3305969" y="4149008"/>
+            <a:ext cx="1530017" cy="1350015"/>
+          </a:xfrm>
+          <a:prstGeom prst="rect">
+            <a:avLst/>
+          </a:prstGeom>
+          <a:ln w="19050"/>
+        </p:spPr>
+        <p:style>
+          <a:lnRef idx="2">
+            <a:schemeClr val="accent1"/>
+          </a:lnRef>
+          <a:fillRef idx="1">
+            <a:schemeClr val="lt1"/>
+          </a:fillRef>
+          <a:effectRef idx="0">
+            <a:schemeClr val="accent1"/>
+          </a:effectRef>
+          <a:fontRef idx="minor">
+            <a:schemeClr val="dk1"/>
+          </a:fontRef>
+        </p:style>
+        <p:txBody>
+          <a:bodyPr rtlCol="0" anchor="t"/>
+          <a:lstStyle/>
+          <a:p>
+            <a:pPr marL="171450" indent="-171450">
+              <a:buFont typeface="Arial" panose="020B0604020202020204" pitchFamily="34" charset="0"/>
+              <a:buChar char="•"/>
+            </a:pPr>
+            <a:r>
+              <a:rPr lang="nl-BE" sz="1000" dirty="0" err="1"/>
+              <a:t>AssignProcess</a:t>
+            </a:r>
+            <a:r>
+              <a:rPr lang="nl-BE" sz="1000" dirty="0"/>
+              <a:t>()</a:t>
+            </a:r>
+          </a:p>
+          <a:p>
+            <a:pPr marL="171450" indent="-171450">
+              <a:buFont typeface="Arial" panose="020B0604020202020204" pitchFamily="34" charset="0"/>
+              <a:buChar char="•"/>
+            </a:pPr>
+            <a:r>
+              <a:rPr lang="nl-BE" sz="1000" dirty="0" err="1"/>
+              <a:t>SetProcessTemplate</a:t>
+            </a:r>
+            <a:r>
+              <a:rPr lang="nl-BE" sz="1000" dirty="0"/>
+              <a:t>()</a:t>
+            </a:r>
+          </a:p>
+        </p:txBody>
+      </p:sp>
+      <p:sp>
+        <p:nvSpPr>
+          <p:cNvPr id="221" name="Rechthoek 220"/>
+          <p:cNvSpPr/>
+          <p:nvPr/>
+        </p:nvSpPr>
+        <p:spPr>
+          <a:xfrm>
+            <a:off x="5645995" y="4779015"/>
+            <a:ext cx="1530017" cy="90001"/>
+          </a:xfrm>
+          <a:prstGeom prst="rect">
+            <a:avLst/>
+          </a:prstGeom>
+          <a:ln w="19050"/>
+        </p:spPr>
+        <p:style>
+          <a:lnRef idx="2">
+            <a:schemeClr val="accent1"/>
+          </a:lnRef>
+          <a:fillRef idx="1">
+            <a:schemeClr val="lt1"/>
+          </a:fillRef>
+          <a:effectRef idx="0">
+            <a:schemeClr val="accent1"/>
+          </a:effectRef>
+          <a:fontRef idx="minor">
+            <a:schemeClr val="dk1"/>
+          </a:fontRef>
+        </p:style>
+        <p:txBody>
+          <a:bodyPr rtlCol="0" anchor="ctr"/>
+          <a:lstStyle/>
+          <a:p>
+            <a:pPr algn="ctr"/>
+            <a:endParaRPr lang="nl-BE" sz="1000"/>
+          </a:p>
+        </p:txBody>
+      </p:sp>
+      <p:sp>
+        <p:nvSpPr>
+          <p:cNvPr id="222" name="Rechthoek 221"/>
+          <p:cNvSpPr/>
+          <p:nvPr/>
+        </p:nvSpPr>
+        <p:spPr>
+          <a:xfrm>
+            <a:off x="5645995" y="4869016"/>
+            <a:ext cx="1530017" cy="90001"/>
+          </a:xfrm>
+          <a:prstGeom prst="rect">
+            <a:avLst/>
+          </a:prstGeom>
+          <a:ln w="19050"/>
+        </p:spPr>
+        <p:style>
+          <a:lnRef idx="2">
+            <a:schemeClr val="accent1"/>
+          </a:lnRef>
+          <a:fillRef idx="1">
+            <a:schemeClr val="lt1"/>
+          </a:fillRef>
+          <a:effectRef idx="0">
+            <a:schemeClr val="accent1"/>
+          </a:effectRef>
+          <a:fontRef idx="minor">
+            <a:schemeClr val="dk1"/>
+          </a:fontRef>
+        </p:style>
+        <p:txBody>
+          <a:bodyPr rtlCol="0" anchor="ctr"/>
+          <a:lstStyle/>
+          <a:p>
+            <a:pPr algn="ctr"/>
+            <a:endParaRPr lang="nl-BE" sz="1000"/>
+          </a:p>
+        </p:txBody>
+      </p:sp>
+      <p:sp>
+        <p:nvSpPr>
+          <p:cNvPr id="257" name="Rechthoek 256"/>
+          <p:cNvSpPr/>
+          <p:nvPr/>
+        </p:nvSpPr>
+        <p:spPr>
+          <a:xfrm>
+            <a:off x="5015988" y="6399033"/>
+            <a:ext cx="1530017" cy="90001"/>
+          </a:xfrm>
+          <a:prstGeom prst="rect">
+            <a:avLst/>
+          </a:prstGeom>
+          <a:ln w="19050"/>
+        </p:spPr>
+        <p:style>
+          <a:lnRef idx="2">
+            <a:schemeClr val="accent1"/>
+          </a:lnRef>
+          <a:fillRef idx="1">
+            <a:schemeClr val="lt1"/>
+          </a:fillRef>
+          <a:effectRef idx="0">
+            <a:schemeClr val="accent1"/>
+          </a:effectRef>
+          <a:fontRef idx="minor">
+            <a:schemeClr val="dk1"/>
+          </a:fontRef>
+        </p:style>
+        <p:txBody>
+          <a:bodyPr rtlCol="0" anchor="ctr"/>
+          <a:lstStyle/>
+          <a:p>
+            <a:pPr algn="ctr"/>
+            <a:endParaRPr lang="nl-BE" sz="1000"/>
+          </a:p>
+        </p:txBody>
+      </p:sp>
+      <p:sp>
+        <p:nvSpPr>
+          <p:cNvPr id="258" name="Rechthoek 257"/>
+          <p:cNvSpPr/>
+          <p:nvPr/>
+        </p:nvSpPr>
+        <p:spPr>
+          <a:xfrm>
+            <a:off x="5015988" y="6489034"/>
+            <a:ext cx="1530017" cy="90001"/>
+          </a:xfrm>
+          <a:prstGeom prst="rect">
+            <a:avLst/>
+          </a:prstGeom>
+          <a:ln w="19050"/>
+        </p:spPr>
+        <p:style>
+          <a:lnRef idx="2">
+            <a:schemeClr val="accent1"/>
+          </a:lnRef>
+          <a:fillRef idx="1">
+            <a:schemeClr val="lt1"/>
+          </a:fillRef>
+          <a:effectRef idx="0">
+            <a:schemeClr val="accent1"/>
+          </a:effectRef>
+          <a:fontRef idx="minor">
+            <a:schemeClr val="dk1"/>
+          </a:fontRef>
+        </p:style>
+        <p:txBody>
+          <a:bodyPr rtlCol="0" anchor="ctr"/>
+          <a:lstStyle/>
+          <a:p>
+            <a:pPr algn="ctr"/>
+            <a:endParaRPr lang="nl-BE" sz="1000"/>
+          </a:p>
+        </p:txBody>
+      </p:sp>
+      <p:sp>
+        <p:nvSpPr>
+          <p:cNvPr id="259" name="Rechthoek 258"/>
+          <p:cNvSpPr/>
+          <p:nvPr/>
+        </p:nvSpPr>
+        <p:spPr>
+          <a:xfrm>
+            <a:off x="8076022" y="6399033"/>
+            <a:ext cx="1530017" cy="90001"/>
+          </a:xfrm>
+          <a:prstGeom prst="rect">
+            <a:avLst/>
+          </a:prstGeom>
+          <a:ln w="19050"/>
+        </p:spPr>
+        <p:style>
+          <a:lnRef idx="2">
+            <a:schemeClr val="accent1"/>
+          </a:lnRef>
+          <a:fillRef idx="1">
+            <a:schemeClr val="lt1"/>
+          </a:fillRef>
+          <a:effectRef idx="0">
+            <a:schemeClr val="accent1"/>
+          </a:effectRef>
+          <a:fontRef idx="minor">
+            <a:schemeClr val="dk1"/>
+          </a:fontRef>
+        </p:style>
+        <p:txBody>
+          <a:bodyPr rtlCol="0" anchor="ctr"/>
+          <a:lstStyle/>
+          <a:p>
+            <a:pPr algn="ctr"/>
+            <a:endParaRPr lang="nl-BE" sz="1000"/>
+          </a:p>
+        </p:txBody>
+      </p:sp>
+      <p:sp>
+        <p:nvSpPr>
+          <p:cNvPr id="260" name="Rechthoek 259"/>
+          <p:cNvSpPr/>
+          <p:nvPr/>
+        </p:nvSpPr>
+        <p:spPr>
+          <a:xfrm>
+            <a:off x="8076022" y="6489034"/>
+            <a:ext cx="1530017" cy="90001"/>
+          </a:xfrm>
+          <a:prstGeom prst="rect">
+            <a:avLst/>
+          </a:prstGeom>
+          <a:ln w="19050"/>
+        </p:spPr>
+        <p:style>
+          <a:lnRef idx="2">
+            <a:schemeClr val="accent1"/>
+          </a:lnRef>
+          <a:fillRef idx="1">
+            <a:schemeClr val="lt1"/>
+          </a:fillRef>
+          <a:effectRef idx="0">
+            <a:schemeClr val="accent1"/>
+          </a:effectRef>
+          <a:fontRef idx="minor">
+            <a:schemeClr val="dk1"/>
+          </a:fontRef>
+        </p:style>
+        <p:txBody>
+          <a:bodyPr rtlCol="0" anchor="ctr"/>
+          <a:lstStyle/>
+          <a:p>
+            <a:pPr algn="ctr"/>
+            <a:endParaRPr lang="nl-BE" sz="1000"/>
+          </a:p>
+        </p:txBody>
+      </p:sp>
+      <p:sp>
+        <p:nvSpPr>
+          <p:cNvPr id="79" name="Rechthoek 78"/>
+          <p:cNvSpPr/>
+          <p:nvPr/>
+        </p:nvSpPr>
+        <p:spPr>
+          <a:xfrm>
+            <a:off x="965943" y="3429000"/>
+            <a:ext cx="1530017" cy="450005"/>
+          </a:xfrm>
+          <a:prstGeom prst="rect">
+            <a:avLst/>
+          </a:prstGeom>
+          <a:ln w="19050"/>
+        </p:spPr>
+        <p:style>
+          <a:lnRef idx="2">
+            <a:schemeClr val="accent1"/>
+          </a:lnRef>
+          <a:fillRef idx="1">
+            <a:schemeClr val="lt1"/>
+          </a:fillRef>
+          <a:effectRef idx="0">
+            <a:schemeClr val="accent1"/>
+          </a:effectRef>
+          <a:fontRef idx="minor">
+            <a:schemeClr val="dk1"/>
+          </a:fontRef>
+        </p:style>
+        <p:txBody>
+          <a:bodyPr rtlCol="0" anchor="t"/>
+          <a:lstStyle/>
+          <a:p>
+            <a:pPr algn="ctr"/>
+            <a:r>
+              <a:rPr lang="nl-BE" sz="1400" dirty="0"/>
+              <a:t>FSM_ASSIGN</a:t>
+            </a:r>
+          </a:p>
+        </p:txBody>
+      </p:sp>
+      <p:sp>
+        <p:nvSpPr>
+          <p:cNvPr id="85" name="Rechthoek 84"/>
+          <p:cNvSpPr/>
+          <p:nvPr/>
+        </p:nvSpPr>
+        <p:spPr>
+          <a:xfrm>
+            <a:off x="965943" y="3969006"/>
+            <a:ext cx="1530017" cy="450005"/>
+          </a:xfrm>
+          <a:prstGeom prst="rect">
+            <a:avLst/>
+          </a:prstGeom>
+          <a:ln w="19050"/>
+        </p:spPr>
+        <p:style>
+          <a:lnRef idx="2">
+            <a:schemeClr val="accent1"/>
+          </a:lnRef>
+          <a:fillRef idx="1">
+            <a:schemeClr val="lt1"/>
+          </a:fillRef>
+          <a:effectRef idx="0">
+            <a:schemeClr val="accent1"/>
+          </a:effectRef>
+          <a:fontRef idx="minor">
+            <a:schemeClr val="dk1"/>
+          </a:fontRef>
+        </p:style>
+        <p:txBody>
+          <a:bodyPr rtlCol="0" anchor="t"/>
+          <a:lstStyle/>
+          <a:p>
+            <a:pPr algn="ctr"/>
+            <a:r>
+              <a:rPr lang="nl-BE" sz="1400" dirty="0"/>
+              <a:t>FSM_ROUTE</a:t>
+            </a:r>
+          </a:p>
+        </p:txBody>
+      </p:sp>
+      <p:sp>
+        <p:nvSpPr>
+          <p:cNvPr id="86" name="Rechthoek 85"/>
+          <p:cNvSpPr/>
+          <p:nvPr/>
+        </p:nvSpPr>
+        <p:spPr>
+          <a:xfrm>
+            <a:off x="965943" y="4509012"/>
+            <a:ext cx="1530017" cy="450005"/>
+          </a:xfrm>
+          <a:prstGeom prst="rect">
+            <a:avLst/>
+          </a:prstGeom>
+          <a:ln w="19050"/>
+        </p:spPr>
+        <p:style>
+          <a:lnRef idx="2">
+            <a:schemeClr val="accent1"/>
+          </a:lnRef>
+          <a:fillRef idx="1">
+            <a:schemeClr val="lt1"/>
+          </a:fillRef>
+          <a:effectRef idx="0">
+            <a:schemeClr val="accent1"/>
+          </a:effectRef>
+          <a:fontRef idx="minor">
+            <a:schemeClr val="dk1"/>
+          </a:fontRef>
+        </p:style>
+        <p:txBody>
+          <a:bodyPr rtlCol="0" anchor="t"/>
+          <a:lstStyle/>
+          <a:p>
+            <a:pPr algn="ctr"/>
+            <a:r>
+              <a:rPr lang="nl-BE" sz="1400" dirty="0"/>
+              <a:t>FSM_ACCOUNT</a:t>
+            </a:r>
+          </a:p>
+        </p:txBody>
+      </p:sp>
+      <p:sp>
+        <p:nvSpPr>
+          <p:cNvPr id="90" name="Rechthoek 89"/>
+          <p:cNvSpPr/>
+          <p:nvPr/>
+        </p:nvSpPr>
+        <p:spPr>
+          <a:xfrm>
+            <a:off x="965943" y="5049018"/>
+            <a:ext cx="1530017" cy="450005"/>
+          </a:xfrm>
+          <a:prstGeom prst="rect">
+            <a:avLst/>
+          </a:prstGeom>
+          <a:ln w="19050"/>
+        </p:spPr>
+        <p:style>
+          <a:lnRef idx="2">
+            <a:schemeClr val="accent1"/>
+          </a:lnRef>
+          <a:fillRef idx="1">
+            <a:schemeClr val="lt1"/>
+          </a:fillRef>
+          <a:effectRef idx="0">
+            <a:schemeClr val="accent1"/>
+          </a:effectRef>
+          <a:fontRef idx="minor">
+            <a:schemeClr val="dk1"/>
+          </a:fontRef>
+        </p:style>
+        <p:txBody>
+          <a:bodyPr rtlCol="0" anchor="t"/>
+          <a:lstStyle/>
+          <a:p>
+            <a:pPr algn="ctr"/>
+            <a:r>
+              <a:rPr lang="nl-BE" sz="1400" dirty="0"/>
+              <a:t>FSM_SMOKE</a:t>
+            </a:r>
+          </a:p>
+        </p:txBody>
+      </p:sp>
+      <p:sp>
+        <p:nvSpPr>
+          <p:cNvPr id="91" name="Rechthoek 90"/>
+          <p:cNvSpPr/>
+          <p:nvPr/>
+        </p:nvSpPr>
+        <p:spPr>
+          <a:xfrm>
+            <a:off x="965943" y="3699003"/>
+            <a:ext cx="1530017" cy="90001"/>
+          </a:xfrm>
+          <a:prstGeom prst="rect">
+            <a:avLst/>
+          </a:prstGeom>
+          <a:ln w="19050"/>
+        </p:spPr>
+        <p:style>
+          <a:lnRef idx="2">
+            <a:schemeClr val="accent1"/>
+          </a:lnRef>
+          <a:fillRef idx="1">
+            <a:schemeClr val="lt1"/>
+          </a:fillRef>
+          <a:effectRef idx="0">
+            <a:schemeClr val="accent1"/>
+          </a:effectRef>
+          <a:fontRef idx="minor">
+            <a:schemeClr val="dk1"/>
+          </a:fontRef>
+        </p:style>
+        <p:txBody>
+          <a:bodyPr rtlCol="0" anchor="ctr"/>
+          <a:lstStyle/>
+          <a:p>
+            <a:pPr algn="ctr"/>
+            <a:endParaRPr lang="nl-BE" sz="1000"/>
+          </a:p>
+        </p:txBody>
+      </p:sp>
+      <p:sp>
+        <p:nvSpPr>
+          <p:cNvPr id="92" name="Rechthoek 91"/>
+          <p:cNvSpPr/>
+          <p:nvPr/>
+        </p:nvSpPr>
+        <p:spPr>
+          <a:xfrm>
+            <a:off x="965943" y="3789004"/>
+            <a:ext cx="1530017" cy="90001"/>
+          </a:xfrm>
+          <a:prstGeom prst="rect">
+            <a:avLst/>
+          </a:prstGeom>
+          <a:ln w="19050"/>
+        </p:spPr>
+        <p:style>
+          <a:lnRef idx="2">
+            <a:schemeClr val="accent1"/>
+          </a:lnRef>
+          <a:fillRef idx="1">
+            <a:schemeClr val="lt1"/>
+          </a:fillRef>
+          <a:effectRef idx="0">
+            <a:schemeClr val="accent1"/>
+          </a:effectRef>
+          <a:fontRef idx="minor">
+            <a:schemeClr val="dk1"/>
+          </a:fontRef>
+        </p:style>
+        <p:txBody>
+          <a:bodyPr rtlCol="0" anchor="ctr"/>
+          <a:lstStyle/>
+          <a:p>
+            <a:pPr algn="ctr"/>
+            <a:endParaRPr lang="nl-BE" sz="1000"/>
+          </a:p>
+        </p:txBody>
+      </p:sp>
+      <p:sp>
+        <p:nvSpPr>
+          <p:cNvPr id="93" name="Rechthoek 92"/>
+          <p:cNvSpPr/>
+          <p:nvPr/>
+        </p:nvSpPr>
+        <p:spPr>
+          <a:xfrm>
+            <a:off x="965943" y="4239009"/>
+            <a:ext cx="1530017" cy="90001"/>
+          </a:xfrm>
+          <a:prstGeom prst="rect">
+            <a:avLst/>
+          </a:prstGeom>
+          <a:ln w="19050"/>
+        </p:spPr>
+        <p:style>
+          <a:lnRef idx="2">
+            <a:schemeClr val="accent1"/>
+          </a:lnRef>
+          <a:fillRef idx="1">
+            <a:schemeClr val="lt1"/>
+          </a:fillRef>
+          <a:effectRef idx="0">
+            <a:schemeClr val="accent1"/>
+          </a:effectRef>
+          <a:fontRef idx="minor">
+            <a:schemeClr val="dk1"/>
+          </a:fontRef>
+        </p:style>
+        <p:txBody>
+          <a:bodyPr rtlCol="0" anchor="ctr"/>
+          <a:lstStyle/>
+          <a:p>
+            <a:pPr algn="ctr"/>
+            <a:endParaRPr lang="nl-BE" sz="1000"/>
+          </a:p>
+        </p:txBody>
+      </p:sp>
+      <p:sp>
+        <p:nvSpPr>
+          <p:cNvPr id="94" name="Rechthoek 93"/>
+          <p:cNvSpPr/>
+          <p:nvPr/>
+        </p:nvSpPr>
+        <p:spPr>
+          <a:xfrm>
+            <a:off x="965943" y="4329010"/>
+            <a:ext cx="1530017" cy="90001"/>
+          </a:xfrm>
+          <a:prstGeom prst="rect">
+            <a:avLst/>
+          </a:prstGeom>
+          <a:ln w="19050"/>
+        </p:spPr>
+        <p:style>
+          <a:lnRef idx="2">
+            <a:schemeClr val="accent1"/>
+          </a:lnRef>
+          <a:fillRef idx="1">
+            <a:schemeClr val="lt1"/>
+          </a:fillRef>
+          <a:effectRef idx="0">
+            <a:schemeClr val="accent1"/>
+          </a:effectRef>
+          <a:fontRef idx="minor">
+            <a:schemeClr val="dk1"/>
+          </a:fontRef>
+        </p:style>
+        <p:txBody>
+          <a:bodyPr rtlCol="0" anchor="ctr"/>
+          <a:lstStyle/>
+          <a:p>
+            <a:pPr algn="ctr"/>
+            <a:endParaRPr lang="nl-BE" sz="1000"/>
+          </a:p>
+        </p:txBody>
+      </p:sp>
+      <p:sp>
+        <p:nvSpPr>
+          <p:cNvPr id="96" name="Rechthoek 95"/>
+          <p:cNvSpPr/>
+          <p:nvPr/>
+        </p:nvSpPr>
+        <p:spPr>
+          <a:xfrm>
+            <a:off x="965943" y="4779015"/>
+            <a:ext cx="1530017" cy="90001"/>
+          </a:xfrm>
+          <a:prstGeom prst="rect">
+            <a:avLst/>
+          </a:prstGeom>
+          <a:ln w="19050"/>
+        </p:spPr>
+        <p:style>
+          <a:lnRef idx="2">
+            <a:schemeClr val="accent1"/>
+          </a:lnRef>
+          <a:fillRef idx="1">
+            <a:schemeClr val="lt1"/>
+          </a:fillRef>
+          <a:effectRef idx="0">
+            <a:schemeClr val="accent1"/>
+          </a:effectRef>
+          <a:fontRef idx="minor">
+            <a:schemeClr val="dk1"/>
+          </a:fontRef>
+        </p:style>
+        <p:txBody>
+          <a:bodyPr rtlCol="0" anchor="ctr"/>
+          <a:lstStyle/>
+          <a:p>
+            <a:pPr algn="ctr"/>
+            <a:endParaRPr lang="nl-BE" sz="1000"/>
+          </a:p>
+        </p:txBody>
+      </p:sp>
+      <p:sp>
+        <p:nvSpPr>
+          <p:cNvPr id="98" name="Rechthoek 97"/>
+          <p:cNvSpPr/>
+          <p:nvPr/>
+        </p:nvSpPr>
+        <p:spPr>
+          <a:xfrm>
+            <a:off x="965943" y="4869016"/>
+            <a:ext cx="1530017" cy="90001"/>
+          </a:xfrm>
+          <a:prstGeom prst="rect">
+            <a:avLst/>
+          </a:prstGeom>
+          <a:ln w="19050"/>
+        </p:spPr>
+        <p:style>
+          <a:lnRef idx="2">
+            <a:schemeClr val="accent1"/>
+          </a:lnRef>
+          <a:fillRef idx="1">
+            <a:schemeClr val="lt1"/>
+          </a:fillRef>
+          <a:effectRef idx="0">
+            <a:schemeClr val="accent1"/>
+          </a:effectRef>
+          <a:fontRef idx="minor">
+            <a:schemeClr val="dk1"/>
+          </a:fontRef>
+        </p:style>
+        <p:txBody>
+          <a:bodyPr rtlCol="0" anchor="ctr"/>
+          <a:lstStyle/>
+          <a:p>
+            <a:pPr algn="ctr"/>
+            <a:endParaRPr lang="nl-BE" sz="1000"/>
+          </a:p>
+        </p:txBody>
+      </p:sp>
+      <p:sp>
+        <p:nvSpPr>
+          <p:cNvPr id="99" name="Rechthoek 98"/>
+          <p:cNvSpPr/>
+          <p:nvPr/>
+        </p:nvSpPr>
+        <p:spPr>
+          <a:xfrm>
+            <a:off x="965943" y="5319021"/>
+            <a:ext cx="1530017" cy="90001"/>
+          </a:xfrm>
+          <a:prstGeom prst="rect">
+            <a:avLst/>
+          </a:prstGeom>
+          <a:ln w="19050"/>
+        </p:spPr>
+        <p:style>
+          <a:lnRef idx="2">
+            <a:schemeClr val="accent1"/>
+          </a:lnRef>
+          <a:fillRef idx="1">
+            <a:schemeClr val="lt1"/>
+          </a:fillRef>
+          <a:effectRef idx="0">
+            <a:schemeClr val="accent1"/>
+          </a:effectRef>
+          <a:fontRef idx="minor">
+            <a:schemeClr val="dk1"/>
+          </a:fontRef>
+        </p:style>
+        <p:txBody>
+          <a:bodyPr rtlCol="0" anchor="ctr"/>
+          <a:lstStyle/>
+          <a:p>
+            <a:pPr algn="ctr"/>
+            <a:endParaRPr lang="nl-BE" sz="1000"/>
+          </a:p>
+        </p:txBody>
+      </p:sp>
+      <p:sp>
+        <p:nvSpPr>
+          <p:cNvPr id="100" name="Rechthoek 99"/>
+          <p:cNvSpPr/>
+          <p:nvPr/>
+        </p:nvSpPr>
+        <p:spPr>
+          <a:xfrm>
+            <a:off x="965943" y="5409022"/>
+            <a:ext cx="1530017" cy="90001"/>
+          </a:xfrm>
+          <a:prstGeom prst="rect">
+            <a:avLst/>
+          </a:prstGeom>
+          <a:ln w="19050"/>
+        </p:spPr>
+        <p:style>
+          <a:lnRef idx="2">
+            <a:schemeClr val="accent1"/>
+          </a:lnRef>
+          <a:fillRef idx="1">
+            <a:schemeClr val="lt1"/>
+          </a:fillRef>
+          <a:effectRef idx="0">
+            <a:schemeClr val="accent1"/>
+          </a:effectRef>
+          <a:fontRef idx="minor">
+            <a:schemeClr val="dk1"/>
+          </a:fontRef>
+        </p:style>
+        <p:txBody>
+          <a:bodyPr rtlCol="0" anchor="ctr"/>
+          <a:lstStyle/>
+          <a:p>
+            <a:pPr algn="ctr"/>
+            <a:endParaRPr lang="nl-BE" sz="1000"/>
+          </a:p>
+        </p:txBody>
+      </p:sp>
+      <p:sp>
+        <p:nvSpPr>
+          <p:cNvPr id="102" name="Ruit 101"/>
+          <p:cNvSpPr/>
+          <p:nvPr/>
+        </p:nvSpPr>
+        <p:spPr>
+          <a:xfrm>
+            <a:off x="2945965" y="3519001"/>
+            <a:ext cx="360004" cy="270003"/>
+          </a:xfrm>
+          <a:prstGeom prst="diamond">
+            <a:avLst/>
+          </a:prstGeom>
+          <a:ln w="19050"/>
+        </p:spPr>
+        <p:style>
+          <a:lnRef idx="2">
+            <a:schemeClr val="accent1"/>
+          </a:lnRef>
+          <a:fillRef idx="1">
+            <a:schemeClr val="lt1"/>
+          </a:fillRef>
+          <a:effectRef idx="0">
+            <a:schemeClr val="accent1"/>
+          </a:effectRef>
+          <a:fontRef idx="minor">
+            <a:schemeClr val="dk1"/>
+          </a:fontRef>
+        </p:style>
+        <p:txBody>
+          <a:bodyPr rtlCol="0" anchor="ctr"/>
+          <a:lstStyle/>
+          <a:p>
+            <a:pPr algn="ctr"/>
+            <a:endParaRPr lang="nl-BE"/>
+          </a:p>
+        </p:txBody>
+      </p:sp>
+      <p:cxnSp>
+        <p:nvCxnSpPr>
+          <p:cNvPr id="103" name="Rechte verbindingslijn 102"/>
+          <p:cNvCxnSpPr>
+            <a:stCxn id="79" idx="3"/>
+            <a:endCxn id="102" idx="1"/>
+          </p:cNvCxnSpPr>
+          <p:nvPr/>
+        </p:nvCxnSpPr>
+        <p:spPr>
+          <a:xfrm>
+            <a:off x="2495960" y="3654003"/>
+            <a:ext cx="450005" cy="0"/>
+          </a:xfrm>
+          <a:prstGeom prst="line">
+            <a:avLst/>
+          </a:prstGeom>
+          <a:ln w="19050"/>
+        </p:spPr>
+        <p:style>
+          <a:lnRef idx="1">
+            <a:schemeClr val="accent1"/>
+          </a:lnRef>
+          <a:fillRef idx="0">
+            <a:schemeClr val="accent1"/>
+          </a:fillRef>
+          <a:effectRef idx="0">
+            <a:schemeClr val="accent1"/>
+          </a:effectRef>
+          <a:fontRef idx="minor">
+            <a:schemeClr val="tx1"/>
+          </a:fontRef>
+        </p:style>
+      </p:cxnSp>
+      <p:sp>
+        <p:nvSpPr>
+          <p:cNvPr id="104" name="Ruit 103"/>
+          <p:cNvSpPr/>
+          <p:nvPr/>
+        </p:nvSpPr>
+        <p:spPr>
+          <a:xfrm>
+            <a:off x="2945965" y="4059007"/>
+            <a:ext cx="360004" cy="270003"/>
+          </a:xfrm>
+          <a:prstGeom prst="diamond">
+            <a:avLst/>
+          </a:prstGeom>
+          <a:ln w="19050"/>
+        </p:spPr>
+        <p:style>
+          <a:lnRef idx="2">
+            <a:schemeClr val="accent1"/>
+          </a:lnRef>
+          <a:fillRef idx="1">
+            <a:schemeClr val="lt1"/>
+          </a:fillRef>
+          <a:effectRef idx="0">
+            <a:schemeClr val="accent1"/>
+          </a:effectRef>
+          <a:fontRef idx="minor">
+            <a:schemeClr val="dk1"/>
+          </a:fontRef>
+        </p:style>
+        <p:txBody>
+          <a:bodyPr rtlCol="0" anchor="ctr"/>
+          <a:lstStyle/>
+          <a:p>
+            <a:pPr algn="ctr"/>
+            <a:endParaRPr lang="nl-BE"/>
+          </a:p>
+        </p:txBody>
+      </p:sp>
+      <p:sp>
+        <p:nvSpPr>
+          <p:cNvPr id="105" name="Ruit 104"/>
+          <p:cNvSpPr/>
+          <p:nvPr/>
+        </p:nvSpPr>
+        <p:spPr>
+          <a:xfrm>
+            <a:off x="2945965" y="4599013"/>
+            <a:ext cx="360004" cy="270003"/>
+          </a:xfrm>
+          <a:prstGeom prst="diamond">
+            <a:avLst/>
+          </a:prstGeom>
+          <a:ln w="19050"/>
+        </p:spPr>
+        <p:style>
+          <a:lnRef idx="2">
+            <a:schemeClr val="accent1"/>
+          </a:lnRef>
+          <a:fillRef idx="1">
+            <a:schemeClr val="lt1"/>
+          </a:fillRef>
+          <a:effectRef idx="0">
+            <a:schemeClr val="accent1"/>
+          </a:effectRef>
+          <a:fontRef idx="minor">
+            <a:schemeClr val="dk1"/>
+          </a:fontRef>
+        </p:style>
+        <p:txBody>
+          <a:bodyPr rtlCol="0" anchor="ctr"/>
+          <a:lstStyle/>
+          <a:p>
+            <a:pPr algn="ctr"/>
+            <a:endParaRPr lang="nl-BE"/>
+          </a:p>
+        </p:txBody>
+      </p:sp>
+      <p:sp>
+        <p:nvSpPr>
+          <p:cNvPr id="106" name="Ruit 105"/>
+          <p:cNvSpPr/>
+          <p:nvPr/>
+        </p:nvSpPr>
+        <p:spPr>
+          <a:xfrm>
+            <a:off x="2945965" y="5139019"/>
+            <a:ext cx="360004" cy="270003"/>
+          </a:xfrm>
+          <a:prstGeom prst="diamond">
+            <a:avLst/>
+          </a:prstGeom>
+          <a:ln w="19050"/>
+        </p:spPr>
+        <p:style>
+          <a:lnRef idx="2">
+            <a:schemeClr val="accent1"/>
+          </a:lnRef>
+          <a:fillRef idx="1">
+            <a:schemeClr val="lt1"/>
+          </a:fillRef>
+          <a:effectRef idx="0">
+            <a:schemeClr val="accent1"/>
+          </a:effectRef>
+          <a:fontRef idx="minor">
+            <a:schemeClr val="dk1"/>
+          </a:fontRef>
+        </p:style>
+        <p:txBody>
+          <a:bodyPr rtlCol="0" anchor="ctr"/>
+          <a:lstStyle/>
+          <a:p>
+            <a:pPr algn="ctr"/>
+            <a:endParaRPr lang="nl-BE"/>
+          </a:p>
+        </p:txBody>
+      </p:sp>
+      <p:cxnSp>
+        <p:nvCxnSpPr>
+          <p:cNvPr id="107" name="Rechte verbindingslijn 106"/>
+          <p:cNvCxnSpPr>
+            <a:stCxn id="85" idx="3"/>
+            <a:endCxn id="104" idx="1"/>
+          </p:cNvCxnSpPr>
+          <p:nvPr/>
+        </p:nvCxnSpPr>
+        <p:spPr>
+          <a:xfrm>
+            <a:off x="2495960" y="4194009"/>
+            <a:ext cx="450005" cy="0"/>
+          </a:xfrm>
+          <a:prstGeom prst="line">
+            <a:avLst/>
+          </a:prstGeom>
+          <a:ln w="19050"/>
+        </p:spPr>
+        <p:style>
+          <a:lnRef idx="1">
+            <a:schemeClr val="accent1"/>
+          </a:lnRef>
+          <a:fillRef idx="0">
+            <a:schemeClr val="accent1"/>
+          </a:fillRef>
+          <a:effectRef idx="0">
+            <a:schemeClr val="accent1"/>
+          </a:effectRef>
+          <a:fontRef idx="minor">
+            <a:schemeClr val="tx1"/>
+          </a:fontRef>
+        </p:style>
+      </p:cxnSp>
+      <p:cxnSp>
+        <p:nvCxnSpPr>
+          <p:cNvPr id="108" name="Rechte verbindingslijn 107"/>
+          <p:cNvCxnSpPr>
+            <a:stCxn id="86" idx="3"/>
+            <a:endCxn id="105" idx="1"/>
+          </p:cNvCxnSpPr>
+          <p:nvPr/>
+        </p:nvCxnSpPr>
+        <p:spPr>
+          <a:xfrm>
+            <a:off x="2495960" y="4734015"/>
+            <a:ext cx="450005" cy="0"/>
+          </a:xfrm>
+          <a:prstGeom prst="line">
+            <a:avLst/>
+          </a:prstGeom>
+          <a:ln w="19050"/>
+        </p:spPr>
+        <p:style>
+          <a:lnRef idx="1">
+            <a:schemeClr val="accent1"/>
+          </a:lnRef>
+          <a:fillRef idx="0">
+            <a:schemeClr val="accent1"/>
+          </a:fillRef>
+          <a:effectRef idx="0">
+            <a:schemeClr val="accent1"/>
+          </a:effectRef>
+          <a:fontRef idx="minor">
+            <a:schemeClr val="tx1"/>
+          </a:fontRef>
+        </p:style>
+      </p:cxnSp>
+      <p:cxnSp>
+        <p:nvCxnSpPr>
+          <p:cNvPr id="110" name="Rechte verbindingslijn 109"/>
+          <p:cNvCxnSpPr>
+            <a:stCxn id="90" idx="3"/>
+            <a:endCxn id="106" idx="1"/>
+          </p:cNvCxnSpPr>
+          <p:nvPr/>
+        </p:nvCxnSpPr>
+        <p:spPr>
+          <a:xfrm>
+            <a:off x="2495960" y="5274021"/>
+            <a:ext cx="450005" cy="0"/>
+          </a:xfrm>
+          <a:prstGeom prst="line">
+            <a:avLst/>
+          </a:prstGeom>
+          <a:ln w="19050"/>
+        </p:spPr>
+        <p:style>
+          <a:lnRef idx="1">
+            <a:schemeClr val="accent1"/>
+          </a:lnRef>
+          <a:fillRef idx="0">
+            <a:schemeClr val="accent1"/>
+          </a:fillRef>
+          <a:effectRef idx="0">
+            <a:schemeClr val="accent1"/>
+          </a:effectRef>
+          <a:fontRef idx="minor">
+            <a:schemeClr val="tx1"/>
+          </a:fontRef>
+        </p:style>
+      </p:cxnSp>
+      <p:sp>
+        <p:nvSpPr>
+          <p:cNvPr id="112" name="Tekstvak 111"/>
+          <p:cNvSpPr txBox="1"/>
+          <p:nvPr/>
+        </p:nvSpPr>
+        <p:spPr>
+          <a:xfrm>
+            <a:off x="2495960" y="3609002"/>
+            <a:ext cx="450005" cy="178235"/>
+          </a:xfrm>
+          <a:prstGeom prst="rect">
+            <a:avLst/>
+          </a:prstGeom>
+          <a:noFill/>
+          <a:ln w="19050">
+            <a:noFill/>
+          </a:ln>
+        </p:spPr>
+        <p:style>
+          <a:lnRef idx="2">
+            <a:schemeClr val="accent1"/>
+          </a:lnRef>
+          <a:fillRef idx="1">
+            <a:schemeClr val="lt1"/>
+          </a:fillRef>
+          <a:effectRef idx="0">
+            <a:schemeClr val="accent1"/>
+          </a:effectRef>
+          <a:fontRef idx="minor">
+            <a:schemeClr val="dk1"/>
+          </a:fontRef>
+        </p:style>
+        <p:txBody>
+          <a:bodyPr wrap="none" rtlCol="0">
+            <a:noAutofit/>
+          </a:bodyPr>
+          <a:lstStyle/>
+          <a:p>
+            <a:pPr algn="ctr"/>
+            <a:r>
+              <a:rPr lang="nl-BE" sz="900" dirty="0" err="1">
+                <a:solidFill>
+                  <a:schemeClr val="tx1"/>
+                </a:solidFill>
+              </a:rPr>
+              <a:t>Assign</a:t>
+            </a:r>
+            <a:endParaRPr lang="nl-BE" sz="900" dirty="0">
+              <a:solidFill>
+                <a:schemeClr val="tx1"/>
+              </a:solidFill>
+            </a:endParaRPr>
+          </a:p>
+        </p:txBody>
+      </p:sp>
+      <p:sp>
+        <p:nvSpPr>
+          <p:cNvPr id="113" name="Tekstvak 112"/>
+          <p:cNvSpPr txBox="1"/>
+          <p:nvPr/>
+        </p:nvSpPr>
+        <p:spPr>
+          <a:xfrm>
+            <a:off x="2495960" y="4150775"/>
+            <a:ext cx="450005" cy="178235"/>
+          </a:xfrm>
+          <a:prstGeom prst="rect">
+            <a:avLst/>
+          </a:prstGeom>
+          <a:noFill/>
+          <a:ln w="19050">
+            <a:noFill/>
+          </a:ln>
+        </p:spPr>
+        <p:style>
+          <a:lnRef idx="2">
+            <a:schemeClr val="accent1"/>
+          </a:lnRef>
+          <a:fillRef idx="1">
+            <a:schemeClr val="lt1"/>
+          </a:fillRef>
+          <a:effectRef idx="0">
+            <a:schemeClr val="accent1"/>
+          </a:effectRef>
+          <a:fontRef idx="minor">
+            <a:schemeClr val="dk1"/>
+          </a:fontRef>
+        </p:style>
+        <p:txBody>
+          <a:bodyPr wrap="none" rtlCol="0">
+            <a:noAutofit/>
+          </a:bodyPr>
+          <a:lstStyle/>
+          <a:p>
+            <a:pPr algn="ctr"/>
+            <a:r>
+              <a:rPr lang="nl-BE" sz="900" dirty="0" err="1">
+                <a:solidFill>
+                  <a:schemeClr val="tx1"/>
+                </a:solidFill>
+              </a:rPr>
+              <a:t>Assign</a:t>
+            </a:r>
+            <a:endParaRPr lang="nl-BE" sz="900" dirty="0">
+              <a:solidFill>
+                <a:schemeClr val="tx1"/>
+              </a:solidFill>
+            </a:endParaRPr>
+          </a:p>
+        </p:txBody>
+      </p:sp>
+      <p:sp>
+        <p:nvSpPr>
+          <p:cNvPr id="114" name="Tekstvak 113"/>
+          <p:cNvSpPr txBox="1"/>
+          <p:nvPr/>
+        </p:nvSpPr>
+        <p:spPr>
+          <a:xfrm>
+            <a:off x="2495960" y="4689014"/>
+            <a:ext cx="450005" cy="178235"/>
+          </a:xfrm>
+          <a:prstGeom prst="rect">
+            <a:avLst/>
+          </a:prstGeom>
+          <a:noFill/>
+          <a:ln w="19050">
+            <a:noFill/>
+          </a:ln>
+        </p:spPr>
+        <p:style>
+          <a:lnRef idx="2">
+            <a:schemeClr val="accent1"/>
+          </a:lnRef>
+          <a:fillRef idx="1">
+            <a:schemeClr val="lt1"/>
+          </a:fillRef>
+          <a:effectRef idx="0">
+            <a:schemeClr val="accent1"/>
+          </a:effectRef>
+          <a:fontRef idx="minor">
+            <a:schemeClr val="dk1"/>
+          </a:fontRef>
+        </p:style>
+        <p:txBody>
+          <a:bodyPr wrap="none" rtlCol="0">
+            <a:noAutofit/>
+          </a:bodyPr>
+          <a:lstStyle/>
+          <a:p>
+            <a:pPr algn="ctr"/>
+            <a:r>
+              <a:rPr lang="nl-BE" sz="900" dirty="0" err="1">
+                <a:solidFill>
+                  <a:schemeClr val="tx1"/>
+                </a:solidFill>
+              </a:rPr>
+              <a:t>Assign</a:t>
+            </a:r>
+            <a:endParaRPr lang="nl-BE" sz="900" dirty="0">
+              <a:solidFill>
+                <a:schemeClr val="tx1"/>
+              </a:solidFill>
+            </a:endParaRPr>
+          </a:p>
+        </p:txBody>
+      </p:sp>
+      <p:sp>
+        <p:nvSpPr>
+          <p:cNvPr id="118" name="Tekstvak 117"/>
+          <p:cNvSpPr txBox="1"/>
+          <p:nvPr/>
+        </p:nvSpPr>
+        <p:spPr>
+          <a:xfrm>
+            <a:off x="2495960" y="5229020"/>
+            <a:ext cx="450005" cy="178235"/>
+          </a:xfrm>
+          <a:prstGeom prst="rect">
+            <a:avLst/>
+          </a:prstGeom>
+          <a:noFill/>
+          <a:ln w="19050">
+            <a:noFill/>
+          </a:ln>
+        </p:spPr>
+        <p:style>
+          <a:lnRef idx="2">
+            <a:schemeClr val="accent1"/>
+          </a:lnRef>
+          <a:fillRef idx="1">
+            <a:schemeClr val="lt1"/>
+          </a:fillRef>
+          <a:effectRef idx="0">
+            <a:schemeClr val="accent1"/>
+          </a:effectRef>
+          <a:fontRef idx="minor">
+            <a:schemeClr val="dk1"/>
+          </a:fontRef>
+        </p:style>
+        <p:txBody>
+          <a:bodyPr wrap="none" rtlCol="0">
+            <a:noAutofit/>
+          </a:bodyPr>
+          <a:lstStyle/>
+          <a:p>
+            <a:pPr algn="ctr"/>
+            <a:r>
+              <a:rPr lang="nl-BE" sz="900" dirty="0" err="1">
+                <a:solidFill>
+                  <a:schemeClr val="tx1"/>
+                </a:solidFill>
+              </a:rPr>
+              <a:t>Assign</a:t>
+            </a:r>
+            <a:endParaRPr lang="nl-BE" sz="900" dirty="0">
+              <a:solidFill>
+                <a:schemeClr val="tx1"/>
+              </a:solidFill>
+            </a:endParaRPr>
+          </a:p>
+        </p:txBody>
+      </p:sp>
+      <p:sp>
+        <p:nvSpPr>
+          <p:cNvPr id="121" name="Tekstvak 120"/>
+          <p:cNvSpPr txBox="1"/>
+          <p:nvPr/>
+        </p:nvSpPr>
+        <p:spPr>
+          <a:xfrm>
+            <a:off x="5195990" y="4689014"/>
+            <a:ext cx="450005" cy="178235"/>
+          </a:xfrm>
+          <a:prstGeom prst="rect">
+            <a:avLst/>
+          </a:prstGeom>
+          <a:noFill/>
+          <a:ln w="19050">
+            <a:noFill/>
+          </a:ln>
+        </p:spPr>
+        <p:style>
+          <a:lnRef idx="2">
+            <a:schemeClr val="accent1"/>
+          </a:lnRef>
+          <a:fillRef idx="1">
+            <a:schemeClr val="lt1"/>
+          </a:fillRef>
+          <a:effectRef idx="0">
+            <a:schemeClr val="accent1"/>
+          </a:effectRef>
+          <a:fontRef idx="minor">
+            <a:schemeClr val="dk1"/>
+          </a:fontRef>
+        </p:style>
+        <p:txBody>
+          <a:bodyPr wrap="none" rtlCol="0">
+            <a:noAutofit/>
+          </a:bodyPr>
+          <a:lstStyle/>
+          <a:p>
+            <a:pPr algn="ctr"/>
+            <a:r>
+              <a:rPr lang="nl-BE" sz="900" dirty="0">
+                <a:solidFill>
+                  <a:schemeClr val="tx1"/>
+                </a:solidFill>
+              </a:rPr>
+              <a:t>Template</a:t>
+            </a:r>
+          </a:p>
+        </p:txBody>
+      </p:sp>
+      <p:sp>
+        <p:nvSpPr>
+          <p:cNvPr id="129" name="Tekstvak 128"/>
+          <p:cNvSpPr txBox="1"/>
+          <p:nvPr/>
+        </p:nvSpPr>
+        <p:spPr>
+          <a:xfrm>
+            <a:off x="5375992" y="4509012"/>
+            <a:ext cx="270004" cy="270003"/>
+          </a:xfrm>
+          <a:prstGeom prst="rect">
+            <a:avLst/>
+          </a:prstGeom>
+          <a:noFill/>
+          <a:ln w="19050">
+            <a:noFill/>
+          </a:ln>
+        </p:spPr>
+        <p:style>
+          <a:lnRef idx="2">
+            <a:schemeClr val="accent1"/>
+          </a:lnRef>
+          <a:fillRef idx="1">
+            <a:schemeClr val="lt1"/>
+          </a:fillRef>
+          <a:effectRef idx="0">
+            <a:schemeClr val="accent1"/>
+          </a:effectRef>
+          <a:fontRef idx="minor">
+            <a:schemeClr val="dk1"/>
+          </a:fontRef>
+        </p:style>
+        <p:txBody>
+          <a:bodyPr wrap="none" rtlCol="0" anchor="ctr">
+            <a:noAutofit/>
+          </a:bodyPr>
+          <a:lstStyle/>
+          <a:p>
+            <a:pPr algn="ctr"/>
+            <a:r>
+              <a:rPr lang="nl-BE" sz="1200" dirty="0">
+                <a:solidFill>
+                  <a:schemeClr val="tx1"/>
+                </a:solidFill>
+              </a:rPr>
+              <a:t>0..1</a:t>
+            </a:r>
+          </a:p>
+        </p:txBody>
+      </p:sp>
+      <p:sp>
+        <p:nvSpPr>
+          <p:cNvPr id="132" name="Tekstvak 131"/>
+          <p:cNvSpPr txBox="1"/>
+          <p:nvPr/>
+        </p:nvSpPr>
+        <p:spPr>
+          <a:xfrm>
+            <a:off x="2495960" y="5049018"/>
+            <a:ext cx="270004" cy="270003"/>
+          </a:xfrm>
+          <a:prstGeom prst="rect">
+            <a:avLst/>
+          </a:prstGeom>
+          <a:noFill/>
+          <a:ln w="19050">
+            <a:noFill/>
+          </a:ln>
+        </p:spPr>
+        <p:style>
+          <a:lnRef idx="2">
+            <a:schemeClr val="accent1"/>
+          </a:lnRef>
+          <a:fillRef idx="1">
+            <a:schemeClr val="lt1"/>
+          </a:fillRef>
+          <a:effectRef idx="0">
+            <a:schemeClr val="accent1"/>
+          </a:effectRef>
+          <a:fontRef idx="minor">
+            <a:schemeClr val="dk1"/>
+          </a:fontRef>
+        </p:style>
+        <p:txBody>
+          <a:bodyPr wrap="none" rtlCol="0" anchor="ctr">
+            <a:noAutofit/>
+          </a:bodyPr>
+          <a:lstStyle/>
+          <a:p>
+            <a:pPr algn="ctr"/>
+            <a:r>
+              <a:rPr lang="nl-BE" sz="1200" dirty="0">
+                <a:solidFill>
+                  <a:schemeClr val="tx1"/>
+                </a:solidFill>
+              </a:rPr>
+              <a:t>1..*</a:t>
+            </a:r>
+          </a:p>
+        </p:txBody>
+      </p:sp>
+      <p:sp>
+        <p:nvSpPr>
+          <p:cNvPr id="133" name="Tekstvak 132"/>
+          <p:cNvSpPr txBox="1"/>
+          <p:nvPr/>
+        </p:nvSpPr>
+        <p:spPr>
+          <a:xfrm>
+            <a:off x="2495960" y="4509012"/>
+            <a:ext cx="270004" cy="270003"/>
+          </a:xfrm>
+          <a:prstGeom prst="rect">
+            <a:avLst/>
+          </a:prstGeom>
+          <a:noFill/>
+          <a:ln w="19050">
+            <a:noFill/>
+          </a:ln>
+        </p:spPr>
+        <p:style>
+          <a:lnRef idx="2">
+            <a:schemeClr val="accent1"/>
+          </a:lnRef>
+          <a:fillRef idx="1">
+            <a:schemeClr val="lt1"/>
+          </a:fillRef>
+          <a:effectRef idx="0">
+            <a:schemeClr val="accent1"/>
+          </a:effectRef>
+          <a:fontRef idx="minor">
+            <a:schemeClr val="dk1"/>
+          </a:fontRef>
+        </p:style>
+        <p:txBody>
+          <a:bodyPr wrap="none" rtlCol="0" anchor="ctr">
+            <a:noAutofit/>
+          </a:bodyPr>
+          <a:lstStyle/>
+          <a:p>
+            <a:pPr algn="ctr"/>
+            <a:r>
+              <a:rPr lang="nl-BE" sz="1200" dirty="0">
+                <a:solidFill>
+                  <a:schemeClr val="tx1"/>
+                </a:solidFill>
+              </a:rPr>
+              <a:t>1..*</a:t>
+            </a:r>
+          </a:p>
+        </p:txBody>
+      </p:sp>
+      <p:sp>
+        <p:nvSpPr>
+          <p:cNvPr id="135" name="Tekstvak 134"/>
+          <p:cNvSpPr txBox="1"/>
+          <p:nvPr/>
+        </p:nvSpPr>
+        <p:spPr>
+          <a:xfrm>
+            <a:off x="2495960" y="3969006"/>
+            <a:ext cx="270004" cy="270003"/>
+          </a:xfrm>
+          <a:prstGeom prst="rect">
+            <a:avLst/>
+          </a:prstGeom>
+          <a:noFill/>
+          <a:ln w="19050">
+            <a:noFill/>
+          </a:ln>
+        </p:spPr>
+        <p:style>
+          <a:lnRef idx="2">
+            <a:schemeClr val="accent1"/>
+          </a:lnRef>
+          <a:fillRef idx="1">
+            <a:schemeClr val="lt1"/>
+          </a:fillRef>
+          <a:effectRef idx="0">
+            <a:schemeClr val="accent1"/>
+          </a:effectRef>
+          <a:fontRef idx="minor">
+            <a:schemeClr val="dk1"/>
+          </a:fontRef>
+        </p:style>
+        <p:txBody>
+          <a:bodyPr wrap="none" rtlCol="0" anchor="ctr">
+            <a:noAutofit/>
+          </a:bodyPr>
+          <a:lstStyle/>
+          <a:p>
+            <a:pPr algn="ctr"/>
+            <a:r>
+              <a:rPr lang="nl-BE" sz="1200" dirty="0">
+                <a:solidFill>
+                  <a:schemeClr val="tx1"/>
+                </a:solidFill>
+              </a:rPr>
+              <a:t>1..*</a:t>
+            </a:r>
+          </a:p>
+        </p:txBody>
+      </p:sp>
+      <p:sp>
+        <p:nvSpPr>
+          <p:cNvPr id="136" name="Tekstvak 135"/>
+          <p:cNvSpPr txBox="1"/>
+          <p:nvPr/>
+        </p:nvSpPr>
+        <p:spPr>
+          <a:xfrm>
+            <a:off x="2495960" y="3429000"/>
+            <a:ext cx="270004" cy="270003"/>
+          </a:xfrm>
+          <a:prstGeom prst="rect">
+            <a:avLst/>
+          </a:prstGeom>
+          <a:noFill/>
+          <a:ln w="19050">
+            <a:noFill/>
+          </a:ln>
+        </p:spPr>
+        <p:style>
+          <a:lnRef idx="2">
+            <a:schemeClr val="accent1"/>
+          </a:lnRef>
+          <a:fillRef idx="1">
+            <a:schemeClr val="lt1"/>
+          </a:fillRef>
+          <a:effectRef idx="0">
+            <a:schemeClr val="accent1"/>
+          </a:effectRef>
+          <a:fontRef idx="minor">
+            <a:schemeClr val="dk1"/>
+          </a:fontRef>
+        </p:style>
+        <p:txBody>
+          <a:bodyPr wrap="none" rtlCol="0" anchor="ctr">
+            <a:noAutofit/>
+          </a:bodyPr>
+          <a:lstStyle/>
+          <a:p>
+            <a:pPr algn="ctr"/>
+            <a:r>
+              <a:rPr lang="nl-BE" sz="1200" dirty="0">
+                <a:solidFill>
+                  <a:schemeClr val="tx1"/>
+                </a:solidFill>
+              </a:rPr>
+              <a:t>1..*</a:t>
+            </a:r>
+          </a:p>
+        </p:txBody>
+      </p:sp>
+      <p:grpSp>
+        <p:nvGrpSpPr>
+          <p:cNvPr id="6" name="Groep 5"/>
+          <p:cNvGrpSpPr/>
+          <p:nvPr/>
+        </p:nvGrpSpPr>
+        <p:grpSpPr>
+          <a:xfrm>
+            <a:off x="8076022" y="4329009"/>
+            <a:ext cx="1530017" cy="630008"/>
+            <a:chOff x="8076022" y="4340259"/>
+            <a:chExt cx="1530017" cy="708759"/>
+          </a:xfrm>
+        </p:grpSpPr>
+        <p:sp>
+          <p:nvSpPr>
+            <p:cNvPr id="137" name="Rechthoek 136"/>
+            <p:cNvSpPr/>
+            <p:nvPr/>
+          </p:nvSpPr>
+          <p:spPr>
+            <a:xfrm>
+              <a:off x="8076022" y="4340259"/>
+              <a:ext cx="1530017" cy="708758"/>
+            </a:xfrm>
+            <a:prstGeom prst="rect">
+              <a:avLst/>
+            </a:prstGeom>
+            <a:ln w="19050"/>
+          </p:spPr>
+          <p:style>
+            <a:lnRef idx="2">
+              <a:schemeClr val="accent1"/>
+            </a:lnRef>
+            <a:fillRef idx="1">
+              <a:schemeClr val="lt1"/>
+            </a:fillRef>
+            <a:effectRef idx="0">
+              <a:schemeClr val="accent1"/>
+            </a:effectRef>
+            <a:fontRef idx="minor">
+              <a:schemeClr val="dk1"/>
+            </a:fontRef>
+          </p:style>
+          <p:txBody>
+            <a:bodyPr rtlCol="0" anchor="t"/>
+            <a:lstStyle/>
+            <a:p>
+              <a:pPr algn="ctr"/>
+              <a:r>
+                <a:rPr lang="nl-BE" sz="1400" dirty="0"/>
+                <a:t>_EVENT_DISPATCHER</a:t>
+              </a:r>
+            </a:p>
+          </p:txBody>
+        </p:sp>
+        <p:sp>
+          <p:nvSpPr>
+            <p:cNvPr id="138" name="Rechthoek 137"/>
+            <p:cNvSpPr/>
+            <p:nvPr/>
+          </p:nvSpPr>
+          <p:spPr>
+            <a:xfrm>
+              <a:off x="8076022" y="4869016"/>
+              <a:ext cx="1530017" cy="90001"/>
+            </a:xfrm>
+            <a:prstGeom prst="rect">
+              <a:avLst/>
+            </a:prstGeom>
+            <a:ln w="19050"/>
+          </p:spPr>
+          <p:style>
+            <a:lnRef idx="2">
+              <a:schemeClr val="accent1"/>
+            </a:lnRef>
+            <a:fillRef idx="1">
+              <a:schemeClr val="lt1"/>
+            </a:fillRef>
+            <a:effectRef idx="0">
+              <a:schemeClr val="accent1"/>
+            </a:effectRef>
+            <a:fontRef idx="minor">
+              <a:schemeClr val="dk1"/>
+            </a:fontRef>
+          </p:style>
+          <p:txBody>
+            <a:bodyPr rtlCol="0" anchor="ctr"/>
+            <a:lstStyle/>
+            <a:p>
+              <a:pPr algn="ctr"/>
+              <a:endParaRPr lang="nl-BE" sz="1000"/>
+            </a:p>
+          </p:txBody>
+        </p:sp>
+        <p:sp>
+          <p:nvSpPr>
+            <p:cNvPr id="139" name="Rechthoek 138"/>
+            <p:cNvSpPr/>
+            <p:nvPr/>
+          </p:nvSpPr>
+          <p:spPr>
+            <a:xfrm>
+              <a:off x="8076022" y="4959017"/>
+              <a:ext cx="1530017" cy="90001"/>
+            </a:xfrm>
+            <a:prstGeom prst="rect">
+              <a:avLst/>
+            </a:prstGeom>
+            <a:ln w="19050"/>
+          </p:spPr>
+          <p:style>
+            <a:lnRef idx="2">
+              <a:schemeClr val="accent1"/>
+            </a:lnRef>
+            <a:fillRef idx="1">
+              <a:schemeClr val="lt1"/>
+            </a:fillRef>
+            <a:effectRef idx="0">
+              <a:schemeClr val="accent1"/>
+            </a:effectRef>
+            <a:fontRef idx="minor">
+              <a:schemeClr val="dk1"/>
+            </a:fontRef>
+          </p:style>
+          <p:txBody>
+            <a:bodyPr rtlCol="0" anchor="ctr"/>
+            <a:lstStyle/>
+            <a:p>
+              <a:pPr algn="ctr"/>
+              <a:endParaRPr lang="nl-BE" sz="1000"/>
+            </a:p>
+          </p:txBody>
+        </p:sp>
+      </p:grpSp>
+      <p:cxnSp>
+        <p:nvCxnSpPr>
+          <p:cNvPr id="141" name="Verbindingslijn: gebogen 140"/>
+          <p:cNvCxnSpPr>
+            <a:stCxn id="142" idx="3"/>
+            <a:endCxn id="137" idx="1"/>
+          </p:cNvCxnSpPr>
+          <p:nvPr/>
+        </p:nvCxnSpPr>
+        <p:spPr>
+          <a:xfrm flipV="1">
+            <a:off x="7536016" y="4644013"/>
+            <a:ext cx="540006" cy="90002"/>
+          </a:xfrm>
+          <a:prstGeom prst="bentConnector3">
+            <a:avLst>
+              <a:gd name="adj1" fmla="val 50000"/>
+            </a:avLst>
+          </a:prstGeom>
+          <a:ln w="19050"/>
+        </p:spPr>
+        <p:style>
+          <a:lnRef idx="1">
+            <a:schemeClr val="accent1"/>
+          </a:lnRef>
+          <a:fillRef idx="0">
+            <a:schemeClr val="accent1"/>
+          </a:fillRef>
+          <a:effectRef idx="0">
+            <a:schemeClr val="accent1"/>
+          </a:effectRef>
+          <a:fontRef idx="minor">
+            <a:schemeClr val="tx1"/>
+          </a:fontRef>
+        </p:style>
+      </p:cxnSp>
+      <p:sp>
+        <p:nvSpPr>
+          <p:cNvPr id="142" name="Ruit 141"/>
+          <p:cNvSpPr/>
+          <p:nvPr/>
+        </p:nvSpPr>
+        <p:spPr>
+          <a:xfrm>
+            <a:off x="7176012" y="4599013"/>
+            <a:ext cx="360004" cy="270003"/>
+          </a:xfrm>
+          <a:prstGeom prst="diamond">
+            <a:avLst/>
+          </a:prstGeom>
+          <a:ln w="19050"/>
+        </p:spPr>
+        <p:style>
+          <a:lnRef idx="2">
+            <a:schemeClr val="accent1"/>
+          </a:lnRef>
+          <a:fillRef idx="1">
+            <a:schemeClr val="lt1"/>
+          </a:fillRef>
+          <a:effectRef idx="0">
+            <a:schemeClr val="accent1"/>
+          </a:effectRef>
+          <a:fontRef idx="minor">
+            <a:schemeClr val="dk1"/>
+          </a:fontRef>
+        </p:style>
+        <p:txBody>
+          <a:bodyPr rtlCol="0" anchor="ctr"/>
+          <a:lstStyle/>
+          <a:p>
+            <a:pPr algn="ctr"/>
+            <a:endParaRPr lang="nl-BE"/>
+          </a:p>
+        </p:txBody>
+      </p:sp>
+    </p:spTree>
+    <p:extLst>
+      <p:ext uri="{BB962C8B-B14F-4D97-AF65-F5344CB8AC3E}">
+        <p14:creationId xmlns:p14="http://schemas.microsoft.com/office/powerpoint/2010/main" val="346943778"/>
+      </p:ext>
+    </p:extLst>
+  </p:cSld>
+  <p:clrMapOvr>
+    <a:masterClrMapping/>
+  </p:clrMapOvr>
+  <mc:AlternateContent xmlns:mc="http://schemas.openxmlformats.org/markup-compatibility/2006" xmlns:p159="http://schemas.microsoft.com/office/powerpoint/2015/09/main">
+    <mc:Choice Requires="p159">
+      <p:transition xmlns:p14="http://schemas.microsoft.com/office/powerpoint/2010/main" spd="slow" p14:dur="2000">
+        <p159:morph option="byObject"/>
+      </p:transition>
+    </mc:Choice>
+    <mc:Fallback xmlns="">
+      <p:transition spd="slow">
+        <p:fade/>
+      </p:transition>
+    </mc:Fallback>
+  </mc:AlternateContent>
+</p:sld>
+</file>
+
+<file path=ppt/slides/slide8.xml><?xml version="1.0" encoding="utf-8"?>
+<p:sld xmlns:a="http://schemas.openxmlformats.org/drawingml/2006/main" xmlns:r="http://schemas.openxmlformats.org/officeDocument/2006/relationships" xmlns:p="http://schemas.openxmlformats.org/presentationml/2006/main">
+  <p:cSld>
     <p:spTree>
       <p:nvGrpSpPr>
         <p:cNvPr id="1" name=""/>

</xml_diff>

<commit_message>
Jippie! Finally got the Sub Statemachine declaration understandable for end-users.
Reworked the hierarchical state machine processing in terms of sub
processing.
Now, the declaration and usage of subs is completely understandable and
easy to implement.
I am excited to see how end-users will see the possibilities.
</commit_message>
<xml_diff>
--- a/Moose Training/Presentations/DCS World - MOOSE - Tasking - SEAD.pptx
+++ b/Moose Training/Presentations/DCS World - MOOSE - Tasking - SEAD.pptx
@@ -295,7 +295,7 @@
           <a:p>
             <a:fld id="{96DFF08F-DC6B-4601-B491-B0F83F6DD2DA}" type="datetimeFigureOut">
               <a:rPr lang="en-US" dirty="0"/>
-              <a:t>11/8/2016</a:t>
+              <a:t>11/21/2016</a:t>
             </a:fld>
             <a:endParaRPr lang="en-US" dirty="0"/>
           </a:p>
@@ -529,7 +529,7 @@
           <a:p>
             <a:fld id="{96DFF08F-DC6B-4601-B491-B0F83F6DD2DA}" type="datetimeFigureOut">
               <a:rPr lang="en-US" dirty="0"/>
-              <a:t>11/8/2016</a:t>
+              <a:t>11/21/2016</a:t>
             </a:fld>
             <a:endParaRPr lang="en-US" dirty="0"/>
           </a:p>
@@ -759,7 +759,7 @@
           <a:p>
             <a:fld id="{96DFF08F-DC6B-4601-B491-B0F83F6DD2DA}" type="datetimeFigureOut">
               <a:rPr lang="en-US" dirty="0"/>
-              <a:t>11/8/2016</a:t>
+              <a:t>11/21/2016</a:t>
             </a:fld>
             <a:endParaRPr lang="en-US" dirty="0"/>
           </a:p>
@@ -998,7 +998,7 @@
           <a:p>
             <a:fld id="{96DFF08F-DC6B-4601-B491-B0F83F6DD2DA}" type="datetimeFigureOut">
               <a:rPr lang="en-US" dirty="0"/>
-              <a:t>11/8/2016</a:t>
+              <a:t>11/21/2016</a:t>
             </a:fld>
             <a:endParaRPr lang="en-US" dirty="0"/>
           </a:p>
@@ -1569,7 +1569,7 @@
           <a:p>
             <a:fld id="{96DFF08F-DC6B-4601-B491-B0F83F6DD2DA}" type="datetimeFigureOut">
               <a:rPr lang="en-US" dirty="0"/>
-              <a:t>11/8/2016</a:t>
+              <a:t>11/21/2016</a:t>
             </a:fld>
             <a:endParaRPr lang="en-US" dirty="0"/>
           </a:p>
@@ -1998,7 +1998,7 @@
           <a:p>
             <a:fld id="{96DFF08F-DC6B-4601-B491-B0F83F6DD2DA}" type="datetimeFigureOut">
               <a:rPr lang="en-US" dirty="0"/>
-              <a:t>11/8/2016</a:t>
+              <a:t>11/21/2016</a:t>
             </a:fld>
             <a:endParaRPr lang="en-US" dirty="0"/>
           </a:p>
@@ -2212,7 +2212,7 @@
           <a:p>
             <a:fld id="{96DFF08F-DC6B-4601-B491-B0F83F6DD2DA}" type="datetimeFigureOut">
               <a:rPr lang="en-US" dirty="0"/>
-              <a:t>11/8/2016</a:t>
+              <a:t>11/21/2016</a:t>
             </a:fld>
             <a:endParaRPr lang="en-US" dirty="0"/>
           </a:p>
@@ -2492,7 +2492,7 @@
           <a:p>
             <a:fld id="{96DFF08F-DC6B-4601-B491-B0F83F6DD2DA}" type="datetimeFigureOut">
               <a:rPr lang="en-US" dirty="0"/>
-              <a:t>11/8/2016</a:t>
+              <a:t>11/21/2016</a:t>
             </a:fld>
             <a:endParaRPr lang="en-US" dirty="0"/>
           </a:p>
@@ -2764,7 +2764,7 @@
           <a:p>
             <a:fld id="{96DFF08F-DC6B-4601-B491-B0F83F6DD2DA}" type="datetimeFigureOut">
               <a:rPr lang="en-US" dirty="0"/>
-              <a:t>11/8/2016</a:t>
+              <a:t>11/21/2016</a:t>
             </a:fld>
             <a:endParaRPr lang="en-US" dirty="0"/>
           </a:p>
@@ -3021,7 +3021,7 @@
             <a:fld id="{96DFF08F-DC6B-4601-B491-B0F83F6DD2DA}" type="datetimeFigureOut">
               <a:rPr lang="en-US" dirty="0"/>
               <a:pPr/>
-              <a:t>11/8/2016</a:t>
+              <a:t>11/21/2016</a:t>
             </a:fld>
             <a:endParaRPr lang="en-US" dirty="0"/>
           </a:p>
@@ -6219,201 +6219,132 @@
           <a:chExt cx="0" cy="0"/>
         </a:xfrm>
       </p:grpSpPr>
-      <p:cxnSp>
-        <p:nvCxnSpPr>
-          <p:cNvPr id="4" name="Rechte verbindingslijn 3"/>
-          <p:cNvCxnSpPr/>
-          <p:nvPr/>
-        </p:nvCxnSpPr>
-        <p:spPr>
-          <a:xfrm>
-            <a:off x="0" y="2528990"/>
-            <a:ext cx="12192000" cy="0"/>
-          </a:xfrm>
-          <a:prstGeom prst="line">
-            <a:avLst/>
-          </a:prstGeom>
-          <a:ln w="12700">
-            <a:solidFill>
-              <a:schemeClr val="accent3">
-                <a:lumMod val="40000"/>
-                <a:lumOff val="60000"/>
-              </a:schemeClr>
-            </a:solidFill>
-            <a:prstDash val="dash"/>
-          </a:ln>
-        </p:spPr>
-        <p:style>
-          <a:lnRef idx="2">
-            <a:schemeClr val="dk1"/>
-          </a:lnRef>
-          <a:fillRef idx="0">
-            <a:schemeClr val="dk1"/>
-          </a:fillRef>
-          <a:effectRef idx="1">
-            <a:schemeClr val="dk1"/>
-          </a:effectRef>
-          <a:fontRef idx="minor">
+      <p:sp>
+        <p:nvSpPr>
+          <p:cNvPr id="208" name="Rechthoek 207"/>
+          <p:cNvSpPr/>
+          <p:nvPr/>
+        </p:nvSpPr>
+        <p:spPr>
+          <a:xfrm>
+            <a:off x="5915998" y="2708992"/>
+            <a:ext cx="1980022" cy="540006"/>
+          </a:xfrm>
+          <a:prstGeom prst="rect">
+            <a:avLst/>
+          </a:prstGeom>
+          <a:solidFill>
             <a:schemeClr val="tx1"/>
-          </a:fontRef>
-        </p:style>
-      </p:cxnSp>
-      <p:cxnSp>
-        <p:nvCxnSpPr>
-          <p:cNvPr id="5" name="Rechte verbindingslijn 4"/>
-          <p:cNvCxnSpPr/>
-          <p:nvPr/>
-        </p:nvCxnSpPr>
-        <p:spPr>
-          <a:xfrm>
-            <a:off x="-24000" y="3248992"/>
-            <a:ext cx="12192000" cy="0"/>
-          </a:xfrm>
-          <a:prstGeom prst="line">
-            <a:avLst/>
-          </a:prstGeom>
-          <a:ln w="12700">
-            <a:solidFill>
-              <a:schemeClr val="accent3">
-                <a:lumMod val="40000"/>
-                <a:lumOff val="60000"/>
-              </a:schemeClr>
-            </a:solidFill>
-            <a:prstDash val="dash"/>
-          </a:ln>
-        </p:spPr>
-        <p:style>
-          <a:lnRef idx="2">
-            <a:schemeClr val="dk1"/>
-          </a:lnRef>
-          <a:fillRef idx="0">
-            <a:schemeClr val="dk1"/>
-          </a:fillRef>
-          <a:effectRef idx="1">
-            <a:schemeClr val="dk1"/>
-          </a:effectRef>
-          <a:fontRef idx="minor">
+          </a:solidFill>
+          <a:ln w="28575"/>
+        </p:spPr>
+        <p:style>
+          <a:lnRef idx="2">
+            <a:schemeClr val="accent1"/>
+          </a:lnRef>
+          <a:fillRef idx="1">
+            <a:schemeClr val="lt1"/>
+          </a:fillRef>
+          <a:effectRef idx="0">
+            <a:schemeClr val="accent1"/>
+          </a:effectRef>
+          <a:fontRef idx="minor">
+            <a:schemeClr val="dk1"/>
+          </a:fontRef>
+        </p:style>
+        <p:txBody>
+          <a:bodyPr rtlCol="0" anchor="ctr"/>
+          <a:lstStyle/>
+          <a:p>
+            <a:pPr algn="ctr"/>
+            <a:endParaRPr lang="nl-BE" sz="1000"/>
+          </a:p>
+        </p:txBody>
+      </p:sp>
+      <p:sp>
+        <p:nvSpPr>
+          <p:cNvPr id="207" name="Rechthoek 206"/>
+          <p:cNvSpPr/>
+          <p:nvPr/>
+        </p:nvSpPr>
+        <p:spPr>
+          <a:xfrm>
+            <a:off x="3485971" y="2708992"/>
+            <a:ext cx="900010" cy="540006"/>
+          </a:xfrm>
+          <a:prstGeom prst="rect">
+            <a:avLst/>
+          </a:prstGeom>
+          <a:solidFill>
             <a:schemeClr val="tx1"/>
-          </a:fontRef>
-        </p:style>
-      </p:cxnSp>
-      <p:cxnSp>
-        <p:nvCxnSpPr>
-          <p:cNvPr id="62" name="Rechte verbindingslijn 61"/>
-          <p:cNvCxnSpPr/>
-          <p:nvPr/>
-        </p:nvCxnSpPr>
-        <p:spPr>
-          <a:xfrm>
-            <a:off x="-24000" y="3968992"/>
-            <a:ext cx="12192000" cy="0"/>
-          </a:xfrm>
-          <a:prstGeom prst="line">
-            <a:avLst/>
-          </a:prstGeom>
-          <a:ln w="12700">
-            <a:solidFill>
-              <a:schemeClr val="accent3">
-                <a:lumMod val="40000"/>
-                <a:lumOff val="60000"/>
-              </a:schemeClr>
-            </a:solidFill>
-            <a:prstDash val="dash"/>
-          </a:ln>
-        </p:spPr>
-        <p:style>
-          <a:lnRef idx="2">
-            <a:schemeClr val="dk1"/>
-          </a:lnRef>
-          <a:fillRef idx="0">
-            <a:schemeClr val="dk1"/>
-          </a:fillRef>
-          <a:effectRef idx="1">
-            <a:schemeClr val="dk1"/>
-          </a:effectRef>
-          <a:fontRef idx="minor">
+          </a:solidFill>
+          <a:ln w="28575"/>
+        </p:spPr>
+        <p:style>
+          <a:lnRef idx="2">
+            <a:schemeClr val="accent1"/>
+          </a:lnRef>
+          <a:fillRef idx="1">
+            <a:schemeClr val="lt1"/>
+          </a:fillRef>
+          <a:effectRef idx="0">
+            <a:schemeClr val="accent1"/>
+          </a:effectRef>
+          <a:fontRef idx="minor">
+            <a:schemeClr val="dk1"/>
+          </a:fontRef>
+        </p:style>
+        <p:txBody>
+          <a:bodyPr rtlCol="0" anchor="ctr"/>
+          <a:lstStyle/>
+          <a:p>
+            <a:pPr algn="ctr"/>
+            <a:endParaRPr lang="nl-BE" sz="1000"/>
+          </a:p>
+        </p:txBody>
+      </p:sp>
+      <p:sp>
+        <p:nvSpPr>
+          <p:cNvPr id="206" name="Rechthoek 205"/>
+          <p:cNvSpPr/>
+          <p:nvPr/>
+        </p:nvSpPr>
+        <p:spPr>
+          <a:xfrm>
+            <a:off x="2045955" y="2708992"/>
+            <a:ext cx="900010" cy="540006"/>
+          </a:xfrm>
+          <a:prstGeom prst="rect">
+            <a:avLst/>
+          </a:prstGeom>
+          <a:solidFill>
             <a:schemeClr val="tx1"/>
-          </a:fontRef>
-        </p:style>
-      </p:cxnSp>
-      <p:cxnSp>
-        <p:nvCxnSpPr>
-          <p:cNvPr id="67" name="Rechte verbindingslijn 66"/>
-          <p:cNvCxnSpPr/>
-          <p:nvPr/>
-        </p:nvCxnSpPr>
-        <p:spPr>
-          <a:xfrm>
-            <a:off x="-24000" y="4688992"/>
-            <a:ext cx="12192000" cy="0"/>
-          </a:xfrm>
-          <a:prstGeom prst="line">
-            <a:avLst/>
-          </a:prstGeom>
-          <a:ln w="12700">
-            <a:solidFill>
-              <a:schemeClr val="accent3">
-                <a:lumMod val="40000"/>
-                <a:lumOff val="60000"/>
-              </a:schemeClr>
-            </a:solidFill>
-            <a:prstDash val="dash"/>
-          </a:ln>
-        </p:spPr>
-        <p:style>
-          <a:lnRef idx="2">
-            <a:schemeClr val="dk1"/>
-          </a:lnRef>
-          <a:fillRef idx="0">
-            <a:schemeClr val="dk1"/>
-          </a:fillRef>
-          <a:effectRef idx="1">
-            <a:schemeClr val="dk1"/>
-          </a:effectRef>
-          <a:fontRef idx="minor">
-            <a:schemeClr val="tx1"/>
-          </a:fontRef>
-        </p:style>
-      </p:cxnSp>
-      <p:cxnSp>
-        <p:nvCxnSpPr>
-          <p:cNvPr id="148" name="Rechte verbindingslijn 147"/>
-          <p:cNvCxnSpPr/>
-          <p:nvPr/>
-        </p:nvCxnSpPr>
-        <p:spPr>
-          <a:xfrm>
-            <a:off x="24068" y="5409020"/>
-            <a:ext cx="12192000" cy="0"/>
-          </a:xfrm>
-          <a:prstGeom prst="line">
-            <a:avLst/>
-          </a:prstGeom>
-          <a:ln w="12700">
-            <a:solidFill>
-              <a:schemeClr val="accent3">
-                <a:lumMod val="40000"/>
-                <a:lumOff val="60000"/>
-              </a:schemeClr>
-            </a:solidFill>
-            <a:prstDash val="dash"/>
-          </a:ln>
-        </p:spPr>
-        <p:style>
-          <a:lnRef idx="2">
-            <a:schemeClr val="dk1"/>
-          </a:lnRef>
-          <a:fillRef idx="0">
-            <a:schemeClr val="dk1"/>
-          </a:fillRef>
-          <a:effectRef idx="1">
-            <a:schemeClr val="dk1"/>
-          </a:effectRef>
-          <a:fontRef idx="minor">
-            <a:schemeClr val="tx1"/>
-          </a:fontRef>
-        </p:style>
-      </p:cxnSp>
+          </a:solidFill>
+          <a:ln w="28575"/>
+        </p:spPr>
+        <p:style>
+          <a:lnRef idx="2">
+            <a:schemeClr val="accent1"/>
+          </a:lnRef>
+          <a:fillRef idx="1">
+            <a:schemeClr val="lt1"/>
+          </a:fillRef>
+          <a:effectRef idx="0">
+            <a:schemeClr val="accent1"/>
+          </a:effectRef>
+          <a:fontRef idx="minor">
+            <a:schemeClr val="dk1"/>
+          </a:fontRef>
+        </p:style>
+        <p:txBody>
+          <a:bodyPr rtlCol="0" anchor="ctr"/>
+          <a:lstStyle/>
+          <a:p>
+            <a:pPr algn="ctr"/>
+            <a:endParaRPr lang="nl-BE" sz="1000"/>
+          </a:p>
+        </p:txBody>
+      </p:sp>
       <p:sp>
         <p:nvSpPr>
           <p:cNvPr id="2" name="Titel 1"/>
@@ -6451,102 +6382,6 @@
               <a:t>components</a:t>
             </a:r>
             <a:endParaRPr lang="nl-BE" dirty="0"/>
-          </a:p>
-        </p:txBody>
-      </p:sp>
-      <p:sp>
-        <p:nvSpPr>
-          <p:cNvPr id="6" name="Afgeronde rechthoek 11"/>
-          <p:cNvSpPr/>
-          <p:nvPr/>
-        </p:nvSpPr>
-        <p:spPr>
-          <a:xfrm>
-            <a:off x="3936000" y="1989000"/>
-            <a:ext cx="720000" cy="360004"/>
-          </a:xfrm>
-          <a:prstGeom prst="roundRect">
-            <a:avLst/>
-          </a:prstGeom>
-          <a:solidFill>
-            <a:schemeClr val="bg2">
-              <a:lumMod val="40000"/>
-              <a:lumOff val="60000"/>
-            </a:schemeClr>
-          </a:solidFill>
-          <a:ln w="28575"/>
-        </p:spPr>
-        <p:style>
-          <a:lnRef idx="2">
-            <a:schemeClr val="accent1"/>
-          </a:lnRef>
-          <a:fillRef idx="1">
-            <a:schemeClr val="lt1"/>
-          </a:fillRef>
-          <a:effectRef idx="0">
-            <a:schemeClr val="accent1"/>
-          </a:effectRef>
-          <a:fontRef idx="minor">
-            <a:schemeClr val="dk1"/>
-          </a:fontRef>
-        </p:style>
-        <p:txBody>
-          <a:bodyPr rtlCol="0" anchor="ctr"/>
-          <a:lstStyle/>
-          <a:p>
-            <a:pPr algn="ctr"/>
-            <a:r>
-              <a:rPr lang="nl-BE" sz="1000" dirty="0"/>
-              <a:t>Next</a:t>
-            </a:r>
-          </a:p>
-        </p:txBody>
-      </p:sp>
-      <p:sp>
-        <p:nvSpPr>
-          <p:cNvPr id="8" name="Afgeronde rechthoek 65"/>
-          <p:cNvSpPr/>
-          <p:nvPr/>
-        </p:nvSpPr>
-        <p:spPr>
-          <a:xfrm>
-            <a:off x="2136000" y="1989000"/>
-            <a:ext cx="720000" cy="360004"/>
-          </a:xfrm>
-          <a:prstGeom prst="roundRect">
-            <a:avLst/>
-          </a:prstGeom>
-          <a:solidFill>
-            <a:schemeClr val="bg2">
-              <a:lumMod val="40000"/>
-              <a:lumOff val="60000"/>
-            </a:schemeClr>
-          </a:solidFill>
-          <a:ln w="28575"/>
-        </p:spPr>
-        <p:style>
-          <a:lnRef idx="2">
-            <a:schemeClr val="accent1"/>
-          </a:lnRef>
-          <a:fillRef idx="1">
-            <a:schemeClr val="lt1"/>
-          </a:fillRef>
-          <a:effectRef idx="0">
-            <a:schemeClr val="accent1"/>
-          </a:effectRef>
-          <a:fontRef idx="minor">
-            <a:schemeClr val="dk1"/>
-          </a:fontRef>
-        </p:style>
-        <p:txBody>
-          <a:bodyPr rtlCol="0" anchor="ctr"/>
-          <a:lstStyle/>
-          <a:p>
-            <a:pPr algn="ctr"/>
-            <a:r>
-              <a:rPr lang="nl-BE" sz="1000" dirty="0"/>
-              <a:t>Next</a:t>
-            </a:r>
           </a:p>
         </p:txBody>
       </p:sp>
@@ -6644,8 +6479,8 @@
         </p:nvSpPr>
         <p:spPr>
           <a:xfrm>
-            <a:off x="156000" y="2708992"/>
-            <a:ext cx="1080000" cy="360000"/>
+            <a:off x="2135956" y="2798993"/>
+            <a:ext cx="720008" cy="360000"/>
           </a:xfrm>
           <a:prstGeom prst="rect">
             <a:avLst/>
@@ -6679,7 +6514,7 @@
             <a:pPr algn="ctr"/>
             <a:r>
               <a:rPr lang="nl-BE" sz="1000" dirty="0"/>
-              <a:t>ASSIGN</a:t>
+              <a:t>Accept</a:t>
             </a:r>
           </a:p>
         </p:txBody>
@@ -6692,7 +6527,7 @@
         </p:nvSpPr>
         <p:spPr>
           <a:xfrm>
-            <a:off x="3036000" y="1989000"/>
+            <a:off x="2135956" y="1988984"/>
             <a:ext cx="720000" cy="360004"/>
           </a:xfrm>
           <a:prstGeom prst="rect">
@@ -6732,14 +6567,14 @@
       </p:sp>
       <p:sp>
         <p:nvSpPr>
-          <p:cNvPr id="19" name="Rechthoek 18"/>
+          <p:cNvPr id="24" name="Rechthoek 23"/>
           <p:cNvSpPr/>
           <p:nvPr/>
         </p:nvSpPr>
         <p:spPr>
           <a:xfrm>
-            <a:off x="4836000" y="1989000"/>
-            <a:ext cx="720000" cy="360004"/>
+            <a:off x="9336037" y="3969006"/>
+            <a:ext cx="720008" cy="360004"/>
           </a:xfrm>
           <a:prstGeom prst="rect">
             <a:avLst/>
@@ -6770,22 +6605,223 @@
             <a:pPr algn="ctr"/>
             <a:r>
               <a:rPr lang="nl-BE" sz="1000" dirty="0" err="1"/>
-              <a:t>Assigned</a:t>
+              <a:t>Failed</a:t>
             </a:r>
             <a:endParaRPr lang="nl-BE" sz="1000" dirty="0"/>
           </a:p>
         </p:txBody>
       </p:sp>
-      <p:sp>
-        <p:nvSpPr>
-          <p:cNvPr id="20" name="Rechthoek 19"/>
+      <p:cxnSp>
+        <p:nvCxnSpPr>
+          <p:cNvPr id="46" name="Rechte verbindingslijn met pijl 45"/>
+          <p:cNvCxnSpPr>
+            <a:stCxn id="202" idx="3"/>
+            <a:endCxn id="24" idx="1"/>
+          </p:cNvCxnSpPr>
+          <p:nvPr/>
+        </p:nvCxnSpPr>
+        <p:spPr>
+          <a:xfrm>
+            <a:off x="8976024" y="4149008"/>
+            <a:ext cx="360013" cy="0"/>
+          </a:xfrm>
+          <a:prstGeom prst="straightConnector1">
+            <a:avLst/>
+          </a:prstGeom>
+          <a:ln w="28575">
+            <a:tailEnd type="triangle"/>
+          </a:ln>
+        </p:spPr>
+        <p:style>
+          <a:lnRef idx="1">
+            <a:schemeClr val="accent1"/>
+          </a:lnRef>
+          <a:fillRef idx="0">
+            <a:schemeClr val="accent1"/>
+          </a:fillRef>
+          <a:effectRef idx="0">
+            <a:schemeClr val="accent1"/>
+          </a:effectRef>
+          <a:fontRef idx="minor">
+            <a:schemeClr val="tx1"/>
+          </a:fontRef>
+        </p:style>
+      </p:cxnSp>
+      <p:cxnSp>
+        <p:nvCxnSpPr>
+          <p:cNvPr id="49" name="Rechte verbindingslijn met pijl 48"/>
+          <p:cNvCxnSpPr>
+            <a:stCxn id="95" idx="3"/>
+          </p:cNvCxnSpPr>
+          <p:nvPr/>
+        </p:nvCxnSpPr>
+        <p:spPr>
+          <a:xfrm>
+            <a:off x="1865953" y="2168986"/>
+            <a:ext cx="270047" cy="16"/>
+          </a:xfrm>
+          <a:prstGeom prst="straightConnector1">
+            <a:avLst/>
+          </a:prstGeom>
+          <a:ln w="28575">
+            <a:tailEnd type="triangle"/>
+          </a:ln>
+        </p:spPr>
+        <p:style>
+          <a:lnRef idx="1">
+            <a:schemeClr val="accent1"/>
+          </a:lnRef>
+          <a:fillRef idx="0">
+            <a:schemeClr val="accent1"/>
+          </a:fillRef>
+          <a:effectRef idx="0">
+            <a:schemeClr val="accent1"/>
+          </a:effectRef>
+          <a:fontRef idx="minor">
+            <a:schemeClr val="tx1"/>
+          </a:fontRef>
+        </p:style>
+      </p:cxnSp>
+      <p:cxnSp>
+        <p:nvCxnSpPr>
+          <p:cNvPr id="85" name="Rechte verbindingslijn met pijl 84"/>
+          <p:cNvCxnSpPr>
+            <a:stCxn id="18" idx="2"/>
+            <a:endCxn id="17" idx="0"/>
+          </p:cNvCxnSpPr>
+          <p:nvPr/>
+        </p:nvCxnSpPr>
+        <p:spPr>
+          <a:xfrm>
+            <a:off x="2495956" y="2348988"/>
+            <a:ext cx="4" cy="450005"/>
+          </a:xfrm>
+          <a:prstGeom prst="straightConnector1">
+            <a:avLst/>
+          </a:prstGeom>
+          <a:ln w="28575">
+            <a:tailEnd type="triangle"/>
+          </a:ln>
+        </p:spPr>
+        <p:style>
+          <a:lnRef idx="1">
+            <a:schemeClr val="accent1"/>
+          </a:lnRef>
+          <a:fillRef idx="0">
+            <a:schemeClr val="accent1"/>
+          </a:fillRef>
+          <a:effectRef idx="0">
+            <a:schemeClr val="accent1"/>
+          </a:effectRef>
+          <a:fontRef idx="minor">
+            <a:schemeClr val="tx1"/>
+          </a:fontRef>
+        </p:style>
+      </p:cxnSp>
+      <p:sp>
+        <p:nvSpPr>
+          <p:cNvPr id="95" name="Rechthoek 94"/>
           <p:cNvSpPr/>
           <p:nvPr/>
         </p:nvSpPr>
         <p:spPr>
           <a:xfrm>
-            <a:off x="7536015" y="1988984"/>
-            <a:ext cx="720009" cy="360004"/>
+            <a:off x="1685951" y="2078985"/>
+            <a:ext cx="180002" cy="180002"/>
+          </a:xfrm>
+          <a:prstGeom prst="rect">
+            <a:avLst/>
+          </a:prstGeom>
+          <a:solidFill>
+            <a:schemeClr val="accent1"/>
+          </a:solidFill>
+          <a:ln w="28575">
+            <a:solidFill>
+              <a:schemeClr val="accent1"/>
+            </a:solidFill>
+          </a:ln>
+        </p:spPr>
+        <p:style>
+          <a:lnRef idx="2">
+            <a:schemeClr val="accent1"/>
+          </a:lnRef>
+          <a:fillRef idx="1">
+            <a:schemeClr val="lt1"/>
+          </a:fillRef>
+          <a:effectRef idx="0">
+            <a:schemeClr val="accent1"/>
+          </a:effectRef>
+          <a:fontRef idx="minor">
+            <a:schemeClr val="dk1"/>
+          </a:fontRef>
+        </p:style>
+        <p:txBody>
+          <a:bodyPr rtlCol="0" anchor="ctr"/>
+          <a:lstStyle/>
+          <a:p>
+            <a:pPr algn="ctr"/>
+            <a:endParaRPr lang="nl-BE"/>
+          </a:p>
+        </p:txBody>
+      </p:sp>
+      <p:sp>
+        <p:nvSpPr>
+          <p:cNvPr id="72" name="Rechthoek 71"/>
+          <p:cNvSpPr/>
+          <p:nvPr/>
+        </p:nvSpPr>
+        <p:spPr>
+          <a:xfrm>
+            <a:off x="3575972" y="2798993"/>
+            <a:ext cx="720008" cy="360000"/>
+          </a:xfrm>
+          <a:prstGeom prst="rect">
+            <a:avLst/>
+          </a:prstGeom>
+          <a:solidFill>
+            <a:schemeClr val="accent2">
+              <a:lumMod val="20000"/>
+              <a:lumOff val="80000"/>
+            </a:schemeClr>
+          </a:solidFill>
+          <a:ln w="28575"/>
+        </p:spPr>
+        <p:style>
+          <a:lnRef idx="2">
+            <a:schemeClr val="accent1"/>
+          </a:lnRef>
+          <a:fillRef idx="1">
+            <a:schemeClr val="lt1"/>
+          </a:fillRef>
+          <a:effectRef idx="0">
+            <a:schemeClr val="accent1"/>
+          </a:effectRef>
+          <a:fontRef idx="minor">
+            <a:schemeClr val="dk1"/>
+          </a:fontRef>
+        </p:style>
+        <p:txBody>
+          <a:bodyPr rtlCol="0" anchor="ctr"/>
+          <a:lstStyle/>
+          <a:p>
+            <a:pPr algn="ctr"/>
+            <a:r>
+              <a:rPr lang="nl-BE" sz="1000" dirty="0"/>
+              <a:t>Route</a:t>
+            </a:r>
+          </a:p>
+        </p:txBody>
+      </p:sp>
+      <p:sp>
+        <p:nvSpPr>
+          <p:cNvPr id="77" name="Rechthoek 76"/>
+          <p:cNvSpPr/>
+          <p:nvPr/>
+        </p:nvSpPr>
+        <p:spPr>
+          <a:xfrm>
+            <a:off x="3575972" y="1988984"/>
+            <a:ext cx="720000" cy="360004"/>
           </a:xfrm>
           <a:prstGeom prst="rect">
             <a:avLst/>
@@ -6816,22 +6852,104 @@
             <a:pPr algn="ctr"/>
             <a:r>
               <a:rPr lang="nl-BE" sz="1000" dirty="0" err="1"/>
-              <a:t>Success</a:t>
+              <a:t>Accepted</a:t>
             </a:r>
             <a:endParaRPr lang="nl-BE" sz="1000" dirty="0"/>
           </a:p>
         </p:txBody>
       </p:sp>
-      <p:sp>
-        <p:nvSpPr>
-          <p:cNvPr id="21" name="Afgeronde rechthoek 11"/>
+      <p:cxnSp>
+        <p:nvCxnSpPr>
+          <p:cNvPr id="88" name="Rechte verbindingslijn met pijl 87"/>
+          <p:cNvCxnSpPr>
+            <a:stCxn id="77" idx="2"/>
+            <a:endCxn id="72" idx="0"/>
+          </p:cNvCxnSpPr>
+          <p:nvPr/>
+        </p:nvCxnSpPr>
+        <p:spPr>
+          <a:xfrm>
+            <a:off x="3935972" y="2348988"/>
+            <a:ext cx="4" cy="450005"/>
+          </a:xfrm>
+          <a:prstGeom prst="straightConnector1">
+            <a:avLst/>
+          </a:prstGeom>
+          <a:ln w="28575">
+            <a:tailEnd type="triangle"/>
+          </a:ln>
+        </p:spPr>
+        <p:style>
+          <a:lnRef idx="1">
+            <a:schemeClr val="accent1"/>
+          </a:lnRef>
+          <a:fillRef idx="0">
+            <a:schemeClr val="accent1"/>
+          </a:fillRef>
+          <a:effectRef idx="0">
+            <a:schemeClr val="accent1"/>
+          </a:effectRef>
+          <a:fontRef idx="minor">
+            <a:schemeClr val="tx1"/>
+          </a:fontRef>
+        </p:style>
+      </p:cxnSp>
+      <p:sp>
+        <p:nvSpPr>
+          <p:cNvPr id="128" name="Rechthoek 127"/>
           <p:cNvSpPr/>
           <p:nvPr/>
         </p:nvSpPr>
         <p:spPr>
           <a:xfrm>
-            <a:off x="6636006" y="1989000"/>
-            <a:ext cx="720008" cy="360004"/>
+            <a:off x="4925987" y="1988984"/>
+            <a:ext cx="720000" cy="360004"/>
+          </a:xfrm>
+          <a:prstGeom prst="rect">
+            <a:avLst/>
+          </a:prstGeom>
+          <a:solidFill>
+            <a:schemeClr val="tx1"/>
+          </a:solidFill>
+          <a:ln w="28575"/>
+        </p:spPr>
+        <p:style>
+          <a:lnRef idx="2">
+            <a:schemeClr val="accent1"/>
+          </a:lnRef>
+          <a:fillRef idx="1">
+            <a:schemeClr val="lt1"/>
+          </a:fillRef>
+          <a:effectRef idx="0">
+            <a:schemeClr val="accent1"/>
+          </a:effectRef>
+          <a:fontRef idx="minor">
+            <a:schemeClr val="dk1"/>
+          </a:fontRef>
+        </p:style>
+        <p:txBody>
+          <a:bodyPr rtlCol="0" anchor="ctr"/>
+          <a:lstStyle/>
+          <a:p>
+            <a:pPr algn="ctr"/>
+            <a:r>
+              <a:rPr lang="nl-BE" sz="1000" dirty="0" err="1"/>
+              <a:t>Arrived</a:t>
+            </a:r>
+            <a:endParaRPr lang="nl-BE" sz="1000" dirty="0"/>
+          </a:p>
+        </p:txBody>
+      </p:sp>
+      <p:sp>
+        <p:nvSpPr>
+          <p:cNvPr id="132" name="Afgeronde rechthoek 11"/>
+          <p:cNvSpPr/>
+          <p:nvPr/>
+        </p:nvSpPr>
+        <p:spPr>
+          <a:xfrm>
+            <a:off x="4925987" y="2798997"/>
+            <a:ext cx="720000" cy="360004"/>
           </a:xfrm>
           <a:prstGeom prst="roundRect">
             <a:avLst/>
@@ -6865,20 +6983,462 @@
             <a:pPr algn="ctr"/>
             <a:r>
               <a:rPr lang="nl-BE" sz="1000" dirty="0"/>
-              <a:t>Next</a:t>
-            </a:r>
-          </a:p>
-        </p:txBody>
-      </p:sp>
-      <p:sp>
-        <p:nvSpPr>
-          <p:cNvPr id="23" name="Afgeronde rechthoek 11"/>
+              <a:t>Update</a:t>
+            </a:r>
+          </a:p>
+        </p:txBody>
+      </p:sp>
+      <p:cxnSp>
+        <p:nvCxnSpPr>
+          <p:cNvPr id="136" name="Rechte verbindingslijn met pijl 135"/>
+          <p:cNvCxnSpPr>
+            <a:stCxn id="128" idx="2"/>
+            <a:endCxn id="132" idx="0"/>
+          </p:cNvCxnSpPr>
+          <p:nvPr/>
+        </p:nvCxnSpPr>
+        <p:spPr>
+          <a:xfrm>
+            <a:off x="5285987" y="2348988"/>
+            <a:ext cx="0" cy="450009"/>
+          </a:xfrm>
+          <a:prstGeom prst="straightConnector1">
+            <a:avLst/>
+          </a:prstGeom>
+          <a:ln w="28575">
+            <a:tailEnd type="triangle"/>
+          </a:ln>
+        </p:spPr>
+        <p:style>
+          <a:lnRef idx="1">
+            <a:schemeClr val="accent1"/>
+          </a:lnRef>
+          <a:fillRef idx="0">
+            <a:schemeClr val="accent1"/>
+          </a:fillRef>
+          <a:effectRef idx="0">
+            <a:schemeClr val="accent1"/>
+          </a:effectRef>
+          <a:fontRef idx="minor">
+            <a:schemeClr val="tx1"/>
+          </a:fontRef>
+        </p:style>
+      </p:cxnSp>
+      <p:sp>
+        <p:nvSpPr>
+          <p:cNvPr id="146" name="Rechthoek 145"/>
           <p:cNvSpPr/>
           <p:nvPr/>
         </p:nvSpPr>
         <p:spPr>
           <a:xfrm>
-            <a:off x="9336000" y="1989000"/>
+            <a:off x="6005999" y="1988984"/>
+            <a:ext cx="720000" cy="360004"/>
+          </a:xfrm>
+          <a:prstGeom prst="rect">
+            <a:avLst/>
+          </a:prstGeom>
+          <a:solidFill>
+            <a:schemeClr val="tx1"/>
+          </a:solidFill>
+          <a:ln w="28575"/>
+        </p:spPr>
+        <p:style>
+          <a:lnRef idx="2">
+            <a:schemeClr val="accent1"/>
+          </a:lnRef>
+          <a:fillRef idx="1">
+            <a:schemeClr val="lt1"/>
+          </a:fillRef>
+          <a:effectRef idx="0">
+            <a:schemeClr val="accent1"/>
+          </a:effectRef>
+          <a:fontRef idx="minor">
+            <a:schemeClr val="dk1"/>
+          </a:fontRef>
+        </p:style>
+        <p:txBody>
+          <a:bodyPr rtlCol="0" anchor="ctr"/>
+          <a:lstStyle/>
+          <a:p>
+            <a:pPr algn="ctr"/>
+            <a:r>
+              <a:rPr lang="nl-BE" sz="1000" dirty="0" err="1"/>
+              <a:t>Updated</a:t>
+            </a:r>
+            <a:endParaRPr lang="nl-BE" sz="1000" dirty="0"/>
+          </a:p>
+        </p:txBody>
+      </p:sp>
+      <p:cxnSp>
+        <p:nvCxnSpPr>
+          <p:cNvPr id="117" name="Verbindingslijn: gebogen 116"/>
+          <p:cNvCxnSpPr>
+            <a:stCxn id="132" idx="3"/>
+            <a:endCxn id="146" idx="1"/>
+          </p:cNvCxnSpPr>
+          <p:nvPr/>
+        </p:nvCxnSpPr>
+        <p:spPr>
+          <a:xfrm flipV="1">
+            <a:off x="5645987" y="2168986"/>
+            <a:ext cx="360012" cy="810013"/>
+          </a:xfrm>
+          <a:prstGeom prst="bentConnector3">
+            <a:avLst/>
+          </a:prstGeom>
+          <a:ln w="28575">
+            <a:tailEnd type="triangle"/>
+          </a:ln>
+        </p:spPr>
+        <p:style>
+          <a:lnRef idx="1">
+            <a:schemeClr val="accent1"/>
+          </a:lnRef>
+          <a:fillRef idx="0">
+            <a:schemeClr val="accent1"/>
+          </a:fillRef>
+          <a:effectRef idx="0">
+            <a:schemeClr val="accent1"/>
+          </a:effectRef>
+          <a:fontRef idx="minor">
+            <a:schemeClr val="tx1"/>
+          </a:fontRef>
+        </p:style>
+      </p:cxnSp>
+      <p:cxnSp>
+        <p:nvCxnSpPr>
+          <p:cNvPr id="122" name="Rechte verbindingslijn met pijl 121"/>
+          <p:cNvCxnSpPr>
+            <a:stCxn id="146" idx="2"/>
+          </p:cNvCxnSpPr>
+          <p:nvPr/>
+        </p:nvCxnSpPr>
+        <p:spPr>
+          <a:xfrm>
+            <a:off x="6365999" y="2348988"/>
+            <a:ext cx="0" cy="450009"/>
+          </a:xfrm>
+          <a:prstGeom prst="straightConnector1">
+            <a:avLst/>
+          </a:prstGeom>
+          <a:ln w="28575">
+            <a:tailEnd type="triangle"/>
+          </a:ln>
+        </p:spPr>
+        <p:style>
+          <a:lnRef idx="1">
+            <a:schemeClr val="accent1"/>
+          </a:lnRef>
+          <a:fillRef idx="0">
+            <a:schemeClr val="accent1"/>
+          </a:fillRef>
+          <a:effectRef idx="0">
+            <a:schemeClr val="accent1"/>
+          </a:effectRef>
+          <a:fontRef idx="minor">
+            <a:schemeClr val="tx1"/>
+          </a:fontRef>
+        </p:style>
+      </p:cxnSp>
+      <p:sp>
+        <p:nvSpPr>
+          <p:cNvPr id="147" name="Rechthoek 146"/>
+          <p:cNvSpPr/>
+          <p:nvPr/>
+        </p:nvSpPr>
+        <p:spPr>
+          <a:xfrm>
+            <a:off x="6005999" y="2798993"/>
+            <a:ext cx="720008" cy="360000"/>
+          </a:xfrm>
+          <a:prstGeom prst="rect">
+            <a:avLst/>
+          </a:prstGeom>
+          <a:solidFill>
+            <a:schemeClr val="accent2">
+              <a:lumMod val="20000"/>
+              <a:lumOff val="80000"/>
+            </a:schemeClr>
+          </a:solidFill>
+          <a:ln w="28575"/>
+        </p:spPr>
+        <p:style>
+          <a:lnRef idx="2">
+            <a:schemeClr val="accent1"/>
+          </a:lnRef>
+          <a:fillRef idx="1">
+            <a:schemeClr val="lt1"/>
+          </a:fillRef>
+          <a:effectRef idx="0">
+            <a:schemeClr val="accent1"/>
+          </a:effectRef>
+          <a:fontRef idx="minor">
+            <a:schemeClr val="dk1"/>
+          </a:fontRef>
+        </p:style>
+        <p:txBody>
+          <a:bodyPr rtlCol="0" anchor="ctr"/>
+          <a:lstStyle/>
+          <a:p>
+            <a:pPr algn="ctr"/>
+            <a:r>
+              <a:rPr lang="nl-BE" sz="1000" dirty="0"/>
+              <a:t>Account</a:t>
+            </a:r>
+          </a:p>
+        </p:txBody>
+      </p:sp>
+      <p:cxnSp>
+        <p:nvCxnSpPr>
+          <p:cNvPr id="127" name="Verbindingslijn: gebogen 126"/>
+          <p:cNvCxnSpPr>
+            <a:stCxn id="17" idx="3"/>
+            <a:endCxn id="77" idx="1"/>
+          </p:cNvCxnSpPr>
+          <p:nvPr/>
+        </p:nvCxnSpPr>
+        <p:spPr>
+          <a:xfrm flipV="1">
+            <a:off x="2855964" y="2168986"/>
+            <a:ext cx="720008" cy="810007"/>
+          </a:xfrm>
+          <a:prstGeom prst="bentConnector3">
+            <a:avLst/>
+          </a:prstGeom>
+          <a:ln w="28575">
+            <a:tailEnd type="triangle"/>
+          </a:ln>
+        </p:spPr>
+        <p:style>
+          <a:lnRef idx="1">
+            <a:schemeClr val="accent1"/>
+          </a:lnRef>
+          <a:fillRef idx="0">
+            <a:schemeClr val="accent1"/>
+          </a:fillRef>
+          <a:effectRef idx="0">
+            <a:schemeClr val="accent1"/>
+          </a:effectRef>
+          <a:fontRef idx="minor">
+            <a:schemeClr val="tx1"/>
+          </a:fontRef>
+        </p:style>
+      </p:cxnSp>
+      <p:cxnSp>
+        <p:nvCxnSpPr>
+          <p:cNvPr id="149" name="Verbindingslijn: gebogen 148"/>
+          <p:cNvCxnSpPr>
+            <a:stCxn id="72" idx="3"/>
+            <a:endCxn id="128" idx="1"/>
+          </p:cNvCxnSpPr>
+          <p:nvPr/>
+        </p:nvCxnSpPr>
+        <p:spPr>
+          <a:xfrm flipV="1">
+            <a:off x="4295980" y="2168986"/>
+            <a:ext cx="630007" cy="810007"/>
+          </a:xfrm>
+          <a:prstGeom prst="bentConnector3">
+            <a:avLst/>
+          </a:prstGeom>
+          <a:ln w="28575">
+            <a:tailEnd type="triangle"/>
+          </a:ln>
+        </p:spPr>
+        <p:style>
+          <a:lnRef idx="1">
+            <a:schemeClr val="accent1"/>
+          </a:lnRef>
+          <a:fillRef idx="0">
+            <a:schemeClr val="accent1"/>
+          </a:fillRef>
+          <a:effectRef idx="0">
+            <a:schemeClr val="accent1"/>
+          </a:effectRef>
+          <a:fontRef idx="minor">
+            <a:schemeClr val="tx1"/>
+          </a:fontRef>
+        </p:style>
+      </p:cxnSp>
+      <p:cxnSp>
+        <p:nvCxnSpPr>
+          <p:cNvPr id="159" name="Verbindingslijn: gebogen 158"/>
+          <p:cNvCxnSpPr>
+            <a:stCxn id="146" idx="2"/>
+            <a:endCxn id="160" idx="0"/>
+          </p:cNvCxnSpPr>
+          <p:nvPr/>
+        </p:nvCxnSpPr>
+        <p:spPr>
+          <a:xfrm rot="16200000" flipH="1">
+            <a:off x="6681005" y="2033982"/>
+            <a:ext cx="450005" cy="1080016"/>
+          </a:xfrm>
+          <a:prstGeom prst="bentConnector3">
+            <a:avLst/>
+          </a:prstGeom>
+          <a:ln w="28575">
+            <a:tailEnd type="triangle"/>
+          </a:ln>
+        </p:spPr>
+        <p:style>
+          <a:lnRef idx="1">
+            <a:schemeClr val="accent1"/>
+          </a:lnRef>
+          <a:fillRef idx="0">
+            <a:schemeClr val="accent1"/>
+          </a:fillRef>
+          <a:effectRef idx="0">
+            <a:schemeClr val="accent1"/>
+          </a:effectRef>
+          <a:fontRef idx="minor">
+            <a:schemeClr val="tx1"/>
+          </a:fontRef>
+        </p:style>
+      </p:cxnSp>
+      <p:sp>
+        <p:nvSpPr>
+          <p:cNvPr id="160" name="Rechthoek 159"/>
+          <p:cNvSpPr/>
+          <p:nvPr/>
+        </p:nvSpPr>
+        <p:spPr>
+          <a:xfrm>
+            <a:off x="7086011" y="2798993"/>
+            <a:ext cx="720008" cy="360000"/>
+          </a:xfrm>
+          <a:prstGeom prst="rect">
+            <a:avLst/>
+          </a:prstGeom>
+          <a:solidFill>
+            <a:schemeClr val="accent2">
+              <a:lumMod val="20000"/>
+              <a:lumOff val="80000"/>
+            </a:schemeClr>
+          </a:solidFill>
+          <a:ln w="28575"/>
+        </p:spPr>
+        <p:style>
+          <a:lnRef idx="2">
+            <a:schemeClr val="accent1"/>
+          </a:lnRef>
+          <a:fillRef idx="1">
+            <a:schemeClr val="lt1"/>
+          </a:fillRef>
+          <a:effectRef idx="0">
+            <a:schemeClr val="accent1"/>
+          </a:effectRef>
+          <a:fontRef idx="minor">
+            <a:schemeClr val="dk1"/>
+          </a:fontRef>
+        </p:style>
+        <p:txBody>
+          <a:bodyPr rtlCol="0" anchor="ctr"/>
+          <a:lstStyle/>
+          <a:p>
+            <a:pPr algn="ctr"/>
+            <a:r>
+              <a:rPr lang="nl-BE" sz="1000" dirty="0" err="1"/>
+              <a:t>Smoke</a:t>
+            </a:r>
+            <a:endParaRPr lang="nl-BE" sz="1000" dirty="0"/>
+          </a:p>
+        </p:txBody>
+      </p:sp>
+      <p:sp>
+        <p:nvSpPr>
+          <p:cNvPr id="161" name="Rechthoek 160"/>
+          <p:cNvSpPr/>
+          <p:nvPr/>
+        </p:nvSpPr>
+        <p:spPr>
+          <a:xfrm>
+            <a:off x="8256024" y="1988984"/>
+            <a:ext cx="720000" cy="360004"/>
+          </a:xfrm>
+          <a:prstGeom prst="rect">
+            <a:avLst/>
+          </a:prstGeom>
+          <a:solidFill>
+            <a:schemeClr val="tx1"/>
+          </a:solidFill>
+          <a:ln w="28575"/>
+        </p:spPr>
+        <p:style>
+          <a:lnRef idx="2">
+            <a:schemeClr val="accent1"/>
+          </a:lnRef>
+          <a:fillRef idx="1">
+            <a:schemeClr val="lt1"/>
+          </a:fillRef>
+          <a:effectRef idx="0">
+            <a:schemeClr val="accent1"/>
+          </a:effectRef>
+          <a:fontRef idx="minor">
+            <a:schemeClr val="dk1"/>
+          </a:fontRef>
+        </p:style>
+        <p:txBody>
+          <a:bodyPr rtlCol="0" anchor="ctr"/>
+          <a:lstStyle/>
+          <a:p>
+            <a:pPr algn="ctr"/>
+            <a:r>
+              <a:rPr lang="nl-BE" sz="1000" dirty="0" err="1"/>
+              <a:t>Destroyed</a:t>
+            </a:r>
+            <a:endParaRPr lang="nl-BE" sz="1000" dirty="0"/>
+          </a:p>
+        </p:txBody>
+      </p:sp>
+      <p:cxnSp>
+        <p:nvCxnSpPr>
+          <p:cNvPr id="163" name="Verbindingslijn: gebogen 162"/>
+          <p:cNvCxnSpPr>
+            <a:stCxn id="147" idx="3"/>
+            <a:endCxn id="161" idx="1"/>
+          </p:cNvCxnSpPr>
+          <p:nvPr/>
+        </p:nvCxnSpPr>
+        <p:spPr>
+          <a:xfrm flipV="1">
+            <a:off x="6726007" y="2168986"/>
+            <a:ext cx="1530017" cy="810007"/>
+          </a:xfrm>
+          <a:prstGeom prst="bentConnector3">
+            <a:avLst>
+              <a:gd name="adj1" fmla="val 13264"/>
+            </a:avLst>
+          </a:prstGeom>
+          <a:ln w="28575">
+            <a:tailEnd type="triangle"/>
+          </a:ln>
+        </p:spPr>
+        <p:style>
+          <a:lnRef idx="1">
+            <a:schemeClr val="accent1"/>
+          </a:lnRef>
+          <a:fillRef idx="0">
+            <a:schemeClr val="accent1"/>
+          </a:fillRef>
+          <a:effectRef idx="0">
+            <a:schemeClr val="accent1"/>
+          </a:effectRef>
+          <a:fontRef idx="minor">
+            <a:schemeClr val="tx1"/>
+          </a:fontRef>
+        </p:style>
+      </p:cxnSp>
+      <p:sp>
+        <p:nvSpPr>
+          <p:cNvPr id="171" name="Afgeronde rechthoek 11"/>
+          <p:cNvSpPr/>
+          <p:nvPr/>
+        </p:nvSpPr>
+        <p:spPr>
+          <a:xfrm>
+            <a:off x="8256024" y="2798993"/>
             <a:ext cx="720000" cy="360004"/>
           </a:xfrm>
           <a:prstGeom prst="roundRect">
@@ -6913,22 +7473,58 @@
             <a:pPr algn="ctr"/>
             <a:r>
               <a:rPr lang="nl-BE" sz="1000" dirty="0" err="1"/>
-              <a:t>Fail</a:t>
+              <a:t>Success</a:t>
             </a:r>
             <a:endParaRPr lang="nl-BE" sz="1000" dirty="0"/>
           </a:p>
         </p:txBody>
       </p:sp>
-      <p:sp>
-        <p:nvSpPr>
-          <p:cNvPr id="24" name="Rechthoek 23"/>
+      <p:cxnSp>
+        <p:nvCxnSpPr>
+          <p:cNvPr id="173" name="Rechte verbindingslijn met pijl 172"/>
+          <p:cNvCxnSpPr>
+            <a:stCxn id="161" idx="2"/>
+            <a:endCxn id="171" idx="0"/>
+          </p:cNvCxnSpPr>
+          <p:nvPr/>
+        </p:nvCxnSpPr>
+        <p:spPr>
+          <a:xfrm>
+            <a:off x="8616024" y="2348988"/>
+            <a:ext cx="0" cy="450005"/>
+          </a:xfrm>
+          <a:prstGeom prst="straightConnector1">
+            <a:avLst/>
+          </a:prstGeom>
+          <a:ln w="28575">
+            <a:tailEnd type="triangle"/>
+          </a:ln>
+        </p:spPr>
+        <p:style>
+          <a:lnRef idx="1">
+            <a:schemeClr val="accent1"/>
+          </a:lnRef>
+          <a:fillRef idx="0">
+            <a:schemeClr val="accent1"/>
+          </a:fillRef>
+          <a:effectRef idx="0">
+            <a:schemeClr val="accent1"/>
+          </a:effectRef>
+          <a:fontRef idx="minor">
+            <a:schemeClr val="tx1"/>
+          </a:fontRef>
+        </p:style>
+      </p:cxnSp>
+      <p:sp>
+        <p:nvSpPr>
+          <p:cNvPr id="194" name="Rechthoek 193"/>
           <p:cNvSpPr/>
           <p:nvPr/>
         </p:nvSpPr>
         <p:spPr>
           <a:xfrm>
-            <a:off x="10236000" y="1989000"/>
-            <a:ext cx="792000" cy="360004"/>
+            <a:off x="9336036" y="1988984"/>
+            <a:ext cx="720008" cy="360004"/>
           </a:xfrm>
           <a:prstGeom prst="rect">
             <a:avLst/>
@@ -6959,7 +7555,7 @@
             <a:pPr algn="ctr"/>
             <a:r>
               <a:rPr lang="nl-BE" sz="1000" dirty="0" err="1"/>
-              <a:t>Failed</a:t>
+              <a:t>Destroyed</a:t>
             </a:r>
             <a:endParaRPr lang="nl-BE" sz="1000" dirty="0"/>
           </a:p>
@@ -6967,19 +7563,19 @@
       </p:sp>
       <p:cxnSp>
         <p:nvCxnSpPr>
-          <p:cNvPr id="26" name="Rechte verbindingslijn met pijl 25"/>
+          <p:cNvPr id="196" name="Verbindingslijn: gebogen 195"/>
           <p:cNvCxnSpPr>
-            <a:stCxn id="8" idx="3"/>
-            <a:endCxn id="18" idx="1"/>
+            <a:stCxn id="171" idx="3"/>
+            <a:endCxn id="194" idx="1"/>
           </p:cNvCxnSpPr>
           <p:nvPr/>
         </p:nvCxnSpPr>
         <p:spPr>
-          <a:xfrm>
-            <a:off x="2856000" y="2169002"/>
-            <a:ext cx="180000" cy="0"/>
-          </a:xfrm>
-          <a:prstGeom prst="straightConnector1">
+          <a:xfrm flipV="1">
+            <a:off x="8976024" y="2168986"/>
+            <a:ext cx="360012" cy="810009"/>
+          </a:xfrm>
+          <a:prstGeom prst="bentConnector3">
             <a:avLst/>
           </a:prstGeom>
           <a:ln w="28575">
@@ -7003,17 +7599,17 @@
       </p:cxnSp>
       <p:cxnSp>
         <p:nvCxnSpPr>
-          <p:cNvPr id="32" name="Rechte verbindingslijn met pijl 31"/>
+          <p:cNvPr id="197" name="Rechte verbindingslijn met pijl 196"/>
           <p:cNvCxnSpPr>
-            <a:stCxn id="6" idx="3"/>
-            <a:endCxn id="19" idx="1"/>
+            <a:stCxn id="194" idx="3"/>
+            <a:endCxn id="200" idx="1"/>
           </p:cNvCxnSpPr>
           <p:nvPr/>
         </p:nvCxnSpPr>
         <p:spPr>
           <a:xfrm>
-            <a:off x="4656000" y="2169002"/>
-            <a:ext cx="180000" cy="0"/>
+            <a:off x="10056044" y="2168986"/>
+            <a:ext cx="360004" cy="0"/>
           </a:xfrm>
           <a:prstGeom prst="straightConnector1">
             <a:avLst/>
@@ -7037,302 +7633,15 @@
           </a:fontRef>
         </p:style>
       </p:cxnSp>
-      <p:cxnSp>
-        <p:nvCxnSpPr>
-          <p:cNvPr id="38" name="Rechte verbindingslijn met pijl 37"/>
-          <p:cNvCxnSpPr>
-            <a:stCxn id="21" idx="3"/>
-            <a:endCxn id="20" idx="1"/>
-          </p:cNvCxnSpPr>
-          <p:nvPr/>
-        </p:nvCxnSpPr>
-        <p:spPr>
-          <a:xfrm flipV="1">
-            <a:off x="7356014" y="2168986"/>
-            <a:ext cx="180001" cy="16"/>
-          </a:xfrm>
-          <a:prstGeom prst="straightConnector1">
-            <a:avLst/>
-          </a:prstGeom>
-          <a:ln w="28575">
-            <a:tailEnd type="triangle"/>
-          </a:ln>
-        </p:spPr>
-        <p:style>
-          <a:lnRef idx="1">
-            <a:schemeClr val="accent1"/>
-          </a:lnRef>
-          <a:fillRef idx="0">
-            <a:schemeClr val="accent1"/>
-          </a:fillRef>
-          <a:effectRef idx="0">
-            <a:schemeClr val="accent1"/>
-          </a:effectRef>
-          <a:fontRef idx="minor">
-            <a:schemeClr val="tx1"/>
-          </a:fontRef>
-        </p:style>
-      </p:cxnSp>
-      <p:cxnSp>
-        <p:nvCxnSpPr>
-          <p:cNvPr id="46" name="Rechte verbindingslijn met pijl 45"/>
-          <p:cNvCxnSpPr>
-            <a:endCxn id="24" idx="1"/>
-          </p:cNvCxnSpPr>
-          <p:nvPr/>
-        </p:nvCxnSpPr>
-        <p:spPr>
-          <a:xfrm>
-            <a:off x="10056000" y="2169000"/>
-            <a:ext cx="180000" cy="2"/>
-          </a:xfrm>
-          <a:prstGeom prst="straightConnector1">
-            <a:avLst/>
-          </a:prstGeom>
-          <a:ln w="28575">
-            <a:tailEnd type="triangle"/>
-          </a:ln>
-        </p:spPr>
-        <p:style>
-          <a:lnRef idx="1">
-            <a:schemeClr val="accent1"/>
-          </a:lnRef>
-          <a:fillRef idx="0">
-            <a:schemeClr val="accent1"/>
-          </a:fillRef>
-          <a:effectRef idx="0">
-            <a:schemeClr val="accent1"/>
-          </a:effectRef>
-          <a:fontRef idx="minor">
-            <a:schemeClr val="tx1"/>
-          </a:fontRef>
-        </p:style>
-      </p:cxnSp>
-      <p:cxnSp>
-        <p:nvCxnSpPr>
-          <p:cNvPr id="49" name="Rechte verbindingslijn met pijl 48"/>
-          <p:cNvCxnSpPr>
-            <a:stCxn id="95" idx="3"/>
-            <a:endCxn id="8" idx="1"/>
-          </p:cNvCxnSpPr>
-          <p:nvPr/>
-        </p:nvCxnSpPr>
-        <p:spPr>
-          <a:xfrm>
-            <a:off x="1865953" y="2168986"/>
-            <a:ext cx="270047" cy="16"/>
-          </a:xfrm>
-          <a:prstGeom prst="straightConnector1">
-            <a:avLst/>
-          </a:prstGeom>
-          <a:ln w="28575">
-            <a:tailEnd type="triangle"/>
-          </a:ln>
-        </p:spPr>
-        <p:style>
-          <a:lnRef idx="1">
-            <a:schemeClr val="accent1"/>
-          </a:lnRef>
-          <a:fillRef idx="0">
-            <a:schemeClr val="accent1"/>
-          </a:fillRef>
-          <a:effectRef idx="0">
-            <a:schemeClr val="accent1"/>
-          </a:effectRef>
-          <a:fontRef idx="minor">
-            <a:schemeClr val="tx1"/>
-          </a:fontRef>
-        </p:style>
-      </p:cxnSp>
-      <p:sp>
-        <p:nvSpPr>
-          <p:cNvPr id="52" name="Afgeronde rechthoek 65"/>
+      <p:sp>
+        <p:nvSpPr>
+          <p:cNvPr id="200" name="Rechthoek 199"/>
           <p:cNvSpPr/>
           <p:nvPr/>
         </p:nvSpPr>
         <p:spPr>
           <a:xfrm>
-            <a:off x="3936000" y="2708992"/>
-            <a:ext cx="720000" cy="360004"/>
-          </a:xfrm>
-          <a:prstGeom prst="roundRect">
-            <a:avLst/>
-          </a:prstGeom>
-          <a:solidFill>
-            <a:schemeClr val="accent2">
-              <a:lumMod val="20000"/>
-              <a:lumOff val="80000"/>
-            </a:schemeClr>
-          </a:solidFill>
-          <a:ln w="28575"/>
-        </p:spPr>
-        <p:style>
-          <a:lnRef idx="2">
-            <a:schemeClr val="accent1"/>
-          </a:lnRef>
-          <a:fillRef idx="1">
-            <a:schemeClr val="lt1"/>
-          </a:fillRef>
-          <a:effectRef idx="0">
-            <a:schemeClr val="accent1"/>
-          </a:effectRef>
-          <a:fontRef idx="minor">
-            <a:schemeClr val="dk1"/>
-          </a:fontRef>
-        </p:style>
-        <p:txBody>
-          <a:bodyPr rtlCol="0" anchor="ctr"/>
-          <a:lstStyle/>
-          <a:p>
-            <a:pPr algn="ctr"/>
-            <a:r>
-              <a:rPr lang="nl-BE" sz="1000" dirty="0"/>
-              <a:t>Start</a:t>
-            </a:r>
-          </a:p>
-        </p:txBody>
-      </p:sp>
-      <p:cxnSp>
-        <p:nvCxnSpPr>
-          <p:cNvPr id="53" name="Rechte verbindingslijn met pijl 52"/>
-          <p:cNvCxnSpPr>
-            <a:stCxn id="52" idx="0"/>
-            <a:endCxn id="6" idx="2"/>
-          </p:cNvCxnSpPr>
-          <p:nvPr/>
-        </p:nvCxnSpPr>
-        <p:spPr>
-          <a:xfrm flipV="1">
-            <a:off x="4296000" y="2349004"/>
-            <a:ext cx="0" cy="359988"/>
-          </a:xfrm>
-          <a:prstGeom prst="straightConnector1">
-            <a:avLst/>
-          </a:prstGeom>
-          <a:ln w="28575">
-            <a:tailEnd type="triangle"/>
-          </a:ln>
-        </p:spPr>
-        <p:style>
-          <a:lnRef idx="1">
-            <a:schemeClr val="accent1"/>
-          </a:lnRef>
-          <a:fillRef idx="0">
-            <a:schemeClr val="accent1"/>
-          </a:fillRef>
-          <a:effectRef idx="0">
-            <a:schemeClr val="accent1"/>
-          </a:effectRef>
-          <a:fontRef idx="minor">
-            <a:schemeClr val="tx1"/>
-          </a:fontRef>
-        </p:style>
-      </p:cxnSp>
-      <p:sp>
-        <p:nvSpPr>
-          <p:cNvPr id="61" name="Rechthoek 60"/>
-          <p:cNvSpPr/>
-          <p:nvPr/>
-        </p:nvSpPr>
-        <p:spPr>
-          <a:xfrm>
-            <a:off x="156000" y="3428992"/>
-            <a:ext cx="1080000" cy="360000"/>
-          </a:xfrm>
-          <a:prstGeom prst="rect">
-            <a:avLst/>
-          </a:prstGeom>
-          <a:solidFill>
-            <a:schemeClr val="accent2">
-              <a:lumMod val="20000"/>
-              <a:lumOff val="80000"/>
-            </a:schemeClr>
-          </a:solidFill>
-          <a:ln w="28575"/>
-        </p:spPr>
-        <p:style>
-          <a:lnRef idx="2">
-            <a:schemeClr val="accent1"/>
-          </a:lnRef>
-          <a:fillRef idx="1">
-            <a:schemeClr val="lt1"/>
-          </a:fillRef>
-          <a:effectRef idx="0">
-            <a:schemeClr val="accent1"/>
-          </a:effectRef>
-          <a:fontRef idx="minor">
-            <a:schemeClr val="dk1"/>
-          </a:fontRef>
-        </p:style>
-        <p:txBody>
-          <a:bodyPr rtlCol="0" anchor="ctr"/>
-          <a:lstStyle/>
-          <a:p>
-            <a:pPr algn="ctr"/>
-            <a:r>
-              <a:rPr lang="nl-BE" sz="1000" dirty="0"/>
-              <a:t>ROUTE</a:t>
-            </a:r>
-          </a:p>
-        </p:txBody>
-      </p:sp>
-      <p:sp>
-        <p:nvSpPr>
-          <p:cNvPr id="66" name="Rechthoek 65"/>
-          <p:cNvSpPr/>
-          <p:nvPr/>
-        </p:nvSpPr>
-        <p:spPr>
-          <a:xfrm>
-            <a:off x="156000" y="4148992"/>
-            <a:ext cx="1080000" cy="360000"/>
-          </a:xfrm>
-          <a:prstGeom prst="rect">
-            <a:avLst/>
-          </a:prstGeom>
-          <a:solidFill>
-            <a:schemeClr val="accent2">
-              <a:lumMod val="20000"/>
-              <a:lumOff val="80000"/>
-            </a:schemeClr>
-          </a:solidFill>
-          <a:ln w="28575"/>
-        </p:spPr>
-        <p:style>
-          <a:lnRef idx="2">
-            <a:schemeClr val="accent1"/>
-          </a:lnRef>
-          <a:fillRef idx="1">
-            <a:schemeClr val="lt1"/>
-          </a:fillRef>
-          <a:effectRef idx="0">
-            <a:schemeClr val="accent1"/>
-          </a:effectRef>
-          <a:fontRef idx="minor">
-            <a:schemeClr val="dk1"/>
-          </a:fontRef>
-        </p:style>
-        <p:txBody>
-          <a:bodyPr rtlCol="0" anchor="ctr"/>
-          <a:lstStyle/>
-          <a:p>
-            <a:pPr algn="ctr"/>
-            <a:r>
-              <a:rPr lang="nl-BE" sz="1000" dirty="0"/>
-              <a:t>DESTROY</a:t>
-            </a:r>
-          </a:p>
-        </p:txBody>
-      </p:sp>
-      <p:sp>
-        <p:nvSpPr>
-          <p:cNvPr id="84" name="Rechthoek 83"/>
-          <p:cNvSpPr/>
-          <p:nvPr/>
-        </p:nvSpPr>
-        <p:spPr>
-          <a:xfrm>
-            <a:off x="3575972" y="2798991"/>
+            <a:off x="10416048" y="2078985"/>
             <a:ext cx="180002" cy="180002"/>
           </a:xfrm>
           <a:prstGeom prst="rect">
@@ -7370,19 +7679,68 @@
           </a:p>
         </p:txBody>
       </p:sp>
+      <p:sp>
+        <p:nvSpPr>
+          <p:cNvPr id="202" name="Afgeronde rechthoek 11"/>
+          <p:cNvSpPr/>
+          <p:nvPr/>
+        </p:nvSpPr>
+        <p:spPr>
+          <a:xfrm>
+            <a:off x="8256024" y="3969006"/>
+            <a:ext cx="720000" cy="360004"/>
+          </a:xfrm>
+          <a:prstGeom prst="roundRect">
+            <a:avLst/>
+          </a:prstGeom>
+          <a:solidFill>
+            <a:schemeClr val="bg2">
+              <a:lumMod val="40000"/>
+              <a:lumOff val="60000"/>
+            </a:schemeClr>
+          </a:solidFill>
+          <a:ln w="28575"/>
+        </p:spPr>
+        <p:style>
+          <a:lnRef idx="2">
+            <a:schemeClr val="accent1"/>
+          </a:lnRef>
+          <a:fillRef idx="1">
+            <a:schemeClr val="lt1"/>
+          </a:fillRef>
+          <a:effectRef idx="0">
+            <a:schemeClr val="accent1"/>
+          </a:effectRef>
+          <a:fontRef idx="minor">
+            <a:schemeClr val="dk1"/>
+          </a:fontRef>
+        </p:style>
+        <p:txBody>
+          <a:bodyPr rtlCol="0" anchor="ctr"/>
+          <a:lstStyle/>
+          <a:p>
+            <a:pPr algn="ctr"/>
+            <a:r>
+              <a:rPr lang="nl-BE" sz="1000" dirty="0" err="1"/>
+              <a:t>Fail</a:t>
+            </a:r>
+            <a:endParaRPr lang="nl-BE" sz="1000" dirty="0"/>
+          </a:p>
+        </p:txBody>
+      </p:sp>
       <p:cxnSp>
         <p:nvCxnSpPr>
-          <p:cNvPr id="85" name="Rechte verbindingslijn met pijl 84"/>
+          <p:cNvPr id="203" name="Rechte verbindingslijn met pijl 202"/>
           <p:cNvCxnSpPr>
-            <a:stCxn id="84" idx="3"/>
-            <a:endCxn id="52" idx="1"/>
+            <a:stCxn id="24" idx="3"/>
+            <a:endCxn id="204" idx="1"/>
           </p:cNvCxnSpPr>
           <p:nvPr/>
         </p:nvCxnSpPr>
         <p:spPr>
           <a:xfrm>
-            <a:off x="3755974" y="2888992"/>
-            <a:ext cx="180026" cy="2"/>
+            <a:off x="10056045" y="4149008"/>
+            <a:ext cx="360003" cy="0"/>
           </a:xfrm>
           <a:prstGeom prst="straightConnector1">
             <a:avLst/>
@@ -7408,13 +7766,13 @@
       </p:cxnSp>
       <p:sp>
         <p:nvSpPr>
-          <p:cNvPr id="95" name="Rechthoek 94"/>
+          <p:cNvPr id="204" name="Rechthoek 203"/>
           <p:cNvSpPr/>
           <p:nvPr/>
         </p:nvSpPr>
         <p:spPr>
           <a:xfrm>
-            <a:off x="1685951" y="2078985"/>
+            <a:off x="10416048" y="4059007"/>
             <a:ext cx="180002" cy="180002"/>
           </a:xfrm>
           <a:prstGeom prst="rect">
@@ -7454,13 +7812,180 @@
       </p:sp>
       <p:sp>
         <p:nvSpPr>
-          <p:cNvPr id="118" name="Rechthoek 117"/>
+          <p:cNvPr id="210" name="Rechthoek 209"/>
           <p:cNvSpPr/>
           <p:nvPr/>
         </p:nvSpPr>
         <p:spPr>
           <a:xfrm>
-            <a:off x="5375992" y="3518999"/>
+            <a:off x="9336037" y="4509012"/>
+            <a:ext cx="720008" cy="360004"/>
+          </a:xfrm>
+          <a:prstGeom prst="rect">
+            <a:avLst/>
+          </a:prstGeom>
+          <a:solidFill>
+            <a:schemeClr val="tx1"/>
+          </a:solidFill>
+          <a:ln w="28575"/>
+        </p:spPr>
+        <p:style>
+          <a:lnRef idx="2">
+            <a:schemeClr val="accent1"/>
+          </a:lnRef>
+          <a:fillRef idx="1">
+            <a:schemeClr val="lt1"/>
+          </a:fillRef>
+          <a:effectRef idx="0">
+            <a:schemeClr val="accent1"/>
+          </a:effectRef>
+          <a:fontRef idx="minor">
+            <a:schemeClr val="dk1"/>
+          </a:fontRef>
+        </p:style>
+        <p:txBody>
+          <a:bodyPr rtlCol="0" anchor="ctr"/>
+          <a:lstStyle/>
+          <a:p>
+            <a:pPr algn="ctr"/>
+            <a:r>
+              <a:rPr lang="nl-BE" sz="1000" dirty="0" err="1"/>
+              <a:t>Aborted</a:t>
+            </a:r>
+            <a:endParaRPr lang="nl-BE" sz="1000" dirty="0"/>
+          </a:p>
+        </p:txBody>
+      </p:sp>
+      <p:cxnSp>
+        <p:nvCxnSpPr>
+          <p:cNvPr id="211" name="Rechte verbindingslijn met pijl 210"/>
+          <p:cNvCxnSpPr>
+            <a:stCxn id="212" idx="3"/>
+            <a:endCxn id="210" idx="1"/>
+          </p:cNvCxnSpPr>
+          <p:nvPr/>
+        </p:nvCxnSpPr>
+        <p:spPr>
+          <a:xfrm>
+            <a:off x="8976024" y="4689014"/>
+            <a:ext cx="360013" cy="0"/>
+          </a:xfrm>
+          <a:prstGeom prst="straightConnector1">
+            <a:avLst/>
+          </a:prstGeom>
+          <a:ln w="28575">
+            <a:tailEnd type="triangle"/>
+          </a:ln>
+        </p:spPr>
+        <p:style>
+          <a:lnRef idx="1">
+            <a:schemeClr val="accent1"/>
+          </a:lnRef>
+          <a:fillRef idx="0">
+            <a:schemeClr val="accent1"/>
+          </a:fillRef>
+          <a:effectRef idx="0">
+            <a:schemeClr val="accent1"/>
+          </a:effectRef>
+          <a:fontRef idx="minor">
+            <a:schemeClr val="tx1"/>
+          </a:fontRef>
+        </p:style>
+      </p:cxnSp>
+      <p:sp>
+        <p:nvSpPr>
+          <p:cNvPr id="212" name="Afgeronde rechthoek 11"/>
+          <p:cNvSpPr/>
+          <p:nvPr/>
+        </p:nvSpPr>
+        <p:spPr>
+          <a:xfrm>
+            <a:off x="8256024" y="4509012"/>
+            <a:ext cx="720000" cy="360004"/>
+          </a:xfrm>
+          <a:prstGeom prst="roundRect">
+            <a:avLst/>
+          </a:prstGeom>
+          <a:solidFill>
+            <a:schemeClr val="bg2">
+              <a:lumMod val="40000"/>
+              <a:lumOff val="60000"/>
+            </a:schemeClr>
+          </a:solidFill>
+          <a:ln w="28575"/>
+        </p:spPr>
+        <p:style>
+          <a:lnRef idx="2">
+            <a:schemeClr val="accent1"/>
+          </a:lnRef>
+          <a:fillRef idx="1">
+            <a:schemeClr val="lt1"/>
+          </a:fillRef>
+          <a:effectRef idx="0">
+            <a:schemeClr val="accent1"/>
+          </a:effectRef>
+          <a:fontRef idx="minor">
+            <a:schemeClr val="dk1"/>
+          </a:fontRef>
+        </p:style>
+        <p:txBody>
+          <a:bodyPr rtlCol="0" anchor="ctr"/>
+          <a:lstStyle/>
+          <a:p>
+            <a:pPr algn="ctr"/>
+            <a:r>
+              <a:rPr lang="nl-BE" sz="1000" dirty="0" err="1"/>
+              <a:t>Abort</a:t>
+            </a:r>
+            <a:endParaRPr lang="nl-BE" sz="1000" dirty="0"/>
+          </a:p>
+        </p:txBody>
+      </p:sp>
+      <p:cxnSp>
+        <p:nvCxnSpPr>
+          <p:cNvPr id="213" name="Rechte verbindingslijn met pijl 212"/>
+          <p:cNvCxnSpPr>
+            <a:stCxn id="210" idx="3"/>
+            <a:endCxn id="214" idx="1"/>
+          </p:cNvCxnSpPr>
+          <p:nvPr/>
+        </p:nvCxnSpPr>
+        <p:spPr>
+          <a:xfrm>
+            <a:off x="10056045" y="4689014"/>
+            <a:ext cx="360003" cy="0"/>
+          </a:xfrm>
+          <a:prstGeom prst="straightConnector1">
+            <a:avLst/>
+          </a:prstGeom>
+          <a:ln w="28575">
+            <a:tailEnd type="triangle"/>
+          </a:ln>
+        </p:spPr>
+        <p:style>
+          <a:lnRef idx="1">
+            <a:schemeClr val="accent1"/>
+          </a:lnRef>
+          <a:fillRef idx="0">
+            <a:schemeClr val="accent1"/>
+          </a:fillRef>
+          <a:effectRef idx="0">
+            <a:schemeClr val="accent1"/>
+          </a:effectRef>
+          <a:fontRef idx="minor">
+            <a:schemeClr val="tx1"/>
+          </a:fontRef>
+        </p:style>
+      </p:cxnSp>
+      <p:sp>
+        <p:nvSpPr>
+          <p:cNvPr id="214" name="Rechthoek 213"/>
+          <p:cNvSpPr/>
+          <p:nvPr/>
+        </p:nvSpPr>
+        <p:spPr>
+          <a:xfrm>
+            <a:off x="10416048" y="4599013"/>
             <a:ext cx="180002" cy="180002"/>
           </a:xfrm>
           <a:prstGeom prst="rect">
@@ -7498,667 +8023,6 @@
           </a:p>
         </p:txBody>
       </p:sp>
-      <p:cxnSp>
-        <p:nvCxnSpPr>
-          <p:cNvPr id="120" name="Verbindingslijn: gebogen 119"/>
-          <p:cNvCxnSpPr>
-            <a:stCxn id="18" idx="2"/>
-            <a:endCxn id="84" idx="1"/>
-          </p:cNvCxnSpPr>
-          <p:nvPr/>
-        </p:nvCxnSpPr>
-        <p:spPr>
-          <a:xfrm rot="16200000" flipH="1">
-            <a:off x="3215992" y="2529012"/>
-            <a:ext cx="539988" cy="179972"/>
-          </a:xfrm>
-          <a:prstGeom prst="bentConnector2">
-            <a:avLst/>
-          </a:prstGeom>
-          <a:ln w="28575">
-            <a:tailEnd type="triangle"/>
-          </a:ln>
-        </p:spPr>
-        <p:style>
-          <a:lnRef idx="1">
-            <a:schemeClr val="accent1"/>
-          </a:lnRef>
-          <a:fillRef idx="0">
-            <a:schemeClr val="accent1"/>
-          </a:fillRef>
-          <a:effectRef idx="0">
-            <a:schemeClr val="accent1"/>
-          </a:effectRef>
-          <a:fontRef idx="minor">
-            <a:schemeClr val="tx1"/>
-          </a:fontRef>
-        </p:style>
-      </p:cxnSp>
-      <p:cxnSp>
-        <p:nvCxnSpPr>
-          <p:cNvPr id="121" name="Verbindingslijn: gebogen 120"/>
-          <p:cNvCxnSpPr>
-            <a:stCxn id="19" idx="2"/>
-            <a:endCxn id="118" idx="1"/>
-          </p:cNvCxnSpPr>
-          <p:nvPr/>
-        </p:nvCxnSpPr>
-        <p:spPr>
-          <a:xfrm rot="16200000" flipH="1">
-            <a:off x="4655998" y="2889006"/>
-            <a:ext cx="1259996" cy="179992"/>
-          </a:xfrm>
-          <a:prstGeom prst="bentConnector2">
-            <a:avLst/>
-          </a:prstGeom>
-          <a:ln w="28575">
-            <a:tailEnd type="triangle"/>
-          </a:ln>
-        </p:spPr>
-        <p:style>
-          <a:lnRef idx="1">
-            <a:schemeClr val="accent1"/>
-          </a:lnRef>
-          <a:fillRef idx="0">
-            <a:schemeClr val="accent1"/>
-          </a:fillRef>
-          <a:effectRef idx="0">
-            <a:schemeClr val="accent1"/>
-          </a:effectRef>
-          <a:fontRef idx="minor">
-            <a:schemeClr val="tx1"/>
-          </a:fontRef>
-        </p:style>
-      </p:cxnSp>
-      <p:cxnSp>
-        <p:nvCxnSpPr>
-          <p:cNvPr id="125" name="Rechte verbindingslijn met pijl 124"/>
-          <p:cNvCxnSpPr>
-            <a:stCxn id="118" idx="3"/>
-            <a:endCxn id="64" idx="1"/>
-          </p:cNvCxnSpPr>
-          <p:nvPr/>
-        </p:nvCxnSpPr>
-        <p:spPr>
-          <a:xfrm>
-            <a:off x="5555994" y="3609000"/>
-            <a:ext cx="180010" cy="0"/>
-          </a:xfrm>
-          <a:prstGeom prst="straightConnector1">
-            <a:avLst/>
-          </a:prstGeom>
-          <a:ln w="28575">
-            <a:tailEnd type="triangle"/>
-          </a:ln>
-        </p:spPr>
-        <p:style>
-          <a:lnRef idx="1">
-            <a:schemeClr val="accent1"/>
-          </a:lnRef>
-          <a:fillRef idx="0">
-            <a:schemeClr val="accent1"/>
-          </a:fillRef>
-          <a:effectRef idx="0">
-            <a:schemeClr val="accent1"/>
-          </a:effectRef>
-          <a:fontRef idx="minor">
-            <a:schemeClr val="tx1"/>
-          </a:fontRef>
-        </p:style>
-      </p:cxnSp>
-      <p:sp>
-        <p:nvSpPr>
-          <p:cNvPr id="113" name="Afgeronde rechthoek 65"/>
-          <p:cNvSpPr/>
-          <p:nvPr/>
-        </p:nvSpPr>
-        <p:spPr>
-          <a:xfrm>
-            <a:off x="5735996" y="4149006"/>
-            <a:ext cx="720000" cy="360004"/>
-          </a:xfrm>
-          <a:prstGeom prst="roundRect">
-            <a:avLst/>
-          </a:prstGeom>
-          <a:solidFill>
-            <a:schemeClr val="accent2">
-              <a:lumMod val="20000"/>
-              <a:lumOff val="80000"/>
-            </a:schemeClr>
-          </a:solidFill>
-          <a:ln w="28575"/>
-        </p:spPr>
-        <p:style>
-          <a:lnRef idx="2">
-            <a:schemeClr val="accent1"/>
-          </a:lnRef>
-          <a:fillRef idx="1">
-            <a:schemeClr val="lt1"/>
-          </a:fillRef>
-          <a:effectRef idx="0">
-            <a:schemeClr val="accent1"/>
-          </a:effectRef>
-          <a:fontRef idx="minor">
-            <a:schemeClr val="dk1"/>
-          </a:fontRef>
-        </p:style>
-        <p:txBody>
-          <a:bodyPr rtlCol="0" anchor="ctr"/>
-          <a:lstStyle/>
-          <a:p>
-            <a:pPr algn="ctr"/>
-            <a:r>
-              <a:rPr lang="nl-BE" sz="1000" dirty="0"/>
-              <a:t>Start</a:t>
-            </a:r>
-          </a:p>
-        </p:txBody>
-      </p:sp>
-      <p:sp>
-        <p:nvSpPr>
-          <p:cNvPr id="64" name="Afgeronde rechthoek 65"/>
-          <p:cNvSpPr/>
-          <p:nvPr/>
-        </p:nvSpPr>
-        <p:spPr>
-          <a:xfrm>
-            <a:off x="5736004" y="3428998"/>
-            <a:ext cx="720000" cy="360004"/>
-          </a:xfrm>
-          <a:prstGeom prst="roundRect">
-            <a:avLst/>
-          </a:prstGeom>
-          <a:solidFill>
-            <a:schemeClr val="accent2">
-              <a:lumMod val="20000"/>
-              <a:lumOff val="80000"/>
-            </a:schemeClr>
-          </a:solidFill>
-          <a:ln w="28575"/>
-        </p:spPr>
-        <p:style>
-          <a:lnRef idx="2">
-            <a:schemeClr val="accent1"/>
-          </a:lnRef>
-          <a:fillRef idx="1">
-            <a:schemeClr val="lt1"/>
-          </a:fillRef>
-          <a:effectRef idx="0">
-            <a:schemeClr val="accent1"/>
-          </a:effectRef>
-          <a:fontRef idx="minor">
-            <a:schemeClr val="dk1"/>
-          </a:fontRef>
-        </p:style>
-        <p:txBody>
-          <a:bodyPr rtlCol="0" anchor="ctr"/>
-          <a:lstStyle/>
-          <a:p>
-            <a:pPr algn="ctr"/>
-            <a:r>
-              <a:rPr lang="nl-BE" sz="1000" dirty="0"/>
-              <a:t>Start</a:t>
-            </a:r>
-          </a:p>
-        </p:txBody>
-      </p:sp>
-      <p:cxnSp>
-        <p:nvCxnSpPr>
-          <p:cNvPr id="133" name="Verbindingslijn: gebogen 132"/>
-          <p:cNvCxnSpPr>
-            <a:stCxn id="19" idx="2"/>
-            <a:endCxn id="134" idx="1"/>
-          </p:cNvCxnSpPr>
-          <p:nvPr/>
-        </p:nvCxnSpPr>
-        <p:spPr>
-          <a:xfrm rot="16200000" flipH="1">
-            <a:off x="4295994" y="3249010"/>
-            <a:ext cx="1980004" cy="179992"/>
-          </a:xfrm>
-          <a:prstGeom prst="bentConnector2">
-            <a:avLst/>
-          </a:prstGeom>
-          <a:ln w="28575">
-            <a:tailEnd type="triangle"/>
-          </a:ln>
-        </p:spPr>
-        <p:style>
-          <a:lnRef idx="1">
-            <a:schemeClr val="accent1"/>
-          </a:lnRef>
-          <a:fillRef idx="0">
-            <a:schemeClr val="accent1"/>
-          </a:fillRef>
-          <a:effectRef idx="0">
-            <a:schemeClr val="accent1"/>
-          </a:effectRef>
-          <a:fontRef idx="minor">
-            <a:schemeClr val="tx1"/>
-          </a:fontRef>
-        </p:style>
-      </p:cxnSp>
-      <p:sp>
-        <p:nvSpPr>
-          <p:cNvPr id="134" name="Rechthoek 133"/>
-          <p:cNvSpPr/>
-          <p:nvPr/>
-        </p:nvSpPr>
-        <p:spPr>
-          <a:xfrm>
-            <a:off x="5375992" y="4239007"/>
-            <a:ext cx="180002" cy="180002"/>
-          </a:xfrm>
-          <a:prstGeom prst="rect">
-            <a:avLst/>
-          </a:prstGeom>
-          <a:solidFill>
-            <a:schemeClr val="accent1"/>
-          </a:solidFill>
-          <a:ln w="28575">
-            <a:solidFill>
-              <a:schemeClr val="accent1"/>
-            </a:solidFill>
-          </a:ln>
-        </p:spPr>
-        <p:style>
-          <a:lnRef idx="2">
-            <a:schemeClr val="accent1"/>
-          </a:lnRef>
-          <a:fillRef idx="1">
-            <a:schemeClr val="lt1"/>
-          </a:fillRef>
-          <a:effectRef idx="0">
-            <a:schemeClr val="accent1"/>
-          </a:effectRef>
-          <a:fontRef idx="minor">
-            <a:schemeClr val="dk1"/>
-          </a:fontRef>
-        </p:style>
-        <p:txBody>
-          <a:bodyPr rtlCol="0" anchor="ctr"/>
-          <a:lstStyle/>
-          <a:p>
-            <a:pPr algn="ctr"/>
-            <a:endParaRPr lang="nl-BE"/>
-          </a:p>
-        </p:txBody>
-      </p:sp>
-      <p:cxnSp>
-        <p:nvCxnSpPr>
-          <p:cNvPr id="137" name="Rechte verbindingslijn met pijl 136"/>
-          <p:cNvCxnSpPr>
-            <a:stCxn id="134" idx="3"/>
-            <a:endCxn id="113" idx="1"/>
-          </p:cNvCxnSpPr>
-          <p:nvPr/>
-        </p:nvCxnSpPr>
-        <p:spPr>
-          <a:xfrm>
-            <a:off x="5555994" y="4329008"/>
-            <a:ext cx="180002" cy="0"/>
-          </a:xfrm>
-          <a:prstGeom prst="straightConnector1">
-            <a:avLst/>
-          </a:prstGeom>
-          <a:ln w="28575">
-            <a:tailEnd type="triangle"/>
-          </a:ln>
-        </p:spPr>
-        <p:style>
-          <a:lnRef idx="1">
-            <a:schemeClr val="accent1"/>
-          </a:lnRef>
-          <a:fillRef idx="0">
-            <a:schemeClr val="accent1"/>
-          </a:fillRef>
-          <a:effectRef idx="0">
-            <a:schemeClr val="accent1"/>
-          </a:effectRef>
-          <a:fontRef idx="minor">
-            <a:schemeClr val="tx1"/>
-          </a:fontRef>
-        </p:style>
-      </p:cxnSp>
-      <p:sp>
-        <p:nvSpPr>
-          <p:cNvPr id="140" name="Rechthoek 139"/>
-          <p:cNvSpPr/>
-          <p:nvPr/>
-        </p:nvSpPr>
-        <p:spPr>
-          <a:xfrm>
-            <a:off x="155934" y="4869018"/>
-            <a:ext cx="1080000" cy="360000"/>
-          </a:xfrm>
-          <a:prstGeom prst="rect">
-            <a:avLst/>
-          </a:prstGeom>
-          <a:solidFill>
-            <a:schemeClr val="accent2">
-              <a:lumMod val="20000"/>
-              <a:lumOff val="80000"/>
-            </a:schemeClr>
-          </a:solidFill>
-          <a:ln w="28575"/>
-        </p:spPr>
-        <p:style>
-          <a:lnRef idx="2">
-            <a:schemeClr val="accent1"/>
-          </a:lnRef>
-          <a:fillRef idx="1">
-            <a:schemeClr val="lt1"/>
-          </a:fillRef>
-          <a:effectRef idx="0">
-            <a:schemeClr val="accent1"/>
-          </a:effectRef>
-          <a:fontRef idx="minor">
-            <a:schemeClr val="dk1"/>
-          </a:fontRef>
-        </p:style>
-        <p:txBody>
-          <a:bodyPr rtlCol="0" anchor="ctr"/>
-          <a:lstStyle/>
-          <a:p>
-            <a:pPr algn="ctr"/>
-            <a:r>
-              <a:rPr lang="nl-BE" sz="1000" dirty="0"/>
-              <a:t>SMOKE_</a:t>
-            </a:r>
-          </a:p>
-          <a:p>
-            <a:pPr algn="ctr"/>
-            <a:r>
-              <a:rPr lang="nl-BE" sz="1000" dirty="0"/>
-              <a:t>TARGETS</a:t>
-            </a:r>
-          </a:p>
-        </p:txBody>
-      </p:sp>
-      <p:sp>
-        <p:nvSpPr>
-          <p:cNvPr id="141" name="Afgeronde rechthoek 65"/>
-          <p:cNvSpPr/>
-          <p:nvPr/>
-        </p:nvSpPr>
-        <p:spPr>
-          <a:xfrm>
-            <a:off x="5735996" y="4869014"/>
-            <a:ext cx="720000" cy="360004"/>
-          </a:xfrm>
-          <a:prstGeom prst="roundRect">
-            <a:avLst/>
-          </a:prstGeom>
-          <a:solidFill>
-            <a:schemeClr val="accent2">
-              <a:lumMod val="20000"/>
-              <a:lumOff val="80000"/>
-            </a:schemeClr>
-          </a:solidFill>
-          <a:ln w="28575"/>
-        </p:spPr>
-        <p:style>
-          <a:lnRef idx="2">
-            <a:schemeClr val="accent1"/>
-          </a:lnRef>
-          <a:fillRef idx="1">
-            <a:schemeClr val="lt1"/>
-          </a:fillRef>
-          <a:effectRef idx="0">
-            <a:schemeClr val="accent1"/>
-          </a:effectRef>
-          <a:fontRef idx="minor">
-            <a:schemeClr val="dk1"/>
-          </a:fontRef>
-        </p:style>
-        <p:txBody>
-          <a:bodyPr rtlCol="0" anchor="ctr"/>
-          <a:lstStyle/>
-          <a:p>
-            <a:pPr algn="ctr"/>
-            <a:r>
-              <a:rPr lang="nl-BE" sz="1000" dirty="0"/>
-              <a:t>Start</a:t>
-            </a:r>
-          </a:p>
-        </p:txBody>
-      </p:sp>
-      <p:sp>
-        <p:nvSpPr>
-          <p:cNvPr id="142" name="Rechthoek 141"/>
-          <p:cNvSpPr/>
-          <p:nvPr/>
-        </p:nvSpPr>
-        <p:spPr>
-          <a:xfrm>
-            <a:off x="5375992" y="4959015"/>
-            <a:ext cx="180002" cy="180002"/>
-          </a:xfrm>
-          <a:prstGeom prst="rect">
-            <a:avLst/>
-          </a:prstGeom>
-          <a:solidFill>
-            <a:schemeClr val="accent1"/>
-          </a:solidFill>
-          <a:ln w="28575">
-            <a:solidFill>
-              <a:schemeClr val="accent1"/>
-            </a:solidFill>
-          </a:ln>
-        </p:spPr>
-        <p:style>
-          <a:lnRef idx="2">
-            <a:schemeClr val="accent1"/>
-          </a:lnRef>
-          <a:fillRef idx="1">
-            <a:schemeClr val="lt1"/>
-          </a:fillRef>
-          <a:effectRef idx="0">
-            <a:schemeClr val="accent1"/>
-          </a:effectRef>
-          <a:fontRef idx="minor">
-            <a:schemeClr val="dk1"/>
-          </a:fontRef>
-        </p:style>
-        <p:txBody>
-          <a:bodyPr rtlCol="0" anchor="ctr"/>
-          <a:lstStyle/>
-          <a:p>
-            <a:pPr algn="ctr"/>
-            <a:endParaRPr lang="nl-BE"/>
-          </a:p>
-        </p:txBody>
-      </p:sp>
-      <p:cxnSp>
-        <p:nvCxnSpPr>
-          <p:cNvPr id="143" name="Rechte verbindingslijn met pijl 142"/>
-          <p:cNvCxnSpPr>
-            <a:stCxn id="142" idx="3"/>
-            <a:endCxn id="141" idx="1"/>
-          </p:cNvCxnSpPr>
-          <p:nvPr/>
-        </p:nvCxnSpPr>
-        <p:spPr>
-          <a:xfrm>
-            <a:off x="5555994" y="5049016"/>
-            <a:ext cx="180002" cy="0"/>
-          </a:xfrm>
-          <a:prstGeom prst="straightConnector1">
-            <a:avLst/>
-          </a:prstGeom>
-          <a:ln w="28575">
-            <a:tailEnd type="triangle"/>
-          </a:ln>
-        </p:spPr>
-        <p:style>
-          <a:lnRef idx="1">
-            <a:schemeClr val="accent1"/>
-          </a:lnRef>
-          <a:fillRef idx="0">
-            <a:schemeClr val="accent1"/>
-          </a:fillRef>
-          <a:effectRef idx="0">
-            <a:schemeClr val="accent1"/>
-          </a:effectRef>
-          <a:fontRef idx="minor">
-            <a:schemeClr val="tx1"/>
-          </a:fontRef>
-        </p:style>
-      </p:cxnSp>
-      <p:cxnSp>
-        <p:nvCxnSpPr>
-          <p:cNvPr id="145" name="Verbindingslijn: gebogen 144"/>
-          <p:cNvCxnSpPr>
-            <a:stCxn id="19" idx="2"/>
-            <a:endCxn id="142" idx="1"/>
-          </p:cNvCxnSpPr>
-          <p:nvPr/>
-        </p:nvCxnSpPr>
-        <p:spPr>
-          <a:xfrm rot="16200000" flipH="1">
-            <a:off x="3935990" y="3609014"/>
-            <a:ext cx="2700012" cy="179992"/>
-          </a:xfrm>
-          <a:prstGeom prst="bentConnector2">
-            <a:avLst/>
-          </a:prstGeom>
-          <a:ln w="28575">
-            <a:tailEnd type="triangle"/>
-          </a:ln>
-        </p:spPr>
-        <p:style>
-          <a:lnRef idx="1">
-            <a:schemeClr val="accent1"/>
-          </a:lnRef>
-          <a:fillRef idx="0">
-            <a:schemeClr val="accent1"/>
-          </a:fillRef>
-          <a:effectRef idx="0">
-            <a:schemeClr val="accent1"/>
-          </a:effectRef>
-          <a:fontRef idx="minor">
-            <a:schemeClr val="tx1"/>
-          </a:fontRef>
-        </p:style>
-      </p:cxnSp>
-      <p:sp>
-        <p:nvSpPr>
-          <p:cNvPr id="153" name="Rechthoek 152"/>
-          <p:cNvSpPr/>
-          <p:nvPr/>
-        </p:nvSpPr>
-        <p:spPr>
-          <a:xfrm>
-            <a:off x="6636006" y="4239007"/>
-            <a:ext cx="180002" cy="180002"/>
-          </a:xfrm>
-          <a:prstGeom prst="rect">
-            <a:avLst/>
-          </a:prstGeom>
-          <a:solidFill>
-            <a:schemeClr val="accent1"/>
-          </a:solidFill>
-          <a:ln w="28575">
-            <a:solidFill>
-              <a:schemeClr val="accent1"/>
-            </a:solidFill>
-          </a:ln>
-        </p:spPr>
-        <p:style>
-          <a:lnRef idx="2">
-            <a:schemeClr val="accent1"/>
-          </a:lnRef>
-          <a:fillRef idx="1">
-            <a:schemeClr val="lt1"/>
-          </a:fillRef>
-          <a:effectRef idx="0">
-            <a:schemeClr val="accent1"/>
-          </a:effectRef>
-          <a:fontRef idx="minor">
-            <a:schemeClr val="dk1"/>
-          </a:fontRef>
-        </p:style>
-        <p:txBody>
-          <a:bodyPr rtlCol="0" anchor="ctr"/>
-          <a:lstStyle/>
-          <a:p>
-            <a:pPr algn="ctr"/>
-            <a:endParaRPr lang="nl-BE"/>
-          </a:p>
-        </p:txBody>
-      </p:sp>
-      <p:cxnSp>
-        <p:nvCxnSpPr>
-          <p:cNvPr id="154" name="Rechte verbindingslijn met pijl 153"/>
-          <p:cNvCxnSpPr>
-            <a:stCxn id="113" idx="3"/>
-            <a:endCxn id="153" idx="1"/>
-          </p:cNvCxnSpPr>
-          <p:nvPr/>
-        </p:nvCxnSpPr>
-        <p:spPr>
-          <a:xfrm>
-            <a:off x="6455996" y="4329008"/>
-            <a:ext cx="180010" cy="0"/>
-          </a:xfrm>
-          <a:prstGeom prst="straightConnector1">
-            <a:avLst/>
-          </a:prstGeom>
-          <a:ln w="28575">
-            <a:tailEnd type="triangle"/>
-          </a:ln>
-        </p:spPr>
-        <p:style>
-          <a:lnRef idx="1">
-            <a:schemeClr val="accent1"/>
-          </a:lnRef>
-          <a:fillRef idx="0">
-            <a:schemeClr val="accent1"/>
-          </a:fillRef>
-          <a:effectRef idx="0">
-            <a:schemeClr val="accent1"/>
-          </a:effectRef>
-          <a:fontRef idx="minor">
-            <a:schemeClr val="tx1"/>
-          </a:fontRef>
-        </p:style>
-      </p:cxnSp>
-      <p:cxnSp>
-        <p:nvCxnSpPr>
-          <p:cNvPr id="157" name="Verbindingslijn: gebogen 156"/>
-          <p:cNvCxnSpPr>
-            <a:stCxn id="153" idx="3"/>
-            <a:endCxn id="21" idx="2"/>
-          </p:cNvCxnSpPr>
-          <p:nvPr/>
-        </p:nvCxnSpPr>
-        <p:spPr>
-          <a:xfrm flipV="1">
-            <a:off x="6816008" y="2349004"/>
-            <a:ext cx="180002" cy="1980004"/>
-          </a:xfrm>
-          <a:prstGeom prst="bentConnector2">
-            <a:avLst/>
-          </a:prstGeom>
-          <a:ln w="28575">
-            <a:tailEnd type="triangle"/>
-          </a:ln>
-        </p:spPr>
-        <p:style>
-          <a:lnRef idx="1">
-            <a:schemeClr val="accent1"/>
-          </a:lnRef>
-          <a:fillRef idx="0">
-            <a:schemeClr val="accent1"/>
-          </a:fillRef>
-          <a:effectRef idx="0">
-            <a:schemeClr val="accent1"/>
-          </a:effectRef>
-          <a:fontRef idx="minor">
-            <a:schemeClr val="tx1"/>
-          </a:fontRef>
-        </p:style>
-      </p:cxnSp>
     </p:spTree>
     <p:extLst>
       <p:ext uri="{BB962C8B-B14F-4D97-AF65-F5344CB8AC3E}">

</xml_diff>